<commit_message>
Corrections, additions and reorganization of slide deck
</commit_message>
<xml_diff>
--- a/LectureSlides/10b_ModelsFor OutliersAndOverdispersion.pptx
+++ b/LectureSlides/10b_ModelsFor OutliersAndOverdispersion.pptx
@@ -5,7 +5,7 @@
     <p:sldMasterId id="2147483648" r:id="rId1"/>
   </p:sldMasterIdLst>
   <p:notesMasterIdLst>
-    <p:notesMasterId r:id="rId44"/>
+    <p:notesMasterId r:id="rId43"/>
   </p:notesMasterIdLst>
   <p:sldIdLst>
     <p:sldId id="337" r:id="rId2"/>
@@ -36,20 +36,19 @@
     <p:sldId id="321" r:id="rId27"/>
     <p:sldId id="364" r:id="rId28"/>
     <p:sldId id="365" r:id="rId29"/>
-    <p:sldId id="363" r:id="rId30"/>
-    <p:sldId id="323" r:id="rId31"/>
-    <p:sldId id="324" r:id="rId32"/>
-    <p:sldId id="326" r:id="rId33"/>
-    <p:sldId id="327" r:id="rId34"/>
-    <p:sldId id="328" r:id="rId35"/>
-    <p:sldId id="329" r:id="rId36"/>
-    <p:sldId id="330" r:id="rId37"/>
-    <p:sldId id="331" r:id="rId38"/>
-    <p:sldId id="332" r:id="rId39"/>
-    <p:sldId id="333" r:id="rId40"/>
-    <p:sldId id="334" r:id="rId41"/>
-    <p:sldId id="335" r:id="rId42"/>
-    <p:sldId id="336" r:id="rId43"/>
+    <p:sldId id="323" r:id="rId30"/>
+    <p:sldId id="324" r:id="rId31"/>
+    <p:sldId id="326" r:id="rId32"/>
+    <p:sldId id="327" r:id="rId33"/>
+    <p:sldId id="328" r:id="rId34"/>
+    <p:sldId id="329" r:id="rId35"/>
+    <p:sldId id="330" r:id="rId36"/>
+    <p:sldId id="331" r:id="rId37"/>
+    <p:sldId id="332" r:id="rId38"/>
+    <p:sldId id="333" r:id="rId39"/>
+    <p:sldId id="334" r:id="rId40"/>
+    <p:sldId id="335" r:id="rId41"/>
+    <p:sldId id="336" r:id="rId42"/>
   </p:sldIdLst>
   <p:sldSz cx="9144000" cy="5143500" type="screen16x9"/>
   <p:notesSz cx="6858000" cy="9144000"/>
@@ -249,7 +248,7 @@
           <a:p>
             <a:fld id="{B45A0028-71D2-4800-AD8E-38BD1BCDF688}" type="datetimeFigureOut">
               <a:rPr lang="en-US" smtClean="0"/>
-              <a:t>10/12/2024</a:t>
+              <a:t>10/19/2024</a:t>
             </a:fld>
             <a:endParaRPr lang="en-US"/>
           </a:p>
@@ -695,7 +694,7 @@
           <a:p>
             <a:fld id="{241EB5C9-1307-BA42-ABA2-0BC069CD8E7F}" type="datetimeFigureOut">
               <a:rPr lang="en-US" smtClean="0"/>
-              <a:t>10/12/2024</a:t>
+              <a:t>10/19/2024</a:t>
             </a:fld>
             <a:endParaRPr lang="en-US"/>
           </a:p>
@@ -863,7 +862,7 @@
           <a:p>
             <a:fld id="{241EB5C9-1307-BA42-ABA2-0BC069CD8E7F}" type="datetimeFigureOut">
               <a:rPr lang="en-US" smtClean="0"/>
-              <a:t>10/12/2024</a:t>
+              <a:t>10/19/2024</a:t>
             </a:fld>
             <a:endParaRPr lang="en-US"/>
           </a:p>
@@ -1041,7 +1040,7 @@
           <a:p>
             <a:fld id="{241EB5C9-1307-BA42-ABA2-0BC069CD8E7F}" type="datetimeFigureOut">
               <a:rPr lang="en-US" smtClean="0"/>
-              <a:t>10/12/2024</a:t>
+              <a:t>10/19/2024</a:t>
             </a:fld>
             <a:endParaRPr lang="en-US"/>
           </a:p>
@@ -1209,7 +1208,7 @@
           <a:p>
             <a:fld id="{241EB5C9-1307-BA42-ABA2-0BC069CD8E7F}" type="datetimeFigureOut">
               <a:rPr lang="en-US" smtClean="0"/>
-              <a:t>10/12/2024</a:t>
+              <a:t>10/19/2024</a:t>
             </a:fld>
             <a:endParaRPr lang="en-US"/>
           </a:p>
@@ -1454,7 +1453,7 @@
           <a:p>
             <a:fld id="{241EB5C9-1307-BA42-ABA2-0BC069CD8E7F}" type="datetimeFigureOut">
               <a:rPr lang="en-US" smtClean="0"/>
-              <a:t>10/12/2024</a:t>
+              <a:t>10/19/2024</a:t>
             </a:fld>
             <a:endParaRPr lang="en-US"/>
           </a:p>
@@ -1739,7 +1738,7 @@
           <a:p>
             <a:fld id="{241EB5C9-1307-BA42-ABA2-0BC069CD8E7F}" type="datetimeFigureOut">
               <a:rPr lang="en-US" smtClean="0"/>
-              <a:t>10/12/2024</a:t>
+              <a:t>10/19/2024</a:t>
             </a:fld>
             <a:endParaRPr lang="en-US"/>
           </a:p>
@@ -2158,7 +2157,7 @@
           <a:p>
             <a:fld id="{241EB5C9-1307-BA42-ABA2-0BC069CD8E7F}" type="datetimeFigureOut">
               <a:rPr lang="en-US" smtClean="0"/>
-              <a:t>10/12/2024</a:t>
+              <a:t>10/19/2024</a:t>
             </a:fld>
             <a:endParaRPr lang="en-US"/>
           </a:p>
@@ -2275,7 +2274,7 @@
           <a:p>
             <a:fld id="{241EB5C9-1307-BA42-ABA2-0BC069CD8E7F}" type="datetimeFigureOut">
               <a:rPr lang="en-US" smtClean="0"/>
-              <a:t>10/12/2024</a:t>
+              <a:t>10/19/2024</a:t>
             </a:fld>
             <a:endParaRPr lang="en-US"/>
           </a:p>
@@ -2370,7 +2369,7 @@
           <a:p>
             <a:fld id="{241EB5C9-1307-BA42-ABA2-0BC069CD8E7F}" type="datetimeFigureOut">
               <a:rPr lang="en-US" smtClean="0"/>
-              <a:t>10/12/2024</a:t>
+              <a:t>10/19/2024</a:t>
             </a:fld>
             <a:endParaRPr lang="en-US"/>
           </a:p>
@@ -2645,7 +2644,7 @@
           <a:p>
             <a:fld id="{241EB5C9-1307-BA42-ABA2-0BC069CD8E7F}" type="datetimeFigureOut">
               <a:rPr lang="en-US" smtClean="0"/>
-              <a:t>10/12/2024</a:t>
+              <a:t>10/19/2024</a:t>
             </a:fld>
             <a:endParaRPr lang="en-US"/>
           </a:p>
@@ -2897,7 +2896,7 @@
           <a:p>
             <a:fld id="{241EB5C9-1307-BA42-ABA2-0BC069CD8E7F}" type="datetimeFigureOut">
               <a:rPr lang="en-US" smtClean="0"/>
-              <a:t>10/12/2024</a:t>
+              <a:t>10/19/2024</a:t>
             </a:fld>
             <a:endParaRPr lang="en-US"/>
           </a:p>
@@ -3108,7 +3107,7 @@
           <a:p>
             <a:fld id="{241EB5C9-1307-BA42-ABA2-0BC069CD8E7F}" type="datetimeFigureOut">
               <a:rPr lang="en-US" smtClean="0"/>
-              <a:t>10/12/2024</a:t>
+              <a:t>10/19/2024</a:t>
             </a:fld>
             <a:endParaRPr lang="en-US"/>
           </a:p>
@@ -4359,8 +4358,8 @@
           </a:p>
         </p:txBody>
       </p:sp>
-      <mc:AlternateContent xmlns:mc="http://schemas.openxmlformats.org/markup-compatibility/2006">
-        <mc:Choice xmlns:a14="http://schemas.microsoft.com/office/drawing/2010/main" Requires="a14">
+      <mc:AlternateContent xmlns:mc="http://schemas.openxmlformats.org/markup-compatibility/2006" xmlns:a14="http://schemas.microsoft.com/office/drawing/2010/main">
+        <mc:Choice Requires="a14">
           <p:sp>
             <p:nvSpPr>
               <p:cNvPr id="3" name="Content Placeholder 2">
@@ -4517,7 +4516,7 @@
             </p:txBody>
           </p:sp>
         </mc:Choice>
-        <mc:Fallback>
+        <mc:Fallback xmlns="">
           <p:sp>
             <p:nvSpPr>
               <p:cNvPr id="3" name="Content Placeholder 2">
@@ -4987,8 +4986,8 @@
           </a:p>
         </p:txBody>
       </p:sp>
-      <mc:AlternateContent xmlns:mc="http://schemas.openxmlformats.org/markup-compatibility/2006">
-        <mc:Choice xmlns:a14="http://schemas.microsoft.com/office/drawing/2010/main" Requires="a14">
+      <mc:AlternateContent xmlns:mc="http://schemas.openxmlformats.org/markup-compatibility/2006" xmlns:a14="http://schemas.microsoft.com/office/drawing/2010/main">
+        <mc:Choice Requires="a14">
           <p:sp>
             <p:nvSpPr>
               <p:cNvPr id="3" name="Content Placeholder 2">
@@ -5546,7 +5545,7 @@
             </p:txBody>
           </p:sp>
         </mc:Choice>
-        <mc:Fallback>
+        <mc:Fallback xmlns="">
           <p:sp>
             <p:nvSpPr>
               <p:cNvPr id="3" name="Content Placeholder 2">
@@ -5816,8 +5815,8 @@
           </a:p>
         </p:txBody>
       </p:sp>
-      <mc:AlternateContent xmlns:mc="http://schemas.openxmlformats.org/markup-compatibility/2006">
-        <mc:Choice xmlns:a14="http://schemas.microsoft.com/office/drawing/2010/main" Requires="a14">
+      <mc:AlternateContent xmlns:mc="http://schemas.openxmlformats.org/markup-compatibility/2006" xmlns:a14="http://schemas.microsoft.com/office/drawing/2010/main">
+        <mc:Choice Requires="a14">
           <p:sp>
             <p:nvSpPr>
               <p:cNvPr id="3" name="Content Placeholder 2">
@@ -6025,7 +6024,13 @@
                                   <a:rPr lang="en-US" b="0" i="1" smtClean="0">
                                     <a:latin typeface="Cambria Math" panose="02040503050406030204" pitchFamily="18" charset="0"/>
                                   </a:rPr>
-                                  <m:t>−1</m:t>
+                                  <m:t>−</m:t>
+                                </m:r>
+                                <m:r>
+                                  <a:rPr lang="en-US" b="0" i="1" smtClean="0">
+                                    <a:latin typeface="Cambria Math" panose="02040503050406030204" pitchFamily="18" charset="0"/>
+                                  </a:rPr>
+                                  <m:t>1</m:t>
                                 </m:r>
                               </m:e>
                             </m:mr>
@@ -6041,7 +6046,13 @@
                                   <a:rPr lang="en-US" b="0" i="1" smtClean="0">
                                     <a:latin typeface="Cambria Math" panose="02040503050406030204" pitchFamily="18" charset="0"/>
                                   </a:rPr>
-                                  <m:t>−1</m:t>
+                                  <m:t>−</m:t>
+                                </m:r>
+                                <m:r>
+                                  <a:rPr lang="en-US" b="0" i="1" smtClean="0">
+                                    <a:latin typeface="Cambria Math" panose="02040503050406030204" pitchFamily="18" charset="0"/>
+                                  </a:rPr>
+                                  <m:t>1</m:t>
                                 </m:r>
                               </m:e>
                             </m:mr>
@@ -6095,7 +6106,13 @@
                                 <a:rPr lang="en-US" b="0" i="1" smtClean="0">
                                   <a:latin typeface="Cambria Math" panose="02040503050406030204" pitchFamily="18" charset="0"/>
                                 </a:rPr>
-                                <m:t>1−</m:t>
+                                <m:t>1</m:t>
+                              </m:r>
+                              <m:r>
+                                <a:rPr lang="en-US" b="0" i="1" smtClean="0">
+                                  <a:latin typeface="Cambria Math" panose="02040503050406030204" pitchFamily="18" charset="0"/>
+                                </a:rPr>
+                                <m:t>−</m:t>
                               </m:r>
                               <m:r>
                                 <a:rPr lang="en-US" b="0" i="1" smtClean="0">
@@ -6359,7 +6376,7 @@
             </p:txBody>
           </p:sp>
         </mc:Choice>
-        <mc:Fallback>
+        <mc:Fallback xmlns="">
           <p:sp>
             <p:nvSpPr>
               <p:cNvPr id="3" name="Content Placeholder 2">
@@ -6471,8 +6488,8 @@
           </a:p>
         </p:txBody>
       </p:sp>
-      <mc:AlternateContent xmlns:mc="http://schemas.openxmlformats.org/markup-compatibility/2006">
-        <mc:Choice xmlns:a14="http://schemas.microsoft.com/office/drawing/2010/main" Requires="a14">
+      <mc:AlternateContent xmlns:mc="http://schemas.openxmlformats.org/markup-compatibility/2006" xmlns:a14="http://schemas.microsoft.com/office/drawing/2010/main">
+        <mc:Choice Requires="a14">
           <p:sp>
             <p:nvSpPr>
               <p:cNvPr id="3" name="Content Placeholder 2">
@@ -7142,7 +7159,7 @@
             </p:txBody>
           </p:sp>
         </mc:Choice>
-        <mc:Fallback>
+        <mc:Fallback xmlns="">
           <p:sp>
             <p:nvSpPr>
               <p:cNvPr id="3" name="Content Placeholder 2">
@@ -7449,8 +7466,8 @@
           </a:p>
         </p:txBody>
       </p:sp>
-      <mc:AlternateContent xmlns:mc="http://schemas.openxmlformats.org/markup-compatibility/2006">
-        <mc:Choice xmlns:a14="http://schemas.microsoft.com/office/drawing/2010/main" Requires="a14">
+      <mc:AlternateContent xmlns:mc="http://schemas.openxmlformats.org/markup-compatibility/2006" xmlns:a14="http://schemas.microsoft.com/office/drawing/2010/main">
+        <mc:Choice Requires="a14">
           <p:sp>
             <p:nvSpPr>
               <p:cNvPr id="3" name="Content Placeholder 2">
@@ -8021,14 +8038,7 @@
                         <a:latin typeface="Cambria Math" panose="02040503050406030204" pitchFamily="18" charset="0"/>
                         <a:ea typeface="Cambria Math" panose="02040503050406030204" pitchFamily="18" charset="0"/>
                       </a:rPr>
-                      <m:t>=</m:t>
-                    </m:r>
-                    <m:r>
-                      <a:rPr lang="en-US" b="0" i="0" smtClean="0">
-                        <a:latin typeface="Cambria Math" panose="02040503050406030204" pitchFamily="18" charset="0"/>
-                        <a:ea typeface="Cambria Math" panose="02040503050406030204" pitchFamily="18" charset="0"/>
-                      </a:rPr>
-                      <m:t>0</m:t>
+                      <m:t>=0</m:t>
                     </m:r>
                   </m:oMath>
                 </a14:m>
@@ -8047,7 +8057,7 @@
             </p:txBody>
           </p:sp>
         </mc:Choice>
-        <mc:Fallback>
+        <mc:Fallback xmlns="">
           <p:sp>
             <p:nvSpPr>
               <p:cNvPr id="3" name="Content Placeholder 2">
@@ -8319,8 +8329,8 @@
           </a:p>
         </p:txBody>
       </p:sp>
-      <mc:AlternateContent xmlns:mc="http://schemas.openxmlformats.org/markup-compatibility/2006">
-        <mc:Choice xmlns:a14="http://schemas.microsoft.com/office/drawing/2010/main" Requires="a14">
+      <mc:AlternateContent xmlns:mc="http://schemas.openxmlformats.org/markup-compatibility/2006" xmlns:a14="http://schemas.microsoft.com/office/drawing/2010/main">
+        <mc:Choice Requires="a14">
           <p:sp>
             <p:nvSpPr>
               <p:cNvPr id="3" name="Content Placeholder 2">
@@ -8862,7 +8872,7 @@
             </p:txBody>
           </p:sp>
         </mc:Choice>
-        <mc:Fallback>
+        <mc:Fallback xmlns="">
           <p:sp>
             <p:nvSpPr>
               <p:cNvPr id="3" name="Content Placeholder 2">
@@ -10446,8 +10456,8 @@
           </a:p>
         </p:txBody>
       </p:sp>
-      <mc:AlternateContent xmlns:mc="http://schemas.openxmlformats.org/markup-compatibility/2006">
-        <mc:Choice xmlns:a14="http://schemas.microsoft.com/office/drawing/2010/main" Requires="a14">
+      <mc:AlternateContent xmlns:mc="http://schemas.openxmlformats.org/markup-compatibility/2006" xmlns:a14="http://schemas.microsoft.com/office/drawing/2010/main">
+        <mc:Choice Requires="a14">
           <p:sp>
             <p:nvSpPr>
               <p:cNvPr id="4" name="Text Placeholder 3">
@@ -10588,7 +10598,7 @@
             </p:txBody>
           </p:sp>
         </mc:Choice>
-        <mc:Fallback>
+        <mc:Fallback xmlns="">
           <p:sp>
             <p:nvSpPr>
               <p:cNvPr id="4" name="Text Placeholder 3">
@@ -10845,407 +10855,6 @@
   <p:cSld>
     <p:spTree>
       <p:nvGrpSpPr>
-        <p:cNvPr id="1" name="">
-          <a:extLst>
-            <a:ext uri="{FF2B5EF4-FFF2-40B4-BE49-F238E27FC236}">
-              <a16:creationId xmlns:a16="http://schemas.microsoft.com/office/drawing/2014/main" id="{C7BA57E5-E9F7-8861-8A2A-655AFF5AC2A0}"/>
-            </a:ext>
-          </a:extLst>
-        </p:cNvPr>
-        <p:cNvGrpSpPr/>
-        <p:nvPr/>
-      </p:nvGrpSpPr>
-      <p:grpSpPr>
-        <a:xfrm>
-          <a:off x="0" y="0"/>
-          <a:ext cx="0" cy="0"/>
-          <a:chOff x="0" y="0"/>
-          <a:chExt cx="0" cy="0"/>
-        </a:xfrm>
-      </p:grpSpPr>
-      <p:sp>
-        <p:nvSpPr>
-          <p:cNvPr id="2" name="Title 1">
-            <a:extLst>
-              <a:ext uri="{FF2B5EF4-FFF2-40B4-BE49-F238E27FC236}">
-                <a16:creationId xmlns:a16="http://schemas.microsoft.com/office/drawing/2014/main" id="{CCFFFC98-40C8-5C89-16B2-244DB4617AAA}"/>
-              </a:ext>
-            </a:extLst>
-          </p:cNvPr>
-          <p:cNvSpPr>
-            <a:spLocks noGrp="1"/>
-          </p:cNvSpPr>
-          <p:nvPr>
-            <p:ph type="title"/>
-          </p:nvPr>
-        </p:nvSpPr>
-        <p:spPr>
-          <a:xfrm>
-            <a:off x="457201" y="204787"/>
-            <a:ext cx="8195055" cy="660845"/>
-          </a:xfrm>
-        </p:spPr>
-        <p:txBody>
-          <a:bodyPr>
-            <a:normAutofit/>
-          </a:bodyPr>
-          <a:lstStyle/>
-          <a:p>
-            <a:pPr marL="0" lvl="0" indent="0" algn="ctr">
-              <a:buNone/>
-            </a:pPr>
-            <a:r>
-              <a:rPr sz="3200" dirty="0"/>
-              <a:t>Dealing With Outliers</a:t>
-            </a:r>
-          </a:p>
-        </p:txBody>
-      </p:sp>
-      <p:sp>
-        <p:nvSpPr>
-          <p:cNvPr id="4" name="Text Placeholder 3">
-            <a:extLst>
-              <a:ext uri="{FF2B5EF4-FFF2-40B4-BE49-F238E27FC236}">
-                <a16:creationId xmlns:a16="http://schemas.microsoft.com/office/drawing/2014/main" id="{4B5E7846-251A-C63B-C80E-875E12536120}"/>
-              </a:ext>
-            </a:extLst>
-          </p:cNvPr>
-          <p:cNvSpPr>
-            <a:spLocks noGrp="1"/>
-          </p:cNvSpPr>
-          <p:nvPr>
-            <p:ph type="body" sz="half" idx="2"/>
-          </p:nvPr>
-        </p:nvSpPr>
-        <p:spPr>
-          <a:xfrm>
-            <a:off x="457201" y="1076326"/>
-            <a:ext cx="4561839" cy="3518297"/>
-          </a:xfrm>
-        </p:spPr>
-        <p:txBody>
-          <a:bodyPr>
-            <a:normAutofit/>
-          </a:bodyPr>
-          <a:lstStyle/>
-          <a:p>
-            <a:pPr marL="0" lvl="0" indent="0">
-              <a:buNone/>
-            </a:pPr>
-            <a:r>
-              <a:rPr sz="1800" dirty="0"/>
-              <a:t>Example: </a:t>
-            </a:r>
-            <a:r>
-              <a:rPr lang="en-US" sz="1800" dirty="0"/>
-              <a:t>OLS regression with and without a single outlier</a:t>
-            </a:r>
-          </a:p>
-          <a:p>
-            <a:pPr marL="285750" lvl="0" indent="-285750">
-              <a:buFont typeface="Arial" panose="020B0604020202020204" pitchFamily="34" charset="0"/>
-              <a:buChar char="•"/>
-            </a:pPr>
-            <a:r>
-              <a:rPr lang="en-US" sz="1800" dirty="0"/>
-              <a:t>Regression without the outlier represents the </a:t>
-            </a:r>
-          </a:p>
-          <a:p>
-            <a:pPr marL="285750" lvl="0" indent="-285750">
-              <a:buFont typeface="Arial" panose="020B0604020202020204" pitchFamily="34" charset="0"/>
-              <a:buChar char="•"/>
-            </a:pPr>
-            <a:r>
-              <a:rPr sz="1800" dirty="0"/>
-              <a:t>Add a single outlier regression data set</a:t>
-            </a:r>
-          </a:p>
-          <a:p>
-            <a:pPr lvl="0" indent="0">
-              <a:buNone/>
-            </a:pPr>
-            <a:r>
-              <a:rPr sz="1800" dirty="0">
-                <a:latin typeface="Courier"/>
-              </a:rPr>
-              <a:t>## Intercept = 5.098  Partial Slope = 0.365</a:t>
-            </a:r>
-          </a:p>
-        </p:txBody>
-      </p:sp>
-      <p:pic>
-        <p:nvPicPr>
-          <p:cNvPr id="6" name="Picture 5">
-            <a:extLst>
-              <a:ext uri="{FF2B5EF4-FFF2-40B4-BE49-F238E27FC236}">
-                <a16:creationId xmlns:a16="http://schemas.microsoft.com/office/drawing/2014/main" id="{3AB32C25-C62E-685D-FB94-241AF195279E}"/>
-              </a:ext>
-            </a:extLst>
-          </p:cNvPr>
-          <p:cNvPicPr>
-            <a:picLocks noChangeAspect="1"/>
-          </p:cNvPicPr>
-          <p:nvPr/>
-        </p:nvPicPr>
-        <p:blipFill>
-          <a:blip r:embed="rId2"/>
-          <a:stretch>
-            <a:fillRect/>
-          </a:stretch>
-        </p:blipFill>
-        <p:spPr>
-          <a:xfrm>
-            <a:off x="5019040" y="843534"/>
-            <a:ext cx="4124960" cy="4153662"/>
-          </a:xfrm>
-          <a:prstGeom prst="rect">
-            <a:avLst/>
-          </a:prstGeom>
-        </p:spPr>
-      </p:pic>
-      <p:cxnSp>
-        <p:nvCxnSpPr>
-          <p:cNvPr id="3" name="Straight Arrow Connector 2">
-            <a:extLst>
-              <a:ext uri="{FF2B5EF4-FFF2-40B4-BE49-F238E27FC236}">
-                <a16:creationId xmlns:a16="http://schemas.microsoft.com/office/drawing/2014/main" id="{3846F4AD-68B3-A3D9-23D3-F83EA904BD0C}"/>
-              </a:ext>
-            </a:extLst>
-          </p:cNvPr>
-          <p:cNvCxnSpPr>
-            <a:cxnSpLocks/>
-          </p:cNvCxnSpPr>
-          <p:nvPr/>
-        </p:nvCxnSpPr>
-        <p:spPr>
-          <a:xfrm flipH="1">
-            <a:off x="4170156" y="2048256"/>
-            <a:ext cx="629428" cy="2285918"/>
-          </a:xfrm>
-          <a:prstGeom prst="straightConnector1">
-            <a:avLst/>
-          </a:prstGeom>
-          <a:ln w="38100">
-            <a:solidFill>
-              <a:srgbClr val="C00000"/>
-            </a:solidFill>
-            <a:tailEnd type="triangle"/>
-          </a:ln>
-        </p:spPr>
-        <p:style>
-          <a:lnRef idx="2">
-            <a:schemeClr val="accent1"/>
-          </a:lnRef>
-          <a:fillRef idx="0">
-            <a:schemeClr val="accent1"/>
-          </a:fillRef>
-          <a:effectRef idx="1">
-            <a:schemeClr val="accent1"/>
-          </a:effectRef>
-          <a:fontRef idx="minor">
-            <a:schemeClr val="tx1"/>
-          </a:fontRef>
-        </p:style>
-      </p:cxnSp>
-    </p:spTree>
-    <p:extLst>
-      <p:ext uri="{BB962C8B-B14F-4D97-AF65-F5344CB8AC3E}">
-        <p14:creationId xmlns:p14="http://schemas.microsoft.com/office/powerpoint/2010/main" val="1335314117"/>
-      </p:ext>
-    </p:extLst>
-  </p:cSld>
-  <p:clrMapOvr>
-    <a:masterClrMapping/>
-  </p:clrMapOvr>
-</p:sld>
-</file>
-
-<file path=ppt/slides/slide3.xml><?xml version="1.0" encoding="utf-8"?>
-<p:sld xmlns:a="http://schemas.openxmlformats.org/drawingml/2006/main" xmlns:r="http://schemas.openxmlformats.org/officeDocument/2006/relationships" xmlns:p="http://schemas.openxmlformats.org/presentationml/2006/main">
-  <p:cSld>
-    <p:spTree>
-      <p:nvGrpSpPr>
-        <p:cNvPr id="1" name="">
-          <a:extLst>
-            <a:ext uri="{FF2B5EF4-FFF2-40B4-BE49-F238E27FC236}">
-              <a16:creationId xmlns:a16="http://schemas.microsoft.com/office/drawing/2014/main" id="{217CC54D-A93E-7DF0-F2EC-6036421943BA}"/>
-            </a:ext>
-          </a:extLst>
-        </p:cNvPr>
-        <p:cNvGrpSpPr/>
-        <p:nvPr/>
-      </p:nvGrpSpPr>
-      <p:grpSpPr>
-        <a:xfrm>
-          <a:off x="0" y="0"/>
-          <a:ext cx="0" cy="0"/>
-          <a:chOff x="0" y="0"/>
-          <a:chExt cx="0" cy="0"/>
-        </a:xfrm>
-      </p:grpSpPr>
-      <p:sp>
-        <p:nvSpPr>
-          <p:cNvPr id="2" name="Title 1">
-            <a:extLst>
-              <a:ext uri="{FF2B5EF4-FFF2-40B4-BE49-F238E27FC236}">
-                <a16:creationId xmlns:a16="http://schemas.microsoft.com/office/drawing/2014/main" id="{3B05EEC6-D606-BDA0-212E-8D3ADDACF228}"/>
-              </a:ext>
-            </a:extLst>
-          </p:cNvPr>
-          <p:cNvSpPr>
-            <a:spLocks noGrp="1"/>
-          </p:cNvSpPr>
-          <p:nvPr>
-            <p:ph type="title"/>
-          </p:nvPr>
-        </p:nvSpPr>
-        <p:spPr/>
-        <p:txBody>
-          <a:bodyPr/>
-          <a:lstStyle/>
-          <a:p>
-            <a:pPr marL="0" lvl="0" indent="0">
-              <a:buNone/>
-            </a:pPr>
-            <a:r>
-              <a:rPr lang="en-US" dirty="0"/>
-              <a:t>Introduction</a:t>
-            </a:r>
-            <a:endParaRPr dirty="0"/>
-          </a:p>
-        </p:txBody>
-      </p:sp>
-      <p:sp>
-        <p:nvSpPr>
-          <p:cNvPr id="3" name="Content Placeholder 2">
-            <a:extLst>
-              <a:ext uri="{FF2B5EF4-FFF2-40B4-BE49-F238E27FC236}">
-                <a16:creationId xmlns:a16="http://schemas.microsoft.com/office/drawing/2014/main" id="{07854A8C-8365-5A51-A4BD-48F8386E8528}"/>
-              </a:ext>
-            </a:extLst>
-          </p:cNvPr>
-          <p:cNvSpPr>
-            <a:spLocks noGrp="1"/>
-          </p:cNvSpPr>
-          <p:nvPr>
-            <p:ph idx="1"/>
-          </p:nvPr>
-        </p:nvSpPr>
-        <p:spPr/>
-        <p:txBody>
-          <a:bodyPr>
-            <a:normAutofit fontScale="85000" lnSpcReduction="20000"/>
-          </a:bodyPr>
-          <a:lstStyle/>
-          <a:p>
-            <a:pPr marL="0" lvl="0" indent="0">
-              <a:buNone/>
-            </a:pPr>
-            <a:r>
-              <a:rPr lang="en-US" dirty="0"/>
-              <a:t>Several commonly encountered data problems create problems for OLS and GLM models</a:t>
-            </a:r>
-            <a:endParaRPr dirty="0"/>
-          </a:p>
-          <a:p>
-            <a:pPr lvl="0"/>
-            <a:r>
-              <a:rPr lang="en-US" b="1" dirty="0"/>
-              <a:t>Zero inflated response variables </a:t>
-            </a:r>
-            <a:r>
-              <a:rPr lang="en-US" dirty="0"/>
-              <a:t>have an unusual number of zero values   </a:t>
-            </a:r>
-          </a:p>
-          <a:p>
-            <a:pPr lvl="1"/>
-            <a:r>
-              <a:rPr lang="en-US" dirty="0"/>
-              <a:t>Use a </a:t>
-            </a:r>
-            <a:r>
-              <a:rPr lang="en-US" b="1" dirty="0"/>
-              <a:t>mixture model </a:t>
-            </a:r>
-            <a:r>
-              <a:rPr lang="en-US" dirty="0"/>
-              <a:t>to switch between a binomial and another distribution</a:t>
-            </a:r>
-          </a:p>
-          <a:p>
-            <a:pPr lvl="0"/>
-            <a:r>
-              <a:rPr lang="en-US" b="1" dirty="0"/>
-              <a:t>Over-dispersed response variables </a:t>
-            </a:r>
-            <a:r>
-              <a:rPr lang="en-US" dirty="0"/>
-              <a:t>have a long (typically right) tail </a:t>
-            </a:r>
-          </a:p>
-          <a:p>
-            <a:pPr lvl="1"/>
-            <a:r>
-              <a:rPr lang="en-US" dirty="0"/>
-              <a:t>Apply models with distributions and mixtures that account for large low probability responses </a:t>
-            </a:r>
-          </a:p>
-          <a:p>
-            <a:pPr lvl="0"/>
-            <a:r>
-              <a:rPr lang="en-US" b="1" dirty="0"/>
-              <a:t>Outliers in independent variables </a:t>
-            </a:r>
-            <a:r>
-              <a:rPr lang="en-US" dirty="0"/>
-              <a:t>have an undue influence on OLS and GLM models </a:t>
-            </a:r>
-          </a:p>
-          <a:p>
-            <a:pPr lvl="1"/>
-            <a:r>
-              <a:rPr lang="en-US" dirty="0"/>
-              <a:t>Robust regression models </a:t>
-            </a:r>
-            <a:r>
-              <a:rPr lang="en-US" b="1" dirty="0"/>
-              <a:t>limit the influence of outliers </a:t>
-            </a:r>
-            <a:r>
-              <a:rPr lang="en-US" dirty="0"/>
-              <a:t>on the response </a:t>
-            </a:r>
-          </a:p>
-          <a:p>
-            <a:pPr lvl="0"/>
-            <a:r>
-              <a:rPr lang="en-US" dirty="0"/>
-              <a:t>We can extend the OLS and GLM frameworks to deal with these situations  </a:t>
-            </a:r>
-            <a:endParaRPr dirty="0"/>
-          </a:p>
-        </p:txBody>
-      </p:sp>
-    </p:spTree>
-    <p:extLst>
-      <p:ext uri="{BB962C8B-B14F-4D97-AF65-F5344CB8AC3E}">
-        <p14:creationId xmlns:p14="http://schemas.microsoft.com/office/powerpoint/2010/main" val="487459844"/>
-      </p:ext>
-    </p:extLst>
-  </p:cSld>
-  <p:clrMapOvr>
-    <a:masterClrMapping/>
-  </p:clrMapOvr>
-</p:sld>
-</file>
-
-<file path=ppt/slides/slide30.xml><?xml version="1.0" encoding="utf-8"?>
-<p:sld xmlns:a="http://schemas.openxmlformats.org/drawingml/2006/main" xmlns:r="http://schemas.openxmlformats.org/officeDocument/2006/relationships" xmlns:p="http://schemas.openxmlformats.org/presentationml/2006/main">
-  <p:cSld>
-    <p:spTree>
-      <p:nvGrpSpPr>
         <p:cNvPr id="1" name=""/>
         <p:cNvGrpSpPr/>
         <p:nvPr/>
@@ -11291,8 +10900,8 @@
           </a:p>
         </p:txBody>
       </p:sp>
-      <mc:AlternateContent xmlns:mc="http://schemas.openxmlformats.org/markup-compatibility/2006">
-        <mc:Choice xmlns:a14="http://schemas.microsoft.com/office/drawing/2010/main" Requires="a14">
+      <mc:AlternateContent xmlns:mc="http://schemas.openxmlformats.org/markup-compatibility/2006" xmlns:a14="http://schemas.microsoft.com/office/drawing/2010/main">
+        <mc:Choice Requires="a14">
           <p:sp>
             <p:nvSpPr>
               <p:cNvPr id="3" name="Content Placeholder 2"/>
@@ -11904,7 +11513,7 @@
             </p:txBody>
           </p:sp>
         </mc:Choice>
-        <mc:Fallback>
+        <mc:Fallback xmlns="">
           <p:sp>
             <p:nvSpPr>
               <p:cNvPr id="3" name="Content Placeholder 2"/>
@@ -11950,7 +11559,187 @@
 </p:sld>
 </file>
 
-<file path=ppt/slides/slide31.xml><?xml version="1.0" encoding="utf-8"?>
+<file path=ppt/slides/slide3.xml><?xml version="1.0" encoding="utf-8"?>
+<p:sld xmlns:a="http://schemas.openxmlformats.org/drawingml/2006/main" xmlns:r="http://schemas.openxmlformats.org/officeDocument/2006/relationships" xmlns:p="http://schemas.openxmlformats.org/presentationml/2006/main">
+  <p:cSld>
+    <p:spTree>
+      <p:nvGrpSpPr>
+        <p:cNvPr id="1" name="">
+          <a:extLst>
+            <a:ext uri="{FF2B5EF4-FFF2-40B4-BE49-F238E27FC236}">
+              <a16:creationId xmlns:a16="http://schemas.microsoft.com/office/drawing/2014/main" id="{217CC54D-A93E-7DF0-F2EC-6036421943BA}"/>
+            </a:ext>
+          </a:extLst>
+        </p:cNvPr>
+        <p:cNvGrpSpPr/>
+        <p:nvPr/>
+      </p:nvGrpSpPr>
+      <p:grpSpPr>
+        <a:xfrm>
+          <a:off x="0" y="0"/>
+          <a:ext cx="0" cy="0"/>
+          <a:chOff x="0" y="0"/>
+          <a:chExt cx="0" cy="0"/>
+        </a:xfrm>
+      </p:grpSpPr>
+      <p:sp>
+        <p:nvSpPr>
+          <p:cNvPr id="2" name="Title 1">
+            <a:extLst>
+              <a:ext uri="{FF2B5EF4-FFF2-40B4-BE49-F238E27FC236}">
+                <a16:creationId xmlns:a16="http://schemas.microsoft.com/office/drawing/2014/main" id="{3B05EEC6-D606-BDA0-212E-8D3ADDACF228}"/>
+              </a:ext>
+            </a:extLst>
+          </p:cNvPr>
+          <p:cNvSpPr>
+            <a:spLocks noGrp="1"/>
+          </p:cNvSpPr>
+          <p:nvPr>
+            <p:ph type="title"/>
+          </p:nvPr>
+        </p:nvSpPr>
+        <p:spPr/>
+        <p:txBody>
+          <a:bodyPr/>
+          <a:lstStyle/>
+          <a:p>
+            <a:pPr marL="0" lvl="0" indent="0">
+              <a:buNone/>
+            </a:pPr>
+            <a:r>
+              <a:rPr lang="en-US" dirty="0"/>
+              <a:t>Introduction</a:t>
+            </a:r>
+            <a:endParaRPr dirty="0"/>
+          </a:p>
+        </p:txBody>
+      </p:sp>
+      <p:sp>
+        <p:nvSpPr>
+          <p:cNvPr id="3" name="Content Placeholder 2">
+            <a:extLst>
+              <a:ext uri="{FF2B5EF4-FFF2-40B4-BE49-F238E27FC236}">
+                <a16:creationId xmlns:a16="http://schemas.microsoft.com/office/drawing/2014/main" id="{07854A8C-8365-5A51-A4BD-48F8386E8528}"/>
+              </a:ext>
+            </a:extLst>
+          </p:cNvPr>
+          <p:cNvSpPr>
+            <a:spLocks noGrp="1"/>
+          </p:cNvSpPr>
+          <p:nvPr>
+            <p:ph idx="1"/>
+          </p:nvPr>
+        </p:nvSpPr>
+        <p:spPr/>
+        <p:txBody>
+          <a:bodyPr>
+            <a:normAutofit fontScale="85000" lnSpcReduction="20000"/>
+          </a:bodyPr>
+          <a:lstStyle/>
+          <a:p>
+            <a:pPr marL="0" lvl="0" indent="0">
+              <a:buNone/>
+            </a:pPr>
+            <a:r>
+              <a:rPr lang="en-US" dirty="0"/>
+              <a:t>Several commonly encountered data problems create problems for OLS and GLM models</a:t>
+            </a:r>
+            <a:endParaRPr dirty="0"/>
+          </a:p>
+          <a:p>
+            <a:pPr lvl="0"/>
+            <a:r>
+              <a:rPr lang="en-US" b="1" dirty="0"/>
+              <a:t>Zero inflated response variables </a:t>
+            </a:r>
+            <a:r>
+              <a:rPr lang="en-US" dirty="0"/>
+              <a:t>have an unusual number of zero values   </a:t>
+            </a:r>
+          </a:p>
+          <a:p>
+            <a:pPr lvl="1"/>
+            <a:r>
+              <a:rPr lang="en-US" dirty="0"/>
+              <a:t>Use a </a:t>
+            </a:r>
+            <a:r>
+              <a:rPr lang="en-US" b="1" dirty="0"/>
+              <a:t>mixture model </a:t>
+            </a:r>
+            <a:r>
+              <a:rPr lang="en-US" dirty="0"/>
+              <a:t>to switch between a binomial and another distribution</a:t>
+            </a:r>
+          </a:p>
+          <a:p>
+            <a:pPr lvl="0"/>
+            <a:r>
+              <a:rPr lang="en-US" b="1" dirty="0"/>
+              <a:t>Over-dispersed response variables </a:t>
+            </a:r>
+            <a:r>
+              <a:rPr lang="en-US" dirty="0"/>
+              <a:t>have a long (typically right) tail </a:t>
+            </a:r>
+          </a:p>
+          <a:p>
+            <a:pPr lvl="1"/>
+            <a:r>
+              <a:rPr lang="en-US" dirty="0"/>
+              <a:t>Apply models with distributions and mixtures that account for large low probability responses </a:t>
+            </a:r>
+          </a:p>
+          <a:p>
+            <a:pPr lvl="0"/>
+            <a:r>
+              <a:rPr lang="en-US" b="1" dirty="0"/>
+              <a:t>Outliers in independent variables </a:t>
+            </a:r>
+            <a:r>
+              <a:rPr lang="en-US" dirty="0"/>
+              <a:t>have an undue influence on OLS and GLM models </a:t>
+            </a:r>
+          </a:p>
+          <a:p>
+            <a:pPr lvl="1"/>
+            <a:r>
+              <a:rPr lang="en-US" dirty="0"/>
+              <a:t>Robust regression models </a:t>
+            </a:r>
+            <a:r>
+              <a:rPr lang="en-US" b="1" dirty="0"/>
+              <a:t>limit the influence of outliers </a:t>
+            </a:r>
+            <a:r>
+              <a:rPr lang="en-US" dirty="0"/>
+              <a:t>on the response </a:t>
+            </a:r>
+          </a:p>
+          <a:p>
+            <a:pPr lvl="0"/>
+            <a:r>
+              <a:rPr lang="en-US" dirty="0"/>
+              <a:t>We can extend the OLS and GLM frameworks to deal with these situations  </a:t>
+            </a:r>
+            <a:endParaRPr dirty="0"/>
+          </a:p>
+        </p:txBody>
+      </p:sp>
+    </p:spTree>
+    <p:extLst>
+      <p:ext uri="{BB962C8B-B14F-4D97-AF65-F5344CB8AC3E}">
+        <p14:creationId xmlns:p14="http://schemas.microsoft.com/office/powerpoint/2010/main" val="487459844"/>
+      </p:ext>
+    </p:extLst>
+  </p:cSld>
+  <p:clrMapOvr>
+    <a:masterClrMapping/>
+  </p:clrMapOvr>
+</p:sld>
+</file>
+
+<file path=ppt/slides/slide30.xml><?xml version="1.0" encoding="utf-8"?>
 <p:sld xmlns:a="http://schemas.openxmlformats.org/drawingml/2006/main" xmlns:r="http://schemas.openxmlformats.org/officeDocument/2006/relationships" xmlns:p="http://schemas.openxmlformats.org/presentationml/2006/main">
   <p:cSld>
     <p:spTree>
@@ -12031,27 +11820,15 @@
             </a:pPr>
             <a:r>
               <a:rPr sz="1800" dirty="0"/>
-              <a:t>Plot Cook’s distance as </a:t>
-            </a:r>
-            <a:r>
-              <a:rPr sz="1800" b="1" dirty="0"/>
-              <a:t>leverage</a:t>
-            </a:r>
-            <a:r>
-              <a:rPr sz="1800" dirty="0"/>
-              <a:t> vs. the </a:t>
+              <a:t>Cook’s distance </a:t>
             </a:r>
             <a:r>
               <a:rPr lang="en-US" sz="1800" dirty="0"/>
-              <a:t>standardized </a:t>
-            </a:r>
-            <a:r>
-              <a:rPr sz="1800" dirty="0"/>
-              <a:t>residual</a:t>
-            </a:r>
-            <a:r>
-              <a:rPr lang="en-US" sz="1800" dirty="0"/>
-              <a:t>s</a:t>
+              <a:t>plot enables evaluation of </a:t>
+            </a:r>
+            <a:r>
+              <a:rPr lang="en-US" sz="1800" b="1" dirty="0"/>
+              <a:t>outlier influence </a:t>
             </a:r>
           </a:p>
           <a:p>
@@ -12060,8 +11837,12 @@
               <a:buChar char="•"/>
             </a:pPr>
             <a:r>
+              <a:rPr lang="en-US" sz="1800" b="1" dirty="0"/>
+              <a:t>Standardized residuals </a:t>
+            </a:r>
+            <a:r>
               <a:rPr lang="en-US" sz="1800" dirty="0"/>
-              <a:t>Standardized residuals on the vertical axis</a:t>
+              <a:t>on the vertical axis</a:t>
             </a:r>
           </a:p>
           <a:p>
@@ -12070,10 +11851,28 @@
               <a:buChar char="•"/>
             </a:pPr>
             <a:r>
+              <a:rPr lang="en-US" sz="1800" b="1" dirty="0"/>
+              <a:t>Leverage</a:t>
+            </a:r>
+            <a:r>
               <a:rPr lang="en-US" sz="1800" dirty="0"/>
-              <a:t>Leverage </a:t>
-            </a:r>
-            <a:endParaRPr sz="1800" dirty="0"/>
+              <a:t> on the horizontal axis</a:t>
+            </a:r>
+          </a:p>
+          <a:p>
+            <a:pPr marL="285750" lvl="0" indent="-285750">
+              <a:buFont typeface="Arial" panose="020B0604020202020204" pitchFamily="34" charset="0"/>
+              <a:buChar char="•"/>
+            </a:pPr>
+            <a:r>
+              <a:rPr lang="en-US" sz="1800" dirty="0"/>
+              <a:t>Size of the markers indicates overall </a:t>
+            </a:r>
+            <a:r>
+              <a:rPr lang="en-US" sz="1800" b="1" dirty="0"/>
+              <a:t>influence </a:t>
+            </a:r>
+            <a:endParaRPr sz="1800" b="1" dirty="0"/>
           </a:p>
         </p:txBody>
       </p:sp>
@@ -12115,7 +11914,7 @@
 </p:sld>
 </file>
 
-<file path=ppt/slides/slide32.xml><?xml version="1.0" encoding="utf-8"?>
+<file path=ppt/slides/slide31.xml><?xml version="1.0" encoding="utf-8"?>
 <p:sld xmlns:a="http://schemas.openxmlformats.org/drawingml/2006/main" xmlns:r="http://schemas.openxmlformats.org/officeDocument/2006/relationships" xmlns:p="http://schemas.openxmlformats.org/presentationml/2006/main">
   <p:cSld>
     <p:spTree>
@@ -12178,8 +11977,16 @@
             </a:pPr>
             <a:r>
               <a:rPr dirty="0"/>
-              <a:t>Why are linear models sensitive to outliers</a:t>
-            </a:r>
+              <a:t>Why are linear models sensitive </a:t>
+            </a:r>
+            <a:r>
+              <a:t>to outliers</a:t>
+            </a:r>
+            <a:r>
+              <a:rPr lang="en-US"/>
+              <a:t>?</a:t>
+            </a:r>
+            <a:endParaRPr dirty="0"/>
           </a:p>
           <a:p>
             <a:pPr lvl="0"/>
@@ -12271,7 +12078,7 @@
 </p:sld>
 </file>
 
-<file path=ppt/slides/slide33.xml><?xml version="1.0" encoding="utf-8"?>
+<file path=ppt/slides/slide32.xml><?xml version="1.0" encoding="utf-8"?>
 <p:sld xmlns:a="http://schemas.openxmlformats.org/drawingml/2006/main" xmlns:r="http://schemas.openxmlformats.org/officeDocument/2006/relationships" xmlns:p="http://schemas.openxmlformats.org/presentationml/2006/main">
   <p:cSld>
     <p:spTree>
@@ -12474,7 +12281,7 @@
 </p:sld>
 </file>
 
-<file path=ppt/slides/slide34.xml><?xml version="1.0" encoding="utf-8"?>
+<file path=ppt/slides/slide33.xml><?xml version="1.0" encoding="utf-8"?>
 <p:sld xmlns:a="http://schemas.openxmlformats.org/drawingml/2006/main" xmlns:r="http://schemas.openxmlformats.org/officeDocument/2006/relationships" xmlns:p="http://schemas.openxmlformats.org/presentationml/2006/main">
   <p:cSld>
     <p:spTree>
@@ -12794,7 +12601,7 @@
 </p:sld>
 </file>
 
-<file path=ppt/slides/slide35.xml><?xml version="1.0" encoding="utf-8"?>
+<file path=ppt/slides/slide34.xml><?xml version="1.0" encoding="utf-8"?>
 <p:sld xmlns:a="http://schemas.openxmlformats.org/drawingml/2006/main" xmlns:r="http://schemas.openxmlformats.org/officeDocument/2006/relationships" xmlns:p="http://schemas.openxmlformats.org/presentationml/2006/main">
   <p:cSld>
     <p:spTree>
@@ -12920,7 +12727,7 @@
 </p:sld>
 </file>
 
-<file path=ppt/slides/slide36.xml><?xml version="1.0" encoding="utf-8"?>
+<file path=ppt/slides/slide35.xml><?xml version="1.0" encoding="utf-8"?>
 <p:sld xmlns:a="http://schemas.openxmlformats.org/drawingml/2006/main" xmlns:r="http://schemas.openxmlformats.org/officeDocument/2006/relationships" xmlns:p="http://schemas.openxmlformats.org/presentationml/2006/main">
   <p:cSld>
     <p:spTree>
@@ -13227,7 +13034,7 @@
 </p:sld>
 </file>
 
-<file path=ppt/slides/slide37.xml><?xml version="1.0" encoding="utf-8"?>
+<file path=ppt/slides/slide36.xml><?xml version="1.0" encoding="utf-8"?>
 <p:sld xmlns:a="http://schemas.openxmlformats.org/drawingml/2006/main" xmlns:r="http://schemas.openxmlformats.org/officeDocument/2006/relationships" xmlns:p="http://schemas.openxmlformats.org/presentationml/2006/main">
   <p:cSld>
     <p:spTree>
@@ -13488,7 +13295,7 @@
 </p:sld>
 </file>
 
-<file path=ppt/slides/slide38.xml><?xml version="1.0" encoding="utf-8"?>
+<file path=ppt/slides/slide37.xml><?xml version="1.0" encoding="utf-8"?>
 <p:sld xmlns:a="http://schemas.openxmlformats.org/drawingml/2006/main" xmlns:r="http://schemas.openxmlformats.org/officeDocument/2006/relationships" xmlns:p="http://schemas.openxmlformats.org/presentationml/2006/main">
   <p:cSld>
     <p:spTree>
@@ -13735,7 +13542,7 @@
 </p:sld>
 </file>
 
-<file path=ppt/slides/slide39.xml><?xml version="1.0" encoding="utf-8"?>
+<file path=ppt/slides/slide38.xml><?xml version="1.0" encoding="utf-8"?>
 <p:sld xmlns:a="http://schemas.openxmlformats.org/drawingml/2006/main" xmlns:r="http://schemas.openxmlformats.org/officeDocument/2006/relationships" xmlns:p="http://schemas.openxmlformats.org/presentationml/2006/main">
   <p:cSld>
     <p:spTree>
@@ -13835,6 +13642,61 @@
           </a:ln>
         </p:spPr>
       </p:pic>
+    </p:spTree>
+  </p:cSld>
+  <p:clrMapOvr>
+    <a:masterClrMapping/>
+  </p:clrMapOvr>
+</p:sld>
+</file>
+
+<file path=ppt/slides/slide39.xml><?xml version="1.0" encoding="utf-8"?>
+<p:sld xmlns:a="http://schemas.openxmlformats.org/drawingml/2006/main" xmlns:r="http://schemas.openxmlformats.org/officeDocument/2006/relationships" xmlns:p="http://schemas.openxmlformats.org/presentationml/2006/main">
+  <p:cSld>
+    <p:spTree>
+      <p:nvGrpSpPr>
+        <p:cNvPr id="1" name=""/>
+        <p:cNvGrpSpPr/>
+        <p:nvPr/>
+      </p:nvGrpSpPr>
+      <p:grpSpPr>
+        <a:xfrm>
+          <a:off x="0" y="0"/>
+          <a:ext cx="0" cy="0"/>
+          <a:chOff x="0" y="0"/>
+          <a:chExt cx="0" cy="0"/>
+        </a:xfrm>
+      </p:grpSpPr>
+      <p:sp>
+        <p:nvSpPr>
+          <p:cNvPr id="3" name="Content Placeholder 2"/>
+          <p:cNvSpPr>
+            <a:spLocks noGrp="1"/>
+          </p:cNvSpPr>
+          <p:nvPr>
+            <p:ph idx="1"/>
+          </p:nvPr>
+        </p:nvSpPr>
+        <p:spPr/>
+        <p:txBody>
+          <a:bodyPr/>
+          <a:lstStyle/>
+          <a:p>
+            <a:pPr marL="0" lvl="0" indent="0">
+              <a:buNone/>
+            </a:pPr>
+            <a:endParaRPr/>
+          </a:p>
+          <a:p>
+            <a:pPr marL="0" lvl="0" indent="0">
+              <a:buNone/>
+            </a:pPr>
+            <a:r>
+              <a:t>Notice the different slope for the regression with Huber loss</a:t>
+            </a:r>
+          </a:p>
+        </p:txBody>
+      </p:sp>
     </p:spTree>
   </p:cSld>
   <p:clrMapOvr>
@@ -13926,61 +13788,6 @@
       </p:grpSpPr>
       <p:sp>
         <p:nvSpPr>
-          <p:cNvPr id="3" name="Content Placeholder 2"/>
-          <p:cNvSpPr>
-            <a:spLocks noGrp="1"/>
-          </p:cNvSpPr>
-          <p:nvPr>
-            <p:ph idx="1"/>
-          </p:nvPr>
-        </p:nvSpPr>
-        <p:spPr/>
-        <p:txBody>
-          <a:bodyPr/>
-          <a:lstStyle/>
-          <a:p>
-            <a:pPr marL="0" lvl="0" indent="0">
-              <a:buNone/>
-            </a:pPr>
-            <a:endParaRPr/>
-          </a:p>
-          <a:p>
-            <a:pPr marL="0" lvl="0" indent="0">
-              <a:buNone/>
-            </a:pPr>
-            <a:r>
-              <a:t>Notice the different slope for the regression with Huber loss</a:t>
-            </a:r>
-          </a:p>
-        </p:txBody>
-      </p:sp>
-    </p:spTree>
-  </p:cSld>
-  <p:clrMapOvr>
-    <a:masterClrMapping/>
-  </p:clrMapOvr>
-</p:sld>
-</file>
-
-<file path=ppt/slides/slide41.xml><?xml version="1.0" encoding="utf-8"?>
-<p:sld xmlns:a="http://schemas.openxmlformats.org/drawingml/2006/main" xmlns:r="http://schemas.openxmlformats.org/officeDocument/2006/relationships" xmlns:p="http://schemas.openxmlformats.org/presentationml/2006/main">
-  <p:cSld>
-    <p:spTree>
-      <p:nvGrpSpPr>
-        <p:cNvPr id="1" name=""/>
-        <p:cNvGrpSpPr/>
-        <p:nvPr/>
-      </p:nvGrpSpPr>
-      <p:grpSpPr>
-        <a:xfrm>
-          <a:off x="0" y="0"/>
-          <a:ext cx="0" cy="0"/>
-          <a:chOff x="0" y="0"/>
-          <a:chExt cx="0" cy="0"/>
-        </a:xfrm>
-      </p:grpSpPr>
-      <p:sp>
-        <p:nvSpPr>
           <p:cNvPr id="2" name="Title 1"/>
           <p:cNvSpPr>
             <a:spLocks noGrp="1"/>
@@ -14094,7 +13901,7 @@
 </p:sld>
 </file>
 
-<file path=ppt/slides/slide42.xml><?xml version="1.0" encoding="utf-8"?>
+<file path=ppt/slides/slide41.xml><?xml version="1.0" encoding="utf-8"?>
 <p:sld xmlns:a="http://schemas.openxmlformats.org/drawingml/2006/main" xmlns:r="http://schemas.openxmlformats.org/officeDocument/2006/relationships" xmlns:p="http://schemas.openxmlformats.org/presentationml/2006/main">
   <p:cSld>
     <p:spTree>
@@ -14589,25 +14396,7 @@
                       <a:rPr lang="en-US" b="0" i="1" smtClean="0">
                         <a:latin typeface="Cambria Math" panose="02040503050406030204" pitchFamily="18" charset="0"/>
                       </a:rPr>
-                      <m:t>=</m:t>
-                    </m:r>
-                    <m:r>
-                      <a:rPr lang="en-US" b="0" i="1" smtClean="0">
-                        <a:latin typeface="Cambria Math" panose="02040503050406030204" pitchFamily="18" charset="0"/>
-                      </a:rPr>
-                      <m:t>2</m:t>
-                    </m:r>
-                    <m:r>
-                      <a:rPr lang="en-US" b="0" i="1" smtClean="0">
-                        <a:latin typeface="Cambria Math" panose="02040503050406030204" pitchFamily="18" charset="0"/>
-                      </a:rPr>
-                      <m:t>.</m:t>
-                    </m:r>
-                    <m:r>
-                      <a:rPr lang="en-US" b="0" i="1" smtClean="0">
-                        <a:latin typeface="Cambria Math" panose="02040503050406030204" pitchFamily="18" charset="0"/>
-                      </a:rPr>
-                      <m:t>0</m:t>
+                      <m:t>=2.0</m:t>
                     </m:r>
                   </m:oMath>
                 </a14:m>

</xml_diff>

<commit_message>
Updates and improvements to slides
</commit_message>
<xml_diff>
--- a/LectureSlides/10b_ModelsFor OutliersAndOverdispersion.pptx
+++ b/LectureSlides/10b_ModelsFor OutliersAndOverdispersion.pptx
@@ -5,7 +5,7 @@
     <p:sldMasterId id="2147483648" r:id="rId1"/>
   </p:sldMasterIdLst>
   <p:notesMasterIdLst>
-    <p:notesMasterId r:id="rId54"/>
+    <p:notesMasterId r:id="rId55"/>
   </p:notesMasterIdLst>
   <p:sldIdLst>
     <p:sldId id="337" r:id="rId2"/>
@@ -46,20 +46,21 @@
     <p:sldId id="321" r:id="rId37"/>
     <p:sldId id="364" r:id="rId38"/>
     <p:sldId id="365" r:id="rId39"/>
-    <p:sldId id="323" r:id="rId40"/>
-    <p:sldId id="324" r:id="rId41"/>
-    <p:sldId id="326" r:id="rId42"/>
-    <p:sldId id="366" r:id="rId43"/>
-    <p:sldId id="327" r:id="rId44"/>
-    <p:sldId id="328" r:id="rId45"/>
-    <p:sldId id="329" r:id="rId46"/>
-    <p:sldId id="330" r:id="rId47"/>
-    <p:sldId id="331" r:id="rId48"/>
-    <p:sldId id="332" r:id="rId49"/>
-    <p:sldId id="333" r:id="rId50"/>
-    <p:sldId id="367" r:id="rId51"/>
-    <p:sldId id="368" r:id="rId52"/>
-    <p:sldId id="381" r:id="rId53"/>
+    <p:sldId id="382" r:id="rId40"/>
+    <p:sldId id="323" r:id="rId41"/>
+    <p:sldId id="324" r:id="rId42"/>
+    <p:sldId id="326" r:id="rId43"/>
+    <p:sldId id="366" r:id="rId44"/>
+    <p:sldId id="327" r:id="rId45"/>
+    <p:sldId id="328" r:id="rId46"/>
+    <p:sldId id="329" r:id="rId47"/>
+    <p:sldId id="330" r:id="rId48"/>
+    <p:sldId id="331" r:id="rId49"/>
+    <p:sldId id="332" r:id="rId50"/>
+    <p:sldId id="333" r:id="rId51"/>
+    <p:sldId id="367" r:id="rId52"/>
+    <p:sldId id="368" r:id="rId53"/>
+    <p:sldId id="381" r:id="rId54"/>
   </p:sldIdLst>
   <p:sldSz cx="9144000" cy="5143500" type="screen16x9"/>
   <p:notesSz cx="6858000" cy="9144000"/>
@@ -259,7 +260,7 @@
           <a:p>
             <a:fld id="{B45A0028-71D2-4800-AD8E-38BD1BCDF688}" type="datetimeFigureOut">
               <a:rPr lang="en-US" smtClean="0"/>
-              <a:t>10/21/2024</a:t>
+              <a:t>10/29/2024</a:t>
             </a:fld>
             <a:endParaRPr lang="en-US"/>
           </a:p>
@@ -705,7 +706,7 @@
           <a:p>
             <a:fld id="{241EB5C9-1307-BA42-ABA2-0BC069CD8E7F}" type="datetimeFigureOut">
               <a:rPr lang="en-US" smtClean="0"/>
-              <a:t>10/21/2024</a:t>
+              <a:t>10/29/2024</a:t>
             </a:fld>
             <a:endParaRPr lang="en-US"/>
           </a:p>
@@ -873,7 +874,7 @@
           <a:p>
             <a:fld id="{241EB5C9-1307-BA42-ABA2-0BC069CD8E7F}" type="datetimeFigureOut">
               <a:rPr lang="en-US" smtClean="0"/>
-              <a:t>10/21/2024</a:t>
+              <a:t>10/29/2024</a:t>
             </a:fld>
             <a:endParaRPr lang="en-US"/>
           </a:p>
@@ -1051,7 +1052,7 @@
           <a:p>
             <a:fld id="{241EB5C9-1307-BA42-ABA2-0BC069CD8E7F}" type="datetimeFigureOut">
               <a:rPr lang="en-US" smtClean="0"/>
-              <a:t>10/21/2024</a:t>
+              <a:t>10/29/2024</a:t>
             </a:fld>
             <a:endParaRPr lang="en-US"/>
           </a:p>
@@ -1219,7 +1220,7 @@
           <a:p>
             <a:fld id="{241EB5C9-1307-BA42-ABA2-0BC069CD8E7F}" type="datetimeFigureOut">
               <a:rPr lang="en-US" smtClean="0"/>
-              <a:t>10/21/2024</a:t>
+              <a:t>10/29/2024</a:t>
             </a:fld>
             <a:endParaRPr lang="en-US"/>
           </a:p>
@@ -1464,7 +1465,7 @@
           <a:p>
             <a:fld id="{241EB5C9-1307-BA42-ABA2-0BC069CD8E7F}" type="datetimeFigureOut">
               <a:rPr lang="en-US" smtClean="0"/>
-              <a:t>10/21/2024</a:t>
+              <a:t>10/29/2024</a:t>
             </a:fld>
             <a:endParaRPr lang="en-US"/>
           </a:p>
@@ -1749,7 +1750,7 @@
           <a:p>
             <a:fld id="{241EB5C9-1307-BA42-ABA2-0BC069CD8E7F}" type="datetimeFigureOut">
               <a:rPr lang="en-US" smtClean="0"/>
-              <a:t>10/21/2024</a:t>
+              <a:t>10/29/2024</a:t>
             </a:fld>
             <a:endParaRPr lang="en-US"/>
           </a:p>
@@ -2168,7 +2169,7 @@
           <a:p>
             <a:fld id="{241EB5C9-1307-BA42-ABA2-0BC069CD8E7F}" type="datetimeFigureOut">
               <a:rPr lang="en-US" smtClean="0"/>
-              <a:t>10/21/2024</a:t>
+              <a:t>10/29/2024</a:t>
             </a:fld>
             <a:endParaRPr lang="en-US"/>
           </a:p>
@@ -2285,7 +2286,7 @@
           <a:p>
             <a:fld id="{241EB5C9-1307-BA42-ABA2-0BC069CD8E7F}" type="datetimeFigureOut">
               <a:rPr lang="en-US" smtClean="0"/>
-              <a:t>10/21/2024</a:t>
+              <a:t>10/29/2024</a:t>
             </a:fld>
             <a:endParaRPr lang="en-US"/>
           </a:p>
@@ -2380,7 +2381,7 @@
           <a:p>
             <a:fld id="{241EB5C9-1307-BA42-ABA2-0BC069CD8E7F}" type="datetimeFigureOut">
               <a:rPr lang="en-US" smtClean="0"/>
-              <a:t>10/21/2024</a:t>
+              <a:t>10/29/2024</a:t>
             </a:fld>
             <a:endParaRPr lang="en-US"/>
           </a:p>
@@ -2655,7 +2656,7 @@
           <a:p>
             <a:fld id="{241EB5C9-1307-BA42-ABA2-0BC069CD8E7F}" type="datetimeFigureOut">
               <a:rPr lang="en-US" smtClean="0"/>
-              <a:t>10/21/2024</a:t>
+              <a:t>10/29/2024</a:t>
             </a:fld>
             <a:endParaRPr lang="en-US"/>
           </a:p>
@@ -2907,7 +2908,7 @@
           <a:p>
             <a:fld id="{241EB5C9-1307-BA42-ABA2-0BC069CD8E7F}" type="datetimeFigureOut">
               <a:rPr lang="en-US" smtClean="0"/>
-              <a:t>10/21/2024</a:t>
+              <a:t>10/29/2024</a:t>
             </a:fld>
             <a:endParaRPr lang="en-US"/>
           </a:p>
@@ -3118,7 +3119,7 @@
           <a:p>
             <a:fld id="{241EB5C9-1307-BA42-ABA2-0BC069CD8E7F}" type="datetimeFigureOut">
               <a:rPr lang="en-US" smtClean="0"/>
-              <a:t>10/21/2024</a:t>
+              <a:t>10/29/2024</a:t>
             </a:fld>
             <a:endParaRPr lang="en-US"/>
           </a:p>
@@ -4194,113 +4195,227 @@
           </a:p>
         </p:txBody>
       </p:sp>
-      <p:sp>
-        <p:nvSpPr>
-          <p:cNvPr id="3" name="Content Placeholder 2">
-            <a:extLst>
-              <a:ext uri="{FF2B5EF4-FFF2-40B4-BE49-F238E27FC236}">
-                <a16:creationId xmlns:a16="http://schemas.microsoft.com/office/drawing/2014/main" id="{15BB3C24-B2A6-ABAB-74A0-C12FD142248C}"/>
-              </a:ext>
-            </a:extLst>
-          </p:cNvPr>
-          <p:cNvSpPr>
-            <a:spLocks noGrp="1"/>
-          </p:cNvSpPr>
-          <p:nvPr>
-            <p:ph idx="1"/>
-          </p:nvPr>
-        </p:nvSpPr>
-        <p:spPr>
-          <a:xfrm>
-            <a:off x="457200" y="1200151"/>
-            <a:ext cx="8229600" cy="3621976"/>
-          </a:xfrm>
-        </p:spPr>
-        <p:txBody>
-          <a:bodyPr>
-            <a:normAutofit lnSpcReduction="10000"/>
-          </a:bodyPr>
-          <a:lstStyle/>
-          <a:p>
-            <a:pPr marL="0" lvl="0" indent="0">
-              <a:buNone/>
-            </a:pPr>
-            <a:r>
-              <a:rPr lang="en-US" dirty="0"/>
-              <a:t>How can we fit a model with zero inflated distributions?  </a:t>
-            </a:r>
-          </a:p>
-          <a:p>
-            <a:r>
-              <a:rPr lang="en-US" dirty="0"/>
-              <a:t>In some cases, a nearly analytic solution is possible    </a:t>
-            </a:r>
-          </a:p>
-          <a:p>
-            <a:r>
-              <a:rPr lang="en-US" dirty="0"/>
-              <a:t>How can we find a numerical solution? </a:t>
-            </a:r>
-          </a:p>
-          <a:p>
-            <a:pPr lvl="1"/>
-            <a:r>
-              <a:rPr lang="en-US" dirty="0"/>
-              <a:t>Fit parameters of the switching distribution </a:t>
-            </a:r>
-          </a:p>
-          <a:p>
-            <a:pPr lvl="1"/>
-            <a:r>
-              <a:rPr lang="en-US" dirty="0"/>
-              <a:t>Fit parameters of the other distribution </a:t>
-            </a:r>
-          </a:p>
-          <a:p>
-            <a:r>
-              <a:rPr lang="en-US" dirty="0"/>
-              <a:t>Use an iterative solution</a:t>
-            </a:r>
-          </a:p>
-          <a:p>
-            <a:pPr marL="800100" lvl="1" indent="-457200">
-              <a:buFont typeface="+mj-lt"/>
-              <a:buAutoNum type="arabicPeriod"/>
-            </a:pPr>
-            <a:r>
-              <a:rPr lang="en-US" dirty="0"/>
-              <a:t>Estimate parameter(s) of switching distribution  </a:t>
-            </a:r>
-          </a:p>
-          <a:p>
-            <a:pPr marL="800100" lvl="1" indent="-457200">
-              <a:buFont typeface="+mj-lt"/>
-              <a:buAutoNum type="arabicPeriod"/>
-            </a:pPr>
-            <a:r>
-              <a:rPr lang="en-US" dirty="0"/>
-              <a:t>Estimate parameter(s) of other distribution </a:t>
-            </a:r>
-          </a:p>
-          <a:p>
-            <a:pPr marL="800100" lvl="1" indent="-457200">
-              <a:buFont typeface="+mj-lt"/>
-              <a:buAutoNum type="arabicPeriod"/>
-            </a:pPr>
-            <a:r>
-              <a:rPr lang="en-US" dirty="0"/>
-              <a:t>Repeat steps 1 and 2 until convergence  </a:t>
-            </a:r>
-          </a:p>
-          <a:p>
-            <a:endParaRPr lang="en-US" dirty="0"/>
-          </a:p>
-          <a:p>
-            <a:pPr lvl="0"/>
-            <a:endParaRPr dirty="0"/>
-          </a:p>
-        </p:txBody>
-      </p:sp>
+      <mc:AlternateContent xmlns:mc="http://schemas.openxmlformats.org/markup-compatibility/2006">
+        <mc:Choice xmlns:a14="http://schemas.microsoft.com/office/drawing/2010/main" Requires="a14">
+          <p:sp>
+            <p:nvSpPr>
+              <p:cNvPr id="3" name="Content Placeholder 2">
+                <a:extLst>
+                  <a:ext uri="{FF2B5EF4-FFF2-40B4-BE49-F238E27FC236}">
+                    <a16:creationId xmlns:a16="http://schemas.microsoft.com/office/drawing/2014/main" id="{15BB3C24-B2A6-ABAB-74A0-C12FD142248C}"/>
+                  </a:ext>
+                </a:extLst>
+              </p:cNvPr>
+              <p:cNvSpPr>
+                <a:spLocks noGrp="1"/>
+              </p:cNvSpPr>
+              <p:nvPr>
+                <p:ph idx="1"/>
+              </p:nvPr>
+            </p:nvSpPr>
+            <p:spPr>
+              <a:xfrm>
+                <a:off x="457200" y="1200151"/>
+                <a:ext cx="8229600" cy="3621976"/>
+              </a:xfrm>
+            </p:spPr>
+            <p:txBody>
+              <a:bodyPr>
+                <a:normAutofit fontScale="92500" lnSpcReduction="20000"/>
+              </a:bodyPr>
+              <a:lstStyle/>
+              <a:p>
+                <a:pPr marL="0" lvl="0" indent="0">
+                  <a:buNone/>
+                </a:pPr>
+                <a:r>
+                  <a:rPr lang="en-US" dirty="0"/>
+                  <a:t>How can we fit a model with zero inflated distributions?  </a:t>
+                </a:r>
+              </a:p>
+              <a:p>
+                <a:r>
+                  <a:rPr lang="en-US" dirty="0"/>
+                  <a:t>In some cases, a nearly analytic solution is possible    </a:t>
+                </a:r>
+              </a:p>
+              <a:p>
+                <a:r>
+                  <a:rPr lang="en-US" dirty="0"/>
+                  <a:t>How can we find a numerical solution? </a:t>
+                </a:r>
+              </a:p>
+              <a:p>
+                <a:pPr lvl="1"/>
+                <a:r>
+                  <a:rPr lang="en-US" dirty="0"/>
+                  <a:t>Fit parameters of the switching distribution </a:t>
+                </a:r>
+              </a:p>
+              <a:p>
+                <a:pPr lvl="1"/>
+                <a:r>
+                  <a:rPr lang="en-US" dirty="0"/>
+                  <a:t>Fit parameters of the other distribution </a:t>
+                </a:r>
+              </a:p>
+              <a:p>
+                <a:pPr lvl="1"/>
+                <a:r>
+                  <a:rPr lang="en-US" dirty="0"/>
+                  <a:t>The model is nonlinear!</a:t>
+                </a:r>
+              </a:p>
+              <a:p>
+                <a:r>
+                  <a:rPr lang="en-US" dirty="0"/>
+                  <a:t>Use an iterative solution</a:t>
+                </a:r>
+              </a:p>
+              <a:p>
+                <a:pPr marL="800100" lvl="1" indent="-457200">
+                  <a:buFont typeface="+mj-lt"/>
+                  <a:buAutoNum type="arabicPeriod"/>
+                </a:pPr>
+                <a:r>
+                  <a:rPr lang="en-US" dirty="0"/>
+                  <a:t>Estimate parameter(s) of switching distribution  </a:t>
+                </a:r>
+              </a:p>
+              <a:p>
+                <a:pPr marL="800100" lvl="1" indent="-457200">
+                  <a:buFont typeface="+mj-lt"/>
+                  <a:buAutoNum type="arabicPeriod"/>
+                </a:pPr>
+                <a:r>
+                  <a:rPr lang="en-US" dirty="0"/>
+                  <a:t>Estimate parameter(s) of other distribution </a:t>
+                </a:r>
+              </a:p>
+              <a:p>
+                <a:pPr marL="800100" lvl="1" indent="-457200">
+                  <a:buFont typeface="+mj-lt"/>
+                  <a:buAutoNum type="arabicPeriod"/>
+                </a:pPr>
+                <a:r>
+                  <a:rPr lang="en-US" dirty="0"/>
+                  <a:t>Estimate error in fit to the data </a:t>
+                </a:r>
+              </a:p>
+              <a:p>
+                <a:pPr marL="800100" lvl="1" indent="-457200">
+                  <a:buFont typeface="+mj-lt"/>
+                  <a:buAutoNum type="arabicPeriod"/>
+                </a:pPr>
+                <a:r>
+                  <a:rPr lang="en-US" dirty="0"/>
+                  <a:t>Repeat steps 1, 2 and 3 until convergence, </a:t>
+                </a:r>
+                <a14:m>
+                  <m:oMath xmlns:m="http://schemas.openxmlformats.org/officeDocument/2006/math">
+                    <m:r>
+                      <a:rPr lang="en-US" b="0" i="1" smtClean="0">
+                        <a:latin typeface="Cambria Math" panose="02040503050406030204" pitchFamily="18" charset="0"/>
+                      </a:rPr>
+                      <m:t>𝑒𝑟𝑟𝑜𝑟</m:t>
+                    </m:r>
+                    <m:r>
+                      <a:rPr lang="en-US" b="0" i="1" smtClean="0">
+                        <a:latin typeface="Cambria Math" panose="02040503050406030204" pitchFamily="18" charset="0"/>
+                      </a:rPr>
+                      <m:t>&lt;</m:t>
+                    </m:r>
+                    <m:r>
+                      <a:rPr lang="en-US" b="0" i="1" smtClean="0">
+                        <a:latin typeface="Cambria Math" panose="02040503050406030204" pitchFamily="18" charset="0"/>
+                      </a:rPr>
+                      <m:t>𝑡</m:t>
+                    </m:r>
+                    <m:r>
+                      <a:rPr lang="en-US" b="0" i="1" smtClean="0">
+                        <a:latin typeface="Cambria Math" panose="02040503050406030204" pitchFamily="18" charset="0"/>
+                      </a:rPr>
+                      <m:t>h</m:t>
+                    </m:r>
+                    <m:r>
+                      <a:rPr lang="en-US" b="0" i="1" smtClean="0">
+                        <a:latin typeface="Cambria Math" panose="02040503050406030204" pitchFamily="18" charset="0"/>
+                      </a:rPr>
+                      <m:t>𝑟𝑒𝑠</m:t>
+                    </m:r>
+                    <m:r>
+                      <a:rPr lang="en-US" b="0" i="1" smtClean="0">
+                        <a:latin typeface="Cambria Math" panose="02040503050406030204" pitchFamily="18" charset="0"/>
+                      </a:rPr>
+                      <m:t>h</m:t>
+                    </m:r>
+                    <m:r>
+                      <a:rPr lang="en-US" b="0" i="1" smtClean="0">
+                        <a:latin typeface="Cambria Math" panose="02040503050406030204" pitchFamily="18" charset="0"/>
+                      </a:rPr>
+                      <m:t>𝑜𝑙𝑑</m:t>
+                    </m:r>
+                  </m:oMath>
+                </a14:m>
+                <a:r>
+                  <a:rPr lang="en-US" dirty="0"/>
+                  <a:t>  </a:t>
+                </a:r>
+              </a:p>
+              <a:p>
+                <a:endParaRPr lang="en-US" dirty="0"/>
+              </a:p>
+              <a:p>
+                <a:pPr lvl="0"/>
+                <a:endParaRPr dirty="0"/>
+              </a:p>
+            </p:txBody>
+          </p:sp>
+        </mc:Choice>
+        <mc:Fallback>
+          <p:sp>
+            <p:nvSpPr>
+              <p:cNvPr id="3" name="Content Placeholder 2">
+                <a:extLst>
+                  <a:ext uri="{FF2B5EF4-FFF2-40B4-BE49-F238E27FC236}">
+                    <a16:creationId xmlns:a16="http://schemas.microsoft.com/office/drawing/2014/main" id="{15BB3C24-B2A6-ABAB-74A0-C12FD142248C}"/>
+                  </a:ext>
+                </a:extLst>
+              </p:cNvPr>
+              <p:cNvSpPr>
+                <a:spLocks noGrp="1" noRot="1" noChangeAspect="1" noMove="1" noResize="1" noEditPoints="1" noAdjustHandles="1" noChangeArrowheads="1" noChangeShapeType="1" noTextEdit="1"/>
+              </p:cNvSpPr>
+              <p:nvPr>
+                <p:ph idx="1"/>
+              </p:nvPr>
+            </p:nvSpPr>
+            <p:spPr>
+              <a:xfrm>
+                <a:off x="457200" y="1200151"/>
+                <a:ext cx="8229600" cy="3621976"/>
+              </a:xfrm>
+              <a:blipFill>
+                <a:blip r:embed="rId2"/>
+                <a:stretch>
+                  <a:fillRect l="-963" t="-2862"/>
+                </a:stretch>
+              </a:blipFill>
+            </p:spPr>
+            <p:txBody>
+              <a:bodyPr/>
+              <a:lstStyle/>
+              <a:p>
+                <a:r>
+                  <a:rPr lang="en-US">
+                    <a:noFill/>
+                  </a:rPr>
+                  <a:t> </a:t>
+                </a:r>
+              </a:p>
+            </p:txBody>
+          </p:sp>
+        </mc:Fallback>
+      </mc:AlternateContent>
     </p:spTree>
     <p:extLst>
       <p:ext uri="{BB962C8B-B14F-4D97-AF65-F5344CB8AC3E}">
@@ -4395,7 +4510,7 @@
             </p:spPr>
             <p:txBody>
               <a:bodyPr>
-                <a:normAutofit lnSpcReduction="10000"/>
+                <a:normAutofit/>
               </a:bodyPr>
               <a:lstStyle/>
               <a:p>
@@ -4408,42 +4523,9 @@
                 </a:r>
               </a:p>
               <a:p>
-                <a:r>
-                  <a:rPr lang="en-US" dirty="0"/>
-                  <a:t>Use an iterative solution</a:t>
-                </a:r>
-              </a:p>
-              <a:p>
-                <a:pPr marL="800100" lvl="1" indent="-457200">
-                  <a:buFont typeface="+mj-lt"/>
-                  <a:buAutoNum type="arabicPeriod"/>
+                <a:pPr marL="0" indent="0">
+                  <a:buNone/>
                 </a:pPr>
-                <a:r>
-                  <a:rPr lang="en-US" dirty="0"/>
-                  <a:t>Estimate parameter(s) of switching distribution  </a:t>
-                </a:r>
-              </a:p>
-              <a:p>
-                <a:pPr marL="800100" lvl="1" indent="-457200">
-                  <a:buFont typeface="+mj-lt"/>
-                  <a:buAutoNum type="arabicPeriod"/>
-                </a:pPr>
-                <a:r>
-                  <a:rPr lang="en-US" dirty="0"/>
-                  <a:t>Estimate parameter(s) of other distribution </a:t>
-                </a:r>
-              </a:p>
-              <a:p>
-                <a:pPr marL="800100" lvl="1" indent="-457200">
-                  <a:buFont typeface="+mj-lt"/>
-                  <a:buAutoNum type="arabicPeriod"/>
-                </a:pPr>
-                <a:r>
-                  <a:rPr lang="en-US" dirty="0"/>
-                  <a:t>Repeat steps 1 and 2 until convergence  </a:t>
-                </a:r>
-              </a:p>
-              <a:p>
                 <a:r>
                   <a:rPr lang="en-US" dirty="0"/>
                   <a:t>Example, zero-inflated Poisson distribution  </a:t>
@@ -4505,7 +4587,17 @@
                 </a:pPr>
                 <a:r>
                   <a:rPr lang="en-US" dirty="0"/>
-                  <a:t>Repeat steps 1 and 2 until convergence  </a:t>
+                  <a:t>Find error between estimate and observed data </a:t>
+                </a:r>
+              </a:p>
+              <a:p>
+                <a:pPr marL="800100" lvl="1" indent="-457200">
+                  <a:buFont typeface="+mj-lt"/>
+                  <a:buAutoNum type="arabicPeriod"/>
+                </a:pPr>
+                <a:r>
+                  <a:rPr lang="en-US" dirty="0"/>
+                  <a:t>Repeat steps 1, 2 and 3 until convergence  </a:t>
                 </a:r>
               </a:p>
               <a:p>
@@ -4552,7 +4644,7 @@
               <a:blipFill>
                 <a:blip r:embed="rId2"/>
                 <a:stretch>
-                  <a:fillRect l="-1111" t="-2357"/>
+                  <a:fillRect l="-1111" t="-1347"/>
                 </a:stretch>
               </a:blipFill>
             </p:spPr>
@@ -4703,7 +4795,7 @@
             </a:pPr>
             <a:r>
               <a:rPr lang="en-US" sz="2000" dirty="0"/>
-              <a:t>There is a strong right skew, some parties catch larger numbers of fish </a:t>
+              <a:t>There is a strong right skew, some parties catch large numbers of fish </a:t>
             </a:r>
           </a:p>
         </p:txBody>
@@ -5358,8 +5450,8 @@
           <a:chExt cx="0" cy="0"/>
         </a:xfrm>
       </p:grpSpPr>
-      <mc:AlternateContent xmlns:mc="http://schemas.openxmlformats.org/markup-compatibility/2006" xmlns:a14="http://schemas.microsoft.com/office/drawing/2010/main">
-        <mc:Choice Requires="a14">
+      <mc:AlternateContent xmlns:mc="http://schemas.openxmlformats.org/markup-compatibility/2006">
+        <mc:Choice xmlns:a14="http://schemas.microsoft.com/office/drawing/2010/main" Requires="a14">
           <p:sp>
             <p:nvSpPr>
               <p:cNvPr id="3" name="Content Placeholder 2">
@@ -5415,7 +5507,7 @@
                 </a:r>
                 <a:r>
                   <a:rPr lang="en-US" dirty="0"/>
-                  <a:t>transforms the distributions of the residuals to </a:t>
+                  <a:t>transforms the distributions of the residuals to approximately </a:t>
                 </a:r>
                 <a14:m>
                   <m:oMath xmlns:m="http://schemas.openxmlformats.org/officeDocument/2006/math">
@@ -5646,7 +5738,7 @@
             </p:txBody>
           </p:sp>
         </mc:Choice>
-        <mc:Fallback xmlns="">
+        <mc:Fallback>
           <p:sp>
             <p:nvSpPr>
               <p:cNvPr id="3" name="Content Placeholder 2">
@@ -5671,7 +5763,7 @@
               <a:blipFill>
                 <a:blip r:embed="rId3"/>
                 <a:stretch>
-                  <a:fillRect l="-1111" t="-1294" r="-1333"/>
+                  <a:fillRect l="-1111" t="-1294" r="-889"/>
                 </a:stretch>
               </a:blipFill>
             </p:spPr>
@@ -6220,8 +6312,8 @@
         </p:nvSpPr>
         <p:spPr>
           <a:xfrm>
-            <a:off x="457200" y="1200151"/>
-            <a:ext cx="8229600" cy="3737370"/>
+            <a:off x="457200" y="1167938"/>
+            <a:ext cx="8229600" cy="3769583"/>
           </a:xfrm>
         </p:spPr>
         <p:txBody>
@@ -6338,7 +6430,15 @@
             <a:pPr lvl="1"/>
             <a:r>
               <a:rPr dirty="0"/>
-              <a:t>If there </a:t>
+              <a:t>If there</a:t>
+            </a:r>
+            <a:r>
+              <a:rPr lang="en-US" dirty="0"/>
+              <a:t> is</a:t>
+            </a:r>
+            <a:r>
+              <a:rPr dirty="0"/>
+              <a:t> </a:t>
             </a:r>
             <a:r>
               <a:rPr b="1" dirty="0"/>
@@ -6546,8 +6646,8 @@
           </a:p>
         </p:txBody>
       </p:sp>
-      <mc:AlternateContent xmlns:mc="http://schemas.openxmlformats.org/markup-compatibility/2006" xmlns:a14="http://schemas.microsoft.com/office/drawing/2010/main">
-        <mc:Choice Requires="a14">
+      <mc:AlternateContent xmlns:mc="http://schemas.openxmlformats.org/markup-compatibility/2006">
+        <mc:Choice xmlns:a14="http://schemas.microsoft.com/office/drawing/2010/main" Requires="a14">
           <p:sp>
             <p:nvSpPr>
               <p:cNvPr id="3" name="Content Placeholder 2">
@@ -7098,14 +7198,14 @@
                 <a:pPr lvl="1"/>
                 <a:r>
                   <a:rPr lang="en-US" dirty="0"/>
-                  <a:t>First and third distributions give weight on left and right tails </a:t>
+                  <a:t>First and third distributions have weight on left and right tails </a:t>
                 </a:r>
                 <a:endParaRPr dirty="0"/>
               </a:p>
             </p:txBody>
           </p:sp>
         </mc:Choice>
-        <mc:Fallback xmlns="">
+        <mc:Fallback>
           <p:sp>
             <p:nvSpPr>
               <p:cNvPr id="3" name="Content Placeholder 2">
@@ -7259,7 +7359,7 @@
             <a:pPr lvl="0"/>
             <a:r>
               <a:rPr lang="en-US" dirty="0"/>
-              <a:t>Student-t with low degrees of freedom</a:t>
+              <a:t>Student-t with low degrees of freedom – not a GLM! </a:t>
             </a:r>
           </a:p>
           <a:p>
@@ -7375,8 +7475,8 @@
           </a:p>
         </p:txBody>
       </p:sp>
-      <mc:AlternateContent xmlns:mc="http://schemas.openxmlformats.org/markup-compatibility/2006" xmlns:a14="http://schemas.microsoft.com/office/drawing/2010/main">
-        <mc:Choice Requires="a14">
+      <mc:AlternateContent xmlns:mc="http://schemas.openxmlformats.org/markup-compatibility/2006">
+        <mc:Choice xmlns:a14="http://schemas.microsoft.com/office/drawing/2010/main" Requires="a14">
           <p:sp>
             <p:nvSpPr>
               <p:cNvPr id="3" name="Content Placeholder 2">
@@ -7874,7 +7974,7 @@
                 </a14:m>
                 <a:r>
                   <a:rPr lang="en-US" dirty="0"/>
-                  <a:t>, pronounced </a:t>
+                  <a:t>, pronounced ‘</a:t>
                 </a:r>
                 <a14:m>
                   <m:oMath xmlns:m="http://schemas.openxmlformats.org/officeDocument/2006/math">
@@ -7902,7 +8002,7 @@
                 </a14:m>
                 <a:r>
                   <a:rPr lang="en-US" dirty="0"/>
-                  <a:t>, is the number of combinations of size </a:t>
+                  <a:t>’, is the number of combinations of size </a:t>
                 </a:r>
                 <a14:m>
                   <m:oMath xmlns:m="http://schemas.openxmlformats.org/officeDocument/2006/math">
@@ -7936,7 +8036,7 @@
             </p:txBody>
           </p:sp>
         </mc:Choice>
-        <mc:Fallback xmlns="">
+        <mc:Fallback>
           <p:sp>
             <p:nvSpPr>
               <p:cNvPr id="3" name="Content Placeholder 2">
@@ -8048,8 +8148,8 @@
           </a:p>
         </p:txBody>
       </p:sp>
-      <mc:AlternateContent xmlns:mc="http://schemas.openxmlformats.org/markup-compatibility/2006" xmlns:a14="http://schemas.microsoft.com/office/drawing/2010/main">
-        <mc:Choice Requires="a14">
+      <mc:AlternateContent xmlns:mc="http://schemas.openxmlformats.org/markup-compatibility/2006">
+        <mc:Choice xmlns:a14="http://schemas.microsoft.com/office/drawing/2010/main" Requires="a14">
           <p:sp>
             <p:nvSpPr>
               <p:cNvPr id="3" name="Content Placeholder 2">
@@ -8074,7 +8174,7 @@
             </p:spPr>
             <p:txBody>
               <a:bodyPr>
-                <a:normAutofit fontScale="92500" lnSpcReduction="10000"/>
+                <a:normAutofit lnSpcReduction="10000"/>
               </a:bodyPr>
               <a:lstStyle/>
               <a:p>
@@ -8373,7 +8473,7 @@
               <a:p>
                 <a:r>
                   <a:rPr lang="en-US" dirty="0"/>
-                  <a:t>We can reparametrize to get a form suitable for analysis in terms of the average arrival rate, </a:t>
+                  <a:t>Reparametrize to get a form suitable for analysis in terms of the expected arrival rate, </a:t>
                 </a:r>
                 <a14:m>
                   <m:oMath xmlns:m="http://schemas.openxmlformats.org/officeDocument/2006/math">
@@ -8388,7 +8488,7 @@
                 </a14:m>
                 <a:r>
                   <a:rPr lang="en-US" dirty="0"/>
-                  <a:t>, and the variance, </a:t>
+                  <a:t>,  variance, </a:t>
                 </a:r>
                 <a14:m>
                   <m:oMath xmlns:m="http://schemas.openxmlformats.org/officeDocument/2006/math">
@@ -8420,7 +8520,26 @@
                     </m:sSup>
                   </m:oMath>
                 </a14:m>
-                <a:endParaRPr lang="en-US" dirty="0"/>
+                <a:r>
+                  <a:rPr lang="en-US" dirty="0"/>
+                  <a:t> and </a:t>
+                </a:r>
+                <a:r>
+                  <a:rPr lang="en-US" b="1" dirty="0"/>
+                  <a:t>over-dispersion parameter, </a:t>
+                </a:r>
+                <a14:m>
+                  <m:oMath xmlns:m="http://schemas.openxmlformats.org/officeDocument/2006/math">
+                    <m:r>
+                      <a:rPr lang="en-US" b="1" i="1">
+                        <a:latin typeface="Cambria Math" panose="02040503050406030204" pitchFamily="18" charset="0"/>
+                        <a:ea typeface="Cambria Math" panose="02040503050406030204" pitchFamily="18" charset="0"/>
+                      </a:rPr>
+                      <m:t>𝜶</m:t>
+                    </m:r>
+                  </m:oMath>
+                </a14:m>
+                <a:endParaRPr lang="en-US" b="1" dirty="0"/>
               </a:p>
               <a:p>
                 <a:pPr marL="342900" lvl="1" indent="0">
@@ -8432,6 +8551,97 @@
                       <m:jc m:val="centerGroup"/>
                     </m:oMathParaPr>
                     <m:oMath xmlns:m="http://schemas.openxmlformats.org/officeDocument/2006/math">
+                      <m:sSup>
+                        <m:sSupPr>
+                          <m:ctrlPr>
+                            <a:rPr lang="en-US" i="1">
+                              <a:latin typeface="Cambria Math" panose="02040503050406030204" pitchFamily="18" charset="0"/>
+                            </a:rPr>
+                          </m:ctrlPr>
+                        </m:sSupPr>
+                        <m:e>
+                          <m:r>
+                            <a:rPr lang="en-US" i="1">
+                              <a:latin typeface="Cambria Math" panose="02040503050406030204" pitchFamily="18" charset="0"/>
+                              <a:ea typeface="Cambria Math" panose="02040503050406030204" pitchFamily="18" charset="0"/>
+                            </a:rPr>
+                            <m:t>𝜎</m:t>
+                          </m:r>
+                        </m:e>
+                        <m:sup>
+                          <m:r>
+                            <a:rPr lang="en-US" i="1">
+                              <a:latin typeface="Cambria Math" panose="02040503050406030204" pitchFamily="18" charset="0"/>
+                            </a:rPr>
+                            <m:t>2</m:t>
+                          </m:r>
+                        </m:sup>
+                      </m:sSup>
+                      <m:r>
+                        <a:rPr lang="en-US" i="1">
+                          <a:latin typeface="Cambria Math" panose="02040503050406030204" pitchFamily="18" charset="0"/>
+                        </a:rPr>
+                        <m:t>=</m:t>
+                      </m:r>
+                      <m:r>
+                        <a:rPr lang="en-US" i="1">
+                          <a:latin typeface="Cambria Math" panose="02040503050406030204" pitchFamily="18" charset="0"/>
+                          <a:ea typeface="Cambria Math" panose="02040503050406030204" pitchFamily="18" charset="0"/>
+                        </a:rPr>
+                        <m:t>𝜇</m:t>
+                      </m:r>
+                      <m:r>
+                        <a:rPr lang="en-US" i="1">
+                          <a:latin typeface="Cambria Math" panose="02040503050406030204" pitchFamily="18" charset="0"/>
+                          <a:ea typeface="Cambria Math" panose="02040503050406030204" pitchFamily="18" charset="0"/>
+                        </a:rPr>
+                        <m:t>+</m:t>
+                      </m:r>
+                      <m:r>
+                        <a:rPr lang="en-US" i="1">
+                          <a:latin typeface="Cambria Math" panose="02040503050406030204" pitchFamily="18" charset="0"/>
+                          <a:ea typeface="Cambria Math" panose="02040503050406030204" pitchFamily="18" charset="0"/>
+                        </a:rPr>
+                        <m:t>𝛼</m:t>
+                      </m:r>
+                      <m:sSup>
+                        <m:sSupPr>
+                          <m:ctrlPr>
+                            <a:rPr lang="en-US" i="1">
+                              <a:latin typeface="Cambria Math" panose="02040503050406030204" pitchFamily="18" charset="0"/>
+                            </a:rPr>
+                          </m:ctrlPr>
+                        </m:sSupPr>
+                        <m:e>
+                          <m:r>
+                            <a:rPr lang="en-US" i="1">
+                              <a:latin typeface="Cambria Math" panose="02040503050406030204" pitchFamily="18" charset="0"/>
+                              <a:ea typeface="Cambria Math" panose="02040503050406030204" pitchFamily="18" charset="0"/>
+                            </a:rPr>
+                            <m:t>𝜇</m:t>
+                          </m:r>
+                        </m:e>
+                        <m:sup>
+                          <m:r>
+                            <a:rPr lang="en-US" i="1">
+                              <a:latin typeface="Cambria Math" panose="02040503050406030204" pitchFamily="18" charset="0"/>
+                            </a:rPr>
+                            <m:t>2</m:t>
+                          </m:r>
+                        </m:sup>
+                      </m:sSup>
+                      <m:r>
+                        <a:rPr lang="en-US" i="1">
+                          <a:latin typeface="Cambria Math" panose="02040503050406030204" pitchFamily="18" charset="0"/>
+                        </a:rPr>
+                        <m:t> </m:t>
+                      </m:r>
+                      <m:r>
+                        <a:rPr lang="en-US" b="0" i="1" smtClean="0">
+                          <a:latin typeface="Cambria Math" panose="02040503050406030204" pitchFamily="18" charset="0"/>
+                        </a:rPr>
+                        <m:t>,  </m:t>
+                      </m:r>
                       <m:r>
                         <a:rPr lang="en-US" b="0" i="1" smtClean="0">
                           <a:latin typeface="Cambria Math" panose="02040503050406030204" pitchFamily="18" charset="0"/>
@@ -8592,118 +8802,9 @@
                 <a:endParaRPr lang="en-US" dirty="0"/>
               </a:p>
               <a:p>
-                <a:pPr marL="342900" lvl="1" indent="0">
-                  <a:buNone/>
-                </a:pPr>
-                <a:r>
-                  <a:rPr lang="en-US" dirty="0"/>
-                  <a:t>And for over-dispersion parameter, </a:t>
-                </a:r>
-                <a14:m>
-                  <m:oMath xmlns:m="http://schemas.openxmlformats.org/officeDocument/2006/math">
-                    <m:r>
-                      <a:rPr lang="en-US" i="1" smtClean="0">
-                        <a:latin typeface="Cambria Math" panose="02040503050406030204" pitchFamily="18" charset="0"/>
-                        <a:ea typeface="Cambria Math" panose="02040503050406030204" pitchFamily="18" charset="0"/>
-                      </a:rPr>
-                      <m:t>𝛼</m:t>
-                    </m:r>
-                  </m:oMath>
-                </a14:m>
-                <a:endParaRPr lang="en-US" dirty="0"/>
-              </a:p>
-              <a:p>
                 <a:pPr marL="0" indent="0">
                   <a:buNone/>
                 </a:pPr>
-                <a14:m>
-                  <m:oMathPara xmlns:m="http://schemas.openxmlformats.org/officeDocument/2006/math">
-                    <m:oMathParaPr>
-                      <m:jc m:val="centerGroup"/>
-                    </m:oMathParaPr>
-                    <m:oMath xmlns:m="http://schemas.openxmlformats.org/officeDocument/2006/math">
-                      <m:sSup>
-                        <m:sSupPr>
-                          <m:ctrlPr>
-                            <a:rPr lang="en-US" i="1">
-                              <a:latin typeface="Cambria Math" panose="02040503050406030204" pitchFamily="18" charset="0"/>
-                            </a:rPr>
-                          </m:ctrlPr>
-                        </m:sSupPr>
-                        <m:e>
-                          <m:r>
-                            <a:rPr lang="en-US" i="1">
-                              <a:latin typeface="Cambria Math" panose="02040503050406030204" pitchFamily="18" charset="0"/>
-                              <a:ea typeface="Cambria Math" panose="02040503050406030204" pitchFamily="18" charset="0"/>
-                            </a:rPr>
-                            <m:t>𝜎</m:t>
-                          </m:r>
-                        </m:e>
-                        <m:sup>
-                          <m:r>
-                            <a:rPr lang="en-US" i="1">
-                              <a:latin typeface="Cambria Math" panose="02040503050406030204" pitchFamily="18" charset="0"/>
-                            </a:rPr>
-                            <m:t>2</m:t>
-                          </m:r>
-                        </m:sup>
-                      </m:sSup>
-                      <m:r>
-                        <a:rPr lang="en-US" i="1">
-                          <a:latin typeface="Cambria Math" panose="02040503050406030204" pitchFamily="18" charset="0"/>
-                        </a:rPr>
-                        <m:t>=</m:t>
-                      </m:r>
-                      <m:r>
-                        <a:rPr lang="en-US" i="1">
-                          <a:latin typeface="Cambria Math" panose="02040503050406030204" pitchFamily="18" charset="0"/>
-                          <a:ea typeface="Cambria Math" panose="02040503050406030204" pitchFamily="18" charset="0"/>
-                        </a:rPr>
-                        <m:t>𝜇</m:t>
-                      </m:r>
-                      <m:r>
-                        <a:rPr lang="en-US" i="1">
-                          <a:latin typeface="Cambria Math" panose="02040503050406030204" pitchFamily="18" charset="0"/>
-                          <a:ea typeface="Cambria Math" panose="02040503050406030204" pitchFamily="18" charset="0"/>
-                        </a:rPr>
-                        <m:t>+</m:t>
-                      </m:r>
-                      <m:r>
-                        <a:rPr lang="en-US" i="1">
-                          <a:latin typeface="Cambria Math" panose="02040503050406030204" pitchFamily="18" charset="0"/>
-                          <a:ea typeface="Cambria Math" panose="02040503050406030204" pitchFamily="18" charset="0"/>
-                        </a:rPr>
-                        <m:t>𝛼</m:t>
-                      </m:r>
-                      <m:sSup>
-                        <m:sSupPr>
-                          <m:ctrlPr>
-                            <a:rPr lang="en-US" i="1">
-                              <a:latin typeface="Cambria Math" panose="02040503050406030204" pitchFamily="18" charset="0"/>
-                            </a:rPr>
-                          </m:ctrlPr>
-                        </m:sSupPr>
-                        <m:e>
-                          <m:r>
-                            <a:rPr lang="en-US" i="1">
-                              <a:latin typeface="Cambria Math" panose="02040503050406030204" pitchFamily="18" charset="0"/>
-                              <a:ea typeface="Cambria Math" panose="02040503050406030204" pitchFamily="18" charset="0"/>
-                            </a:rPr>
-                            <m:t>𝜇</m:t>
-                          </m:r>
-                        </m:e>
-                        <m:sup>
-                          <m:r>
-                            <a:rPr lang="en-US" i="1">
-                              <a:latin typeface="Cambria Math" panose="02040503050406030204" pitchFamily="18" charset="0"/>
-                            </a:rPr>
-                            <m:t>2</m:t>
-                          </m:r>
-                        </m:sup>
-                      </m:sSup>
-                    </m:oMath>
-                  </m:oMathPara>
-                </a14:m>
                 <a:endParaRPr lang="en-US" dirty="0"/>
               </a:p>
               <a:p>
@@ -8719,7 +8820,7 @@
             </p:txBody>
           </p:sp>
         </mc:Choice>
-        <mc:Fallback xmlns="">
+        <mc:Fallback>
           <p:sp>
             <p:nvSpPr>
               <p:cNvPr id="3" name="Content Placeholder 2">
@@ -8744,7 +8845,7 @@
               <a:blipFill>
                 <a:blip r:embed="rId3"/>
                 <a:stretch>
-                  <a:fillRect l="-963" t="-1852" r="-667" b="-673"/>
+                  <a:fillRect l="-1111" t="-2357" r="-1630"/>
                 </a:stretch>
               </a:blipFill>
             </p:spPr>
@@ -8831,8 +8932,8 @@
           </a:p>
         </p:txBody>
       </p:sp>
-      <mc:AlternateContent xmlns:mc="http://schemas.openxmlformats.org/markup-compatibility/2006" xmlns:a14="http://schemas.microsoft.com/office/drawing/2010/main">
-        <mc:Choice Requires="a14">
+      <mc:AlternateContent xmlns:mc="http://schemas.openxmlformats.org/markup-compatibility/2006">
+        <mc:Choice xmlns:a14="http://schemas.microsoft.com/office/drawing/2010/main" Requires="a14">
           <p:sp>
             <p:nvSpPr>
               <p:cNvPr id="3" name="Content Placeholder 2">
@@ -8857,7 +8958,7 @@
             </p:spPr>
             <p:txBody>
               <a:bodyPr>
-                <a:normAutofit fontScale="77500" lnSpcReduction="20000"/>
+                <a:normAutofit fontScale="85000" lnSpcReduction="20000"/>
               </a:bodyPr>
               <a:lstStyle/>
               <a:p>
@@ -8981,6 +9082,91 @@
                       <m:jc m:val="centerGroup"/>
                     </m:oMathParaPr>
                     <m:oMath xmlns:m="http://schemas.openxmlformats.org/officeDocument/2006/math">
+                      <m:sSup>
+                        <m:sSupPr>
+                          <m:ctrlPr>
+                            <a:rPr lang="en-US" i="1">
+                              <a:latin typeface="Cambria Math" panose="02040503050406030204" pitchFamily="18" charset="0"/>
+                            </a:rPr>
+                          </m:ctrlPr>
+                        </m:sSupPr>
+                        <m:e>
+                          <m:r>
+                            <a:rPr lang="en-US" i="1">
+                              <a:latin typeface="Cambria Math" panose="02040503050406030204" pitchFamily="18" charset="0"/>
+                              <a:ea typeface="Cambria Math" panose="02040503050406030204" pitchFamily="18" charset="0"/>
+                            </a:rPr>
+                            <m:t>𝜎</m:t>
+                          </m:r>
+                        </m:e>
+                        <m:sup>
+                          <m:r>
+                            <a:rPr lang="en-US" i="1">
+                              <a:latin typeface="Cambria Math" panose="02040503050406030204" pitchFamily="18" charset="0"/>
+                            </a:rPr>
+                            <m:t>2</m:t>
+                          </m:r>
+                        </m:sup>
+                      </m:sSup>
+                      <m:r>
+                        <a:rPr lang="en-US" i="1">
+                          <a:latin typeface="Cambria Math" panose="02040503050406030204" pitchFamily="18" charset="0"/>
+                        </a:rPr>
+                        <m:t>=</m:t>
+                      </m:r>
+                      <m:r>
+                        <a:rPr lang="en-US" i="1">
+                          <a:latin typeface="Cambria Math" panose="02040503050406030204" pitchFamily="18" charset="0"/>
+                          <a:ea typeface="Cambria Math" panose="02040503050406030204" pitchFamily="18" charset="0"/>
+                        </a:rPr>
+                        <m:t>𝜇</m:t>
+                      </m:r>
+                      <m:r>
+                        <a:rPr lang="en-US" i="1">
+                          <a:latin typeface="Cambria Math" panose="02040503050406030204" pitchFamily="18" charset="0"/>
+                          <a:ea typeface="Cambria Math" panose="02040503050406030204" pitchFamily="18" charset="0"/>
+                        </a:rPr>
+                        <m:t>+</m:t>
+                      </m:r>
+                      <m:r>
+                        <a:rPr lang="en-US" i="1">
+                          <a:latin typeface="Cambria Math" panose="02040503050406030204" pitchFamily="18" charset="0"/>
+                          <a:ea typeface="Cambria Math" panose="02040503050406030204" pitchFamily="18" charset="0"/>
+                        </a:rPr>
+                        <m:t>𝛼</m:t>
+                      </m:r>
+                      <m:sSup>
+                        <m:sSupPr>
+                          <m:ctrlPr>
+                            <a:rPr lang="en-US" i="1">
+                              <a:latin typeface="Cambria Math" panose="02040503050406030204" pitchFamily="18" charset="0"/>
+                            </a:rPr>
+                          </m:ctrlPr>
+                        </m:sSupPr>
+                        <m:e>
+                          <m:r>
+                            <a:rPr lang="en-US" i="1">
+                              <a:latin typeface="Cambria Math" panose="02040503050406030204" pitchFamily="18" charset="0"/>
+                              <a:ea typeface="Cambria Math" panose="02040503050406030204" pitchFamily="18" charset="0"/>
+                            </a:rPr>
+                            <m:t>𝜇</m:t>
+                          </m:r>
+                        </m:e>
+                        <m:sup>
+                          <m:r>
+                            <a:rPr lang="en-US" i="1">
+                              <a:latin typeface="Cambria Math" panose="02040503050406030204" pitchFamily="18" charset="0"/>
+                            </a:rPr>
+                            <m:t>2</m:t>
+                          </m:r>
+                        </m:sup>
+                      </m:sSup>
+                      <m:r>
+                        <a:rPr lang="en-US" b="0" i="1" smtClean="0">
+                          <a:latin typeface="Cambria Math" panose="02040503050406030204" pitchFamily="18" charset="0"/>
+                        </a:rPr>
+                        <m:t>,  </m:t>
+                      </m:r>
                       <m:r>
                         <a:rPr lang="en-US" b="0" i="1" smtClean="0">
                           <a:latin typeface="Cambria Math" panose="02040503050406030204" pitchFamily="18" charset="0"/>
@@ -9135,109 +9321,6 @@
                           </m:r>
                         </m:den>
                       </m:f>
-                    </m:oMath>
-                  </m:oMathPara>
-                </a14:m>
-                <a:endParaRPr lang="en-US" dirty="0"/>
-              </a:p>
-              <a:p>
-                <a:pPr marL="342900" lvl="1" indent="0">
-                  <a:buNone/>
-                </a:pPr>
-                <a:r>
-                  <a:rPr lang="en-US" dirty="0"/>
-                  <a:t>Where,</a:t>
-                </a:r>
-              </a:p>
-              <a:p>
-                <a:pPr marL="0" indent="0">
-                  <a:buNone/>
-                </a:pPr>
-                <a14:m>
-                  <m:oMathPara xmlns:m="http://schemas.openxmlformats.org/officeDocument/2006/math">
-                    <m:oMathParaPr>
-                      <m:jc m:val="centerGroup"/>
-                    </m:oMathParaPr>
-                    <m:oMath xmlns:m="http://schemas.openxmlformats.org/officeDocument/2006/math">
-                      <m:sSup>
-                        <m:sSupPr>
-                          <m:ctrlPr>
-                            <a:rPr lang="en-US" i="1" smtClean="0">
-                              <a:latin typeface="Cambria Math" panose="02040503050406030204" pitchFamily="18" charset="0"/>
-                            </a:rPr>
-                          </m:ctrlPr>
-                        </m:sSupPr>
-                        <m:e>
-                          <m:r>
-                            <a:rPr lang="en-US" i="1" smtClean="0">
-                              <a:latin typeface="Cambria Math" panose="02040503050406030204" pitchFamily="18" charset="0"/>
-                              <a:ea typeface="Cambria Math" panose="02040503050406030204" pitchFamily="18" charset="0"/>
-                            </a:rPr>
-                            <m:t>𝜎</m:t>
-                          </m:r>
-                        </m:e>
-                        <m:sup>
-                          <m:r>
-                            <a:rPr lang="en-US" b="0" i="1" smtClean="0">
-                              <a:latin typeface="Cambria Math" panose="02040503050406030204" pitchFamily="18" charset="0"/>
-                            </a:rPr>
-                            <m:t>2</m:t>
-                          </m:r>
-                        </m:sup>
-                      </m:sSup>
-                      <m:r>
-                        <a:rPr lang="en-US" b="0" i="1" smtClean="0">
-                          <a:latin typeface="Cambria Math" panose="02040503050406030204" pitchFamily="18" charset="0"/>
-                        </a:rPr>
-                        <m:t>=</m:t>
-                      </m:r>
-                      <m:r>
-                        <a:rPr lang="en-US" b="0" i="1" smtClean="0">
-                          <a:latin typeface="Cambria Math" panose="02040503050406030204" pitchFamily="18" charset="0"/>
-                          <a:ea typeface="Cambria Math" panose="02040503050406030204" pitchFamily="18" charset="0"/>
-                        </a:rPr>
-                        <m:t>𝜇</m:t>
-                      </m:r>
-                      <m:r>
-                        <a:rPr lang="en-US" b="0" i="1" smtClean="0">
-                          <a:latin typeface="Cambria Math" panose="02040503050406030204" pitchFamily="18" charset="0"/>
-                          <a:ea typeface="Cambria Math" panose="02040503050406030204" pitchFamily="18" charset="0"/>
-                        </a:rPr>
-                        <m:t>+</m:t>
-                      </m:r>
-                      <m:r>
-                        <a:rPr lang="en-US" b="0" i="1" smtClean="0">
-                          <a:latin typeface="Cambria Math" panose="02040503050406030204" pitchFamily="18" charset="0"/>
-                          <a:ea typeface="Cambria Math" panose="02040503050406030204" pitchFamily="18" charset="0"/>
-                        </a:rPr>
-                        <m:t>𝛼</m:t>
-                      </m:r>
-                      <m:sSup>
-                        <m:sSupPr>
-                          <m:ctrlPr>
-                            <a:rPr lang="en-US" i="1">
-                              <a:latin typeface="Cambria Math" panose="02040503050406030204" pitchFamily="18" charset="0"/>
-                            </a:rPr>
-                          </m:ctrlPr>
-                        </m:sSupPr>
-                        <m:e>
-                          <m:r>
-                            <a:rPr lang="en-US" i="1">
-                              <a:latin typeface="Cambria Math" panose="02040503050406030204" pitchFamily="18" charset="0"/>
-                              <a:ea typeface="Cambria Math" panose="02040503050406030204" pitchFamily="18" charset="0"/>
-                            </a:rPr>
-                            <m:t>𝜇</m:t>
-                          </m:r>
-                        </m:e>
-                        <m:sup>
-                          <m:r>
-                            <a:rPr lang="en-US" i="1">
-                              <a:latin typeface="Cambria Math" panose="02040503050406030204" pitchFamily="18" charset="0"/>
-                            </a:rPr>
-                            <m:t>2</m:t>
-                          </m:r>
-                        </m:sup>
-                      </m:sSup>
                     </m:oMath>
                   </m:oMathPara>
                 </a14:m>
@@ -9416,7 +9499,7 @@
                 </a14:m>
                 <a:r>
                   <a:rPr lang="en-US" dirty="0"/>
-                  <a:t> the negative binomial distribution identical to the Poisson distribution </a:t>
+                  <a:t> the negative binomial distribution is identical to the Poisson distribution </a:t>
                 </a:r>
               </a:p>
               <a:p>
@@ -9429,7 +9512,7 @@
             </p:txBody>
           </p:sp>
         </mc:Choice>
-        <mc:Fallback xmlns="">
+        <mc:Fallback>
           <p:sp>
             <p:nvSpPr>
               <p:cNvPr id="3" name="Content Placeholder 2">
@@ -9454,7 +9537,7 @@
               <a:blipFill>
                 <a:blip r:embed="rId3"/>
                 <a:stretch>
-                  <a:fillRect l="-667" t="-2189"/>
+                  <a:fillRect l="-741" t="-2357"/>
                 </a:stretch>
               </a:blipFill>
             </p:spPr>
@@ -9580,14 +9663,14 @@
           <a:p>
             <a:r>
               <a:rPr lang="en-US" dirty="0"/>
-              <a:t>Yes, we can combine these two properties   </a:t>
+              <a:t>Create a mixture of two distributions </a:t>
             </a:r>
           </a:p>
           <a:p>
             <a:pPr lvl="1"/>
             <a:r>
               <a:rPr lang="en-US" dirty="0"/>
-              <a:t>A switching distribution for the zero-inflation</a:t>
+              <a:t>A binomial switching distribution for the zero-inflation</a:t>
             </a:r>
           </a:p>
           <a:p>
@@ -9621,7 +9704,7 @@
             <a:pPr lvl="1"/>
             <a:r>
               <a:rPr lang="en-US" dirty="0"/>
-              <a:t>Most days there are no auto accidents on a segment of road most days, but there are a few days with a high number of accidents   </a:t>
+              <a:t>Most days there are no auto accidents on a segment of road, but there are a few days with high numbers of accidents   </a:t>
             </a:r>
           </a:p>
           <a:p>
@@ -10825,9 +10908,9 @@
           <p:nvPr/>
         </p:nvCxnSpPr>
         <p:spPr>
-          <a:xfrm>
-            <a:off x="3821618" y="3140943"/>
-            <a:ext cx="377241" cy="49206"/>
+          <a:xfrm flipV="1">
+            <a:off x="3378770" y="3190149"/>
+            <a:ext cx="820089" cy="762553"/>
           </a:xfrm>
           <a:prstGeom prst="straightConnector1">
             <a:avLst/>
@@ -11415,7 +11498,22 @@
             </a:r>
             <a:r>
               <a:rPr lang="en-US" dirty="0"/>
-              <a:t>have a long (typically right) tail </a:t>
+              <a:t>have a long tails </a:t>
+            </a:r>
+          </a:p>
+          <a:p>
+            <a:pPr lvl="1"/>
+            <a:r>
+              <a:rPr lang="en-US" dirty="0"/>
+              <a:t>Can be asymmetric with long </a:t>
+            </a:r>
+            <a:r>
+              <a:rPr lang="en-US" dirty="0" err="1"/>
+              <a:t>righ</a:t>
+            </a:r>
+            <a:r>
+              <a:rPr lang="en-US" dirty="0"/>
+              <a:t> tail</a:t>
             </a:r>
           </a:p>
           <a:p>
@@ -11603,7 +11701,7 @@
             </a:pPr>
             <a:r>
               <a:rPr lang="en-US" sz="2000" dirty="0"/>
-              <a:t>Perhaps a Bayesian model would have been a better choice</a:t>
+              <a:t>Perhaps a Bayesian model would have been a better choice?</a:t>
             </a:r>
           </a:p>
         </p:txBody>
@@ -11737,7 +11835,7 @@
         </p:spPr>
         <p:txBody>
           <a:bodyPr>
-            <a:normAutofit/>
+            <a:normAutofit fontScale="92500" lnSpcReduction="20000"/>
           </a:bodyPr>
           <a:lstStyle/>
           <a:p>
@@ -11760,7 +11858,7 @@
             </a:pPr>
             <a:r>
               <a:rPr lang="en-US" sz="2000" dirty="0"/>
-              <a:t>Residual plots are similar   </a:t>
+              <a:t>Residual plots are similar, with noticeable outliers    </a:t>
             </a:r>
           </a:p>
           <a:p>
@@ -11770,7 +11868,17 @@
             </a:pPr>
             <a:r>
               <a:rPr lang="en-US" sz="2000" dirty="0"/>
-              <a:t>Both models exhibit a bit of heteroskedasticity   </a:t>
+              <a:t>Both models exhibit a bit of heteroskedasticity</a:t>
+            </a:r>
+          </a:p>
+          <a:p>
+            <a:pPr marL="342900" lvl="0" indent="-342900">
+              <a:buFont typeface="Arial" panose="020B0604020202020204" pitchFamily="34" charset="0"/>
+              <a:buChar char="•"/>
+            </a:pPr>
+            <a:r>
+              <a:rPr lang="en-US" sz="2000" dirty="0"/>
+              <a:t>Heteroskedasticity near zero could be result of poor fit of binomial parameter   </a:t>
             </a:r>
           </a:p>
         </p:txBody>
@@ -12101,7 +12209,17 @@
             </a:pPr>
             <a:r>
               <a:rPr lang="en-US" sz="2000" dirty="0"/>
-              <a:t>The distribution of residuals of the NB distribution regression is slightly less as can be see from greater fraction in straight line (e.g. Normal) </a:t>
+              <a:t>Bulk of residual distribution more symmetric for NB distribution </a:t>
+            </a:r>
+          </a:p>
+          <a:p>
+            <a:pPr marL="342900" lvl="0" indent="-342900">
+              <a:buFont typeface="Arial" panose="020B0604020202020204" pitchFamily="34" charset="0"/>
+              <a:buChar char="•"/>
+            </a:pPr>
+            <a:r>
+              <a:rPr lang="en-US" sz="2000" dirty="0"/>
+              <a:t>Notice the greater fraction in straight line (e.g. Normal) for NB distribution</a:t>
             </a:r>
           </a:p>
         </p:txBody>
@@ -12122,8 +12240,8 @@
         </p:nvCxnSpPr>
         <p:spPr>
           <a:xfrm flipH="1">
-            <a:off x="3192087" y="2103120"/>
-            <a:ext cx="1683328" cy="1903615"/>
+            <a:off x="3192087" y="2273531"/>
+            <a:ext cx="1126375" cy="1733204"/>
           </a:xfrm>
           <a:prstGeom prst="straightConnector1">
             <a:avLst/>
@@ -12340,8 +12458,8 @@
         </p:nvCxnSpPr>
         <p:spPr>
           <a:xfrm>
-            <a:off x="4866078" y="2103120"/>
-            <a:ext cx="2931260" cy="1860909"/>
+            <a:off x="5798127" y="2273531"/>
+            <a:ext cx="1999211" cy="1690498"/>
           </a:xfrm>
           <a:prstGeom prst="straightConnector1">
             <a:avLst/>
@@ -12406,10 +12524,10 @@
       </p:grpSpPr>
       <p:pic>
         <p:nvPicPr>
-          <p:cNvPr id="8" name="Picture 7">
+          <p:cNvPr id="5" name="Picture 4">
             <a:extLst>
               <a:ext uri="{FF2B5EF4-FFF2-40B4-BE49-F238E27FC236}">
-                <a16:creationId xmlns:a16="http://schemas.microsoft.com/office/drawing/2014/main" id="{DC0EE5BF-8915-786A-C492-08A02FDF95BD}"/>
+                <a16:creationId xmlns:a16="http://schemas.microsoft.com/office/drawing/2014/main" id="{939E026C-DE03-7E12-04AD-1D030B1EB977}"/>
               </a:ext>
             </a:extLst>
           </p:cNvPr>
@@ -12426,8 +12544,8 @@
         </p:blipFill>
         <p:spPr>
           <a:xfrm>
-            <a:off x="552797" y="2644025"/>
-            <a:ext cx="8246536" cy="2294688"/>
+            <a:off x="658784" y="2697999"/>
+            <a:ext cx="7826432" cy="2200402"/>
           </a:xfrm>
           <a:prstGeom prst="rect">
             <a:avLst/>
@@ -12650,7 +12768,7 @@
         <p:spPr>
           <a:xfrm>
             <a:off x="3038302" y="2177935"/>
-            <a:ext cx="1354974" cy="1371600"/>
+            <a:ext cx="1338349" cy="1446414"/>
           </a:xfrm>
           <a:prstGeom prst="straightConnector1">
             <a:avLst/>
@@ -12693,52 +12811,8 @@
         </p:nvCxnSpPr>
         <p:spPr>
           <a:xfrm flipH="1">
-            <a:off x="2660073" y="2177935"/>
-            <a:ext cx="128847" cy="685800"/>
-          </a:xfrm>
-          <a:prstGeom prst="straightConnector1">
-            <a:avLst/>
-          </a:prstGeom>
-          <a:ln w="38100">
-            <a:solidFill>
-              <a:srgbClr val="C00000"/>
-            </a:solidFill>
-            <a:tailEnd type="triangle"/>
-          </a:ln>
-        </p:spPr>
-        <p:style>
-          <a:lnRef idx="2">
-            <a:schemeClr val="accent1"/>
-          </a:lnRef>
-          <a:fillRef idx="0">
-            <a:schemeClr val="accent1"/>
-          </a:fillRef>
-          <a:effectRef idx="1">
-            <a:schemeClr val="accent1"/>
-          </a:effectRef>
-          <a:fontRef idx="minor">
-            <a:schemeClr val="tx1"/>
-          </a:fontRef>
-        </p:style>
-      </p:cxnSp>
-      <p:cxnSp>
-        <p:nvCxnSpPr>
-          <p:cNvPr id="26" name="Straight Arrow Connector 25">
-            <a:extLst>
-              <a:ext uri="{FF2B5EF4-FFF2-40B4-BE49-F238E27FC236}">
-                <a16:creationId xmlns:a16="http://schemas.microsoft.com/office/drawing/2014/main" id="{CA425464-A4E1-5170-C64F-67841E4B0A51}"/>
-              </a:ext>
-            </a:extLst>
-          </p:cNvPr>
-          <p:cNvCxnSpPr>
-            <a:cxnSpLocks/>
-          </p:cNvCxnSpPr>
-          <p:nvPr/>
-        </p:nvCxnSpPr>
-        <p:spPr>
-          <a:xfrm>
-            <a:off x="4026131" y="2223655"/>
-            <a:ext cx="2100349" cy="1005840"/>
+            <a:off x="2630978" y="2177935"/>
+            <a:ext cx="157942" cy="723207"/>
           </a:xfrm>
           <a:prstGeom prst="straightConnector1">
             <a:avLst/>
@@ -12925,8 +12999,25 @@
             <a:pPr lvl="1"/>
             <a:r>
               <a:rPr dirty="0"/>
-              <a:t>Errors or noisy measurements</a:t>
-            </a:r>
+              <a:t>Errors or noisy measurement</a:t>
+            </a:r>
+            <a:r>
+              <a:rPr lang="en-US" dirty="0"/>
+              <a:t> value</a:t>
+            </a:r>
+            <a:r>
+              <a:rPr dirty="0"/>
+              <a:t>s</a:t>
+            </a:r>
+            <a:endParaRPr lang="en-US" dirty="0"/>
+          </a:p>
+          <a:p>
+            <a:pPr lvl="1"/>
+            <a:r>
+              <a:rPr lang="en-US" dirty="0"/>
+              <a:t>Extreme events not accounted for in model</a:t>
+            </a:r>
+            <a:endParaRPr dirty="0"/>
           </a:p>
           <a:p>
             <a:pPr lvl="1"/>
@@ -13097,66 +13188,43 @@
             </a:r>
           </a:p>
           <a:p>
-            <a:pPr marL="285750" lvl="0" indent="-285750">
+            <a:pPr marL="285750" indent="-285750">
               <a:buFont typeface="Arial" panose="020B0604020202020204" pitchFamily="34" charset="0"/>
               <a:buChar char="•"/>
             </a:pPr>
             <a:r>
               <a:rPr lang="en-US" sz="1800" dirty="0"/>
-              <a:t>Regression without the outlier </a:t>
-            </a:r>
-          </a:p>
-          <a:p>
-            <a:pPr marL="628650" lvl="1" indent="-285750">
+              <a:t>Add a single </a:t>
+            </a:r>
+            <a:r>
+              <a:rPr lang="en-US" sz="1800" b="1" dirty="0"/>
+              <a:t>outlier with high leverage </a:t>
+            </a:r>
+            <a:r>
+              <a:rPr lang="en-US" sz="1800" dirty="0"/>
+              <a:t>to the regression data set</a:t>
+            </a:r>
+          </a:p>
+          <a:p>
+            <a:pPr marL="285750" indent="-285750">
               <a:buFont typeface="Arial" panose="020B0604020202020204" pitchFamily="34" charset="0"/>
               <a:buChar char="•"/>
             </a:pPr>
             <a:r>
-              <a:rPr lang="en-US" sz="1650" dirty="0"/>
-              <a:t>Regression line represents the bulk of the data well</a:t>
-            </a:r>
-          </a:p>
-          <a:p>
-            <a:pPr marL="285750" lvl="0" indent="-285750">
+              <a:rPr lang="en-US" sz="1800" dirty="0"/>
+              <a:t>Regression without the outlier represents the bulk of the data well</a:t>
+            </a:r>
+          </a:p>
+          <a:p>
+            <a:pPr marL="285750" indent="-285750">
               <a:buFont typeface="Arial" panose="020B0604020202020204" pitchFamily="34" charset="0"/>
               <a:buChar char="•"/>
             </a:pPr>
             <a:r>
-              <a:rPr sz="1800" dirty="0"/>
-              <a:t>Add a single </a:t>
-            </a:r>
-            <a:r>
-              <a:rPr sz="1800" b="1" dirty="0"/>
-              <a:t>outlier</a:t>
-            </a:r>
-            <a:r>
-              <a:rPr lang="en-US" sz="1800" b="1" dirty="0"/>
-              <a:t> with high leverage</a:t>
-            </a:r>
-            <a:r>
-              <a:rPr sz="1800" b="1" dirty="0"/>
-              <a:t> </a:t>
-            </a:r>
-            <a:r>
               <a:rPr lang="en-US" sz="1800" dirty="0"/>
-              <a:t>to the </a:t>
-            </a:r>
-            <a:r>
-              <a:rPr sz="1800" dirty="0"/>
-              <a:t>regression data set</a:t>
-            </a:r>
-            <a:endParaRPr lang="en-US" sz="1800" dirty="0"/>
-          </a:p>
-          <a:p>
-            <a:pPr marL="628650" lvl="1" indent="-285750">
-              <a:buFont typeface="Arial" panose="020B0604020202020204" pitchFamily="34" charset="0"/>
-              <a:buChar char="•"/>
-            </a:pPr>
-            <a:r>
-              <a:rPr lang="en-US" sz="1650" dirty="0"/>
-              <a:t>The regression line is now skewed with respect to the bulk of the data </a:t>
-            </a:r>
-            <a:endParaRPr sz="1650" dirty="0"/>
+              <a:t>The regression line with the outlier is skewed with respect to the bulk of the data </a:t>
+            </a:r>
+            <a:endParaRPr sz="1800" dirty="0"/>
           </a:p>
         </p:txBody>
       </p:sp>
@@ -13205,9 +13273,9 @@
           <p:nvPr/>
         </p:nvCxnSpPr>
         <p:spPr>
-          <a:xfrm>
-            <a:off x="4767072" y="2178304"/>
-            <a:ext cx="3604768" cy="300736"/>
+          <a:xfrm flipV="1">
+            <a:off x="4767072" y="2479040"/>
+            <a:ext cx="3604768" cy="52185"/>
           </a:xfrm>
           <a:prstGeom prst="straightConnector1">
             <a:avLst/>
@@ -13251,7 +13319,7 @@
         <p:spPr>
           <a:xfrm flipV="1">
             <a:off x="4767072" y="1247648"/>
-            <a:ext cx="764032" cy="1540256"/>
+            <a:ext cx="764032" cy="643497"/>
           </a:xfrm>
           <a:prstGeom prst="straightConnector1">
             <a:avLst/>
@@ -13294,8 +13362,8 @@
         </p:nvCxnSpPr>
         <p:spPr>
           <a:xfrm>
-            <a:off x="4531360" y="3364992"/>
-            <a:ext cx="1641856" cy="451104"/>
+            <a:off x="4554728" y="3441469"/>
+            <a:ext cx="1659128" cy="374627"/>
           </a:xfrm>
           <a:prstGeom prst="straightConnector1">
             <a:avLst/>
@@ -13442,7 +13510,7 @@
             </a:pPr>
             <a:r>
               <a:rPr lang="en-US" sz="1800" dirty="0"/>
-              <a:t>Intercept is essentially the same </a:t>
+              <a:t>Intercept has only small change </a:t>
             </a:r>
           </a:p>
           <a:p>
@@ -13452,7 +13520,7 @@
             </a:pPr>
             <a:r>
               <a:rPr lang="en-US" sz="1800" dirty="0"/>
-              <a:t>Slope is changed   </a:t>
+              <a:t>Slope is noticeably changed   </a:t>
             </a:r>
           </a:p>
           <a:p>
@@ -14090,6 +14158,214 @@
 </file>
 
 <file path=ppt/slides/slide39.xml><?xml version="1.0" encoding="utf-8"?>
+<p:sld xmlns:a="http://schemas.openxmlformats.org/drawingml/2006/main" xmlns:r="http://schemas.openxmlformats.org/officeDocument/2006/relationships" xmlns:p="http://schemas.openxmlformats.org/presentationml/2006/main">
+  <p:cSld>
+    <p:spTree>
+      <p:nvGrpSpPr>
+        <p:cNvPr id="1" name="">
+          <a:extLst>
+            <a:ext uri="{FF2B5EF4-FFF2-40B4-BE49-F238E27FC236}">
+              <a16:creationId xmlns:a16="http://schemas.microsoft.com/office/drawing/2014/main" id="{67CF1735-9903-BE8B-601F-5E7F191EC334}"/>
+            </a:ext>
+          </a:extLst>
+        </p:cNvPr>
+        <p:cNvGrpSpPr/>
+        <p:nvPr/>
+      </p:nvGrpSpPr>
+      <p:grpSpPr>
+        <a:xfrm>
+          <a:off x="0" y="0"/>
+          <a:ext cx="0" cy="0"/>
+          <a:chOff x="0" y="0"/>
+          <a:chExt cx="0" cy="0"/>
+        </a:xfrm>
+      </p:grpSpPr>
+      <p:sp>
+        <p:nvSpPr>
+          <p:cNvPr id="2" name="Title 1">
+            <a:extLst>
+              <a:ext uri="{FF2B5EF4-FFF2-40B4-BE49-F238E27FC236}">
+                <a16:creationId xmlns:a16="http://schemas.microsoft.com/office/drawing/2014/main" id="{F87B9E11-5EA0-97D5-B56A-60615F66973C}"/>
+              </a:ext>
+            </a:extLst>
+          </p:cNvPr>
+          <p:cNvSpPr>
+            <a:spLocks noGrp="1"/>
+          </p:cNvSpPr>
+          <p:nvPr>
+            <p:ph type="title"/>
+          </p:nvPr>
+        </p:nvSpPr>
+        <p:spPr/>
+        <p:txBody>
+          <a:bodyPr/>
+          <a:lstStyle/>
+          <a:p>
+            <a:pPr marL="0" lvl="0" indent="0">
+              <a:buNone/>
+            </a:pPr>
+            <a:r>
+              <a:rPr lang="en-US" dirty="0">
+                <a:latin typeface="+mn-lt"/>
+              </a:rPr>
+              <a:t>Measuring Influence of </a:t>
+            </a:r>
+            <a:r>
+              <a:rPr dirty="0">
+                <a:latin typeface="+mn-lt"/>
+              </a:rPr>
+              <a:t>Outliers</a:t>
+            </a:r>
+          </a:p>
+        </p:txBody>
+      </p:sp>
+      <p:sp>
+        <p:nvSpPr>
+          <p:cNvPr id="3" name="Content Placeholder 2">
+            <a:extLst>
+              <a:ext uri="{FF2B5EF4-FFF2-40B4-BE49-F238E27FC236}">
+                <a16:creationId xmlns:a16="http://schemas.microsoft.com/office/drawing/2014/main" id="{9711098F-EB4C-4DC9-6F93-02AA0DA4FFF3}"/>
+              </a:ext>
+            </a:extLst>
+          </p:cNvPr>
+          <p:cNvSpPr>
+            <a:spLocks noGrp="1"/>
+          </p:cNvSpPr>
+          <p:nvPr>
+            <p:ph idx="1"/>
+          </p:nvPr>
+        </p:nvSpPr>
+        <p:spPr>
+          <a:xfrm>
+            <a:off x="457200" y="1200150"/>
+            <a:ext cx="8229600" cy="3609675"/>
+          </a:xfrm>
+        </p:spPr>
+        <p:txBody>
+          <a:bodyPr>
+            <a:normAutofit/>
+          </a:bodyPr>
+          <a:lstStyle/>
+          <a:p>
+            <a:pPr marL="0" lvl="0" indent="0">
+              <a:buNone/>
+            </a:pPr>
+            <a:r>
+              <a:rPr lang="en-US" dirty="0"/>
+              <a:t>There are several measures we can use to understand outliers</a:t>
+            </a:r>
+          </a:p>
+          <a:p>
+            <a:r>
+              <a:rPr lang="en-US" b="1" dirty="0"/>
+              <a:t>Residual distance</a:t>
+            </a:r>
+            <a:r>
+              <a:rPr lang="en-US" dirty="0"/>
+              <a:t>, the difference between observed and model response    </a:t>
+            </a:r>
+          </a:p>
+          <a:p>
+            <a:r>
+              <a:rPr lang="en-US" b="1" dirty="0"/>
+              <a:t>Leverage</a:t>
+            </a:r>
+            <a:r>
+              <a:rPr lang="en-US" dirty="0"/>
+              <a:t>, the absolute distance from the mean of the independent variables   </a:t>
+            </a:r>
+          </a:p>
+          <a:p>
+            <a:r>
+              <a:rPr lang="en-US" b="1" dirty="0"/>
+              <a:t>Influence and Cooke’s distance</a:t>
+            </a:r>
+            <a:r>
+              <a:rPr lang="en-US" dirty="0"/>
+              <a:t>, the change in the response from leaving out an observation when fitting the model   </a:t>
+            </a:r>
+            <a:endParaRPr dirty="0"/>
+          </a:p>
+        </p:txBody>
+      </p:sp>
+    </p:spTree>
+    <p:extLst>
+      <p:ext uri="{BB962C8B-B14F-4D97-AF65-F5344CB8AC3E}">
+        <p14:creationId xmlns:p14="http://schemas.microsoft.com/office/powerpoint/2010/main" val="2272712016"/>
+      </p:ext>
+    </p:extLst>
+  </p:cSld>
+  <p:clrMapOvr>
+    <a:masterClrMapping/>
+  </p:clrMapOvr>
+</p:sld>
+</file>
+
+<file path=ppt/slides/slide4.xml><?xml version="1.0" encoding="utf-8"?>
+<p:sld xmlns:a="http://schemas.openxmlformats.org/drawingml/2006/main" xmlns:r="http://schemas.openxmlformats.org/officeDocument/2006/relationships" xmlns:p="http://schemas.openxmlformats.org/presentationml/2006/main">
+  <p:cSld>
+    <p:spTree>
+      <p:nvGrpSpPr>
+        <p:cNvPr id="1" name=""/>
+        <p:cNvGrpSpPr/>
+        <p:nvPr/>
+      </p:nvGrpSpPr>
+      <p:grpSpPr>
+        <a:xfrm>
+          <a:off x="0" y="0"/>
+          <a:ext cx="0" cy="0"/>
+          <a:chOff x="0" y="0"/>
+          <a:chExt cx="0" cy="0"/>
+        </a:xfrm>
+      </p:grpSpPr>
+      <p:sp>
+        <p:nvSpPr>
+          <p:cNvPr id="2" name="Title 1">
+            <a:extLst>
+              <a:ext uri="{FF2B5EF4-FFF2-40B4-BE49-F238E27FC236}">
+                <a16:creationId xmlns:a16="http://schemas.microsoft.com/office/drawing/2014/main" id="{5498C255-8488-A6BF-D8CF-6C0F8BDB00EA}"/>
+              </a:ext>
+            </a:extLst>
+          </p:cNvPr>
+          <p:cNvSpPr>
+            <a:spLocks noGrp="1"/>
+          </p:cNvSpPr>
+          <p:nvPr>
+            <p:ph type="title"/>
+          </p:nvPr>
+        </p:nvSpPr>
+        <p:spPr>
+          <a:xfrm>
+            <a:off x="771081" y="1850264"/>
+            <a:ext cx="7772400" cy="1021556"/>
+          </a:xfrm>
+        </p:spPr>
+        <p:txBody>
+          <a:bodyPr/>
+          <a:lstStyle/>
+          <a:p>
+            <a:pPr algn="ctr"/>
+            <a:r>
+              <a:rPr lang="en-US" b="0" cap="none" dirty="0"/>
+              <a:t>Models for Zero-Inflated Response</a:t>
+            </a:r>
+          </a:p>
+        </p:txBody>
+      </p:sp>
+    </p:spTree>
+    <p:extLst>
+      <p:ext uri="{BB962C8B-B14F-4D97-AF65-F5344CB8AC3E}">
+        <p14:creationId xmlns:p14="http://schemas.microsoft.com/office/powerpoint/2010/main" val="3761794938"/>
+      </p:ext>
+    </p:extLst>
+  </p:cSld>
+  <p:clrMapOvr>
+    <a:masterClrMapping/>
+  </p:clrMapOvr>
+</p:sld>
+</file>
+
+<file path=ppt/slides/slide40.xml><?xml version="1.0" encoding="utf-8"?>
 <p:sld xmlns:a="http://schemas.openxmlformats.org/drawingml/2006/main" xmlns:r="http://schemas.openxmlformats.org/officeDocument/2006/relationships" xmlns:p="http://schemas.openxmlformats.org/presentationml/2006/main">
   <p:cSld>
     <p:spTree>
@@ -14798,71 +15074,7 @@
 </p:sld>
 </file>
 
-<file path=ppt/slides/slide4.xml><?xml version="1.0" encoding="utf-8"?>
-<p:sld xmlns:a="http://schemas.openxmlformats.org/drawingml/2006/main" xmlns:r="http://schemas.openxmlformats.org/officeDocument/2006/relationships" xmlns:p="http://schemas.openxmlformats.org/presentationml/2006/main">
-  <p:cSld>
-    <p:spTree>
-      <p:nvGrpSpPr>
-        <p:cNvPr id="1" name=""/>
-        <p:cNvGrpSpPr/>
-        <p:nvPr/>
-      </p:nvGrpSpPr>
-      <p:grpSpPr>
-        <a:xfrm>
-          <a:off x="0" y="0"/>
-          <a:ext cx="0" cy="0"/>
-          <a:chOff x="0" y="0"/>
-          <a:chExt cx="0" cy="0"/>
-        </a:xfrm>
-      </p:grpSpPr>
-      <p:sp>
-        <p:nvSpPr>
-          <p:cNvPr id="2" name="Title 1">
-            <a:extLst>
-              <a:ext uri="{FF2B5EF4-FFF2-40B4-BE49-F238E27FC236}">
-                <a16:creationId xmlns:a16="http://schemas.microsoft.com/office/drawing/2014/main" id="{5498C255-8488-A6BF-D8CF-6C0F8BDB00EA}"/>
-              </a:ext>
-            </a:extLst>
-          </p:cNvPr>
-          <p:cNvSpPr>
-            <a:spLocks noGrp="1"/>
-          </p:cNvSpPr>
-          <p:nvPr>
-            <p:ph type="title"/>
-          </p:nvPr>
-        </p:nvSpPr>
-        <p:spPr>
-          <a:xfrm>
-            <a:off x="771081" y="1850264"/>
-            <a:ext cx="7772400" cy="1021556"/>
-          </a:xfrm>
-        </p:spPr>
-        <p:txBody>
-          <a:bodyPr/>
-          <a:lstStyle/>
-          <a:p>
-            <a:pPr algn="ctr"/>
-            <a:r>
-              <a:rPr lang="en-US" b="0" cap="none" dirty="0"/>
-              <a:t>Models for Zero-Inflated Response</a:t>
-            </a:r>
-          </a:p>
-        </p:txBody>
-      </p:sp>
-    </p:spTree>
-    <p:extLst>
-      <p:ext uri="{BB962C8B-B14F-4D97-AF65-F5344CB8AC3E}">
-        <p14:creationId xmlns:p14="http://schemas.microsoft.com/office/powerpoint/2010/main" val="3761794938"/>
-      </p:ext>
-    </p:extLst>
-  </p:cSld>
-  <p:clrMapOvr>
-    <a:masterClrMapping/>
-  </p:clrMapOvr>
-</p:sld>
-</file>
-
-<file path=ppt/slides/slide40.xml><?xml version="1.0" encoding="utf-8"?>
+<file path=ppt/slides/slide41.xml><?xml version="1.0" encoding="utf-8"?>
 <p:sld xmlns:a="http://schemas.openxmlformats.org/drawingml/2006/main" xmlns:r="http://schemas.openxmlformats.org/officeDocument/2006/relationships" xmlns:p="http://schemas.openxmlformats.org/presentationml/2006/main">
   <p:cSld>
     <p:spTree>
@@ -15037,7 +15249,7 @@
 </p:sld>
 </file>
 
-<file path=ppt/slides/slide41.xml><?xml version="1.0" encoding="utf-8"?>
+<file path=ppt/slides/slide42.xml><?xml version="1.0" encoding="utf-8"?>
 <p:sld xmlns:a="http://schemas.openxmlformats.org/drawingml/2006/main" xmlns:r="http://schemas.openxmlformats.org/officeDocument/2006/relationships" xmlns:p="http://schemas.openxmlformats.org/presentationml/2006/main">
   <p:cSld>
     <p:spTree>
@@ -15160,11 +15372,11 @@
             <a:pPr lvl="1"/>
             <a:r>
               <a:rPr lang="en-US" dirty="0"/>
-              <a:t>Influence function is </a:t>
+              <a:t>But the influence function is </a:t>
             </a:r>
             <a:r>
               <a:rPr lang="en-US" b="1" dirty="0"/>
-              <a:t>unbounded</a:t>
+              <a:t>unbounded!</a:t>
             </a:r>
           </a:p>
           <a:p>
@@ -15188,7 +15400,7 @@
 </p:sld>
 </file>
 
-<file path=ppt/slides/slide42.xml><?xml version="1.0" encoding="utf-8"?>
+<file path=ppt/slides/slide43.xml><?xml version="1.0" encoding="utf-8"?>
 <p:sld xmlns:a="http://schemas.openxmlformats.org/drawingml/2006/main" xmlns:r="http://schemas.openxmlformats.org/officeDocument/2006/relationships" xmlns:p="http://schemas.openxmlformats.org/presentationml/2006/main">
   <p:cSld>
     <p:spTree>
@@ -15347,8 +15559,12 @@
           <a:p>
             <a:pPr lvl="1"/>
             <a:r>
+              <a:rPr lang="en-US" dirty="0" err="1"/>
+              <a:t>Difficulet</a:t>
+            </a:r>
+            <a:r>
               <a:rPr dirty="0"/>
-              <a:t>Hard to implement beyond 1-dimension</a:t>
+              <a:t> to implement beyond 1-dimension</a:t>
             </a:r>
             <a:endParaRPr lang="en-US" dirty="0"/>
           </a:p>
@@ -15403,7 +15619,7 @@
 </p:sld>
 </file>
 
-<file path=ppt/slides/slide43.xml><?xml version="1.0" encoding="utf-8"?>
+<file path=ppt/slides/slide44.xml><?xml version="1.0" encoding="utf-8"?>
 <p:sld xmlns:a="http://schemas.openxmlformats.org/drawingml/2006/main" xmlns:r="http://schemas.openxmlformats.org/officeDocument/2006/relationships" xmlns:p="http://schemas.openxmlformats.org/presentationml/2006/main">
   <p:cSld>
     <p:spTree>
@@ -15530,6 +15746,11 @@
               <a:rPr dirty="0"/>
               <a:t>Derivative of influence function is not defined</a:t>
             </a:r>
+            <a:r>
+              <a:rPr lang="en-US" dirty="0"/>
+              <a:t> at 0</a:t>
+            </a:r>
+            <a:endParaRPr dirty="0"/>
           </a:p>
         </p:txBody>
       </p:sp>
@@ -15633,7 +15854,7 @@
 </p:sld>
 </file>
 
-<file path=ppt/slides/slide44.xml><?xml version="1.0" encoding="utf-8"?>
+<file path=ppt/slides/slide45.xml><?xml version="1.0" encoding="utf-8"?>
 <p:sld xmlns:a="http://schemas.openxmlformats.org/drawingml/2006/main" xmlns:r="http://schemas.openxmlformats.org/officeDocument/2006/relationships" xmlns:p="http://schemas.openxmlformats.org/presentationml/2006/main">
   <p:cSld>
     <p:spTree>
@@ -16333,7 +16554,7 @@
 </p:sld>
 </file>
 
-<file path=ppt/slides/slide45.xml><?xml version="1.0" encoding="utf-8"?>
+<file path=ppt/slides/slide46.xml><?xml version="1.0" encoding="utf-8"?>
 <p:sld xmlns:a="http://schemas.openxmlformats.org/drawingml/2006/main" xmlns:r="http://schemas.openxmlformats.org/officeDocument/2006/relationships" xmlns:p="http://schemas.openxmlformats.org/presentationml/2006/main">
   <p:cSld>
     <p:spTree>
@@ -16488,7 +16709,7 @@
 </p:sld>
 </file>
 
-<file path=ppt/slides/slide46.xml><?xml version="1.0" encoding="utf-8"?>
+<file path=ppt/slides/slide47.xml><?xml version="1.0" encoding="utf-8"?>
 <p:sld xmlns:a="http://schemas.openxmlformats.org/drawingml/2006/main" xmlns:r="http://schemas.openxmlformats.org/officeDocument/2006/relationships" xmlns:p="http://schemas.openxmlformats.org/presentationml/2006/main">
   <p:cSld>
     <p:spTree>
@@ -16963,7 +17184,7 @@
 </p:sld>
 </file>
 
-<file path=ppt/slides/slide47.xml><?xml version="1.0" encoding="utf-8"?>
+<file path=ppt/slides/slide48.xml><?xml version="1.0" encoding="utf-8"?>
 <p:sld xmlns:a="http://schemas.openxmlformats.org/drawingml/2006/main" xmlns:r="http://schemas.openxmlformats.org/officeDocument/2006/relationships" xmlns:p="http://schemas.openxmlformats.org/presentationml/2006/main">
   <p:cSld>
     <p:spTree>
@@ -17005,8 +17226,8 @@
           </a:p>
         </p:txBody>
       </p:sp>
-      <mc:AlternateContent xmlns:mc="http://schemas.openxmlformats.org/markup-compatibility/2006" xmlns:a14="http://schemas.microsoft.com/office/drawing/2010/main">
-        <mc:Choice Requires="a14">
+      <mc:AlternateContent xmlns:mc="http://schemas.openxmlformats.org/markup-compatibility/2006">
+        <mc:Choice xmlns:a14="http://schemas.microsoft.com/office/drawing/2010/main" Requires="a14">
           <p:sp>
             <p:nvSpPr>
               <p:cNvPr id="3" name="Content Placeholder 2"/>
@@ -17065,8 +17286,20 @@
               <a:p>
                 <a:pPr lvl="0"/>
                 <a:r>
+                  <a:rPr lang="en-US" dirty="0"/>
+                  <a:t>E</a:t>
+                </a:r>
+                <a:r>
                   <a:rPr dirty="0"/>
-                  <a:t>An example is </a:t>
+                  <a:t>xample</a:t>
+                </a:r>
+                <a:r>
+                  <a:rPr lang="en-US" dirty="0"/>
+                  <a:t>,</a:t>
+                </a:r>
+                <a:r>
+                  <a:rPr dirty="0"/>
+                  <a:t> </a:t>
                 </a:r>
                 <a:r>
                   <a:rPr b="1" dirty="0"/>
@@ -17129,7 +17362,7 @@
             </p:txBody>
           </p:sp>
         </mc:Choice>
-        <mc:Fallback xmlns="">
+        <mc:Fallback>
           <p:sp>
             <p:nvSpPr>
               <p:cNvPr id="3" name="Content Placeholder 2"/>
@@ -17419,7 +17652,7 @@
 </p:sld>
 </file>
 
-<file path=ppt/slides/slide48.xml><?xml version="1.0" encoding="utf-8"?>
+<file path=ppt/slides/slide49.xml><?xml version="1.0" encoding="utf-8"?>
 <p:sld xmlns:a="http://schemas.openxmlformats.org/drawingml/2006/main" xmlns:r="http://schemas.openxmlformats.org/officeDocument/2006/relationships" xmlns:p="http://schemas.openxmlformats.org/presentationml/2006/main">
   <p:cSld>
     <p:spTree>
@@ -17772,7 +18005,168 @@
 </p:sld>
 </file>
 
-<file path=ppt/slides/slide49.xml><?xml version="1.0" encoding="utf-8"?>
+<file path=ppt/slides/slide5.xml><?xml version="1.0" encoding="utf-8"?>
+<p:sld xmlns:a="http://schemas.openxmlformats.org/drawingml/2006/main" xmlns:r="http://schemas.openxmlformats.org/officeDocument/2006/relationships" xmlns:p="http://schemas.openxmlformats.org/presentationml/2006/main">
+  <p:cSld>
+    <p:spTree>
+      <p:nvGrpSpPr>
+        <p:cNvPr id="1" name="">
+          <a:extLst>
+            <a:ext uri="{FF2B5EF4-FFF2-40B4-BE49-F238E27FC236}">
+              <a16:creationId xmlns:a16="http://schemas.microsoft.com/office/drawing/2014/main" id="{9AC68F5F-5608-0C70-F2DD-623A1DC2FC79}"/>
+            </a:ext>
+          </a:extLst>
+        </p:cNvPr>
+        <p:cNvGrpSpPr/>
+        <p:nvPr/>
+      </p:nvGrpSpPr>
+      <p:grpSpPr>
+        <a:xfrm>
+          <a:off x="0" y="0"/>
+          <a:ext cx="0" cy="0"/>
+          <a:chOff x="0" y="0"/>
+          <a:chExt cx="0" cy="0"/>
+        </a:xfrm>
+      </p:grpSpPr>
+      <p:sp>
+        <p:nvSpPr>
+          <p:cNvPr id="2" name="Title 1">
+            <a:extLst>
+              <a:ext uri="{FF2B5EF4-FFF2-40B4-BE49-F238E27FC236}">
+                <a16:creationId xmlns:a16="http://schemas.microsoft.com/office/drawing/2014/main" id="{68CF49BB-AD56-E7CF-4823-D942D28B5EBD}"/>
+              </a:ext>
+            </a:extLst>
+          </p:cNvPr>
+          <p:cNvSpPr>
+            <a:spLocks noGrp="1"/>
+          </p:cNvSpPr>
+          <p:nvPr>
+            <p:ph type="title"/>
+          </p:nvPr>
+        </p:nvSpPr>
+        <p:spPr/>
+        <p:txBody>
+          <a:bodyPr/>
+          <a:lstStyle/>
+          <a:p>
+            <a:pPr marL="0" lvl="0" indent="0">
+              <a:buNone/>
+            </a:pPr>
+            <a:r>
+              <a:rPr lang="en-US" dirty="0"/>
+              <a:t>Zero-Inflated Responses</a:t>
+            </a:r>
+            <a:endParaRPr dirty="0"/>
+          </a:p>
+        </p:txBody>
+      </p:sp>
+      <p:sp>
+        <p:nvSpPr>
+          <p:cNvPr id="3" name="Content Placeholder 2">
+            <a:extLst>
+              <a:ext uri="{FF2B5EF4-FFF2-40B4-BE49-F238E27FC236}">
+                <a16:creationId xmlns:a16="http://schemas.microsoft.com/office/drawing/2014/main" id="{A2E97D54-EC36-0EE6-7D66-58D0B07E5E81}"/>
+              </a:ext>
+            </a:extLst>
+          </p:cNvPr>
+          <p:cNvSpPr>
+            <a:spLocks noGrp="1"/>
+          </p:cNvSpPr>
+          <p:nvPr>
+            <p:ph idx="1"/>
+          </p:nvPr>
+        </p:nvSpPr>
+        <p:spPr/>
+        <p:txBody>
+          <a:bodyPr>
+            <a:normAutofit fontScale="85000" lnSpcReduction="10000"/>
+          </a:bodyPr>
+          <a:lstStyle/>
+          <a:p>
+            <a:pPr marL="0" lvl="0" indent="0">
+              <a:buNone/>
+            </a:pPr>
+            <a:r>
+              <a:rPr lang="en-US" dirty="0"/>
+              <a:t>Zero-inflated response variables arise in many situations </a:t>
+            </a:r>
+            <a:endParaRPr dirty="0"/>
+          </a:p>
+          <a:p>
+            <a:pPr lvl="0"/>
+            <a:r>
+              <a:rPr lang="en-US" dirty="0"/>
+              <a:t>Most people who view an ecommerce site buy 0 products</a:t>
+            </a:r>
+          </a:p>
+          <a:p>
+            <a:pPr lvl="0"/>
+            <a:r>
+              <a:rPr lang="en-US" dirty="0"/>
+              <a:t>Most auto drivers have no crashes per year </a:t>
+            </a:r>
+          </a:p>
+          <a:p>
+            <a:pPr lvl="0"/>
+            <a:r>
+              <a:rPr lang="en-US" dirty="0"/>
+              <a:t>Most dental patients examined require 0 root </a:t>
+            </a:r>
+            <a:r>
+              <a:rPr lang="en-US" dirty="0" err="1"/>
+              <a:t>cannals</a:t>
+            </a:r>
+            <a:r>
+              <a:rPr lang="en-US" dirty="0"/>
+              <a:t> </a:t>
+            </a:r>
+          </a:p>
+          <a:p>
+            <a:pPr lvl="0"/>
+            <a:r>
+              <a:rPr lang="en-US" dirty="0"/>
+              <a:t>In much of the world the average rainfall amount on a specific day is 0 </a:t>
+            </a:r>
+          </a:p>
+          <a:p>
+            <a:pPr lvl="0"/>
+            <a:r>
+              <a:rPr lang="en-US" dirty="0"/>
+              <a:t>The number of sever weather events in a specific area per month is typically 0  </a:t>
+            </a:r>
+          </a:p>
+          <a:p>
+            <a:r>
+              <a:rPr lang="en-US" dirty="0"/>
+              <a:t>In epidemiology the probability distribution of the number of people contracting a disease in per day has many zeros</a:t>
+            </a:r>
+          </a:p>
+          <a:p>
+            <a:r>
+              <a:rPr lang="en-US" dirty="0"/>
+              <a:t>Etc.</a:t>
+            </a:r>
+          </a:p>
+          <a:p>
+            <a:pPr lvl="0"/>
+            <a:endParaRPr dirty="0"/>
+          </a:p>
+        </p:txBody>
+      </p:sp>
+    </p:spTree>
+    <p:extLst>
+      <p:ext uri="{BB962C8B-B14F-4D97-AF65-F5344CB8AC3E}">
+        <p14:creationId xmlns:p14="http://schemas.microsoft.com/office/powerpoint/2010/main" val="1417896931"/>
+      </p:ext>
+    </p:extLst>
+  </p:cSld>
+  <p:clrMapOvr>
+    <a:masterClrMapping/>
+  </p:clrMapOvr>
+</p:sld>
+</file>
+
+<file path=ppt/slides/slide50.xml><?xml version="1.0" encoding="utf-8"?>
 <p:sld xmlns:a="http://schemas.openxmlformats.org/drawingml/2006/main" xmlns:r="http://schemas.openxmlformats.org/officeDocument/2006/relationships" xmlns:p="http://schemas.openxmlformats.org/presentationml/2006/main">
   <p:cSld>
     <p:spTree>
@@ -17946,8 +18340,8 @@
         </p:nvCxnSpPr>
         <p:spPr>
           <a:xfrm>
-            <a:off x="4289368" y="1691640"/>
-            <a:ext cx="4343399" cy="556953"/>
+            <a:off x="4326775" y="1691640"/>
+            <a:ext cx="4305992" cy="556953"/>
           </a:xfrm>
           <a:prstGeom prst="straightConnector1">
             <a:avLst/>
@@ -18070,153 +18464,7 @@
 </p:sld>
 </file>
 
-<file path=ppt/slides/slide5.xml><?xml version="1.0" encoding="utf-8"?>
-<p:sld xmlns:a="http://schemas.openxmlformats.org/drawingml/2006/main" xmlns:r="http://schemas.openxmlformats.org/officeDocument/2006/relationships" xmlns:p="http://schemas.openxmlformats.org/presentationml/2006/main">
-  <p:cSld>
-    <p:spTree>
-      <p:nvGrpSpPr>
-        <p:cNvPr id="1" name="">
-          <a:extLst>
-            <a:ext uri="{FF2B5EF4-FFF2-40B4-BE49-F238E27FC236}">
-              <a16:creationId xmlns:a16="http://schemas.microsoft.com/office/drawing/2014/main" id="{9AC68F5F-5608-0C70-F2DD-623A1DC2FC79}"/>
-            </a:ext>
-          </a:extLst>
-        </p:cNvPr>
-        <p:cNvGrpSpPr/>
-        <p:nvPr/>
-      </p:nvGrpSpPr>
-      <p:grpSpPr>
-        <a:xfrm>
-          <a:off x="0" y="0"/>
-          <a:ext cx="0" cy="0"/>
-          <a:chOff x="0" y="0"/>
-          <a:chExt cx="0" cy="0"/>
-        </a:xfrm>
-      </p:grpSpPr>
-      <p:sp>
-        <p:nvSpPr>
-          <p:cNvPr id="2" name="Title 1">
-            <a:extLst>
-              <a:ext uri="{FF2B5EF4-FFF2-40B4-BE49-F238E27FC236}">
-                <a16:creationId xmlns:a16="http://schemas.microsoft.com/office/drawing/2014/main" id="{68CF49BB-AD56-E7CF-4823-D942D28B5EBD}"/>
-              </a:ext>
-            </a:extLst>
-          </p:cNvPr>
-          <p:cNvSpPr>
-            <a:spLocks noGrp="1"/>
-          </p:cNvSpPr>
-          <p:nvPr>
-            <p:ph type="title"/>
-          </p:nvPr>
-        </p:nvSpPr>
-        <p:spPr/>
-        <p:txBody>
-          <a:bodyPr/>
-          <a:lstStyle/>
-          <a:p>
-            <a:pPr marL="0" lvl="0" indent="0">
-              <a:buNone/>
-            </a:pPr>
-            <a:r>
-              <a:rPr lang="en-US" dirty="0"/>
-              <a:t>Zero-Inflated Responses</a:t>
-            </a:r>
-            <a:endParaRPr dirty="0"/>
-          </a:p>
-        </p:txBody>
-      </p:sp>
-      <p:sp>
-        <p:nvSpPr>
-          <p:cNvPr id="3" name="Content Placeholder 2">
-            <a:extLst>
-              <a:ext uri="{FF2B5EF4-FFF2-40B4-BE49-F238E27FC236}">
-                <a16:creationId xmlns:a16="http://schemas.microsoft.com/office/drawing/2014/main" id="{A2E97D54-EC36-0EE6-7D66-58D0B07E5E81}"/>
-              </a:ext>
-            </a:extLst>
-          </p:cNvPr>
-          <p:cNvSpPr>
-            <a:spLocks noGrp="1"/>
-          </p:cNvSpPr>
-          <p:nvPr>
-            <p:ph idx="1"/>
-          </p:nvPr>
-        </p:nvSpPr>
-        <p:spPr/>
-        <p:txBody>
-          <a:bodyPr>
-            <a:normAutofit fontScale="92500" lnSpcReduction="20000"/>
-          </a:bodyPr>
-          <a:lstStyle/>
-          <a:p>
-            <a:pPr marL="0" lvl="0" indent="0">
-              <a:buNone/>
-            </a:pPr>
-            <a:r>
-              <a:rPr lang="en-US" dirty="0"/>
-              <a:t>Zero-inflated response variables arise in many situations </a:t>
-            </a:r>
-            <a:endParaRPr dirty="0"/>
-          </a:p>
-          <a:p>
-            <a:pPr lvl="0"/>
-            <a:r>
-              <a:rPr lang="en-US" dirty="0"/>
-              <a:t>Most people who view an ecommerce site buy 0 products</a:t>
-            </a:r>
-          </a:p>
-          <a:p>
-            <a:pPr lvl="0"/>
-            <a:r>
-              <a:rPr lang="en-US" dirty="0"/>
-              <a:t>Most auto drivers have no crashes per year </a:t>
-            </a:r>
-          </a:p>
-          <a:p>
-            <a:pPr lvl="0"/>
-            <a:r>
-              <a:rPr lang="en-US" dirty="0"/>
-              <a:t>In much of the world the average rainfall amount on a specific day is 0 </a:t>
-            </a:r>
-          </a:p>
-          <a:p>
-            <a:pPr lvl="0"/>
-            <a:r>
-              <a:rPr lang="en-US" dirty="0"/>
-              <a:t>The number of sever weather events in a specific area per month is often 0  </a:t>
-            </a:r>
-          </a:p>
-          <a:p>
-            <a:r>
-              <a:rPr lang="en-US" dirty="0"/>
-              <a:t>In epidemiology the probability distribution of the number of people contracting a disease in per day has many zeros</a:t>
-            </a:r>
-          </a:p>
-          <a:p>
-            <a:r>
-              <a:rPr lang="en-US" dirty="0"/>
-              <a:t>Etc.</a:t>
-            </a:r>
-          </a:p>
-          <a:p>
-            <a:pPr lvl="0"/>
-            <a:endParaRPr dirty="0"/>
-          </a:p>
-        </p:txBody>
-      </p:sp>
-    </p:spTree>
-    <p:extLst>
-      <p:ext uri="{BB962C8B-B14F-4D97-AF65-F5344CB8AC3E}">
-        <p14:creationId xmlns:p14="http://schemas.microsoft.com/office/powerpoint/2010/main" val="1417896931"/>
-      </p:ext>
-    </p:extLst>
-  </p:cSld>
-  <p:clrMapOvr>
-    <a:masterClrMapping/>
-  </p:clrMapOvr>
-</p:sld>
-</file>
-
-<file path=ppt/slides/slide50.xml><?xml version="1.0" encoding="utf-8"?>
+<file path=ppt/slides/slide51.xml><?xml version="1.0" encoding="utf-8"?>
 <p:sld xmlns:a="http://schemas.openxmlformats.org/drawingml/2006/main" xmlns:r="http://schemas.openxmlformats.org/officeDocument/2006/relationships" xmlns:p="http://schemas.openxmlformats.org/presentationml/2006/main">
   <p:cSld>
     <p:spTree>
@@ -18365,7 +18613,7 @@
         </p:spPr>
         <p:txBody>
           <a:bodyPr>
-            <a:normAutofit/>
+            <a:normAutofit fontScale="92500" lnSpcReduction="20000"/>
           </a:bodyPr>
           <a:lstStyle/>
           <a:p>
@@ -18397,6 +18645,16 @@
             <a:r>
               <a:rPr lang="en-US" sz="2000" dirty="0"/>
               <a:t>The slope coefficients are noticeably different   </a:t>
+            </a:r>
+          </a:p>
+          <a:p>
+            <a:pPr marL="342900" lvl="0" indent="-342900">
+              <a:buFont typeface="Arial" panose="020B0604020202020204" pitchFamily="34" charset="0"/>
+              <a:buChar char="•"/>
+            </a:pPr>
+            <a:r>
+              <a:rPr lang="en-US" sz="2000" dirty="0"/>
+              <a:t>CIs of slope coefficient are reduced in robust model  </a:t>
             </a:r>
           </a:p>
           <a:p>
@@ -18589,7 +18847,7 @@
 </p:sld>
 </file>
 
-<file path=ppt/slides/slide51.xml><?xml version="1.0" encoding="utf-8"?>
+<file path=ppt/slides/slide52.xml><?xml version="1.0" encoding="utf-8"?>
 <p:sld xmlns:a="http://schemas.openxmlformats.org/drawingml/2006/main" xmlns:r="http://schemas.openxmlformats.org/officeDocument/2006/relationships" xmlns:p="http://schemas.openxmlformats.org/presentationml/2006/main">
   <p:cSld>
     <p:spTree>
@@ -18969,7 +19227,7 @@
 </p:sld>
 </file>
 
-<file path=ppt/slides/slide52.xml><?xml version="1.0" encoding="utf-8"?>
+<file path=ppt/slides/slide53.xml><?xml version="1.0" encoding="utf-8"?>
 <p:sld xmlns:a="http://schemas.openxmlformats.org/drawingml/2006/main" xmlns:r="http://schemas.openxmlformats.org/officeDocument/2006/relationships" xmlns:p="http://schemas.openxmlformats.org/presentationml/2006/main">
   <p:cSld>
     <p:spTree>
@@ -19586,7 +19844,7 @@
             <a:pPr lvl="1"/>
             <a:r>
               <a:rPr lang="en-US" dirty="0"/>
-              <a:t>A binomial distribution </a:t>
+              <a:t>A binomial distribution, or switching distribution  </a:t>
             </a:r>
           </a:p>
           <a:p>
@@ -19702,7 +19960,7 @@
             </p:spPr>
             <p:txBody>
               <a:bodyPr>
-                <a:normAutofit fontScale="92500" lnSpcReduction="20000"/>
+                <a:normAutofit lnSpcReduction="10000"/>
               </a:bodyPr>
               <a:lstStyle/>
               <a:p>
@@ -19717,7 +19975,7 @@
               <a:p>
                 <a:r>
                   <a:rPr lang="en-US" dirty="0"/>
-                  <a:t>The binomial distribution serves as a ‘switch’ between 0 response and the other distribution    </a:t>
+                  <a:t>The binomial distribution serves as a ‘switch’ between 0 response and the other distribution(s)    </a:t>
                 </a:r>
               </a:p>
               <a:p>
@@ -19828,13 +20086,13 @@
                 </a14:m>
                 <a:r>
                   <a:rPr lang="en-US" dirty="0"/>
-                  <a:t> may include 0 responses   </a:t>
+                  <a:t> may include 0 responses, but insufficient number  </a:t>
                 </a:r>
               </a:p>
               <a:p>
                 <a:r>
                   <a:rPr lang="en-US" dirty="0"/>
-                  <a:t>Use a binomial distribution switches between 0 response and </a:t>
+                  <a:t>Binomial distribution switches between 0 response and </a:t>
                 </a:r>
                 <a14:m>
                   <m:oMath xmlns:m="http://schemas.openxmlformats.org/officeDocument/2006/math">
@@ -19904,417 +20162,370 @@
                 <a:pPr lvl="1"/>
                 <a:r>
                   <a:rPr lang="en-US" dirty="0"/>
-                  <a:t>Adds an addition degree of freedom </a:t>
-                </a:r>
-              </a:p>
-              <a:p>
-                <a:r>
-                  <a:rPr lang="en-US" dirty="0"/>
-                  <a:t>The zero-inflated density, </a:t>
+                  <a:t>Switching probability adds an addition degree of freedom </a:t>
                 </a:r>
                 <a14:m>
                   <m:oMath xmlns:m="http://schemas.openxmlformats.org/officeDocument/2006/math">
-                    <m:r>
-                      <a:rPr lang="en-US" b="0" i="1" smtClean="0">
-                        <a:latin typeface="Cambria Math" panose="02040503050406030204" pitchFamily="18" charset="0"/>
-                      </a:rPr>
-                      <m:t>𝑃</m:t>
-                    </m:r>
-                    <m:d>
-                      <m:dPr>
+                    <m:m>
+                      <m:mPr>
+                        <m:mcs>
+                          <m:mc>
+                            <m:mcPr>
+                              <m:count m:val="1"/>
+                              <m:mcJc m:val="center"/>
+                            </m:mcPr>
+                          </m:mc>
+                        </m:mcs>
                         <m:ctrlPr>
-                          <a:rPr lang="en-US" b="0" i="1" smtClean="0">
+                          <a:rPr lang="en-US" i="1" smtClean="0">
                             <a:latin typeface="Cambria Math" panose="02040503050406030204" pitchFamily="18" charset="0"/>
                           </a:rPr>
                         </m:ctrlPr>
-                      </m:dPr>
-                      <m:e>
-                        <m:r>
-                          <a:rPr lang="en-US" b="0" i="1" smtClean="0">
-                            <a:latin typeface="Cambria Math" panose="02040503050406030204" pitchFamily="18" charset="0"/>
-                          </a:rPr>
-                          <m:t>𝑌</m:t>
-                        </m:r>
-                      </m:e>
-                    </m:d>
-                  </m:oMath>
-                </a14:m>
-                <a:r>
-                  <a:rPr lang="en-US" dirty="0"/>
-                  <a:t>, can then be written:</a:t>
-                </a:r>
-              </a:p>
-              <a:p>
-                <a:pPr marL="0" indent="0">
-                  <a:buNone/>
-                </a:pPr>
-                <a14:m>
-                  <m:oMathPara xmlns:m="http://schemas.openxmlformats.org/officeDocument/2006/math">
-                    <m:oMathParaPr>
-                      <m:jc m:val="centerGroup"/>
-                    </m:oMathParaPr>
-                    <m:oMath xmlns:m="http://schemas.openxmlformats.org/officeDocument/2006/math">
-                      <m:m>
-                        <m:mPr>
-                          <m:mcs>
-                            <m:mc>
-                              <m:mcPr>
-                                <m:count m:val="1"/>
-                                <m:mcJc m:val="center"/>
-                              </m:mcPr>
-                            </m:mc>
-                          </m:mcs>
-                          <m:ctrlPr>
-                            <a:rPr lang="en-US" i="1" smtClean="0">
+                      </m:mPr>
+                      <m:mr>
+                        <m:e>
+                          <m:r>
+                            <m:rPr>
+                              <m:brk m:alnAt="7"/>
+                            </m:rPr>
+                            <a:rPr lang="en-US" b="0" i="1" smtClean="0">
                               <a:latin typeface="Cambria Math" panose="02040503050406030204" pitchFamily="18" charset="0"/>
                             </a:rPr>
-                          </m:ctrlPr>
-                        </m:mPr>
-                        <m:mr>
-                          <m:e>
-                            <m:r>
-                              <m:rPr>
-                                <m:brk m:alnAt="7"/>
-                              </m:rPr>
-                              <a:rPr lang="en-US" b="0" i="1" smtClean="0">
-                                <a:latin typeface="Cambria Math" panose="02040503050406030204" pitchFamily="18" charset="0"/>
-                              </a:rPr>
-                              <m:t>𝑃</m:t>
-                            </m:r>
-                            <m:d>
-                              <m:dPr>
-                                <m:ctrlPr>
-                                  <a:rPr lang="en-US" b="0" i="1" smtClean="0">
-                                    <a:latin typeface="Cambria Math" panose="02040503050406030204" pitchFamily="18" charset="0"/>
-                                  </a:rPr>
-                                </m:ctrlPr>
-                              </m:dPr>
-                              <m:e>
-                                <m:r>
-                                  <a:rPr lang="en-US" b="0" i="1" smtClean="0">
-                                    <a:latin typeface="Cambria Math" panose="02040503050406030204" pitchFamily="18" charset="0"/>
-                                  </a:rPr>
-                                  <m:t>𝑌</m:t>
-                                </m:r>
-                                <m:r>
-                                  <a:rPr lang="en-US" b="0" i="1" smtClean="0">
-                                    <a:latin typeface="Cambria Math" panose="02040503050406030204" pitchFamily="18" charset="0"/>
-                                  </a:rPr>
-                                  <m:t>=</m:t>
-                                </m:r>
-                                <m:r>
-                                  <a:rPr lang="en-US" b="0" i="1" smtClean="0">
-                                    <a:latin typeface="Cambria Math" panose="02040503050406030204" pitchFamily="18" charset="0"/>
-                                  </a:rPr>
-                                  <m:t>0</m:t>
-                                </m:r>
-                              </m:e>
-                            </m:d>
-                            <m:r>
-                              <m:rPr>
-                                <m:brk m:alnAt="7"/>
-                              </m:rPr>
-                              <a:rPr lang="en-US" b="0" i="1" smtClean="0">
-                                <a:latin typeface="Cambria Math" panose="02040503050406030204" pitchFamily="18" charset="0"/>
-                              </a:rPr>
-                              <m:t>=</m:t>
-                            </m:r>
-                            <m:r>
-                              <a:rPr lang="en-US" b="0" i="1" smtClean="0">
-                                <a:latin typeface="Cambria Math" panose="02040503050406030204" pitchFamily="18" charset="0"/>
-                                <a:ea typeface="Cambria Math" panose="02040503050406030204" pitchFamily="18" charset="0"/>
-                              </a:rPr>
-                              <m:t>𝜋</m:t>
-                            </m:r>
-                            <m:r>
-                              <a:rPr lang="en-US" b="0" i="1" smtClean="0">
-                                <a:latin typeface="Cambria Math" panose="02040503050406030204" pitchFamily="18" charset="0"/>
-                                <a:ea typeface="Cambria Math" panose="02040503050406030204" pitchFamily="18" charset="0"/>
-                              </a:rPr>
-                              <m:t>+</m:t>
-                            </m:r>
-                            <m:d>
-                              <m:dPr>
-                                <m:ctrlPr>
-                                  <a:rPr lang="en-US" b="0" i="1" smtClean="0">
-                                    <a:latin typeface="Cambria Math" panose="02040503050406030204" pitchFamily="18" charset="0"/>
-                                    <a:ea typeface="Cambria Math" panose="02040503050406030204" pitchFamily="18" charset="0"/>
-                                  </a:rPr>
-                                </m:ctrlPr>
-                              </m:dPr>
-                              <m:e>
-                                <m:r>
-                                  <a:rPr lang="en-US" b="0" i="1" smtClean="0">
-                                    <a:latin typeface="Cambria Math" panose="02040503050406030204" pitchFamily="18" charset="0"/>
-                                    <a:ea typeface="Cambria Math" panose="02040503050406030204" pitchFamily="18" charset="0"/>
-                                  </a:rPr>
-                                  <m:t>1</m:t>
-                                </m:r>
-                                <m:r>
-                                  <a:rPr lang="en-US" b="0" i="1" smtClean="0">
-                                    <a:latin typeface="Cambria Math" panose="02040503050406030204" pitchFamily="18" charset="0"/>
-                                    <a:ea typeface="Cambria Math" panose="02040503050406030204" pitchFamily="18" charset="0"/>
-                                  </a:rPr>
-                                  <m:t>−</m:t>
-                                </m:r>
-                                <m:r>
-                                  <a:rPr lang="en-US" b="0" i="1" smtClean="0">
-                                    <a:latin typeface="Cambria Math" panose="02040503050406030204" pitchFamily="18" charset="0"/>
-                                    <a:ea typeface="Cambria Math" panose="02040503050406030204" pitchFamily="18" charset="0"/>
-                                  </a:rPr>
-                                  <m:t>𝜋</m:t>
-                                </m:r>
-                              </m:e>
-                            </m:d>
-                            <m:sSub>
-                              <m:sSubPr>
-                                <m:ctrlPr>
-                                  <a:rPr lang="en-US" i="1">
-                                    <a:latin typeface="Cambria Math" panose="02040503050406030204" pitchFamily="18" charset="0"/>
-                                  </a:rPr>
-                                </m:ctrlPr>
-                              </m:sSubPr>
-                              <m:e>
-                                <m:r>
-                                  <a:rPr lang="en-US" b="0" i="1" smtClean="0">
-                                    <a:latin typeface="Cambria Math" panose="02040503050406030204" pitchFamily="18" charset="0"/>
-                                  </a:rPr>
-                                  <m:t> </m:t>
-                                </m:r>
-                                <m:r>
-                                  <a:rPr lang="en-US" i="1">
-                                    <a:latin typeface="Cambria Math" panose="02040503050406030204" pitchFamily="18" charset="0"/>
-                                  </a:rPr>
-                                  <m:t>𝑃</m:t>
-                                </m:r>
-                              </m:e>
-                              <m:sub>
-                                <m:r>
-                                  <a:rPr lang="en-US" i="1">
-                                    <a:latin typeface="Cambria Math" panose="02040503050406030204" pitchFamily="18" charset="0"/>
-                                  </a:rPr>
-                                  <m:t>0</m:t>
-                                </m:r>
-                              </m:sub>
-                            </m:sSub>
-                            <m:d>
-                              <m:dPr>
-                                <m:ctrlPr>
-                                  <a:rPr lang="en-US" i="1">
-                                    <a:latin typeface="Cambria Math" panose="02040503050406030204" pitchFamily="18" charset="0"/>
-                                  </a:rPr>
-                                </m:ctrlPr>
-                              </m:dPr>
-                              <m:e>
-                                <m:r>
-                                  <a:rPr lang="en-US" b="0" i="1" smtClean="0">
-                                    <a:latin typeface="Cambria Math" panose="02040503050406030204" pitchFamily="18" charset="0"/>
-                                  </a:rPr>
-                                  <m:t>0</m:t>
-                                </m:r>
-                                <m:r>
-                                  <a:rPr lang="en-US" b="0" i="1" smtClean="0">
-                                    <a:latin typeface="Cambria Math" panose="02040503050406030204" pitchFamily="18" charset="0"/>
-                                  </a:rPr>
-                                  <m:t> | </m:t>
-                                </m:r>
-                                <m:r>
-                                  <a:rPr lang="en-US" i="1">
-                                    <a:latin typeface="Cambria Math" panose="02040503050406030204" pitchFamily="18" charset="0"/>
-                                    <a:ea typeface="Cambria Math" panose="02040503050406030204" pitchFamily="18" charset="0"/>
-                                  </a:rPr>
-                                  <m:t>𝜃</m:t>
-                                </m:r>
-                              </m:e>
-                            </m:d>
-                          </m:e>
-                        </m:mr>
-                        <m:mr>
-                          <m:e>
-                            <m:r>
-                              <m:rPr>
-                                <m:brk m:alnAt="7"/>
-                              </m:rPr>
-                              <a:rPr lang="en-US" i="1">
-                                <a:latin typeface="Cambria Math" panose="02040503050406030204" pitchFamily="18" charset="0"/>
-                              </a:rPr>
-                              <m:t>𝑃</m:t>
-                            </m:r>
-                            <m:d>
-                              <m:dPr>
-                                <m:ctrlPr>
-                                  <a:rPr lang="en-US" i="1">
-                                    <a:latin typeface="Cambria Math" panose="02040503050406030204" pitchFamily="18" charset="0"/>
-                                  </a:rPr>
-                                </m:ctrlPr>
-                              </m:dPr>
-                              <m:e>
-                                <m:r>
-                                  <a:rPr lang="en-US" i="1">
-                                    <a:latin typeface="Cambria Math" panose="02040503050406030204" pitchFamily="18" charset="0"/>
-                                  </a:rPr>
-                                  <m:t>𝑌</m:t>
-                                </m:r>
-                                <m:r>
-                                  <a:rPr lang="en-US" i="1">
-                                    <a:latin typeface="Cambria Math" panose="02040503050406030204" pitchFamily="18" charset="0"/>
-                                  </a:rPr>
-                                  <m:t>=</m:t>
-                                </m:r>
-                                <m:sSub>
-                                  <m:sSubPr>
-                                    <m:ctrlPr>
-                                      <a:rPr lang="en-US" i="1" smtClean="0">
-                                        <a:latin typeface="Cambria Math" panose="02040503050406030204" pitchFamily="18" charset="0"/>
-                                      </a:rPr>
-                                    </m:ctrlPr>
-                                  </m:sSubPr>
-                                  <m:e>
-                                    <m:r>
-                                      <a:rPr lang="en-US" b="0" i="1" smtClean="0">
-                                        <a:latin typeface="Cambria Math" panose="02040503050406030204" pitchFamily="18" charset="0"/>
-                                      </a:rPr>
-                                      <m:t>𝑦</m:t>
-                                    </m:r>
-                                  </m:e>
-                                  <m:sub>
-                                    <m:r>
-                                      <a:rPr lang="en-US" b="0" i="1" smtClean="0">
-                                        <a:latin typeface="Cambria Math" panose="02040503050406030204" pitchFamily="18" charset="0"/>
-                                      </a:rPr>
-                                      <m:t>𝑖</m:t>
-                                    </m:r>
-                                  </m:sub>
-                                </m:sSub>
-                              </m:e>
-                            </m:d>
-                            <m:r>
-                              <m:rPr>
-                                <m:brk m:alnAt="7"/>
-                              </m:rPr>
-                              <a:rPr lang="en-US" i="1">
-                                <a:latin typeface="Cambria Math" panose="02040503050406030204" pitchFamily="18" charset="0"/>
-                              </a:rPr>
-                              <m:t>=</m:t>
-                            </m:r>
-                            <m:d>
-                              <m:dPr>
-                                <m:ctrlPr>
-                                  <a:rPr lang="en-US" i="1">
-                                    <a:latin typeface="Cambria Math" panose="02040503050406030204" pitchFamily="18" charset="0"/>
-                                    <a:ea typeface="Cambria Math" panose="02040503050406030204" pitchFamily="18" charset="0"/>
-                                  </a:rPr>
-                                </m:ctrlPr>
-                              </m:dPr>
-                              <m:e>
-                                <m:r>
-                                  <a:rPr lang="en-US" i="1">
-                                    <a:latin typeface="Cambria Math" panose="02040503050406030204" pitchFamily="18" charset="0"/>
-                                    <a:ea typeface="Cambria Math" panose="02040503050406030204" pitchFamily="18" charset="0"/>
-                                  </a:rPr>
-                                  <m:t>1</m:t>
-                                </m:r>
-                                <m:r>
-                                  <a:rPr lang="en-US" i="1">
-                                    <a:latin typeface="Cambria Math" panose="02040503050406030204" pitchFamily="18" charset="0"/>
-                                    <a:ea typeface="Cambria Math" panose="02040503050406030204" pitchFamily="18" charset="0"/>
-                                  </a:rPr>
-                                  <m:t>−</m:t>
-                                </m:r>
-                                <m:r>
-                                  <a:rPr lang="en-US" i="1">
-                                    <a:latin typeface="Cambria Math" panose="02040503050406030204" pitchFamily="18" charset="0"/>
-                                    <a:ea typeface="Cambria Math" panose="02040503050406030204" pitchFamily="18" charset="0"/>
-                                  </a:rPr>
-                                  <m:t>𝜋</m:t>
-                                </m:r>
-                              </m:e>
-                            </m:d>
-                            <m:sSub>
-                              <m:sSubPr>
-                                <m:ctrlPr>
-                                  <a:rPr lang="en-US" i="1">
-                                    <a:latin typeface="Cambria Math" panose="02040503050406030204" pitchFamily="18" charset="0"/>
-                                  </a:rPr>
-                                </m:ctrlPr>
-                              </m:sSubPr>
-                              <m:e>
-                                <m:r>
-                                  <a:rPr lang="en-US" b="0" i="1" smtClean="0">
-                                    <a:latin typeface="Cambria Math" panose="02040503050406030204" pitchFamily="18" charset="0"/>
-                                  </a:rPr>
-                                  <m:t> </m:t>
-                                </m:r>
-                                <m:r>
-                                  <a:rPr lang="en-US" i="1">
-                                    <a:latin typeface="Cambria Math" panose="02040503050406030204" pitchFamily="18" charset="0"/>
-                                  </a:rPr>
-                                  <m:t>𝑃</m:t>
-                                </m:r>
-                              </m:e>
-                              <m:sub>
-                                <m:r>
-                                  <a:rPr lang="en-US" i="1">
-                                    <a:latin typeface="Cambria Math" panose="02040503050406030204" pitchFamily="18" charset="0"/>
-                                  </a:rPr>
-                                  <m:t>0</m:t>
-                                </m:r>
-                              </m:sub>
-                            </m:sSub>
-                            <m:d>
-                              <m:dPr>
-                                <m:ctrlPr>
-                                  <a:rPr lang="en-US" i="1">
-                                    <a:latin typeface="Cambria Math" panose="02040503050406030204" pitchFamily="18" charset="0"/>
-                                  </a:rPr>
-                                </m:ctrlPr>
-                              </m:dPr>
-                              <m:e>
-                                <m:sSub>
-                                  <m:sSubPr>
-                                    <m:ctrlPr>
-                                      <a:rPr lang="en-US" i="1">
-                                        <a:latin typeface="Cambria Math" panose="02040503050406030204" pitchFamily="18" charset="0"/>
-                                      </a:rPr>
-                                    </m:ctrlPr>
-                                  </m:sSubPr>
-                                  <m:e>
-                                    <m:r>
-                                      <a:rPr lang="en-US" i="1">
-                                        <a:latin typeface="Cambria Math" panose="02040503050406030204" pitchFamily="18" charset="0"/>
-                                      </a:rPr>
-                                      <m:t>𝑦</m:t>
-                                    </m:r>
-                                  </m:e>
-                                  <m:sub>
-                                    <m:r>
-                                      <a:rPr lang="en-US" i="1">
-                                        <a:latin typeface="Cambria Math" panose="02040503050406030204" pitchFamily="18" charset="0"/>
-                                      </a:rPr>
-                                      <m:t>𝑖</m:t>
-                                    </m:r>
-                                  </m:sub>
-                                </m:sSub>
-                                <m:r>
-                                  <a:rPr lang="en-US" b="0" i="1" smtClean="0">
-                                    <a:latin typeface="Cambria Math" panose="02040503050406030204" pitchFamily="18" charset="0"/>
-                                  </a:rPr>
-                                  <m:t> | </m:t>
-                                </m:r>
-                                <m:r>
-                                  <a:rPr lang="en-US" i="1">
-                                    <a:latin typeface="Cambria Math" panose="02040503050406030204" pitchFamily="18" charset="0"/>
-                                    <a:ea typeface="Cambria Math" panose="02040503050406030204" pitchFamily="18" charset="0"/>
-                                  </a:rPr>
-                                  <m:t>𝜃</m:t>
-                                </m:r>
-                              </m:e>
-                            </m:d>
-                          </m:e>
-                        </m:mr>
-                      </m:m>
-                    </m:oMath>
-                  </m:oMathPara>
+                            <m:t>𝑃</m:t>
+                          </m:r>
+                          <m:d>
+                            <m:dPr>
+                              <m:ctrlPr>
+                                <a:rPr lang="en-US" b="0" i="1" smtClean="0">
+                                  <a:latin typeface="Cambria Math" panose="02040503050406030204" pitchFamily="18" charset="0"/>
+                                </a:rPr>
+                              </m:ctrlPr>
+                            </m:dPr>
+                            <m:e>
+                              <m:r>
+                                <a:rPr lang="en-US" b="0" i="1" smtClean="0">
+                                  <a:latin typeface="Cambria Math" panose="02040503050406030204" pitchFamily="18" charset="0"/>
+                                </a:rPr>
+                                <m:t>𝑌</m:t>
+                              </m:r>
+                              <m:r>
+                                <a:rPr lang="en-US" b="0" i="1" smtClean="0">
+                                  <a:latin typeface="Cambria Math" panose="02040503050406030204" pitchFamily="18" charset="0"/>
+                                </a:rPr>
+                                <m:t>=</m:t>
+                              </m:r>
+                              <m:r>
+                                <a:rPr lang="en-US" b="0" i="1" smtClean="0">
+                                  <a:latin typeface="Cambria Math" panose="02040503050406030204" pitchFamily="18" charset="0"/>
+                                </a:rPr>
+                                <m:t>0</m:t>
+                              </m:r>
+                            </m:e>
+                          </m:d>
+                          <m:r>
+                            <m:rPr>
+                              <m:brk m:alnAt="7"/>
+                            </m:rPr>
+                            <a:rPr lang="en-US" b="0" i="1" smtClean="0">
+                              <a:latin typeface="Cambria Math" panose="02040503050406030204" pitchFamily="18" charset="0"/>
+                            </a:rPr>
+                            <m:t>=</m:t>
+                          </m:r>
+                          <m:r>
+                            <a:rPr lang="en-US" b="0" i="1" smtClean="0">
+                              <a:latin typeface="Cambria Math" panose="02040503050406030204" pitchFamily="18" charset="0"/>
+                              <a:ea typeface="Cambria Math" panose="02040503050406030204" pitchFamily="18" charset="0"/>
+                            </a:rPr>
+                            <m:t>𝜋</m:t>
+                          </m:r>
+                          <m:r>
+                            <a:rPr lang="en-US" b="0" i="1" smtClean="0">
+                              <a:latin typeface="Cambria Math" panose="02040503050406030204" pitchFamily="18" charset="0"/>
+                              <a:ea typeface="Cambria Math" panose="02040503050406030204" pitchFamily="18" charset="0"/>
+                            </a:rPr>
+                            <m:t>+</m:t>
+                          </m:r>
+                          <m:d>
+                            <m:dPr>
+                              <m:ctrlPr>
+                                <a:rPr lang="en-US" b="0" i="1" smtClean="0">
+                                  <a:latin typeface="Cambria Math" panose="02040503050406030204" pitchFamily="18" charset="0"/>
+                                  <a:ea typeface="Cambria Math" panose="02040503050406030204" pitchFamily="18" charset="0"/>
+                                </a:rPr>
+                              </m:ctrlPr>
+                            </m:dPr>
+                            <m:e>
+                              <m:r>
+                                <a:rPr lang="en-US" b="0" i="1" smtClean="0">
+                                  <a:latin typeface="Cambria Math" panose="02040503050406030204" pitchFamily="18" charset="0"/>
+                                  <a:ea typeface="Cambria Math" panose="02040503050406030204" pitchFamily="18" charset="0"/>
+                                </a:rPr>
+                                <m:t>1</m:t>
+                              </m:r>
+                              <m:r>
+                                <a:rPr lang="en-US" b="0" i="1" smtClean="0">
+                                  <a:latin typeface="Cambria Math" panose="02040503050406030204" pitchFamily="18" charset="0"/>
+                                  <a:ea typeface="Cambria Math" panose="02040503050406030204" pitchFamily="18" charset="0"/>
+                                </a:rPr>
+                                <m:t>−</m:t>
+                              </m:r>
+                              <m:r>
+                                <a:rPr lang="en-US" b="0" i="1" smtClean="0">
+                                  <a:latin typeface="Cambria Math" panose="02040503050406030204" pitchFamily="18" charset="0"/>
+                                  <a:ea typeface="Cambria Math" panose="02040503050406030204" pitchFamily="18" charset="0"/>
+                                </a:rPr>
+                                <m:t>𝜋</m:t>
+                              </m:r>
+                            </m:e>
+                          </m:d>
+                          <m:sSub>
+                            <m:sSubPr>
+                              <m:ctrlPr>
+                                <a:rPr lang="en-US" i="1">
+                                  <a:latin typeface="Cambria Math" panose="02040503050406030204" pitchFamily="18" charset="0"/>
+                                </a:rPr>
+                              </m:ctrlPr>
+                            </m:sSubPr>
+                            <m:e>
+                              <m:r>
+                                <a:rPr lang="en-US" b="0" i="1" smtClean="0">
+                                  <a:latin typeface="Cambria Math" panose="02040503050406030204" pitchFamily="18" charset="0"/>
+                                </a:rPr>
+                                <m:t> </m:t>
+                              </m:r>
+                              <m:r>
+                                <a:rPr lang="en-US" i="1">
+                                  <a:latin typeface="Cambria Math" panose="02040503050406030204" pitchFamily="18" charset="0"/>
+                                </a:rPr>
+                                <m:t>𝑃</m:t>
+                              </m:r>
+                            </m:e>
+                            <m:sub>
+                              <m:r>
+                                <a:rPr lang="en-US" i="1">
+                                  <a:latin typeface="Cambria Math" panose="02040503050406030204" pitchFamily="18" charset="0"/>
+                                </a:rPr>
+                                <m:t>0</m:t>
+                              </m:r>
+                            </m:sub>
+                          </m:sSub>
+                          <m:d>
+                            <m:dPr>
+                              <m:ctrlPr>
+                                <a:rPr lang="en-US" i="1">
+                                  <a:latin typeface="Cambria Math" panose="02040503050406030204" pitchFamily="18" charset="0"/>
+                                </a:rPr>
+                              </m:ctrlPr>
+                            </m:dPr>
+                            <m:e>
+                              <m:r>
+                                <a:rPr lang="en-US" b="0" i="1" smtClean="0">
+                                  <a:latin typeface="Cambria Math" panose="02040503050406030204" pitchFamily="18" charset="0"/>
+                                </a:rPr>
+                                <m:t>0</m:t>
+                              </m:r>
+                              <m:r>
+                                <a:rPr lang="en-US" b="0" i="1" smtClean="0">
+                                  <a:latin typeface="Cambria Math" panose="02040503050406030204" pitchFamily="18" charset="0"/>
+                                </a:rPr>
+                                <m:t> | </m:t>
+                              </m:r>
+                              <m:r>
+                                <a:rPr lang="en-US" i="1">
+                                  <a:latin typeface="Cambria Math" panose="02040503050406030204" pitchFamily="18" charset="0"/>
+                                  <a:ea typeface="Cambria Math" panose="02040503050406030204" pitchFamily="18" charset="0"/>
+                                </a:rPr>
+                                <m:t>𝜃</m:t>
+                              </m:r>
+                            </m:e>
+                          </m:d>
+                        </m:e>
+                      </m:mr>
+                      <m:mr>
+                        <m:e>
+                          <m:r>
+                            <m:rPr>
+                              <m:brk m:alnAt="7"/>
+                            </m:rPr>
+                            <a:rPr lang="en-US" i="1">
+                              <a:latin typeface="Cambria Math" panose="02040503050406030204" pitchFamily="18" charset="0"/>
+                            </a:rPr>
+                            <m:t>𝑃</m:t>
+                          </m:r>
+                          <m:d>
+                            <m:dPr>
+                              <m:ctrlPr>
+                                <a:rPr lang="en-US" i="1">
+                                  <a:latin typeface="Cambria Math" panose="02040503050406030204" pitchFamily="18" charset="0"/>
+                                </a:rPr>
+                              </m:ctrlPr>
+                            </m:dPr>
+                            <m:e>
+                              <m:r>
+                                <a:rPr lang="en-US" i="1">
+                                  <a:latin typeface="Cambria Math" panose="02040503050406030204" pitchFamily="18" charset="0"/>
+                                </a:rPr>
+                                <m:t>𝑌</m:t>
+                              </m:r>
+                              <m:r>
+                                <a:rPr lang="en-US" i="1">
+                                  <a:latin typeface="Cambria Math" panose="02040503050406030204" pitchFamily="18" charset="0"/>
+                                </a:rPr>
+                                <m:t>=</m:t>
+                              </m:r>
+                              <m:sSub>
+                                <m:sSubPr>
+                                  <m:ctrlPr>
+                                    <a:rPr lang="en-US" i="1" smtClean="0">
+                                      <a:latin typeface="Cambria Math" panose="02040503050406030204" pitchFamily="18" charset="0"/>
+                                    </a:rPr>
+                                  </m:ctrlPr>
+                                </m:sSubPr>
+                                <m:e>
+                                  <m:r>
+                                    <a:rPr lang="en-US" b="0" i="1" smtClean="0">
+                                      <a:latin typeface="Cambria Math" panose="02040503050406030204" pitchFamily="18" charset="0"/>
+                                    </a:rPr>
+                                    <m:t>𝑦</m:t>
+                                  </m:r>
+                                </m:e>
+                                <m:sub>
+                                  <m:r>
+                                    <a:rPr lang="en-US" b="0" i="1" smtClean="0">
+                                      <a:latin typeface="Cambria Math" panose="02040503050406030204" pitchFamily="18" charset="0"/>
+                                    </a:rPr>
+                                    <m:t>𝑖</m:t>
+                                  </m:r>
+                                </m:sub>
+                              </m:sSub>
+                            </m:e>
+                          </m:d>
+                          <m:r>
+                            <m:rPr>
+                              <m:brk m:alnAt="7"/>
+                            </m:rPr>
+                            <a:rPr lang="en-US" i="1">
+                              <a:latin typeface="Cambria Math" panose="02040503050406030204" pitchFamily="18" charset="0"/>
+                            </a:rPr>
+                            <m:t>=</m:t>
+                          </m:r>
+                          <m:d>
+                            <m:dPr>
+                              <m:ctrlPr>
+                                <a:rPr lang="en-US" i="1">
+                                  <a:latin typeface="Cambria Math" panose="02040503050406030204" pitchFamily="18" charset="0"/>
+                                  <a:ea typeface="Cambria Math" panose="02040503050406030204" pitchFamily="18" charset="0"/>
+                                </a:rPr>
+                              </m:ctrlPr>
+                            </m:dPr>
+                            <m:e>
+                              <m:r>
+                                <a:rPr lang="en-US" i="1">
+                                  <a:latin typeface="Cambria Math" panose="02040503050406030204" pitchFamily="18" charset="0"/>
+                                  <a:ea typeface="Cambria Math" panose="02040503050406030204" pitchFamily="18" charset="0"/>
+                                </a:rPr>
+                                <m:t>1</m:t>
+                              </m:r>
+                              <m:r>
+                                <a:rPr lang="en-US" i="1">
+                                  <a:latin typeface="Cambria Math" panose="02040503050406030204" pitchFamily="18" charset="0"/>
+                                  <a:ea typeface="Cambria Math" panose="02040503050406030204" pitchFamily="18" charset="0"/>
+                                </a:rPr>
+                                <m:t>−</m:t>
+                              </m:r>
+                              <m:r>
+                                <a:rPr lang="en-US" i="1">
+                                  <a:latin typeface="Cambria Math" panose="02040503050406030204" pitchFamily="18" charset="0"/>
+                                  <a:ea typeface="Cambria Math" panose="02040503050406030204" pitchFamily="18" charset="0"/>
+                                </a:rPr>
+                                <m:t>𝜋</m:t>
+                              </m:r>
+                            </m:e>
+                          </m:d>
+                          <m:sSub>
+                            <m:sSubPr>
+                              <m:ctrlPr>
+                                <a:rPr lang="en-US" i="1">
+                                  <a:latin typeface="Cambria Math" panose="02040503050406030204" pitchFamily="18" charset="0"/>
+                                </a:rPr>
+                              </m:ctrlPr>
+                            </m:sSubPr>
+                            <m:e>
+                              <m:r>
+                                <a:rPr lang="en-US" b="0" i="1" smtClean="0">
+                                  <a:latin typeface="Cambria Math" panose="02040503050406030204" pitchFamily="18" charset="0"/>
+                                </a:rPr>
+                                <m:t> </m:t>
+                              </m:r>
+                              <m:r>
+                                <a:rPr lang="en-US" i="1">
+                                  <a:latin typeface="Cambria Math" panose="02040503050406030204" pitchFamily="18" charset="0"/>
+                                </a:rPr>
+                                <m:t>𝑃</m:t>
+                              </m:r>
+                            </m:e>
+                            <m:sub>
+                              <m:r>
+                                <a:rPr lang="en-US" i="1">
+                                  <a:latin typeface="Cambria Math" panose="02040503050406030204" pitchFamily="18" charset="0"/>
+                                </a:rPr>
+                                <m:t>0</m:t>
+                              </m:r>
+                            </m:sub>
+                          </m:sSub>
+                          <m:d>
+                            <m:dPr>
+                              <m:ctrlPr>
+                                <a:rPr lang="en-US" i="1">
+                                  <a:latin typeface="Cambria Math" panose="02040503050406030204" pitchFamily="18" charset="0"/>
+                                </a:rPr>
+                              </m:ctrlPr>
+                            </m:dPr>
+                            <m:e>
+                              <m:sSub>
+                                <m:sSubPr>
+                                  <m:ctrlPr>
+                                    <a:rPr lang="en-US" i="1">
+                                      <a:latin typeface="Cambria Math" panose="02040503050406030204" pitchFamily="18" charset="0"/>
+                                    </a:rPr>
+                                  </m:ctrlPr>
+                                </m:sSubPr>
+                                <m:e>
+                                  <m:r>
+                                    <a:rPr lang="en-US" i="1">
+                                      <a:latin typeface="Cambria Math" panose="02040503050406030204" pitchFamily="18" charset="0"/>
+                                    </a:rPr>
+                                    <m:t>𝑦</m:t>
+                                  </m:r>
+                                </m:e>
+                                <m:sub>
+                                  <m:r>
+                                    <a:rPr lang="en-US" i="1">
+                                      <a:latin typeface="Cambria Math" panose="02040503050406030204" pitchFamily="18" charset="0"/>
+                                    </a:rPr>
+                                    <m:t>𝑖</m:t>
+                                  </m:r>
+                                </m:sub>
+                              </m:sSub>
+                              <m:r>
+                                <a:rPr lang="en-US" b="0" i="1" smtClean="0">
+                                  <a:latin typeface="Cambria Math" panose="02040503050406030204" pitchFamily="18" charset="0"/>
+                                </a:rPr>
+                                <m:t> | </m:t>
+                              </m:r>
+                              <m:r>
+                                <a:rPr lang="en-US" i="1">
+                                  <a:latin typeface="Cambria Math" panose="02040503050406030204" pitchFamily="18" charset="0"/>
+                                  <a:ea typeface="Cambria Math" panose="02040503050406030204" pitchFamily="18" charset="0"/>
+                                </a:rPr>
+                                <m:t>𝜃</m:t>
+                              </m:r>
+                            </m:e>
+                          </m:d>
+                        </m:e>
+                      </m:mr>
+                    </m:m>
+                  </m:oMath>
                 </a14:m>
                 <a:endParaRPr lang="en-US" dirty="0"/>
               </a:p>
@@ -20350,7 +20561,7 @@
               <a:blipFill>
                 <a:blip r:embed="rId2"/>
                 <a:stretch>
-                  <a:fillRect l="-963" t="-2862"/>
+                  <a:fillRect l="-1111" t="-2357"/>
                 </a:stretch>
               </a:blipFill>
             </p:spPr>
@@ -20437,8 +20648,8 @@
           </a:p>
         </p:txBody>
       </p:sp>
-      <mc:AlternateContent xmlns:mc="http://schemas.openxmlformats.org/markup-compatibility/2006" xmlns:a14="http://schemas.microsoft.com/office/drawing/2010/main">
-        <mc:Choice Requires="a14">
+      <mc:AlternateContent xmlns:mc="http://schemas.openxmlformats.org/markup-compatibility/2006">
+        <mc:Choice xmlns:a14="http://schemas.microsoft.com/office/drawing/2010/main" Requires="a14">
           <p:sp>
             <p:nvSpPr>
               <p:cNvPr id="3" name="Content Placeholder 2">
@@ -20463,7 +20674,7 @@
             </p:spPr>
             <p:txBody>
               <a:bodyPr>
-                <a:normAutofit fontScale="92500" lnSpcReduction="10000"/>
+                <a:normAutofit fontScale="85000" lnSpcReduction="10000"/>
               </a:bodyPr>
               <a:lstStyle/>
               <a:p>
@@ -20489,7 +20700,7 @@
               <a:p>
                 <a:r>
                   <a:rPr lang="en-US" dirty="0"/>
-                  <a:t>Recall the PMF of the Poisson distribution </a:t>
+                  <a:t>Recall the PMF of the standard Poisson distribution </a:t>
                 </a:r>
               </a:p>
               <a:p>
@@ -20751,7 +20962,7 @@
               <a:p>
                 <a:r>
                   <a:rPr lang="en-US" dirty="0"/>
-                  <a:t>Mixing with a binomial distribution with probability parameter, </a:t>
+                  <a:t>Mix Poisson distribution with a binomial distribution with parameter, </a:t>
                 </a:r>
                 <a14:m>
                   <m:oMath xmlns:m="http://schemas.openxmlformats.org/officeDocument/2006/math">
@@ -21175,7 +21386,7 @@
             </p:txBody>
           </p:sp>
         </mc:Choice>
-        <mc:Fallback xmlns="">
+        <mc:Fallback>
           <p:sp>
             <p:nvSpPr>
               <p:cNvPr id="3" name="Content Placeholder 2">
@@ -21200,7 +21411,7 @@
               <a:blipFill>
                 <a:blip r:embed="rId3"/>
                 <a:stretch>
-                  <a:fillRect l="-963" t="-2189"/>
+                  <a:fillRect l="-741" t="-1852"/>
                 </a:stretch>
               </a:blipFill>
             </p:spPr>

</xml_diff>

<commit_message>
Small edits and updates of slides
</commit_message>
<xml_diff>
--- a/LectureSlides/10b_ModelsFor OutliersAndOverdispersion.pptx
+++ b/LectureSlides/10b_ModelsFor OutliersAndOverdispersion.pptx
@@ -260,7 +260,7 @@
           <a:p>
             <a:fld id="{B45A0028-71D2-4800-AD8E-38BD1BCDF688}" type="datetimeFigureOut">
               <a:rPr lang="en-US" smtClean="0"/>
-              <a:t>10/29/2024</a:t>
+              <a:t>10/30/2024</a:t>
             </a:fld>
             <a:endParaRPr lang="en-US"/>
           </a:p>
@@ -706,7 +706,7 @@
           <a:p>
             <a:fld id="{241EB5C9-1307-BA42-ABA2-0BC069CD8E7F}" type="datetimeFigureOut">
               <a:rPr lang="en-US" smtClean="0"/>
-              <a:t>10/29/2024</a:t>
+              <a:t>10/30/2024</a:t>
             </a:fld>
             <a:endParaRPr lang="en-US"/>
           </a:p>
@@ -874,7 +874,7 @@
           <a:p>
             <a:fld id="{241EB5C9-1307-BA42-ABA2-0BC069CD8E7F}" type="datetimeFigureOut">
               <a:rPr lang="en-US" smtClean="0"/>
-              <a:t>10/29/2024</a:t>
+              <a:t>10/30/2024</a:t>
             </a:fld>
             <a:endParaRPr lang="en-US"/>
           </a:p>
@@ -1052,7 +1052,7 @@
           <a:p>
             <a:fld id="{241EB5C9-1307-BA42-ABA2-0BC069CD8E7F}" type="datetimeFigureOut">
               <a:rPr lang="en-US" smtClean="0"/>
-              <a:t>10/29/2024</a:t>
+              <a:t>10/30/2024</a:t>
             </a:fld>
             <a:endParaRPr lang="en-US"/>
           </a:p>
@@ -1220,7 +1220,7 @@
           <a:p>
             <a:fld id="{241EB5C9-1307-BA42-ABA2-0BC069CD8E7F}" type="datetimeFigureOut">
               <a:rPr lang="en-US" smtClean="0"/>
-              <a:t>10/29/2024</a:t>
+              <a:t>10/30/2024</a:t>
             </a:fld>
             <a:endParaRPr lang="en-US"/>
           </a:p>
@@ -1465,7 +1465,7 @@
           <a:p>
             <a:fld id="{241EB5C9-1307-BA42-ABA2-0BC069CD8E7F}" type="datetimeFigureOut">
               <a:rPr lang="en-US" smtClean="0"/>
-              <a:t>10/29/2024</a:t>
+              <a:t>10/30/2024</a:t>
             </a:fld>
             <a:endParaRPr lang="en-US"/>
           </a:p>
@@ -1750,7 +1750,7 @@
           <a:p>
             <a:fld id="{241EB5C9-1307-BA42-ABA2-0BC069CD8E7F}" type="datetimeFigureOut">
               <a:rPr lang="en-US" smtClean="0"/>
-              <a:t>10/29/2024</a:t>
+              <a:t>10/30/2024</a:t>
             </a:fld>
             <a:endParaRPr lang="en-US"/>
           </a:p>
@@ -2169,7 +2169,7 @@
           <a:p>
             <a:fld id="{241EB5C9-1307-BA42-ABA2-0BC069CD8E7F}" type="datetimeFigureOut">
               <a:rPr lang="en-US" smtClean="0"/>
-              <a:t>10/29/2024</a:t>
+              <a:t>10/30/2024</a:t>
             </a:fld>
             <a:endParaRPr lang="en-US"/>
           </a:p>
@@ -2286,7 +2286,7 @@
           <a:p>
             <a:fld id="{241EB5C9-1307-BA42-ABA2-0BC069CD8E7F}" type="datetimeFigureOut">
               <a:rPr lang="en-US" smtClean="0"/>
-              <a:t>10/29/2024</a:t>
+              <a:t>10/30/2024</a:t>
             </a:fld>
             <a:endParaRPr lang="en-US"/>
           </a:p>
@@ -2381,7 +2381,7 @@
           <a:p>
             <a:fld id="{241EB5C9-1307-BA42-ABA2-0BC069CD8E7F}" type="datetimeFigureOut">
               <a:rPr lang="en-US" smtClean="0"/>
-              <a:t>10/29/2024</a:t>
+              <a:t>10/30/2024</a:t>
             </a:fld>
             <a:endParaRPr lang="en-US"/>
           </a:p>
@@ -2656,7 +2656,7 @@
           <a:p>
             <a:fld id="{241EB5C9-1307-BA42-ABA2-0BC069CD8E7F}" type="datetimeFigureOut">
               <a:rPr lang="en-US" smtClean="0"/>
-              <a:t>10/29/2024</a:t>
+              <a:t>10/30/2024</a:t>
             </a:fld>
             <a:endParaRPr lang="en-US"/>
           </a:p>
@@ -2908,7 +2908,7 @@
           <a:p>
             <a:fld id="{241EB5C9-1307-BA42-ABA2-0BC069CD8E7F}" type="datetimeFigureOut">
               <a:rPr lang="en-US" smtClean="0"/>
-              <a:t>10/29/2024</a:t>
+              <a:t>10/30/2024</a:t>
             </a:fld>
             <a:endParaRPr lang="en-US"/>
           </a:p>
@@ -3119,7 +3119,7 @@
           <a:p>
             <a:fld id="{241EB5C9-1307-BA42-ABA2-0BC069CD8E7F}" type="datetimeFigureOut">
               <a:rPr lang="en-US" smtClean="0"/>
-              <a:t>10/29/2024</a:t>
+              <a:t>10/30/2024</a:t>
             </a:fld>
             <a:endParaRPr lang="en-US"/>
           </a:p>
@@ -3519,7 +3519,7 @@
             </a:pPr>
             <a:r>
               <a:rPr lang="en-US" dirty="0"/>
-              <a:t>Dealing with Messy Data</a:t>
+              <a:t>Models for Messy Data</a:t>
             </a:r>
             <a:endParaRPr b="1" dirty="0"/>
           </a:p>
@@ -4195,8 +4195,8 @@
           </a:p>
         </p:txBody>
       </p:sp>
-      <mc:AlternateContent xmlns:mc="http://schemas.openxmlformats.org/markup-compatibility/2006">
-        <mc:Choice xmlns:a14="http://schemas.microsoft.com/office/drawing/2010/main" Requires="a14">
+      <mc:AlternateContent xmlns:mc="http://schemas.openxmlformats.org/markup-compatibility/2006" xmlns:a14="http://schemas.microsoft.com/office/drawing/2010/main">
+        <mc:Choice Requires="a14">
           <p:sp>
             <p:nvSpPr>
               <p:cNvPr id="3" name="Content Placeholder 2">
@@ -4279,7 +4279,7 @@
                 </a:pPr>
                 <a:r>
                   <a:rPr lang="en-US" dirty="0"/>
-                  <a:t>Estimate parameter(s) of switching distribution  </a:t>
+                  <a:t>Estimate parameter(s) of switching distribution</a:t>
                 </a:r>
               </a:p>
               <a:p>
@@ -4289,7 +4289,7 @@
                 </a:pPr>
                 <a:r>
                   <a:rPr lang="en-US" dirty="0"/>
-                  <a:t>Estimate parameter(s) of other distribution </a:t>
+                  <a:t>Estimate parameter(s) of other distribution</a:t>
                 </a:r>
               </a:p>
               <a:p>
@@ -4372,7 +4372,7 @@
             </p:txBody>
           </p:sp>
         </mc:Choice>
-        <mc:Fallback>
+        <mc:Fallback xmlns="">
           <p:sp>
             <p:nvSpPr>
               <p:cNvPr id="3" name="Content Placeholder 2">
@@ -4557,6 +4557,13 @@
                 </a:r>
               </a:p>
               <a:p>
+                <a:pPr lvl="2"/>
+                <a:r>
+                  <a:rPr lang="en-US" dirty="0"/>
+                  <a:t>Poisson distribution parameter held constant </a:t>
+                </a:r>
+              </a:p>
+              <a:p>
                 <a:pPr marL="800100" lvl="1" indent="-457200">
                   <a:buFont typeface="+mj-lt"/>
                   <a:buAutoNum type="arabicPeriod"/>
@@ -4578,6 +4585,13 @@
                 <a:r>
                   <a:rPr lang="en-US" dirty="0"/>
                   <a:t>, of Poisson distribution as GLM</a:t>
+                </a:r>
+              </a:p>
+              <a:p>
+                <a:pPr lvl="2"/>
+                <a:r>
+                  <a:rPr lang="en-US" dirty="0"/>
+                  <a:t>Binomial distribution parameter help constant</a:t>
                 </a:r>
               </a:p>
               <a:p>
@@ -5450,8 +5464,8 @@
           <a:chExt cx="0" cy="0"/>
         </a:xfrm>
       </p:grpSpPr>
-      <mc:AlternateContent xmlns:mc="http://schemas.openxmlformats.org/markup-compatibility/2006">
-        <mc:Choice xmlns:a14="http://schemas.microsoft.com/office/drawing/2010/main" Requires="a14">
+      <mc:AlternateContent xmlns:mc="http://schemas.openxmlformats.org/markup-compatibility/2006" xmlns:a14="http://schemas.microsoft.com/office/drawing/2010/main">
+        <mc:Choice Requires="a14">
           <p:sp>
             <p:nvSpPr>
               <p:cNvPr id="3" name="Content Placeholder 2">
@@ -5738,7 +5752,7 @@
             </p:txBody>
           </p:sp>
         </mc:Choice>
-        <mc:Fallback>
+        <mc:Fallback xmlns="">
           <p:sp>
             <p:nvSpPr>
               <p:cNvPr id="3" name="Content Placeholder 2">
@@ -6218,14 +6232,14 @@
             <a:pPr lvl="0"/>
             <a:r>
               <a:rPr lang="en-US" dirty="0"/>
-              <a:t>Number of publications by academic researchers where a few people have very high numbers</a:t>
+              <a:t>Number of publications by academic researchers, where a few people have very high numbers</a:t>
             </a:r>
           </a:p>
           <a:p>
             <a:pPr lvl="0"/>
             <a:r>
               <a:rPr lang="en-US" dirty="0"/>
-              <a:t>The daily trading volume of a stock  can have spike on a few days</a:t>
+              <a:t>The daily trading volume of a stock  can spike occasionally  </a:t>
             </a:r>
           </a:p>
           <a:p>
@@ -6381,8 +6395,28 @@
           <a:p>
             <a:pPr lvl="1"/>
             <a:r>
+              <a:rPr lang="en-US" dirty="0"/>
+              <a:t>Zero-center predictors to get</a:t>
+            </a:r>
+            <a:r>
               <a:rPr dirty="0"/>
-              <a:t>We do not want to bias the estimation of regression coefficients with predictors that do not have a 0 mean</a:t>
+              <a:t> </a:t>
+            </a:r>
+            <a:r>
+              <a:rPr lang="en-US" dirty="0"/>
+              <a:t>interpretable </a:t>
+            </a:r>
+            <a:r>
+              <a:rPr dirty="0"/>
+              <a:t>estimat</a:t>
+            </a:r>
+            <a:r>
+              <a:rPr lang="en-US" dirty="0"/>
+              <a:t>es</a:t>
+            </a:r>
+            <a:r>
+              <a:rPr dirty="0"/>
+              <a:t> of regression coefficients</a:t>
             </a:r>
           </a:p>
           <a:p>
@@ -6573,6 +6607,13 @@
             <a:r>
               <a:rPr lang="en-US" dirty="0"/>
               <a:t>Mixtures of distributions   </a:t>
+            </a:r>
+          </a:p>
+          <a:p>
+            <a:pPr lvl="0"/>
+            <a:r>
+              <a:rPr lang="en-US" dirty="0"/>
+              <a:t>Or both</a:t>
             </a:r>
             <a:endParaRPr dirty="0"/>
           </a:p>
@@ -6726,7 +6767,7 @@
                 <a:pPr lvl="1"/>
                 <a:r>
                   <a:rPr lang="en-US" dirty="0"/>
-                  <a:t>Probabilities of categorical distribution, </a:t>
+                  <a:t>Switching probabilities from categorical distribution, </a:t>
                 </a:r>
                 <a14:m>
                   <m:oMath xmlns:m="http://schemas.openxmlformats.org/officeDocument/2006/math">
@@ -6836,14 +6877,7 @@
                     </m:d>
                   </m:oMath>
                 </a14:m>
-                <a:r>
-                  <a:rPr lang="ar-AE" dirty="0"/>
-                  <a:t> </a:t>
-                </a:r>
-                <a:r>
-                  <a:rPr lang="en-US" dirty="0"/>
-                  <a:t>, for switching </a:t>
-                </a:r>
+                <a:endParaRPr lang="en-US" dirty="0"/>
               </a:p>
               <a:p>
                 <a:pPr lvl="1"/>
@@ -7359,7 +7393,7 @@
             <a:pPr lvl="0"/>
             <a:r>
               <a:rPr lang="en-US" dirty="0"/>
-              <a:t>Student-t with low degrees of freedom – not a GLM! </a:t>
+              <a:t>Student-t with low degrees of freedom – cannot use GLM! </a:t>
             </a:r>
           </a:p>
           <a:p>
@@ -7475,8 +7509,8 @@
           </a:p>
         </p:txBody>
       </p:sp>
-      <mc:AlternateContent xmlns:mc="http://schemas.openxmlformats.org/markup-compatibility/2006">
-        <mc:Choice xmlns:a14="http://schemas.microsoft.com/office/drawing/2010/main" Requires="a14">
+      <mc:AlternateContent xmlns:mc="http://schemas.openxmlformats.org/markup-compatibility/2006" xmlns:a14="http://schemas.microsoft.com/office/drawing/2010/main">
+        <mc:Choice Requires="a14">
           <p:sp>
             <p:nvSpPr>
               <p:cNvPr id="3" name="Content Placeholder 2">
@@ -7955,18 +7989,21 @@
                     <m:r>
                       <a:rPr lang="en-US" b="1" i="0" dirty="0" smtClean="0">
                         <a:latin typeface="Cambria Math" panose="02040503050406030204" pitchFamily="18" charset="0"/>
+                        <a:hlinkClick r:id="rId3"/>
                       </a:rPr>
                       <m:t>𝐛𝐢𝐧𝐨𝐦𝐢𝐚𝐥</m:t>
                     </m:r>
                     <m:r>
                       <a:rPr lang="en-US" b="1" i="0" dirty="0" smtClean="0">
                         <a:latin typeface="Cambria Math" panose="02040503050406030204" pitchFamily="18" charset="0"/>
+                        <a:hlinkClick r:id="rId3"/>
                       </a:rPr>
                       <m:t> </m:t>
                     </m:r>
                     <m:r>
                       <a:rPr lang="en-US" b="1" i="0" dirty="0" smtClean="0">
                         <a:latin typeface="Cambria Math" panose="02040503050406030204" pitchFamily="18" charset="0"/>
+                        <a:hlinkClick r:id="rId3"/>
                       </a:rPr>
                       <m:t>𝐜𝐨𝐞𝐟𝐟𝐢𝐜𝐢𝐞𝐧𝐭</m:t>
                     </m:r>
@@ -8036,7 +8073,7 @@
             </p:txBody>
           </p:sp>
         </mc:Choice>
-        <mc:Fallback>
+        <mc:Fallback xmlns="">
           <p:sp>
             <p:nvSpPr>
               <p:cNvPr id="3" name="Content Placeholder 2">
@@ -8059,7 +8096,7 @@
                 <a:ext cx="8229600" cy="3616959"/>
               </a:xfrm>
               <a:blipFill>
-                <a:blip r:embed="rId3"/>
+                <a:blip r:embed="rId4"/>
                 <a:stretch>
                   <a:fillRect l="-963" t="-2867"/>
                 </a:stretch>
@@ -8357,13 +8394,7 @@
                                   <a:rPr lang="en-US" b="0" i="1" smtClean="0">
                                     <a:latin typeface="Cambria Math" panose="02040503050406030204" pitchFamily="18" charset="0"/>
                                   </a:rPr>
-                                  <m:t>−</m:t>
-                                </m:r>
-                                <m:r>
-                                  <a:rPr lang="en-US" b="0" i="1" smtClean="0">
-                                    <a:latin typeface="Cambria Math" panose="02040503050406030204" pitchFamily="18" charset="0"/>
-                                  </a:rPr>
-                                  <m:t>1</m:t>
+                                  <m:t>−1</m:t>
                                 </m:r>
                               </m:e>
                             </m:mr>
@@ -8379,13 +8410,7 @@
                                   <a:rPr lang="en-US" b="0" i="1" smtClean="0">
                                     <a:latin typeface="Cambria Math" panose="02040503050406030204" pitchFamily="18" charset="0"/>
                                   </a:rPr>
-                                  <m:t>−</m:t>
-                                </m:r>
-                                <m:r>
-                                  <a:rPr lang="en-US" b="0" i="1" smtClean="0">
-                                    <a:latin typeface="Cambria Math" panose="02040503050406030204" pitchFamily="18" charset="0"/>
-                                  </a:rPr>
-                                  <m:t>1</m:t>
+                                  <m:t>−1</m:t>
                                 </m:r>
                               </m:e>
                             </m:mr>
@@ -8439,13 +8464,7 @@
                                 <a:rPr lang="en-US" b="0" i="1" smtClean="0">
                                   <a:latin typeface="Cambria Math" panose="02040503050406030204" pitchFamily="18" charset="0"/>
                                 </a:rPr>
-                                <m:t>1</m:t>
-                              </m:r>
-                              <m:r>
-                                <a:rPr lang="en-US" b="0" i="1" smtClean="0">
-                                  <a:latin typeface="Cambria Math" panose="02040503050406030204" pitchFamily="18" charset="0"/>
-                                </a:rPr>
-                                <m:t>−</m:t>
+                                <m:t>1−</m:t>
                               </m:r>
                               <m:r>
                                 <a:rPr lang="en-US" b="0" i="1" smtClean="0">
@@ -8522,7 +8541,7 @@
                 </a14:m>
                 <a:r>
                   <a:rPr lang="en-US" dirty="0"/>
-                  <a:t> and </a:t>
+                  <a:t>, and </a:t>
                 </a:r>
                 <a:r>
                   <a:rPr lang="en-US" b="1" dirty="0"/>
@@ -8932,8 +8951,8 @@
           </a:p>
         </p:txBody>
       </p:sp>
-      <mc:AlternateContent xmlns:mc="http://schemas.openxmlformats.org/markup-compatibility/2006">
-        <mc:Choice xmlns:a14="http://schemas.microsoft.com/office/drawing/2010/main" Requires="a14">
+      <mc:AlternateContent xmlns:mc="http://schemas.openxmlformats.org/markup-compatibility/2006" xmlns:a14="http://schemas.microsoft.com/office/drawing/2010/main">
+        <mc:Choice Requires="a14">
           <p:sp>
             <p:nvSpPr>
               <p:cNvPr id="3" name="Content Placeholder 2">
@@ -9512,7 +9531,7 @@
             </p:txBody>
           </p:sp>
         </mc:Choice>
-        <mc:Fallback>
+        <mc:Fallback xmlns="">
           <p:sp>
             <p:nvSpPr>
               <p:cNvPr id="3" name="Content Placeholder 2">
@@ -9683,14 +9702,14 @@
           <a:p>
             <a:r>
               <a:rPr lang="en-US" dirty="0"/>
-              <a:t>Examples:</a:t>
+              <a:t>Examples of over-dispersed count data:</a:t>
             </a:r>
           </a:p>
           <a:p>
             <a:pPr lvl="1"/>
             <a:r>
               <a:rPr lang="en-US" dirty="0"/>
-              <a:t>There are zero tornados on most days in some area, but can have large outbreaks with low probability</a:t>
+              <a:t>There are zero tornados on most days in most area, but can have large outbreaks with low probability</a:t>
             </a:r>
           </a:p>
           <a:p>
@@ -9784,8 +9803,8 @@
           </a:p>
         </p:txBody>
       </p:sp>
-      <mc:AlternateContent xmlns:mc="http://schemas.openxmlformats.org/markup-compatibility/2006" xmlns:a14="http://schemas.microsoft.com/office/drawing/2010/main">
-        <mc:Choice Requires="a14">
+      <mc:AlternateContent xmlns:mc="http://schemas.openxmlformats.org/markup-compatibility/2006">
+        <mc:Choice xmlns:a14="http://schemas.microsoft.com/office/drawing/2010/main" Requires="a14">
           <p:sp>
             <p:nvSpPr>
               <p:cNvPr id="3" name="Content Placeholder 2">
@@ -9881,7 +9900,22 @@
               <a:p>
                 <a:r>
                   <a:rPr lang="en-US" dirty="0"/>
-                  <a:t>We can create a mixture distribution with binomial switching probability     </a:t>
+                  <a:t>We can create a mixture distribution with binomial switching probability, </a:t>
+                </a:r>
+                <a14:m>
+                  <m:oMath xmlns:m="http://schemas.openxmlformats.org/officeDocument/2006/math">
+                    <m:r>
+                      <a:rPr lang="en-US" b="0" i="1" smtClean="0">
+                        <a:latin typeface="Cambria Math" panose="02040503050406030204" pitchFamily="18" charset="0"/>
+                        <a:ea typeface="Cambria Math" panose="02040503050406030204" pitchFamily="18" charset="0"/>
+                      </a:rPr>
+                      <m:t>𝜋</m:t>
+                    </m:r>
+                  </m:oMath>
+                </a14:m>
+                <a:r>
+                  <a:rPr lang="en-US" dirty="0"/>
+                  <a:t>     </a:t>
                 </a:r>
               </a:p>
               <a:p>
@@ -10317,7 +10351,11 @@
               <a:p>
                 <a:r>
                   <a:rPr lang="en-US" dirty="0"/>
-                  <a:t>This distribution is both zero-inflated and over-dispersed</a:t>
+                  <a:t>This distribution is both </a:t>
+                </a:r>
+                <a:r>
+                  <a:rPr lang="en-US" b="1" dirty="0"/>
+                  <a:t>zero-inflated and over-dispersed!</a:t>
                 </a:r>
               </a:p>
               <a:p>
@@ -10327,7 +10365,7 @@
             </p:txBody>
           </p:sp>
         </mc:Choice>
-        <mc:Fallback xmlns="">
+        <mc:Fallback>
           <p:sp>
             <p:nvSpPr>
               <p:cNvPr id="3" name="Content Placeholder 2">
@@ -10865,8 +10903,8 @@
         </p:nvCxnSpPr>
         <p:spPr>
           <a:xfrm flipV="1">
-            <a:off x="3977435" y="2189639"/>
-            <a:ext cx="270630" cy="114813"/>
+            <a:off x="3987685" y="2146274"/>
+            <a:ext cx="219374" cy="114813"/>
           </a:xfrm>
           <a:prstGeom prst="straightConnector1">
             <a:avLst/>
@@ -11163,7 +11201,15 @@
             </a:pPr>
             <a:r>
               <a:rPr lang="en-US" sz="2000" dirty="0"/>
-              <a:t>The inflation coefficient has a large  standard error and CI!</a:t>
+              <a:t>The inflation coefficient has a large  standard error </a:t>
+            </a:r>
+            <a:r>
+              <a:rPr lang="en-US" sz="2000"/>
+              <a:t>and wide CI</a:t>
+            </a:r>
+            <a:r>
+              <a:rPr lang="en-US" sz="2000" dirty="0"/>
+              <a:t>!</a:t>
             </a:r>
           </a:p>
           <a:p>
@@ -11336,8 +11382,8 @@
         </p:nvCxnSpPr>
         <p:spPr>
           <a:xfrm flipV="1">
-            <a:off x="4206240" y="3366655"/>
-            <a:ext cx="906087" cy="232756"/>
+            <a:off x="4276768" y="3366655"/>
+            <a:ext cx="835559" cy="232756"/>
           </a:xfrm>
           <a:prstGeom prst="straightConnector1">
             <a:avLst/>
@@ -11451,7 +11497,7 @@
         <p:spPr/>
         <p:txBody>
           <a:bodyPr>
-            <a:normAutofit fontScale="85000" lnSpcReduction="20000"/>
+            <a:normAutofit fontScale="77500" lnSpcReduction="20000"/>
           </a:bodyPr>
           <a:lstStyle/>
           <a:p>
@@ -11460,7 +11506,7 @@
             </a:pPr>
             <a:r>
               <a:rPr lang="en-US" dirty="0"/>
-              <a:t>Several commonly encountered data problems create problems for OLS and GLM models</a:t>
+              <a:t>Several commonly encountered data problems affect OLS and GLM models</a:t>
             </a:r>
             <a:endParaRPr dirty="0"/>
           </a:p>
@@ -11505,22 +11551,21 @@
             <a:pPr lvl="1"/>
             <a:r>
               <a:rPr lang="en-US" dirty="0"/>
-              <a:t>Can be asymmetric with long </a:t>
-            </a:r>
-            <a:r>
-              <a:rPr lang="en-US" dirty="0" err="1"/>
-              <a:t>righ</a:t>
-            </a:r>
+              <a:t>Can be asymmetric with long tails</a:t>
+            </a:r>
+          </a:p>
+          <a:p>
+            <a:pPr lvl="1"/>
             <a:r>
               <a:rPr lang="en-US" dirty="0"/>
-              <a:t> tail</a:t>
+              <a:t>Use heavy tailed distribution models</a:t>
             </a:r>
           </a:p>
           <a:p>
             <a:pPr lvl="1"/>
             <a:r>
               <a:rPr lang="en-US" dirty="0"/>
-              <a:t>Apply models with distributions and mixtures that account for large low probability responses </a:t>
+              <a:t>Apply models with mixtures of distributions to account for large low probability responses </a:t>
             </a:r>
           </a:p>
           <a:p>
@@ -11546,7 +11591,7 @@
             </a:r>
             <a:r>
               <a:rPr lang="en-US" dirty="0"/>
-              <a:t>on the response </a:t>
+              <a:t>on parameter estimates</a:t>
             </a:r>
           </a:p>
           <a:p>
@@ -17226,8 +17271,8 @@
           </a:p>
         </p:txBody>
       </p:sp>
-      <mc:AlternateContent xmlns:mc="http://schemas.openxmlformats.org/markup-compatibility/2006">
-        <mc:Choice xmlns:a14="http://schemas.microsoft.com/office/drawing/2010/main" Requires="a14">
+      <mc:AlternateContent xmlns:mc="http://schemas.openxmlformats.org/markup-compatibility/2006" xmlns:a14="http://schemas.microsoft.com/office/drawing/2010/main">
+        <mc:Choice Requires="a14">
           <p:sp>
             <p:nvSpPr>
               <p:cNvPr id="3" name="Content Placeholder 2"/>
@@ -17362,7 +17407,7 @@
             </p:txBody>
           </p:sp>
         </mc:Choice>
-        <mc:Fallback>
+        <mc:Fallback xmlns="">
           <p:sp>
             <p:nvSpPr>
               <p:cNvPr id="3" name="Content Placeholder 2"/>
@@ -18138,7 +18183,7 @@
           <a:p>
             <a:r>
               <a:rPr lang="en-US" dirty="0"/>
-              <a:t>In epidemiology the probability distribution of the number of people contracting a disease in per day has many zeros</a:t>
+              <a:t>In epidemiology the probability distribution of the of people contracting a disease per day has many zeros</a:t>
             </a:r>
           </a:p>
           <a:p>
@@ -19851,7 +19896,7 @@
             <a:pPr lvl="1"/>
             <a:r>
               <a:rPr lang="en-US" dirty="0"/>
-              <a:t>One or more standard distributions </a:t>
+              <a:t>A standard distribution </a:t>
             </a:r>
           </a:p>
           <a:p>
@@ -19975,7 +20020,7 @@
               <a:p>
                 <a:r>
                   <a:rPr lang="en-US" dirty="0"/>
-                  <a:t>The binomial distribution serves as a ‘switch’ between 0 response and the other distribution(s)    </a:t>
+                  <a:t>The binomial distribution serves as a ‘switch’ between 0 response and the other distribution  </a:t>
                 </a:r>
               </a:p>
               <a:p>
@@ -20212,13 +20257,7 @@
                                 <a:rPr lang="en-US" b="0" i="1" smtClean="0">
                                   <a:latin typeface="Cambria Math" panose="02040503050406030204" pitchFamily="18" charset="0"/>
                                 </a:rPr>
-                                <m:t>=</m:t>
-                              </m:r>
-                              <m:r>
-                                <a:rPr lang="en-US" b="0" i="1" smtClean="0">
-                                  <a:latin typeface="Cambria Math" panose="02040503050406030204" pitchFamily="18" charset="0"/>
-                                </a:rPr>
-                                <m:t>0</m:t>
+                                <m:t>=0</m:t>
                               </m:r>
                             </m:e>
                           </m:d>
@@ -20260,14 +20299,7 @@
                                   <a:latin typeface="Cambria Math" panose="02040503050406030204" pitchFamily="18" charset="0"/>
                                   <a:ea typeface="Cambria Math" panose="02040503050406030204" pitchFamily="18" charset="0"/>
                                 </a:rPr>
-                                <m:t>1</m:t>
-                              </m:r>
-                              <m:r>
-                                <a:rPr lang="en-US" b="0" i="1" smtClean="0">
-                                  <a:latin typeface="Cambria Math" panose="02040503050406030204" pitchFamily="18" charset="0"/>
-                                  <a:ea typeface="Cambria Math" panose="02040503050406030204" pitchFamily="18" charset="0"/>
-                                </a:rPr>
-                                <m:t>−</m:t>
+                                <m:t>1−</m:t>
                               </m:r>
                               <m:r>
                                 <a:rPr lang="en-US" b="0" i="1" smtClean="0">
@@ -20322,13 +20354,7 @@
                                 <a:rPr lang="en-US" b="0" i="1" smtClean="0">
                                   <a:latin typeface="Cambria Math" panose="02040503050406030204" pitchFamily="18" charset="0"/>
                                 </a:rPr>
-                                <m:t>0</m:t>
-                              </m:r>
-                              <m:r>
-                                <a:rPr lang="en-US" b="0" i="1" smtClean="0">
-                                  <a:latin typeface="Cambria Math" panose="02040503050406030204" pitchFamily="18" charset="0"/>
-                                </a:rPr>
-                                <m:t> | </m:t>
+                                <m:t>0 | </m:t>
                               </m:r>
                               <m:r>
                                 <a:rPr lang="en-US" i="1">
@@ -20424,14 +20450,7 @@
                                   <a:latin typeface="Cambria Math" panose="02040503050406030204" pitchFamily="18" charset="0"/>
                                   <a:ea typeface="Cambria Math" panose="02040503050406030204" pitchFamily="18" charset="0"/>
                                 </a:rPr>
-                                <m:t>1</m:t>
-                              </m:r>
-                              <m:r>
-                                <a:rPr lang="en-US" i="1">
-                                  <a:latin typeface="Cambria Math" panose="02040503050406030204" pitchFamily="18" charset="0"/>
-                                  <a:ea typeface="Cambria Math" panose="02040503050406030204" pitchFamily="18" charset="0"/>
-                                </a:rPr>
-                                <m:t>−</m:t>
+                                <m:t>1−</m:t>
                               </m:r>
                               <m:r>
                                 <a:rPr lang="en-US" i="1">
@@ -20648,8 +20667,8 @@
           </a:p>
         </p:txBody>
       </p:sp>
-      <mc:AlternateContent xmlns:mc="http://schemas.openxmlformats.org/markup-compatibility/2006">
-        <mc:Choice xmlns:a14="http://schemas.microsoft.com/office/drawing/2010/main" Requires="a14">
+      <mc:AlternateContent xmlns:mc="http://schemas.openxmlformats.org/markup-compatibility/2006" xmlns:a14="http://schemas.microsoft.com/office/drawing/2010/main">
+        <mc:Choice Requires="a14">
           <p:sp>
             <p:nvSpPr>
               <p:cNvPr id="3" name="Content Placeholder 2">
@@ -21386,7 +21405,7 @@
             </p:txBody>
           </p:sp>
         </mc:Choice>
-        <mc:Fallback>
+        <mc:Fallback xmlns="">
           <p:sp>
             <p:nvSpPr>
               <p:cNvPr id="3" name="Content Placeholder 2">

</xml_diff>

<commit_message>
Added example slide, edited slide contents, updated annimations
</commit_message>
<xml_diff>
--- a/LectureSlides/10b_ModelsFor OutliersAndOverdispersion.pptx
+++ b/LectureSlides/10b_ModelsFor OutliersAndOverdispersion.pptx
@@ -5,7 +5,7 @@
     <p:sldMasterId id="2147483648" r:id="rId1"/>
   </p:sldMasterIdLst>
   <p:notesMasterIdLst>
-    <p:notesMasterId r:id="rId56"/>
+    <p:notesMasterId r:id="rId57"/>
   </p:notesMasterIdLst>
   <p:sldIdLst>
     <p:sldId id="337" r:id="rId2"/>
@@ -37,31 +37,32 @@
     <p:sldId id="361" r:id="rId28"/>
     <p:sldId id="362" r:id="rId29"/>
     <p:sldId id="351" r:id="rId30"/>
-    <p:sldId id="375" r:id="rId31"/>
-    <p:sldId id="376" r:id="rId32"/>
-    <p:sldId id="380" r:id="rId33"/>
-    <p:sldId id="378" r:id="rId34"/>
-    <p:sldId id="379" r:id="rId35"/>
-    <p:sldId id="377" r:id="rId36"/>
-    <p:sldId id="320" r:id="rId37"/>
-    <p:sldId id="321" r:id="rId38"/>
-    <p:sldId id="364" r:id="rId39"/>
-    <p:sldId id="365" r:id="rId40"/>
-    <p:sldId id="382" r:id="rId41"/>
-    <p:sldId id="323" r:id="rId42"/>
-    <p:sldId id="324" r:id="rId43"/>
-    <p:sldId id="326" r:id="rId44"/>
-    <p:sldId id="366" r:id="rId45"/>
-    <p:sldId id="327" r:id="rId46"/>
-    <p:sldId id="328" r:id="rId47"/>
-    <p:sldId id="329" r:id="rId48"/>
-    <p:sldId id="330" r:id="rId49"/>
-    <p:sldId id="331" r:id="rId50"/>
-    <p:sldId id="332" r:id="rId51"/>
-    <p:sldId id="333" r:id="rId52"/>
-    <p:sldId id="367" r:id="rId53"/>
-    <p:sldId id="368" r:id="rId54"/>
-    <p:sldId id="381" r:id="rId55"/>
+    <p:sldId id="383" r:id="rId31"/>
+    <p:sldId id="375" r:id="rId32"/>
+    <p:sldId id="376" r:id="rId33"/>
+    <p:sldId id="380" r:id="rId34"/>
+    <p:sldId id="378" r:id="rId35"/>
+    <p:sldId id="379" r:id="rId36"/>
+    <p:sldId id="377" r:id="rId37"/>
+    <p:sldId id="320" r:id="rId38"/>
+    <p:sldId id="321" r:id="rId39"/>
+    <p:sldId id="364" r:id="rId40"/>
+    <p:sldId id="365" r:id="rId41"/>
+    <p:sldId id="382" r:id="rId42"/>
+    <p:sldId id="323" r:id="rId43"/>
+    <p:sldId id="324" r:id="rId44"/>
+    <p:sldId id="326" r:id="rId45"/>
+    <p:sldId id="366" r:id="rId46"/>
+    <p:sldId id="327" r:id="rId47"/>
+    <p:sldId id="328" r:id="rId48"/>
+    <p:sldId id="329" r:id="rId49"/>
+    <p:sldId id="330" r:id="rId50"/>
+    <p:sldId id="331" r:id="rId51"/>
+    <p:sldId id="332" r:id="rId52"/>
+    <p:sldId id="333" r:id="rId53"/>
+    <p:sldId id="367" r:id="rId54"/>
+    <p:sldId id="368" r:id="rId55"/>
+    <p:sldId id="381" r:id="rId56"/>
   </p:sldIdLst>
   <p:sldSz cx="9144000" cy="5143500" type="screen16x9"/>
   <p:notesSz cx="6858000" cy="9144000"/>
@@ -261,7 +262,7 @@
           <a:p>
             <a:fld id="{B45A0028-71D2-4800-AD8E-38BD1BCDF688}" type="datetimeFigureOut">
               <a:rPr lang="en-US" smtClean="0"/>
-              <a:t>10/9/2025</a:t>
+              <a:t>10/15/2025</a:t>
             </a:fld>
             <a:endParaRPr lang="en-US"/>
           </a:p>
@@ -791,7 +792,7 @@
           <a:p>
             <a:fld id="{241EB5C9-1307-BA42-ABA2-0BC069CD8E7F}" type="datetimeFigureOut">
               <a:rPr lang="en-US" smtClean="0"/>
-              <a:t>10/9/2025</a:t>
+              <a:t>10/15/2025</a:t>
             </a:fld>
             <a:endParaRPr lang="en-US"/>
           </a:p>
@@ -959,7 +960,7 @@
           <a:p>
             <a:fld id="{241EB5C9-1307-BA42-ABA2-0BC069CD8E7F}" type="datetimeFigureOut">
               <a:rPr lang="en-US" smtClean="0"/>
-              <a:t>10/9/2025</a:t>
+              <a:t>10/15/2025</a:t>
             </a:fld>
             <a:endParaRPr lang="en-US"/>
           </a:p>
@@ -1137,7 +1138,7 @@
           <a:p>
             <a:fld id="{241EB5C9-1307-BA42-ABA2-0BC069CD8E7F}" type="datetimeFigureOut">
               <a:rPr lang="en-US" smtClean="0"/>
-              <a:t>10/9/2025</a:t>
+              <a:t>10/15/2025</a:t>
             </a:fld>
             <a:endParaRPr lang="en-US"/>
           </a:p>
@@ -1305,7 +1306,7 @@
           <a:p>
             <a:fld id="{241EB5C9-1307-BA42-ABA2-0BC069CD8E7F}" type="datetimeFigureOut">
               <a:rPr lang="en-US" smtClean="0"/>
-              <a:t>10/9/2025</a:t>
+              <a:t>10/15/2025</a:t>
             </a:fld>
             <a:endParaRPr lang="en-US"/>
           </a:p>
@@ -1550,7 +1551,7 @@
           <a:p>
             <a:fld id="{241EB5C9-1307-BA42-ABA2-0BC069CD8E7F}" type="datetimeFigureOut">
               <a:rPr lang="en-US" smtClean="0"/>
-              <a:t>10/9/2025</a:t>
+              <a:t>10/15/2025</a:t>
             </a:fld>
             <a:endParaRPr lang="en-US"/>
           </a:p>
@@ -1835,7 +1836,7 @@
           <a:p>
             <a:fld id="{241EB5C9-1307-BA42-ABA2-0BC069CD8E7F}" type="datetimeFigureOut">
               <a:rPr lang="en-US" smtClean="0"/>
-              <a:t>10/9/2025</a:t>
+              <a:t>10/15/2025</a:t>
             </a:fld>
             <a:endParaRPr lang="en-US"/>
           </a:p>
@@ -2254,7 +2255,7 @@
           <a:p>
             <a:fld id="{241EB5C9-1307-BA42-ABA2-0BC069CD8E7F}" type="datetimeFigureOut">
               <a:rPr lang="en-US" smtClean="0"/>
-              <a:t>10/9/2025</a:t>
+              <a:t>10/15/2025</a:t>
             </a:fld>
             <a:endParaRPr lang="en-US"/>
           </a:p>
@@ -2371,7 +2372,7 @@
           <a:p>
             <a:fld id="{241EB5C9-1307-BA42-ABA2-0BC069CD8E7F}" type="datetimeFigureOut">
               <a:rPr lang="en-US" smtClean="0"/>
-              <a:t>10/9/2025</a:t>
+              <a:t>10/15/2025</a:t>
             </a:fld>
             <a:endParaRPr lang="en-US"/>
           </a:p>
@@ -2466,7 +2467,7 @@
           <a:p>
             <a:fld id="{241EB5C9-1307-BA42-ABA2-0BC069CD8E7F}" type="datetimeFigureOut">
               <a:rPr lang="en-US" smtClean="0"/>
-              <a:t>10/9/2025</a:t>
+              <a:t>10/15/2025</a:t>
             </a:fld>
             <a:endParaRPr lang="en-US"/>
           </a:p>
@@ -2741,7 +2742,7 @@
           <a:p>
             <a:fld id="{241EB5C9-1307-BA42-ABA2-0BC069CD8E7F}" type="datetimeFigureOut">
               <a:rPr lang="en-US" smtClean="0"/>
-              <a:t>10/9/2025</a:t>
+              <a:t>10/15/2025</a:t>
             </a:fld>
             <a:endParaRPr lang="en-US"/>
           </a:p>
@@ -2993,7 +2994,7 @@
           <a:p>
             <a:fld id="{241EB5C9-1307-BA42-ABA2-0BC069CD8E7F}" type="datetimeFigureOut">
               <a:rPr lang="en-US" smtClean="0"/>
-              <a:t>10/9/2025</a:t>
+              <a:t>10/15/2025</a:t>
             </a:fld>
             <a:endParaRPr lang="en-US"/>
           </a:p>
@@ -3204,7 +3205,7 @@
           <a:p>
             <a:fld id="{241EB5C9-1307-BA42-ABA2-0BC069CD8E7F}" type="datetimeFigureOut">
               <a:rPr lang="en-US" smtClean="0"/>
-              <a:t>10/9/2025</a:t>
+              <a:t>10/15/2025</a:t>
             </a:fld>
             <a:endParaRPr lang="en-US"/>
           </a:p>
@@ -3750,7 +3751,7 @@
             <a:pPr algn="ctr"/>
             <a:r>
               <a:rPr lang="en-US" sz="1100" dirty="0"/>
-              <a:t>Copyright 2018, 2019, 2020, 2021, 2022, 2023 2024, Stephen F Elston. All rights reserved</a:t>
+              <a:t>Copyright 2018, 2019, 2020, 2021, 2022, 2023 2024, 2025, Stephen F Elston. All rights reserved</a:t>
             </a:r>
             <a:r>
               <a:rPr lang="en-US" dirty="0"/>
@@ -4988,7 +4989,25 @@
                       <a:rPr lang="en-US" b="0" i="1" smtClean="0">
                         <a:latin typeface="Cambria Math" panose="02040503050406030204" pitchFamily="18" charset="0"/>
                       </a:rPr>
-                      <m:t>=2.0</m:t>
+                      <m:t>=</m:t>
+                    </m:r>
+                    <m:r>
+                      <a:rPr lang="en-US" b="0" i="1" smtClean="0">
+                        <a:latin typeface="Cambria Math" panose="02040503050406030204" pitchFamily="18" charset="0"/>
+                      </a:rPr>
+                      <m:t>2</m:t>
+                    </m:r>
+                    <m:r>
+                      <a:rPr lang="en-US" b="0" i="1" smtClean="0">
+                        <a:latin typeface="Cambria Math" panose="02040503050406030204" pitchFamily="18" charset="0"/>
+                      </a:rPr>
+                      <m:t>.</m:t>
+                    </m:r>
+                    <m:r>
+                      <a:rPr lang="en-US" b="0" i="1" smtClean="0">
+                        <a:latin typeface="Cambria Math" panose="02040503050406030204" pitchFamily="18" charset="0"/>
+                      </a:rPr>
+                      <m:t>0</m:t>
                     </m:r>
                   </m:oMath>
                 </a14:m>
@@ -5008,7 +5027,25 @@
                       <a:rPr lang="en-US" i="1">
                         <a:latin typeface="Cambria Math" panose="02040503050406030204" pitchFamily="18" charset="0"/>
                       </a:rPr>
-                      <m:t>=5.0</m:t>
+                      <m:t>=</m:t>
+                    </m:r>
+                    <m:r>
+                      <a:rPr lang="en-US" i="1">
+                        <a:latin typeface="Cambria Math" panose="02040503050406030204" pitchFamily="18" charset="0"/>
+                      </a:rPr>
+                      <m:t>5</m:t>
+                    </m:r>
+                    <m:r>
+                      <a:rPr lang="en-US" i="1">
+                        <a:latin typeface="Cambria Math" panose="02040503050406030204" pitchFamily="18" charset="0"/>
+                      </a:rPr>
+                      <m:t>.</m:t>
+                    </m:r>
+                    <m:r>
+                      <a:rPr lang="en-US" i="1">
+                        <a:latin typeface="Cambria Math" panose="02040503050406030204" pitchFamily="18" charset="0"/>
+                      </a:rPr>
+                      <m:t>0</m:t>
                     </m:r>
                   </m:oMath>
                 </a14:m>
@@ -5604,8 +5641,8 @@
           </a:p>
         </p:txBody>
       </p:sp>
-      <mc:AlternateContent xmlns:mc="http://schemas.openxmlformats.org/markup-compatibility/2006" xmlns:a14="http://schemas.microsoft.com/office/drawing/2010/main">
-        <mc:Choice Requires="a14">
+      <mc:AlternateContent xmlns:mc="http://schemas.openxmlformats.org/markup-compatibility/2006">
+        <mc:Choice xmlns:a14="http://schemas.microsoft.com/office/drawing/2010/main" Requires="a14">
           <p:sp>
             <p:nvSpPr>
               <p:cNvPr id="3" name="Content Placeholder 2">
@@ -5678,7 +5715,7 @@
               <a:p>
                 <a:r>
                   <a:rPr lang="en-US" dirty="0"/>
-                  <a:t>Use an iterative solution</a:t>
+                  <a:t>Use an iterative (alternating) solution</a:t>
                 </a:r>
               </a:p>
               <a:p>
@@ -5781,7 +5818,7 @@
             </p:txBody>
           </p:sp>
         </mc:Choice>
-        <mc:Fallback xmlns="">
+        <mc:Fallback>
           <p:sp>
             <p:nvSpPr>
               <p:cNvPr id="3" name="Content Placeholder 2">
@@ -6287,8 +6324,8 @@
           </a:p>
         </p:txBody>
       </p:sp>
-      <mc:AlternateContent xmlns:mc="http://schemas.openxmlformats.org/markup-compatibility/2006" xmlns:a14="http://schemas.microsoft.com/office/drawing/2010/main">
-        <mc:Choice Requires="a14">
+      <mc:AlternateContent xmlns:mc="http://schemas.openxmlformats.org/markup-compatibility/2006">
+        <mc:Choice xmlns:a14="http://schemas.microsoft.com/office/drawing/2010/main" Requires="a14">
           <p:sp>
             <p:nvSpPr>
               <p:cNvPr id="3" name="Content Placeholder 2">
@@ -6394,7 +6431,7 @@
                 <a:pPr lvl="2"/>
                 <a:r>
                   <a:rPr lang="en-US" dirty="0"/>
-                  <a:t>Binomial distribution parameter help constant</a:t>
+                  <a:t>Binomial distribution parameter held constant</a:t>
                 </a:r>
               </a:p>
               <a:p>
@@ -6436,7 +6473,7 @@
             </p:txBody>
           </p:sp>
         </mc:Choice>
-        <mc:Fallback xmlns="">
+        <mc:Fallback>
           <p:sp>
             <p:nvSpPr>
               <p:cNvPr id="3" name="Content Placeholder 2">
@@ -6867,7 +6904,7 @@
         </p:spPr>
         <p:txBody>
           <a:bodyPr>
-            <a:normAutofit lnSpcReduction="10000"/>
+            <a:normAutofit/>
           </a:bodyPr>
           <a:lstStyle/>
           <a:p>
@@ -6891,28 +6928,6 @@
             <a:r>
               <a:rPr lang="en-US" sz="2000" dirty="0"/>
               <a:t>The distribution is zero inflated, many parties do not catch any fish</a:t>
-            </a:r>
-          </a:p>
-          <a:p>
-            <a:pPr marL="342900" lvl="0" indent="-342900">
-              <a:buFont typeface="Arial" panose="020B0604020202020204" pitchFamily="34" charset="0"/>
-              <a:buChar char="•"/>
-            </a:pPr>
-            <a:r>
-              <a:rPr lang="en-US" sz="2000" dirty="0"/>
-              <a:t>There is a strong right skew, some parties catch large numbers of fish – </a:t>
-            </a:r>
-            <a:r>
-              <a:rPr lang="en-US" sz="2000" b="1" dirty="0"/>
-              <a:t>over-</a:t>
-            </a:r>
-            <a:r>
-              <a:rPr lang="en-US" sz="2000" b="1" dirty="0" err="1"/>
-              <a:t>dispursion</a:t>
-            </a:r>
-            <a:r>
-              <a:rPr lang="en-US" sz="2000" b="1" dirty="0"/>
-              <a:t>!</a:t>
             </a:r>
           </a:p>
         </p:txBody>
@@ -6964,51 +6979,7 @@
         <p:spPr>
           <a:xfrm>
             <a:off x="4060767" y="3125585"/>
-            <a:ext cx="856211" cy="1084811"/>
-          </a:xfrm>
-          <a:prstGeom prst="straightConnector1">
-            <a:avLst/>
-          </a:prstGeom>
-          <a:ln w="38100">
-            <a:solidFill>
-              <a:srgbClr val="C00000"/>
-            </a:solidFill>
-            <a:tailEnd type="triangle"/>
-          </a:ln>
-        </p:spPr>
-        <p:style>
-          <a:lnRef idx="2">
-            <a:schemeClr val="accent1"/>
-          </a:lnRef>
-          <a:fillRef idx="0">
-            <a:schemeClr val="accent1"/>
-          </a:fillRef>
-          <a:effectRef idx="1">
-            <a:schemeClr val="accent1"/>
-          </a:effectRef>
-          <a:fontRef idx="minor">
-            <a:schemeClr val="tx1"/>
-          </a:fontRef>
-        </p:style>
-      </p:cxnSp>
-      <p:cxnSp>
-        <p:nvCxnSpPr>
-          <p:cNvPr id="8" name="Straight Arrow Connector 7">
-            <a:extLst>
-              <a:ext uri="{FF2B5EF4-FFF2-40B4-BE49-F238E27FC236}">
-                <a16:creationId xmlns:a16="http://schemas.microsoft.com/office/drawing/2014/main" id="{39A87C26-2F67-0BF0-33CF-967A294C6947}"/>
-              </a:ext>
-            </a:extLst>
-          </p:cNvPr>
-          <p:cNvCxnSpPr>
-            <a:cxnSpLocks/>
-          </p:cNvCxnSpPr>
-          <p:nvPr/>
-        </p:nvCxnSpPr>
-        <p:spPr>
-          <a:xfrm>
-            <a:off x="3167149" y="4443153"/>
-            <a:ext cx="3133898" cy="0"/>
+            <a:ext cx="935182" cy="332510"/>
           </a:xfrm>
           <a:prstGeom prst="straightConnector1">
             <a:avLst/>
@@ -7129,82 +7100,6 @@
                       </p:childTnLst>
                     </p:cTn>
                   </p:par>
-                  <p:par>
-                    <p:cTn id="9" fill="hold">
-                      <p:stCondLst>
-                        <p:cond delay="indefinite"/>
-                      </p:stCondLst>
-                      <p:childTnLst>
-                        <p:par>
-                          <p:cTn id="10" fill="hold">
-                            <p:stCondLst>
-                              <p:cond delay="0"/>
-                            </p:stCondLst>
-                            <p:childTnLst>
-                              <p:par>
-                                <p:cTn id="11" presetID="1" presetClass="entr" presetSubtype="0" fill="hold" nodeType="clickEffect">
-                                  <p:stCondLst>
-                                    <p:cond delay="0"/>
-                                  </p:stCondLst>
-                                  <p:childTnLst>
-                                    <p:set>
-                                      <p:cBhvr>
-                                        <p:cTn id="12" dur="1" fill="hold">
-                                          <p:stCondLst>
-                                            <p:cond delay="0"/>
-                                          </p:stCondLst>
-                                        </p:cTn>
-                                        <p:tgtEl>
-                                          <p:spTgt spid="4">
-                                            <p:txEl>
-                                              <p:pRg st="2" end="2"/>
-                                            </p:txEl>
-                                          </p:spTgt>
-                                        </p:tgtEl>
-                                        <p:attrNameLst>
-                                          <p:attrName>style.visibility</p:attrName>
-                                        </p:attrNameLst>
-                                      </p:cBhvr>
-                                      <p:to>
-                                        <p:strVal val="visible"/>
-                                      </p:to>
-                                    </p:set>
-                                  </p:childTnLst>
-                                </p:cTn>
-                              </p:par>
-                              <p:par>
-                                <p:cTn id="13" presetID="1" presetClass="entr" presetSubtype="0" fill="hold" nodeType="withEffect">
-                                  <p:stCondLst>
-                                    <p:cond delay="0"/>
-                                  </p:stCondLst>
-                                  <p:childTnLst>
-                                    <p:set>
-                                      <p:cBhvr>
-                                        <p:cTn id="14" dur="1" fill="hold">
-                                          <p:stCondLst>
-                                            <p:cond delay="0"/>
-                                          </p:stCondLst>
-                                        </p:cTn>
-                                        <p:tgtEl>
-                                          <p:spTgt spid="8"/>
-                                        </p:tgtEl>
-                                        <p:attrNameLst>
-                                          <p:attrName>style.visibility</p:attrName>
-                                        </p:attrNameLst>
-                                      </p:cBhvr>
-                                      <p:to>
-                                        <p:strVal val="visible"/>
-                                      </p:to>
-                                    </p:set>
-                                  </p:childTnLst>
-                                </p:cTn>
-                              </p:par>
-                            </p:childTnLst>
-                          </p:cTn>
-                        </p:par>
-                      </p:childTnLst>
-                    </p:cTn>
-                  </p:par>
                 </p:childTnLst>
               </p:cTn>
               <p:prevCondLst>
@@ -7641,8 +7536,8 @@
         </p:nvCxnSpPr>
         <p:spPr>
           <a:xfrm>
-            <a:off x="3653444" y="2907464"/>
-            <a:ext cx="2283471" cy="1078486"/>
+            <a:off x="3653444" y="2937555"/>
+            <a:ext cx="2622665" cy="1030036"/>
           </a:xfrm>
           <a:prstGeom prst="straightConnector1">
             <a:avLst/>
@@ -7685,8 +7580,8 @@
         </p:nvCxnSpPr>
         <p:spPr>
           <a:xfrm>
-            <a:off x="4813071" y="3632660"/>
-            <a:ext cx="814647" cy="706581"/>
+            <a:off x="4821382" y="3602527"/>
+            <a:ext cx="749999" cy="693073"/>
           </a:xfrm>
           <a:prstGeom prst="straightConnector1">
             <a:avLst/>
@@ -7729,7 +7624,7 @@
         </p:nvCxnSpPr>
         <p:spPr>
           <a:xfrm>
-            <a:off x="4842164" y="3973484"/>
+            <a:off x="4756959" y="3948543"/>
             <a:ext cx="926869" cy="631766"/>
           </a:xfrm>
           <a:prstGeom prst="straightConnector1">
@@ -7773,7 +7668,7 @@
         </p:nvCxnSpPr>
         <p:spPr>
           <a:xfrm>
-            <a:off x="4227022" y="2616432"/>
+            <a:off x="4268585" y="2662494"/>
             <a:ext cx="3429001" cy="1103170"/>
           </a:xfrm>
           <a:prstGeom prst="straightConnector1">
@@ -7952,7 +7847,7 @@
                                           </p:stCondLst>
                                         </p:cTn>
                                         <p:tgtEl>
-                                          <p:spTgt spid="12"/>
+                                          <p:spTgt spid="27"/>
                                         </p:tgtEl>
                                         <p:attrNameLst>
                                           <p:attrName>style.visibility</p:attrName>
@@ -8028,7 +7923,7 @@
                                           </p:stCondLst>
                                         </p:cTn>
                                         <p:tgtEl>
-                                          <p:spTgt spid="15"/>
+                                          <p:spTgt spid="12"/>
                                         </p:tgtEl>
                                         <p:attrNameLst>
                                           <p:attrName>style.visibility</p:attrName>
@@ -8104,7 +7999,7 @@
                                           </p:stCondLst>
                                         </p:cTn>
                                         <p:tgtEl>
-                                          <p:spTgt spid="18"/>
+                                          <p:spTgt spid="15"/>
                                         </p:tgtEl>
                                         <p:attrNameLst>
                                           <p:attrName>style.visibility</p:attrName>
@@ -8180,7 +8075,7 @@
                                           </p:stCondLst>
                                         </p:cTn>
                                         <p:tgtEl>
-                                          <p:spTgt spid="27"/>
+                                          <p:spTgt spid="18"/>
                                         </p:tgtEl>
                                         <p:attrNameLst>
                                           <p:attrName>style.visibility</p:attrName>
@@ -9138,15 +9033,18 @@
             </a:r>
             <a:r>
               <a:rPr dirty="0"/>
-              <a:t>: Regularization and sparse models</a:t>
-            </a:r>
-            <a:endParaRPr lang="en-US" dirty="0"/>
+              <a:t>: </a:t>
+            </a:r>
+            <a:r>
+              <a:rPr lang="en-US" dirty="0"/>
+              <a:t>Statistical Properties of Time Series </a:t>
+            </a:r>
           </a:p>
           <a:p>
             <a:pPr lvl="0"/>
             <a:r>
               <a:rPr lang="en-US" dirty="0"/>
-              <a:t>Week 9, Oct 30: Models for messy data</a:t>
+              <a:t>Week 9, Oct 30: Introduction to Time Series Models </a:t>
             </a:r>
             <a:endParaRPr dirty="0"/>
           </a:p>
@@ -9170,11 +9068,11 @@
             </a:r>
             <a:r>
               <a:rPr dirty="0"/>
-              <a:t>: </a:t>
+              <a:t>:</a:t>
             </a:r>
             <a:r>
               <a:rPr lang="en-US" dirty="0"/>
-              <a:t>Properties of time series</a:t>
+              <a:t> Introduction to Bayes Models</a:t>
             </a:r>
             <a:endParaRPr dirty="0"/>
           </a:p>
@@ -9194,11 +9092,11 @@
             </a:r>
             <a:r>
               <a:rPr dirty="0"/>
-              <a:t>: </a:t>
+              <a:t>:</a:t>
             </a:r>
             <a:r>
               <a:rPr lang="en-US" dirty="0"/>
-              <a:t>Forecasting models</a:t>
+              <a:t> MCMC for Bayes</a:t>
             </a:r>
             <a:endParaRPr dirty="0"/>
           </a:p>
@@ -9222,30 +9120,25 @@
             </a:r>
             <a:r>
               <a:rPr dirty="0"/>
-              <a:t>: Bayes MCMC methods</a:t>
-            </a:r>
-            <a:endParaRPr lang="en-US" dirty="0"/>
+              <a:t>:</a:t>
+            </a:r>
+            <a:r>
+              <a:rPr lang="en-US" dirty="0"/>
+              <a:t> Hierarchical Bayesian models</a:t>
+            </a:r>
           </a:p>
           <a:p>
             <a:pPr lvl="0"/>
             <a:r>
               <a:rPr lang="en-US" dirty="0"/>
-              <a:t>Nov 21: Project proposals due</a:t>
+              <a:t>Nov 24: Project proposals due</a:t>
             </a:r>
           </a:p>
           <a:p>
             <a:pPr lvl="0"/>
             <a:r>
               <a:rPr lang="en-US" dirty="0"/>
-              <a:t>Nov 27: </a:t>
-            </a:r>
-            <a:r>
-              <a:rPr lang="en-US" b="1" dirty="0"/>
-              <a:t>No class</a:t>
-            </a:r>
-            <a:r>
-              <a:rPr lang="en-US" dirty="0"/>
-              <a:t>, Thanksgiving holiday</a:t>
+              <a:t>Nov 27: No class, Thanksgiving holiday</a:t>
             </a:r>
             <a:endParaRPr dirty="0"/>
           </a:p>
@@ -9261,8 +9154,13 @@
             </a:r>
             <a:r>
               <a:rPr dirty="0"/>
-              <a:t>: Hierarchical Bayesian models</a:t>
-            </a:r>
+              <a:t>: </a:t>
+            </a:r>
+            <a:r>
+              <a:rPr lang="en-US" dirty="0"/>
+              <a:t>Modern Time Series Models </a:t>
+            </a:r>
+            <a:endParaRPr dirty="0"/>
           </a:p>
           <a:p>
             <a:pPr lvl="0"/>
@@ -9278,6 +9176,23 @@
               <a:rPr dirty="0"/>
               <a:t>: Submit Graduate Independent Projects</a:t>
             </a:r>
+            <a:r>
+              <a:rPr lang="en-US" dirty="0"/>
+              <a:t> – </a:t>
+            </a:r>
+            <a:r>
+              <a:rPr lang="en-US" b="1" dirty="0">
+                <a:solidFill>
+                  <a:srgbClr val="FF0000"/>
+                </a:solidFill>
+              </a:rPr>
+              <a:t>No extension possible!</a:t>
+            </a:r>
+            <a:endParaRPr b="1" dirty="0">
+              <a:solidFill>
+                <a:srgbClr val="FF0000"/>
+              </a:solidFill>
+            </a:endParaRPr>
           </a:p>
           <a:p>
             <a:pPr marL="0" lvl="0" indent="0">
@@ -14010,7 +13925,7 @@
           <a:p>
             <a:r>
               <a:rPr lang="en-US" dirty="0"/>
-              <a:t>Examples of over-dispersed count data:</a:t>
+              <a:t>Examples of zero-inflated and over-dispersed count data:</a:t>
             </a:r>
           </a:p>
           <a:p>
@@ -14575,7 +14490,19 @@
                             <a:rPr lang="en-US" b="0" i="1" smtClean="0">
                               <a:latin typeface="Cambria Math" panose="02040503050406030204" pitchFamily="18" charset="0"/>
                             </a:rPr>
-                            <m:t>=0 | </m:t>
+                            <m:t>=</m:t>
+                          </m:r>
+                          <m:r>
+                            <a:rPr lang="en-US" b="0" i="1" smtClean="0">
+                              <a:latin typeface="Cambria Math" panose="02040503050406030204" pitchFamily="18" charset="0"/>
+                            </a:rPr>
+                            <m:t>0</m:t>
+                          </m:r>
+                          <m:r>
+                            <a:rPr lang="en-US" b="0" i="1" smtClean="0">
+                              <a:latin typeface="Cambria Math" panose="02040503050406030204" pitchFamily="18" charset="0"/>
+                            </a:rPr>
+                            <m:t> | </m:t>
                           </m:r>
                           <m:r>
                             <a:rPr lang="en-US" b="0" i="1" smtClean="0">
@@ -14632,7 +14559,14 @@
                               <a:latin typeface="Cambria Math" panose="02040503050406030204" pitchFamily="18" charset="0"/>
                               <a:ea typeface="Cambria Math" panose="02040503050406030204" pitchFamily="18" charset="0"/>
                             </a:rPr>
-                            <m:t>1−</m:t>
+                            <m:t>1</m:t>
+                          </m:r>
+                          <m:r>
+                            <a:rPr lang="en-US" b="0" i="1" smtClean="0">
+                              <a:latin typeface="Cambria Math" panose="02040503050406030204" pitchFamily="18" charset="0"/>
+                              <a:ea typeface="Cambria Math" panose="02040503050406030204" pitchFamily="18" charset="0"/>
+                            </a:rPr>
+                            <m:t>−</m:t>
                           </m:r>
                           <m:r>
                             <a:rPr lang="en-US" b="0" i="1" smtClean="0">
@@ -14768,7 +14702,14 @@
                               <a:latin typeface="Cambria Math" panose="02040503050406030204" pitchFamily="18" charset="0"/>
                               <a:ea typeface="Cambria Math" panose="02040503050406030204" pitchFamily="18" charset="0"/>
                             </a:rPr>
-                            <m:t>1−</m:t>
+                            <m:t>1</m:t>
+                          </m:r>
+                          <m:r>
+                            <a:rPr lang="en-US" i="1">
+                              <a:latin typeface="Cambria Math" panose="02040503050406030204" pitchFamily="18" charset="0"/>
+                              <a:ea typeface="Cambria Math" panose="02040503050406030204" pitchFamily="18" charset="0"/>
+                            </a:rPr>
+                            <m:t>−</m:t>
                           </m:r>
                           <m:r>
                             <a:rPr lang="en-US" i="1">
@@ -14831,7 +14772,13 @@
                                   <a:rPr lang="en-US" i="1">
                                     <a:latin typeface="Cambria Math" panose="02040503050406030204" pitchFamily="18" charset="0"/>
                                   </a:rPr>
-                                  <m:t>−1</m:t>
+                                  <m:t>−</m:t>
+                                </m:r>
+                                <m:r>
+                                  <a:rPr lang="en-US" i="1">
+                                    <a:latin typeface="Cambria Math" panose="02040503050406030204" pitchFamily="18" charset="0"/>
+                                  </a:rPr>
+                                  <m:t>1</m:t>
                                 </m:r>
                               </m:e>
                             </m:mr>
@@ -14847,7 +14794,13 @@
                                   <a:rPr lang="en-US" i="1">
                                     <a:latin typeface="Cambria Math" panose="02040503050406030204" pitchFamily="18" charset="0"/>
                                   </a:rPr>
-                                  <m:t>−1</m:t>
+                                  <m:t>−</m:t>
+                                </m:r>
+                                <m:r>
+                                  <a:rPr lang="en-US" i="1">
+                                    <a:latin typeface="Cambria Math" panose="02040503050406030204" pitchFamily="18" charset="0"/>
+                                  </a:rPr>
+                                  <m:t>1</m:t>
                                 </m:r>
                               </m:e>
                             </m:mr>
@@ -14901,7 +14854,13 @@
                                 <a:rPr lang="en-US" i="1">
                                   <a:latin typeface="Cambria Math" panose="02040503050406030204" pitchFamily="18" charset="0"/>
                                 </a:rPr>
-                                <m:t>1−</m:t>
+                                <m:t>1</m:t>
+                              </m:r>
+                              <m:r>
+                                <a:rPr lang="en-US" i="1">
+                                  <a:latin typeface="Cambria Math" panose="02040503050406030204" pitchFamily="18" charset="0"/>
+                                </a:rPr>
+                                <m:t>−</m:t>
                               </m:r>
                               <m:r>
                                 <a:rPr lang="en-US" i="1">
@@ -16294,6 +16253,447 @@
         <p:cNvPr id="1" name="">
           <a:extLst>
             <a:ext uri="{FF2B5EF4-FFF2-40B4-BE49-F238E27FC236}">
+              <a16:creationId xmlns:a16="http://schemas.microsoft.com/office/drawing/2014/main" id="{0B7AE21E-FA0D-ED24-47F8-1E46927A3410}"/>
+            </a:ext>
+          </a:extLst>
+        </p:cNvPr>
+        <p:cNvGrpSpPr/>
+        <p:nvPr/>
+      </p:nvGrpSpPr>
+      <p:grpSpPr>
+        <a:xfrm>
+          <a:off x="0" y="0"/>
+          <a:ext cx="0" cy="0"/>
+          <a:chOff x="0" y="0"/>
+          <a:chExt cx="0" cy="0"/>
+        </a:xfrm>
+      </p:grpSpPr>
+      <p:sp>
+        <p:nvSpPr>
+          <p:cNvPr id="2" name="Title 1">
+            <a:extLst>
+              <a:ext uri="{FF2B5EF4-FFF2-40B4-BE49-F238E27FC236}">
+                <a16:creationId xmlns:a16="http://schemas.microsoft.com/office/drawing/2014/main" id="{5E7892C8-0A70-0F50-73AA-664033EB1959}"/>
+              </a:ext>
+            </a:extLst>
+          </p:cNvPr>
+          <p:cNvSpPr>
+            <a:spLocks noGrp="1"/>
+          </p:cNvSpPr>
+          <p:nvPr>
+            <p:ph type="title"/>
+          </p:nvPr>
+        </p:nvSpPr>
+        <p:spPr>
+          <a:xfrm>
+            <a:off x="457201" y="204787"/>
+            <a:ext cx="8441574" cy="451918"/>
+          </a:xfrm>
+        </p:spPr>
+        <p:txBody>
+          <a:bodyPr>
+            <a:noAutofit/>
+          </a:bodyPr>
+          <a:lstStyle/>
+          <a:p>
+            <a:pPr marL="0" lvl="0" indent="0" algn="ctr">
+              <a:buNone/>
+            </a:pPr>
+            <a:r>
+              <a:rPr lang="en-US" sz="3200" b="0" dirty="0"/>
+              <a:t>Example: Zero-Inflated Poisson Regression</a:t>
+            </a:r>
+            <a:endParaRPr sz="3200" b="0" dirty="0"/>
+          </a:p>
+        </p:txBody>
+      </p:sp>
+      <p:sp>
+        <p:nvSpPr>
+          <p:cNvPr id="4" name="Text Placeholder 3">
+            <a:extLst>
+              <a:ext uri="{FF2B5EF4-FFF2-40B4-BE49-F238E27FC236}">
+                <a16:creationId xmlns:a16="http://schemas.microsoft.com/office/drawing/2014/main" id="{D6E7B798-D7EA-4958-6E54-8FA77CBF9F8C}"/>
+              </a:ext>
+            </a:extLst>
+          </p:cNvPr>
+          <p:cNvSpPr>
+            <a:spLocks noGrp="1"/>
+          </p:cNvSpPr>
+          <p:nvPr>
+            <p:ph type="body" sz="half" idx="2"/>
+          </p:nvPr>
+        </p:nvSpPr>
+        <p:spPr>
+          <a:xfrm>
+            <a:off x="457201" y="1995055"/>
+            <a:ext cx="3871650" cy="2685011"/>
+          </a:xfrm>
+        </p:spPr>
+        <p:txBody>
+          <a:bodyPr>
+            <a:normAutofit lnSpcReduction="10000"/>
+          </a:bodyPr>
+          <a:lstStyle/>
+          <a:p>
+            <a:pPr marL="0" lvl="0" indent="0">
+              <a:buNone/>
+            </a:pPr>
+            <a:r>
+              <a:rPr sz="2000" dirty="0"/>
+              <a:t>Example: </a:t>
+            </a:r>
+            <a:r>
+              <a:rPr lang="en-US" sz="2000" dirty="0"/>
+              <a:t>model for fish caught by parties visiting a park</a:t>
+            </a:r>
+          </a:p>
+          <a:p>
+            <a:pPr marL="342900" lvl="0" indent="-342900">
+              <a:buFont typeface="Arial" panose="020B0604020202020204" pitchFamily="34" charset="0"/>
+              <a:buChar char="•"/>
+            </a:pPr>
+            <a:r>
+              <a:rPr lang="en-US" sz="2000" dirty="0"/>
+              <a:t>The distribution is zero inflated, many parties do not catch any fish</a:t>
+            </a:r>
+          </a:p>
+          <a:p>
+            <a:pPr marL="342900" lvl="0" indent="-342900">
+              <a:buFont typeface="Arial" panose="020B0604020202020204" pitchFamily="34" charset="0"/>
+              <a:buChar char="•"/>
+            </a:pPr>
+            <a:r>
+              <a:rPr lang="en-US" sz="2000" dirty="0"/>
+              <a:t>There is a strong right skew, some parties catch large numbers of fish – </a:t>
+            </a:r>
+            <a:r>
+              <a:rPr lang="en-US" sz="2000" b="1" dirty="0"/>
+              <a:t>over-dispersion!</a:t>
+            </a:r>
+          </a:p>
+        </p:txBody>
+      </p:sp>
+      <p:pic>
+        <p:nvPicPr>
+          <p:cNvPr id="6" name="Picture 5">
+            <a:extLst>
+              <a:ext uri="{FF2B5EF4-FFF2-40B4-BE49-F238E27FC236}">
+                <a16:creationId xmlns:a16="http://schemas.microsoft.com/office/drawing/2014/main" id="{1B5E8469-02D9-A783-1EFB-74AB523C7426}"/>
+              </a:ext>
+            </a:extLst>
+          </p:cNvPr>
+          <p:cNvPicPr>
+            <a:picLocks noChangeAspect="1"/>
+          </p:cNvPicPr>
+          <p:nvPr/>
+        </p:nvPicPr>
+        <p:blipFill>
+          <a:blip r:embed="rId2"/>
+          <a:stretch>
+            <a:fillRect/>
+          </a:stretch>
+        </p:blipFill>
+        <p:spPr>
+          <a:xfrm>
+            <a:off x="4355869" y="1512916"/>
+            <a:ext cx="4729701" cy="3058181"/>
+          </a:xfrm>
+          <a:prstGeom prst="rect">
+            <a:avLst/>
+          </a:prstGeom>
+        </p:spPr>
+      </p:pic>
+      <p:cxnSp>
+        <p:nvCxnSpPr>
+          <p:cNvPr id="3" name="Straight Arrow Connector 2">
+            <a:extLst>
+              <a:ext uri="{FF2B5EF4-FFF2-40B4-BE49-F238E27FC236}">
+                <a16:creationId xmlns:a16="http://schemas.microsoft.com/office/drawing/2014/main" id="{A95693FF-EB30-0F9D-74A8-44D2DBEC16AD}"/>
+              </a:ext>
+            </a:extLst>
+          </p:cNvPr>
+          <p:cNvCxnSpPr>
+            <a:cxnSpLocks/>
+          </p:cNvCxnSpPr>
+          <p:nvPr/>
+        </p:nvCxnSpPr>
+        <p:spPr>
+          <a:xfrm>
+            <a:off x="4060767" y="3125585"/>
+            <a:ext cx="910244" cy="336666"/>
+          </a:xfrm>
+          <a:prstGeom prst="straightConnector1">
+            <a:avLst/>
+          </a:prstGeom>
+          <a:ln w="38100">
+            <a:solidFill>
+              <a:srgbClr val="C00000"/>
+            </a:solidFill>
+            <a:tailEnd type="triangle"/>
+          </a:ln>
+        </p:spPr>
+        <p:style>
+          <a:lnRef idx="2">
+            <a:schemeClr val="accent1"/>
+          </a:lnRef>
+          <a:fillRef idx="0">
+            <a:schemeClr val="accent1"/>
+          </a:fillRef>
+          <a:effectRef idx="1">
+            <a:schemeClr val="accent1"/>
+          </a:effectRef>
+          <a:fontRef idx="minor">
+            <a:schemeClr val="tx1"/>
+          </a:fontRef>
+        </p:style>
+      </p:cxnSp>
+      <p:cxnSp>
+        <p:nvCxnSpPr>
+          <p:cNvPr id="8" name="Straight Arrow Connector 7">
+            <a:extLst>
+              <a:ext uri="{FF2B5EF4-FFF2-40B4-BE49-F238E27FC236}">
+                <a16:creationId xmlns:a16="http://schemas.microsoft.com/office/drawing/2014/main" id="{C202D0DE-1B74-3843-2A04-E924FE113FDA}"/>
+              </a:ext>
+            </a:extLst>
+          </p:cNvPr>
+          <p:cNvCxnSpPr>
+            <a:cxnSpLocks/>
+          </p:cNvCxnSpPr>
+          <p:nvPr/>
+        </p:nvCxnSpPr>
+        <p:spPr>
+          <a:xfrm>
+            <a:off x="3167149" y="4443153"/>
+            <a:ext cx="3133898" cy="0"/>
+          </a:xfrm>
+          <a:prstGeom prst="straightConnector1">
+            <a:avLst/>
+          </a:prstGeom>
+          <a:ln w="38100">
+            <a:solidFill>
+              <a:srgbClr val="C00000"/>
+            </a:solidFill>
+            <a:tailEnd type="triangle"/>
+          </a:ln>
+        </p:spPr>
+        <p:style>
+          <a:lnRef idx="2">
+            <a:schemeClr val="accent1"/>
+          </a:lnRef>
+          <a:fillRef idx="0">
+            <a:schemeClr val="accent1"/>
+          </a:fillRef>
+          <a:effectRef idx="1">
+            <a:schemeClr val="accent1"/>
+          </a:effectRef>
+          <a:fontRef idx="minor">
+            <a:schemeClr val="tx1"/>
+          </a:fontRef>
+        </p:style>
+      </p:cxnSp>
+    </p:spTree>
+    <p:extLst>
+      <p:ext uri="{BB962C8B-B14F-4D97-AF65-F5344CB8AC3E}">
+        <p14:creationId xmlns:p14="http://schemas.microsoft.com/office/powerpoint/2010/main" val="2527211815"/>
+      </p:ext>
+    </p:extLst>
+  </p:cSld>
+  <p:clrMapOvr>
+    <a:masterClrMapping/>
+  </p:clrMapOvr>
+  <p:timing>
+    <p:tnLst>
+      <p:par>
+        <p:cTn id="1" dur="indefinite" restart="never" nodeType="tmRoot">
+          <p:childTnLst>
+            <p:seq concurrent="1" nextAc="seek">
+              <p:cTn id="2" dur="indefinite" nodeType="mainSeq">
+                <p:childTnLst>
+                  <p:par>
+                    <p:cTn id="3" fill="hold">
+                      <p:stCondLst>
+                        <p:cond delay="indefinite"/>
+                      </p:stCondLst>
+                      <p:childTnLst>
+                        <p:par>
+                          <p:cTn id="4" fill="hold">
+                            <p:stCondLst>
+                              <p:cond delay="0"/>
+                            </p:stCondLst>
+                            <p:childTnLst>
+                              <p:par>
+                                <p:cTn id="5" presetID="1" presetClass="entr" presetSubtype="0" fill="hold" nodeType="clickEffect">
+                                  <p:stCondLst>
+                                    <p:cond delay="0"/>
+                                  </p:stCondLst>
+                                  <p:childTnLst>
+                                    <p:set>
+                                      <p:cBhvr>
+                                        <p:cTn id="6" dur="1" fill="hold">
+                                          <p:stCondLst>
+                                            <p:cond delay="0"/>
+                                          </p:stCondLst>
+                                        </p:cTn>
+                                        <p:tgtEl>
+                                          <p:spTgt spid="4">
+                                            <p:txEl>
+                                              <p:pRg st="1" end="1"/>
+                                            </p:txEl>
+                                          </p:spTgt>
+                                        </p:tgtEl>
+                                        <p:attrNameLst>
+                                          <p:attrName>style.visibility</p:attrName>
+                                        </p:attrNameLst>
+                                      </p:cBhvr>
+                                      <p:to>
+                                        <p:strVal val="visible"/>
+                                      </p:to>
+                                    </p:set>
+                                  </p:childTnLst>
+                                </p:cTn>
+                              </p:par>
+                              <p:par>
+                                <p:cTn id="7" presetID="1" presetClass="entr" presetSubtype="0" fill="hold" nodeType="withEffect">
+                                  <p:stCondLst>
+                                    <p:cond delay="0"/>
+                                  </p:stCondLst>
+                                  <p:childTnLst>
+                                    <p:set>
+                                      <p:cBhvr>
+                                        <p:cTn id="8" dur="1" fill="hold">
+                                          <p:stCondLst>
+                                            <p:cond delay="0"/>
+                                          </p:stCondLst>
+                                        </p:cTn>
+                                        <p:tgtEl>
+                                          <p:spTgt spid="3"/>
+                                        </p:tgtEl>
+                                        <p:attrNameLst>
+                                          <p:attrName>style.visibility</p:attrName>
+                                        </p:attrNameLst>
+                                      </p:cBhvr>
+                                      <p:to>
+                                        <p:strVal val="visible"/>
+                                      </p:to>
+                                    </p:set>
+                                  </p:childTnLst>
+                                </p:cTn>
+                              </p:par>
+                            </p:childTnLst>
+                          </p:cTn>
+                        </p:par>
+                      </p:childTnLst>
+                    </p:cTn>
+                  </p:par>
+                  <p:par>
+                    <p:cTn id="9" fill="hold">
+                      <p:stCondLst>
+                        <p:cond delay="indefinite"/>
+                      </p:stCondLst>
+                      <p:childTnLst>
+                        <p:par>
+                          <p:cTn id="10" fill="hold">
+                            <p:stCondLst>
+                              <p:cond delay="0"/>
+                            </p:stCondLst>
+                            <p:childTnLst>
+                              <p:par>
+                                <p:cTn id="11" presetID="1" presetClass="entr" presetSubtype="0" fill="hold" nodeType="clickEffect">
+                                  <p:stCondLst>
+                                    <p:cond delay="0"/>
+                                  </p:stCondLst>
+                                  <p:childTnLst>
+                                    <p:set>
+                                      <p:cBhvr>
+                                        <p:cTn id="12" dur="1" fill="hold">
+                                          <p:stCondLst>
+                                            <p:cond delay="0"/>
+                                          </p:stCondLst>
+                                        </p:cTn>
+                                        <p:tgtEl>
+                                          <p:spTgt spid="4">
+                                            <p:txEl>
+                                              <p:pRg st="2" end="2"/>
+                                            </p:txEl>
+                                          </p:spTgt>
+                                        </p:tgtEl>
+                                        <p:attrNameLst>
+                                          <p:attrName>style.visibility</p:attrName>
+                                        </p:attrNameLst>
+                                      </p:cBhvr>
+                                      <p:to>
+                                        <p:strVal val="visible"/>
+                                      </p:to>
+                                    </p:set>
+                                  </p:childTnLst>
+                                </p:cTn>
+                              </p:par>
+                              <p:par>
+                                <p:cTn id="13" presetID="1" presetClass="entr" presetSubtype="0" fill="hold" nodeType="withEffect">
+                                  <p:stCondLst>
+                                    <p:cond delay="0"/>
+                                  </p:stCondLst>
+                                  <p:childTnLst>
+                                    <p:set>
+                                      <p:cBhvr>
+                                        <p:cTn id="14" dur="1" fill="hold">
+                                          <p:stCondLst>
+                                            <p:cond delay="0"/>
+                                          </p:stCondLst>
+                                        </p:cTn>
+                                        <p:tgtEl>
+                                          <p:spTgt spid="8"/>
+                                        </p:tgtEl>
+                                        <p:attrNameLst>
+                                          <p:attrName>style.visibility</p:attrName>
+                                        </p:attrNameLst>
+                                      </p:cBhvr>
+                                      <p:to>
+                                        <p:strVal val="visible"/>
+                                      </p:to>
+                                    </p:set>
+                                  </p:childTnLst>
+                                </p:cTn>
+                              </p:par>
+                            </p:childTnLst>
+                          </p:cTn>
+                        </p:par>
+                      </p:childTnLst>
+                    </p:cTn>
+                  </p:par>
+                </p:childTnLst>
+              </p:cTn>
+              <p:prevCondLst>
+                <p:cond evt="onPrev" delay="0">
+                  <p:tgtEl>
+                    <p:sldTgt/>
+                  </p:tgtEl>
+                </p:cond>
+              </p:prevCondLst>
+              <p:nextCondLst>
+                <p:cond evt="onNext" delay="0">
+                  <p:tgtEl>
+                    <p:sldTgt/>
+                  </p:tgtEl>
+                </p:cond>
+              </p:nextCondLst>
+            </p:seq>
+          </p:childTnLst>
+        </p:cTn>
+      </p:par>
+    </p:tnLst>
+  </p:timing>
+</p:sld>
+</file>
+
+<file path=ppt/slides/slide31.xml><?xml version="1.0" encoding="utf-8"?>
+<p:sld xmlns:a="http://schemas.openxmlformats.org/drawingml/2006/main" xmlns:r="http://schemas.openxmlformats.org/officeDocument/2006/relationships" xmlns:p="http://schemas.openxmlformats.org/presentationml/2006/main">
+  <p:cSld>
+    <p:spTree>
+      <p:nvGrpSpPr>
+        <p:cNvPr id="1" name="">
+          <a:extLst>
+            <a:ext uri="{FF2B5EF4-FFF2-40B4-BE49-F238E27FC236}">
               <a16:creationId xmlns:a16="http://schemas.microsoft.com/office/drawing/2014/main" id="{65708D65-F0CE-46C8-50FA-290102D5DF7C}"/>
             </a:ext>
           </a:extLst>
@@ -17083,7 +17483,7 @@
 </p:sld>
 </file>
 
-<file path=ppt/slides/slide31.xml><?xml version="1.0" encoding="utf-8"?>
+<file path=ppt/slides/slide32.xml><?xml version="1.0" encoding="utf-8"?>
 <p:sld xmlns:a="http://schemas.openxmlformats.org/drawingml/2006/main" xmlns:r="http://schemas.openxmlformats.org/officeDocument/2006/relationships" xmlns:p="http://schemas.openxmlformats.org/presentationml/2006/main">
   <p:cSld>
     <p:spTree>
@@ -17464,7 +17864,7 @@
 </p:sld>
 </file>
 
-<file path=ppt/slides/slide32.xml><?xml version="1.0" encoding="utf-8"?>
+<file path=ppt/slides/slide33.xml><?xml version="1.0" encoding="utf-8"?>
 <p:sld xmlns:a="http://schemas.openxmlformats.org/drawingml/2006/main" xmlns:r="http://schemas.openxmlformats.org/officeDocument/2006/relationships" xmlns:p="http://schemas.openxmlformats.org/presentationml/2006/main">
   <p:cSld>
     <p:spTree>
@@ -18034,7 +18434,7 @@
 </p:sld>
 </file>
 
-<file path=ppt/slides/slide33.xml><?xml version="1.0" encoding="utf-8"?>
+<file path=ppt/slides/slide34.xml><?xml version="1.0" encoding="utf-8"?>
 <p:sld xmlns:a="http://schemas.openxmlformats.org/drawingml/2006/main" xmlns:r="http://schemas.openxmlformats.org/officeDocument/2006/relationships" xmlns:p="http://schemas.openxmlformats.org/presentationml/2006/main">
   <p:cSld>
     <p:spTree>
@@ -18902,7 +19302,7 @@
 </p:sld>
 </file>
 
-<file path=ppt/slides/slide34.xml><?xml version="1.0" encoding="utf-8"?>
+<file path=ppt/slides/slide35.xml><?xml version="1.0" encoding="utf-8"?>
 <p:sld xmlns:a="http://schemas.openxmlformats.org/drawingml/2006/main" xmlns:r="http://schemas.openxmlformats.org/officeDocument/2006/relationships" xmlns:p="http://schemas.openxmlformats.org/presentationml/2006/main">
   <p:cSld>
     <p:spTree>
@@ -19567,7 +19967,7 @@
 </p:sld>
 </file>
 
-<file path=ppt/slides/slide35.xml><?xml version="1.0" encoding="utf-8"?>
+<file path=ppt/slides/slide36.xml><?xml version="1.0" encoding="utf-8"?>
 <p:sld xmlns:a="http://schemas.openxmlformats.org/drawingml/2006/main" xmlns:r="http://schemas.openxmlformats.org/officeDocument/2006/relationships" xmlns:p="http://schemas.openxmlformats.org/presentationml/2006/main">
   <p:cSld>
     <p:spTree>
@@ -19637,7 +20037,7 @@
 </p:sld>
 </file>
 
-<file path=ppt/slides/slide36.xml><?xml version="1.0" encoding="utf-8"?>
+<file path=ppt/slides/slide37.xml><?xml version="1.0" encoding="utf-8"?>
 <p:sld xmlns:a="http://schemas.openxmlformats.org/drawingml/2006/main" xmlns:r="http://schemas.openxmlformats.org/officeDocument/2006/relationships" xmlns:p="http://schemas.openxmlformats.org/presentationml/2006/main">
   <p:cSld>
     <p:spTree>
@@ -20208,7 +20608,7 @@
 </p:sld>
 </file>
 
-<file path=ppt/slides/slide37.xml><?xml version="1.0" encoding="utf-8"?>
+<file path=ppt/slides/slide38.xml><?xml version="1.0" encoding="utf-8"?>
 <p:sld xmlns:a="http://schemas.openxmlformats.org/drawingml/2006/main" xmlns:r="http://schemas.openxmlformats.org/officeDocument/2006/relationships" xmlns:p="http://schemas.openxmlformats.org/presentationml/2006/main">
   <p:cSld>
     <p:spTree>
@@ -20764,7 +21164,7 @@
 </p:sld>
 </file>
 
-<file path=ppt/slides/slide38.xml><?xml version="1.0" encoding="utf-8"?>
+<file path=ppt/slides/slide39.xml><?xml version="1.0" encoding="utf-8"?>
 <p:sld xmlns:a="http://schemas.openxmlformats.org/drawingml/2006/main" xmlns:r="http://schemas.openxmlformats.org/officeDocument/2006/relationships" xmlns:p="http://schemas.openxmlformats.org/presentationml/2006/main">
   <p:cSld>
     <p:spTree>
@@ -21295,7 +21695,201 @@
 </p:sld>
 </file>
 
-<file path=ppt/slides/slide39.xml><?xml version="1.0" encoding="utf-8"?>
+<file path=ppt/slides/slide4.xml><?xml version="1.0" encoding="utf-8"?>
+<p:sld xmlns:a="http://schemas.openxmlformats.org/drawingml/2006/main" xmlns:r="http://schemas.openxmlformats.org/officeDocument/2006/relationships" xmlns:p="http://schemas.openxmlformats.org/presentationml/2006/main">
+  <p:cSld>
+    <p:spTree>
+      <p:nvGrpSpPr>
+        <p:cNvPr id="1" name="">
+          <a:extLst>
+            <a:ext uri="{FF2B5EF4-FFF2-40B4-BE49-F238E27FC236}">
+              <a16:creationId xmlns:a16="http://schemas.microsoft.com/office/drawing/2014/main" id="{217CC54D-A93E-7DF0-F2EC-6036421943BA}"/>
+            </a:ext>
+          </a:extLst>
+        </p:cNvPr>
+        <p:cNvGrpSpPr/>
+        <p:nvPr/>
+      </p:nvGrpSpPr>
+      <p:grpSpPr>
+        <a:xfrm>
+          <a:off x="0" y="0"/>
+          <a:ext cx="0" cy="0"/>
+          <a:chOff x="0" y="0"/>
+          <a:chExt cx="0" cy="0"/>
+        </a:xfrm>
+      </p:grpSpPr>
+      <p:sp>
+        <p:nvSpPr>
+          <p:cNvPr id="2" name="Title 1">
+            <a:extLst>
+              <a:ext uri="{FF2B5EF4-FFF2-40B4-BE49-F238E27FC236}">
+                <a16:creationId xmlns:a16="http://schemas.microsoft.com/office/drawing/2014/main" id="{3B05EEC6-D606-BDA0-212E-8D3ADDACF228}"/>
+              </a:ext>
+            </a:extLst>
+          </p:cNvPr>
+          <p:cNvSpPr>
+            <a:spLocks noGrp="1"/>
+          </p:cNvSpPr>
+          <p:nvPr>
+            <p:ph type="title"/>
+          </p:nvPr>
+        </p:nvSpPr>
+        <p:spPr/>
+        <p:txBody>
+          <a:bodyPr/>
+          <a:lstStyle/>
+          <a:p>
+            <a:pPr marL="0" lvl="0" indent="0">
+              <a:buNone/>
+            </a:pPr>
+            <a:r>
+              <a:rPr lang="en-US" dirty="0"/>
+              <a:t>Introduction</a:t>
+            </a:r>
+            <a:endParaRPr dirty="0"/>
+          </a:p>
+        </p:txBody>
+      </p:sp>
+      <p:sp>
+        <p:nvSpPr>
+          <p:cNvPr id="3" name="Content Placeholder 2">
+            <a:extLst>
+              <a:ext uri="{FF2B5EF4-FFF2-40B4-BE49-F238E27FC236}">
+                <a16:creationId xmlns:a16="http://schemas.microsoft.com/office/drawing/2014/main" id="{07854A8C-8365-5A51-A4BD-48F8386E8528}"/>
+              </a:ext>
+            </a:extLst>
+          </p:cNvPr>
+          <p:cNvSpPr>
+            <a:spLocks noGrp="1"/>
+          </p:cNvSpPr>
+          <p:nvPr>
+            <p:ph idx="1"/>
+          </p:nvPr>
+        </p:nvSpPr>
+        <p:spPr/>
+        <p:txBody>
+          <a:bodyPr>
+            <a:normAutofit fontScale="77500" lnSpcReduction="20000"/>
+          </a:bodyPr>
+          <a:lstStyle/>
+          <a:p>
+            <a:pPr marL="0" lvl="0" indent="0">
+              <a:buNone/>
+            </a:pPr>
+            <a:r>
+              <a:rPr lang="en-US" dirty="0"/>
+              <a:t>Several commonly encountered data problems affect OLS and GLM models</a:t>
+            </a:r>
+            <a:endParaRPr dirty="0"/>
+          </a:p>
+          <a:p>
+            <a:pPr lvl="0"/>
+            <a:r>
+              <a:rPr lang="en-US" b="1" dirty="0"/>
+              <a:t>Zero inflated response variables </a:t>
+            </a:r>
+            <a:r>
+              <a:rPr lang="en-US" dirty="0"/>
+              <a:t>have an unusual number of zero values   </a:t>
+            </a:r>
+          </a:p>
+          <a:p>
+            <a:pPr lvl="1"/>
+            <a:r>
+              <a:rPr lang="en-US" dirty="0"/>
+              <a:t>Use a </a:t>
+            </a:r>
+            <a:r>
+              <a:rPr lang="en-US" b="1" dirty="0"/>
+              <a:t>mixture model </a:t>
+            </a:r>
+            <a:r>
+              <a:rPr lang="en-US" dirty="0"/>
+              <a:t>to switch between a binomial and another distribution</a:t>
+            </a:r>
+          </a:p>
+          <a:p>
+            <a:pPr lvl="0"/>
+            <a:r>
+              <a:rPr lang="en-US" b="1" dirty="0"/>
+              <a:t>Over-dispersed response variables </a:t>
+            </a:r>
+            <a:r>
+              <a:rPr lang="en-US" dirty="0"/>
+              <a:t>have a long tails </a:t>
+            </a:r>
+          </a:p>
+          <a:p>
+            <a:pPr lvl="1"/>
+            <a:r>
+              <a:rPr lang="en-US" dirty="0"/>
+              <a:t>Can be asymmetric with long tails</a:t>
+            </a:r>
+          </a:p>
+          <a:p>
+            <a:pPr lvl="1"/>
+            <a:r>
+              <a:rPr lang="en-US" dirty="0"/>
+              <a:t>Use heavy tailed distribution models</a:t>
+            </a:r>
+          </a:p>
+          <a:p>
+            <a:pPr lvl="1"/>
+            <a:r>
+              <a:rPr lang="en-US" dirty="0"/>
+              <a:t>Apply models with mixtures of distributions to account for large low probability responses </a:t>
+            </a:r>
+          </a:p>
+          <a:p>
+            <a:pPr lvl="0"/>
+            <a:r>
+              <a:rPr lang="en-US" b="1" dirty="0"/>
+              <a:t>Outliers in independent variables </a:t>
+            </a:r>
+            <a:r>
+              <a:rPr lang="en-US" dirty="0"/>
+              <a:t>have an undue influence on OLS and GLM models </a:t>
+            </a:r>
+          </a:p>
+          <a:p>
+            <a:pPr lvl="1"/>
+            <a:r>
+              <a:rPr lang="en-US" dirty="0"/>
+              <a:t>Robust regression models </a:t>
+            </a:r>
+            <a:r>
+              <a:rPr lang="en-US" b="1" dirty="0"/>
+              <a:t>limit the influence of outliers </a:t>
+            </a:r>
+            <a:r>
+              <a:rPr lang="en-US" dirty="0"/>
+              <a:t>on parameter estimates</a:t>
+            </a:r>
+          </a:p>
+          <a:p>
+            <a:pPr lvl="0"/>
+            <a:r>
+              <a:rPr lang="en-US" dirty="0"/>
+              <a:t>We can extend the OLS and GLM frameworks to deal with these situations  </a:t>
+            </a:r>
+            <a:endParaRPr dirty="0"/>
+          </a:p>
+        </p:txBody>
+      </p:sp>
+    </p:spTree>
+    <p:extLst>
+      <p:ext uri="{BB962C8B-B14F-4D97-AF65-F5344CB8AC3E}">
+        <p14:creationId xmlns:p14="http://schemas.microsoft.com/office/powerpoint/2010/main" val="487459844"/>
+      </p:ext>
+    </p:extLst>
+  </p:cSld>
+  <p:clrMapOvr>
+    <a:masterClrMapping/>
+  </p:clrMapOvr>
+</p:sld>
+</file>
+
+<file path=ppt/slides/slide40.xml><?xml version="1.0" encoding="utf-8"?>
 <p:sld xmlns:a="http://schemas.openxmlformats.org/drawingml/2006/main" xmlns:r="http://schemas.openxmlformats.org/officeDocument/2006/relationships" xmlns:p="http://schemas.openxmlformats.org/presentationml/2006/main">
   <p:cSld>
     <p:spTree>
@@ -22012,201 +22606,7 @@
 </p:sld>
 </file>
 
-<file path=ppt/slides/slide4.xml><?xml version="1.0" encoding="utf-8"?>
-<p:sld xmlns:a="http://schemas.openxmlformats.org/drawingml/2006/main" xmlns:r="http://schemas.openxmlformats.org/officeDocument/2006/relationships" xmlns:p="http://schemas.openxmlformats.org/presentationml/2006/main">
-  <p:cSld>
-    <p:spTree>
-      <p:nvGrpSpPr>
-        <p:cNvPr id="1" name="">
-          <a:extLst>
-            <a:ext uri="{FF2B5EF4-FFF2-40B4-BE49-F238E27FC236}">
-              <a16:creationId xmlns:a16="http://schemas.microsoft.com/office/drawing/2014/main" id="{217CC54D-A93E-7DF0-F2EC-6036421943BA}"/>
-            </a:ext>
-          </a:extLst>
-        </p:cNvPr>
-        <p:cNvGrpSpPr/>
-        <p:nvPr/>
-      </p:nvGrpSpPr>
-      <p:grpSpPr>
-        <a:xfrm>
-          <a:off x="0" y="0"/>
-          <a:ext cx="0" cy="0"/>
-          <a:chOff x="0" y="0"/>
-          <a:chExt cx="0" cy="0"/>
-        </a:xfrm>
-      </p:grpSpPr>
-      <p:sp>
-        <p:nvSpPr>
-          <p:cNvPr id="2" name="Title 1">
-            <a:extLst>
-              <a:ext uri="{FF2B5EF4-FFF2-40B4-BE49-F238E27FC236}">
-                <a16:creationId xmlns:a16="http://schemas.microsoft.com/office/drawing/2014/main" id="{3B05EEC6-D606-BDA0-212E-8D3ADDACF228}"/>
-              </a:ext>
-            </a:extLst>
-          </p:cNvPr>
-          <p:cNvSpPr>
-            <a:spLocks noGrp="1"/>
-          </p:cNvSpPr>
-          <p:nvPr>
-            <p:ph type="title"/>
-          </p:nvPr>
-        </p:nvSpPr>
-        <p:spPr/>
-        <p:txBody>
-          <a:bodyPr/>
-          <a:lstStyle/>
-          <a:p>
-            <a:pPr marL="0" lvl="0" indent="0">
-              <a:buNone/>
-            </a:pPr>
-            <a:r>
-              <a:rPr lang="en-US" dirty="0"/>
-              <a:t>Introduction</a:t>
-            </a:r>
-            <a:endParaRPr dirty="0"/>
-          </a:p>
-        </p:txBody>
-      </p:sp>
-      <p:sp>
-        <p:nvSpPr>
-          <p:cNvPr id="3" name="Content Placeholder 2">
-            <a:extLst>
-              <a:ext uri="{FF2B5EF4-FFF2-40B4-BE49-F238E27FC236}">
-                <a16:creationId xmlns:a16="http://schemas.microsoft.com/office/drawing/2014/main" id="{07854A8C-8365-5A51-A4BD-48F8386E8528}"/>
-              </a:ext>
-            </a:extLst>
-          </p:cNvPr>
-          <p:cNvSpPr>
-            <a:spLocks noGrp="1"/>
-          </p:cNvSpPr>
-          <p:nvPr>
-            <p:ph idx="1"/>
-          </p:nvPr>
-        </p:nvSpPr>
-        <p:spPr/>
-        <p:txBody>
-          <a:bodyPr>
-            <a:normAutofit fontScale="77500" lnSpcReduction="20000"/>
-          </a:bodyPr>
-          <a:lstStyle/>
-          <a:p>
-            <a:pPr marL="0" lvl="0" indent="0">
-              <a:buNone/>
-            </a:pPr>
-            <a:r>
-              <a:rPr lang="en-US" dirty="0"/>
-              <a:t>Several commonly encountered data problems affect OLS and GLM models</a:t>
-            </a:r>
-            <a:endParaRPr dirty="0"/>
-          </a:p>
-          <a:p>
-            <a:pPr lvl="0"/>
-            <a:r>
-              <a:rPr lang="en-US" b="1" dirty="0"/>
-              <a:t>Zero inflated response variables </a:t>
-            </a:r>
-            <a:r>
-              <a:rPr lang="en-US" dirty="0"/>
-              <a:t>have an unusual number of zero values   </a:t>
-            </a:r>
-          </a:p>
-          <a:p>
-            <a:pPr lvl="1"/>
-            <a:r>
-              <a:rPr lang="en-US" dirty="0"/>
-              <a:t>Use a </a:t>
-            </a:r>
-            <a:r>
-              <a:rPr lang="en-US" b="1" dirty="0"/>
-              <a:t>mixture model </a:t>
-            </a:r>
-            <a:r>
-              <a:rPr lang="en-US" dirty="0"/>
-              <a:t>to switch between a binomial and another distribution</a:t>
-            </a:r>
-          </a:p>
-          <a:p>
-            <a:pPr lvl="0"/>
-            <a:r>
-              <a:rPr lang="en-US" b="1" dirty="0"/>
-              <a:t>Over-dispersed response variables </a:t>
-            </a:r>
-            <a:r>
-              <a:rPr lang="en-US" dirty="0"/>
-              <a:t>have a long tails </a:t>
-            </a:r>
-          </a:p>
-          <a:p>
-            <a:pPr lvl="1"/>
-            <a:r>
-              <a:rPr lang="en-US" dirty="0"/>
-              <a:t>Can be asymmetric with long tails</a:t>
-            </a:r>
-          </a:p>
-          <a:p>
-            <a:pPr lvl="1"/>
-            <a:r>
-              <a:rPr lang="en-US" dirty="0"/>
-              <a:t>Use heavy tailed distribution models</a:t>
-            </a:r>
-          </a:p>
-          <a:p>
-            <a:pPr lvl="1"/>
-            <a:r>
-              <a:rPr lang="en-US" dirty="0"/>
-              <a:t>Apply models with mixtures of distributions to account for large low probability responses </a:t>
-            </a:r>
-          </a:p>
-          <a:p>
-            <a:pPr lvl="0"/>
-            <a:r>
-              <a:rPr lang="en-US" b="1" dirty="0"/>
-              <a:t>Outliers in independent variables </a:t>
-            </a:r>
-            <a:r>
-              <a:rPr lang="en-US" dirty="0"/>
-              <a:t>have an undue influence on OLS and GLM models </a:t>
-            </a:r>
-          </a:p>
-          <a:p>
-            <a:pPr lvl="1"/>
-            <a:r>
-              <a:rPr lang="en-US" dirty="0"/>
-              <a:t>Robust regression models </a:t>
-            </a:r>
-            <a:r>
-              <a:rPr lang="en-US" b="1" dirty="0"/>
-              <a:t>limit the influence of outliers </a:t>
-            </a:r>
-            <a:r>
-              <a:rPr lang="en-US" dirty="0"/>
-              <a:t>on parameter estimates</a:t>
-            </a:r>
-          </a:p>
-          <a:p>
-            <a:pPr lvl="0"/>
-            <a:r>
-              <a:rPr lang="en-US" dirty="0"/>
-              <a:t>We can extend the OLS and GLM frameworks to deal with these situations  </a:t>
-            </a:r>
-            <a:endParaRPr dirty="0"/>
-          </a:p>
-        </p:txBody>
-      </p:sp>
-    </p:spTree>
-    <p:extLst>
-      <p:ext uri="{BB962C8B-B14F-4D97-AF65-F5344CB8AC3E}">
-        <p14:creationId xmlns:p14="http://schemas.microsoft.com/office/powerpoint/2010/main" val="487459844"/>
-      </p:ext>
-    </p:extLst>
-  </p:cSld>
-  <p:clrMapOvr>
-    <a:masterClrMapping/>
-  </p:clrMapOvr>
-</p:sld>
-</file>
-
-<file path=ppt/slides/slide40.xml><?xml version="1.0" encoding="utf-8"?>
+<file path=ppt/slides/slide41.xml><?xml version="1.0" encoding="utf-8"?>
 <p:sld xmlns:a="http://schemas.openxmlformats.org/drawingml/2006/main" xmlns:r="http://schemas.openxmlformats.org/officeDocument/2006/relationships" xmlns:p="http://schemas.openxmlformats.org/presentationml/2006/main">
   <p:cSld>
     <p:spTree>
@@ -22527,7 +22927,7 @@
 </p:sld>
 </file>
 
-<file path=ppt/slides/slide41.xml><?xml version="1.0" encoding="utf-8"?>
+<file path=ppt/slides/slide42.xml><?xml version="1.0" encoding="utf-8"?>
 <p:sld xmlns:a="http://schemas.openxmlformats.org/drawingml/2006/main" xmlns:r="http://schemas.openxmlformats.org/officeDocument/2006/relationships" xmlns:p="http://schemas.openxmlformats.org/presentationml/2006/main">
   <p:cSld>
     <p:spTree>
@@ -23431,7 +23831,7 @@
 </p:sld>
 </file>
 
-<file path=ppt/slides/slide42.xml><?xml version="1.0" encoding="utf-8"?>
+<file path=ppt/slides/slide43.xml><?xml version="1.0" encoding="utf-8"?>
 <p:sld xmlns:a="http://schemas.openxmlformats.org/drawingml/2006/main" xmlns:r="http://schemas.openxmlformats.org/officeDocument/2006/relationships" xmlns:p="http://schemas.openxmlformats.org/presentationml/2006/main">
   <p:cSld>
     <p:spTree>
@@ -24100,7 +24500,7 @@
 </p:sld>
 </file>
 
-<file path=ppt/slides/slide43.xml><?xml version="1.0" encoding="utf-8"?>
+<file path=ppt/slides/slide44.xml><?xml version="1.0" encoding="utf-8"?>
 <p:sld xmlns:a="http://schemas.openxmlformats.org/drawingml/2006/main" xmlns:r="http://schemas.openxmlformats.org/officeDocument/2006/relationships" xmlns:p="http://schemas.openxmlformats.org/presentationml/2006/main">
   <p:cSld>
     <p:spTree>
@@ -24472,7 +24872,7 @@
 </p:sld>
 </file>
 
-<file path=ppt/slides/slide44.xml><?xml version="1.0" encoding="utf-8"?>
+<file path=ppt/slides/slide45.xml><?xml version="1.0" encoding="utf-8"?>
 <p:sld xmlns:a="http://schemas.openxmlformats.org/drawingml/2006/main" xmlns:r="http://schemas.openxmlformats.org/officeDocument/2006/relationships" xmlns:p="http://schemas.openxmlformats.org/presentationml/2006/main">
   <p:cSld>
     <p:spTree>
@@ -25023,7 +25423,7 @@
 </p:sld>
 </file>
 
-<file path=ppt/slides/slide45.xml><?xml version="1.0" encoding="utf-8"?>
+<file path=ppt/slides/slide46.xml><?xml version="1.0" encoding="utf-8"?>
 <p:sld xmlns:a="http://schemas.openxmlformats.org/drawingml/2006/main" xmlns:r="http://schemas.openxmlformats.org/officeDocument/2006/relationships" xmlns:p="http://schemas.openxmlformats.org/presentationml/2006/main">
   <p:cSld>
     <p:spTree>
@@ -25250,6 +25650,94 @@
           </a:p>
         </p:txBody>
       </p:sp>
+      <p:cxnSp>
+        <p:nvCxnSpPr>
+          <p:cNvPr id="7" name="Straight Arrow Connector 6">
+            <a:extLst>
+              <a:ext uri="{FF2B5EF4-FFF2-40B4-BE49-F238E27FC236}">
+                <a16:creationId xmlns:a16="http://schemas.microsoft.com/office/drawing/2014/main" id="{E1707F7E-EE20-ADD7-6F37-122ACD61A228}"/>
+              </a:ext>
+            </a:extLst>
+          </p:cNvPr>
+          <p:cNvCxnSpPr>
+            <a:cxnSpLocks/>
+          </p:cNvCxnSpPr>
+          <p:nvPr/>
+        </p:nvCxnSpPr>
+        <p:spPr>
+          <a:xfrm flipV="1">
+            <a:off x="4717473" y="1641764"/>
+            <a:ext cx="3262745" cy="768927"/>
+          </a:xfrm>
+          <a:prstGeom prst="straightConnector1">
+            <a:avLst/>
+          </a:prstGeom>
+          <a:ln w="38100">
+            <a:solidFill>
+              <a:srgbClr val="C00000"/>
+            </a:solidFill>
+            <a:tailEnd type="triangle"/>
+          </a:ln>
+        </p:spPr>
+        <p:style>
+          <a:lnRef idx="2">
+            <a:schemeClr val="accent1"/>
+          </a:lnRef>
+          <a:fillRef idx="0">
+            <a:schemeClr val="accent1"/>
+          </a:fillRef>
+          <a:effectRef idx="1">
+            <a:schemeClr val="accent1"/>
+          </a:effectRef>
+          <a:fontRef idx="minor">
+            <a:schemeClr val="tx1"/>
+          </a:fontRef>
+        </p:style>
+      </p:cxnSp>
+      <p:cxnSp>
+        <p:nvCxnSpPr>
+          <p:cNvPr id="10" name="Straight Arrow Connector 9">
+            <a:extLst>
+              <a:ext uri="{FF2B5EF4-FFF2-40B4-BE49-F238E27FC236}">
+                <a16:creationId xmlns:a16="http://schemas.microsoft.com/office/drawing/2014/main" id="{B10F11AD-2F4C-20C9-53CA-5DB2AF77BAE4}"/>
+              </a:ext>
+            </a:extLst>
+          </p:cNvPr>
+          <p:cNvCxnSpPr>
+            <a:cxnSpLocks/>
+          </p:cNvCxnSpPr>
+          <p:nvPr/>
+        </p:nvCxnSpPr>
+        <p:spPr>
+          <a:xfrm flipV="1">
+            <a:off x="4239491" y="3117273"/>
+            <a:ext cx="1749829" cy="710738"/>
+          </a:xfrm>
+          <a:prstGeom prst="straightConnector1">
+            <a:avLst/>
+          </a:prstGeom>
+          <a:ln w="38100">
+            <a:solidFill>
+              <a:srgbClr val="C00000"/>
+            </a:solidFill>
+            <a:tailEnd type="triangle"/>
+          </a:ln>
+        </p:spPr>
+        <p:style>
+          <a:lnRef idx="2">
+            <a:schemeClr val="accent1"/>
+          </a:lnRef>
+          <a:fillRef idx="0">
+            <a:schemeClr val="accent1"/>
+          </a:fillRef>
+          <a:effectRef idx="1">
+            <a:schemeClr val="accent1"/>
+          </a:effectRef>
+          <a:fontRef idx="minor">
+            <a:schemeClr val="tx1"/>
+          </a:fontRef>
+        </p:style>
+      </p:cxnSp>
     </p:spTree>
   </p:cSld>
   <p:clrMapOvr>
@@ -25423,7 +25911,7 @@
                                 </p:cTn>
                               </p:par>
                               <p:par>
-                                <p:cTn id="15" presetID="1" presetClass="entr" presetSubtype="0" fill="hold" grpId="0" nodeType="withEffect">
+                                <p:cTn id="15" presetID="1" presetClass="entr" presetSubtype="0" fill="hold" nodeType="withEffect">
                                   <p:stCondLst>
                                     <p:cond delay="0"/>
                                   </p:stCondLst>
@@ -25431,6 +25919,33 @@
                                     <p:set>
                                       <p:cBhvr>
                                         <p:cTn id="16" dur="1" fill="hold">
+                                          <p:stCondLst>
+                                            <p:cond delay="0"/>
+                                          </p:stCondLst>
+                                        </p:cTn>
+                                        <p:tgtEl>
+                                          <p:spTgt spid="7"/>
+                                        </p:tgtEl>
+                                        <p:attrNameLst>
+                                          <p:attrName>style.visibility</p:attrName>
+                                        </p:attrNameLst>
+                                      </p:cBhvr>
+                                      <p:to>
+                                        <p:strVal val="visible"/>
+                                      </p:to>
+                                    </p:set>
+                                  </p:childTnLst>
+                                </p:cTn>
+                              </p:par>
+                              <p:par>
+                                <p:cTn id="17" presetID="1" presetClass="entr" presetSubtype="0" fill="hold" grpId="0" nodeType="withEffect">
+                                  <p:stCondLst>
+                                    <p:cond delay="0"/>
+                                  </p:stCondLst>
+                                  <p:childTnLst>
+                                    <p:set>
+                                      <p:cBhvr>
+                                        <p:cTn id="18" dur="1" fill="hold">
                                           <p:stCondLst>
                                             <p:cond delay="0"/>
                                           </p:stCondLst>
@@ -25460,50 +25975,19 @@
                     </p:cTn>
                   </p:par>
                   <p:par>
-                    <p:cTn id="17" fill="hold">
+                    <p:cTn id="19" fill="hold">
                       <p:stCondLst>
                         <p:cond delay="indefinite"/>
                       </p:stCondLst>
                       <p:childTnLst>
                         <p:par>
-                          <p:cTn id="18" fill="hold">
+                          <p:cTn id="20" fill="hold">
                             <p:stCondLst>
                               <p:cond delay="0"/>
                             </p:stCondLst>
                             <p:childTnLst>
                               <p:par>
-                                <p:cTn id="19" presetID="1" presetClass="entr" presetSubtype="0" fill="hold" nodeType="clickEffect">
-                                  <p:stCondLst>
-                                    <p:cond delay="0"/>
-                                  </p:stCondLst>
-                                  <p:childTnLst>
-                                    <p:set>
-                                      <p:cBhvr>
-                                        <p:cTn id="20" dur="1" fill="hold">
-                                          <p:stCondLst>
-                                            <p:cond delay="0"/>
-                                          </p:stCondLst>
-                                        </p:cTn>
-                                        <p:tgtEl>
-                                          <p:spTgt spid="3">
-                                            <p:txEl>
-                                              <p:pRg st="4" end="4"/>
-                                            </p:txEl>
-                                          </p:spTgt>
-                                        </p:tgtEl>
-                                        <p:attrNameLst>
-                                          <p:attrName>style.visibility</p:attrName>
-                                        </p:attrNameLst>
-                                      </p:cBhvr>
-                                      <p:to>
-                                        <p:strVal val="visible"/>
-                                      </p:to>
-                                    </p:set>
-                                  </p:childTnLst>
-                                </p:cTn>
-                              </p:par>
-                              <p:par>
-                                <p:cTn id="21" presetID="1" presetClass="entr" presetSubtype="0" fill="hold" nodeType="withEffect">
+                                <p:cTn id="21" presetID="1" presetClass="entr" presetSubtype="0" fill="hold" nodeType="clickEffect">
                                   <p:stCondLst>
                                     <p:cond delay="0"/>
                                   </p:stCondLst>
@@ -25518,7 +26002,7 @@
                                         <p:tgtEl>
                                           <p:spTgt spid="3">
                                             <p:txEl>
-                                              <p:pRg st="5" end="5"/>
+                                              <p:pRg st="4" end="4"/>
                                             </p:txEl>
                                           </p:spTgt>
                                         </p:tgtEl>
@@ -25549,9 +26033,67 @@
                                         <p:tgtEl>
                                           <p:spTgt spid="3">
                                             <p:txEl>
+                                              <p:pRg st="5" end="5"/>
+                                            </p:txEl>
+                                          </p:spTgt>
+                                        </p:tgtEl>
+                                        <p:attrNameLst>
+                                          <p:attrName>style.visibility</p:attrName>
+                                        </p:attrNameLst>
+                                      </p:cBhvr>
+                                      <p:to>
+                                        <p:strVal val="visible"/>
+                                      </p:to>
+                                    </p:set>
+                                  </p:childTnLst>
+                                </p:cTn>
+                              </p:par>
+                              <p:par>
+                                <p:cTn id="25" presetID="1" presetClass="entr" presetSubtype="0" fill="hold" nodeType="withEffect">
+                                  <p:stCondLst>
+                                    <p:cond delay="0"/>
+                                  </p:stCondLst>
+                                  <p:childTnLst>
+                                    <p:set>
+                                      <p:cBhvr>
+                                        <p:cTn id="26" dur="1" fill="hold">
+                                          <p:stCondLst>
+                                            <p:cond delay="0"/>
+                                          </p:stCondLst>
+                                        </p:cTn>
+                                        <p:tgtEl>
+                                          <p:spTgt spid="3">
+                                            <p:txEl>
                                               <p:pRg st="6" end="6"/>
                                             </p:txEl>
                                           </p:spTgt>
+                                        </p:tgtEl>
+                                        <p:attrNameLst>
+                                          <p:attrName>style.visibility</p:attrName>
+                                        </p:attrNameLst>
+                                      </p:cBhvr>
+                                      <p:to>
+                                        <p:strVal val="visible"/>
+                                      </p:to>
+                                    </p:set>
+                                  </p:childTnLst>
+                                </p:cTn>
+                              </p:par>
+                              <p:par>
+                                <p:cTn id="27" presetID="1" presetClass="entr" presetSubtype="0" fill="hold" nodeType="withEffect">
+                                  <p:stCondLst>
+                                    <p:cond delay="0"/>
+                                  </p:stCondLst>
+                                  <p:childTnLst>
+                                    <p:set>
+                                      <p:cBhvr>
+                                        <p:cTn id="28" dur="1" fill="hold">
+                                          <p:stCondLst>
+                                            <p:cond delay="0"/>
+                                          </p:stCondLst>
+                                        </p:cTn>
+                                        <p:tgtEl>
+                                          <p:spTgt spid="10"/>
                                         </p:tgtEl>
                                         <p:attrNameLst>
                                           <p:attrName>style.visibility</p:attrName>
@@ -25599,7 +26141,7 @@
 </p:sld>
 </file>
 
-<file path=ppt/slides/slide46.xml><?xml version="1.0" encoding="utf-8"?>
+<file path=ppt/slides/slide47.xml><?xml version="1.0" encoding="utf-8"?>
 <p:sld xmlns:a="http://schemas.openxmlformats.org/drawingml/2006/main" xmlns:r="http://schemas.openxmlformats.org/officeDocument/2006/relationships" xmlns:p="http://schemas.openxmlformats.org/presentationml/2006/main">
   <p:cSld>
     <p:spTree>
@@ -26683,7 +27225,7 @@
 </p:sld>
 </file>
 
-<file path=ppt/slides/slide47.xml><?xml version="1.0" encoding="utf-8"?>
+<file path=ppt/slides/slide48.xml><?xml version="1.0" encoding="utf-8"?>
 <p:sld xmlns:a="http://schemas.openxmlformats.org/drawingml/2006/main" xmlns:r="http://schemas.openxmlformats.org/officeDocument/2006/relationships" xmlns:p="http://schemas.openxmlformats.org/presentationml/2006/main">
   <p:cSld>
     <p:spTree>
@@ -27170,7 +27712,7 @@
 </p:sld>
 </file>
 
-<file path=ppt/slides/slide48.xml><?xml version="1.0" encoding="utf-8"?>
+<file path=ppt/slides/slide49.xml><?xml version="1.0" encoding="utf-8"?>
 <p:sld xmlns:a="http://schemas.openxmlformats.org/drawingml/2006/main" xmlns:r="http://schemas.openxmlformats.org/officeDocument/2006/relationships" xmlns:p="http://schemas.openxmlformats.org/presentationml/2006/main">
   <p:cSld>
     <p:spTree>
@@ -27644,6 +28186,138 @@
           </a:p>
         </p:txBody>
       </p:sp>
+      <p:cxnSp>
+        <p:nvCxnSpPr>
+          <p:cNvPr id="6" name="Straight Arrow Connector 5">
+            <a:extLst>
+              <a:ext uri="{FF2B5EF4-FFF2-40B4-BE49-F238E27FC236}">
+                <a16:creationId xmlns:a16="http://schemas.microsoft.com/office/drawing/2014/main" id="{FB3082CB-1516-E15D-DF1D-6AC71FF21633}"/>
+              </a:ext>
+            </a:extLst>
+          </p:cNvPr>
+          <p:cNvCxnSpPr>
+            <a:cxnSpLocks/>
+          </p:cNvCxnSpPr>
+          <p:nvPr/>
+        </p:nvCxnSpPr>
+        <p:spPr>
+          <a:xfrm flipV="1">
+            <a:off x="3819698" y="2078182"/>
+            <a:ext cx="3757353" cy="332509"/>
+          </a:xfrm>
+          <a:prstGeom prst="straightConnector1">
+            <a:avLst/>
+          </a:prstGeom>
+          <a:ln w="38100">
+            <a:solidFill>
+              <a:srgbClr val="C00000"/>
+            </a:solidFill>
+            <a:tailEnd type="triangle"/>
+          </a:ln>
+        </p:spPr>
+        <p:style>
+          <a:lnRef idx="2">
+            <a:schemeClr val="accent1"/>
+          </a:lnRef>
+          <a:fillRef idx="0">
+            <a:schemeClr val="accent1"/>
+          </a:fillRef>
+          <a:effectRef idx="1">
+            <a:schemeClr val="accent1"/>
+          </a:effectRef>
+          <a:fontRef idx="minor">
+            <a:schemeClr val="tx1"/>
+          </a:fontRef>
+        </p:style>
+      </p:cxnSp>
+      <p:cxnSp>
+        <p:nvCxnSpPr>
+          <p:cNvPr id="10" name="Straight Arrow Connector 9">
+            <a:extLst>
+              <a:ext uri="{FF2B5EF4-FFF2-40B4-BE49-F238E27FC236}">
+                <a16:creationId xmlns:a16="http://schemas.microsoft.com/office/drawing/2014/main" id="{9BD75EF2-A7E1-5990-C1C8-35953C44AEF4}"/>
+              </a:ext>
+            </a:extLst>
+          </p:cNvPr>
+          <p:cNvCxnSpPr>
+            <a:cxnSpLocks/>
+          </p:cNvCxnSpPr>
+          <p:nvPr/>
+        </p:nvCxnSpPr>
+        <p:spPr>
+          <a:xfrm flipV="1">
+            <a:off x="5016731" y="3266902"/>
+            <a:ext cx="993371" cy="951807"/>
+          </a:xfrm>
+          <a:prstGeom prst="straightConnector1">
+            <a:avLst/>
+          </a:prstGeom>
+          <a:ln w="38100">
+            <a:solidFill>
+              <a:srgbClr val="C00000"/>
+            </a:solidFill>
+            <a:tailEnd type="triangle"/>
+          </a:ln>
+        </p:spPr>
+        <p:style>
+          <a:lnRef idx="2">
+            <a:schemeClr val="accent1"/>
+          </a:lnRef>
+          <a:fillRef idx="0">
+            <a:schemeClr val="accent1"/>
+          </a:fillRef>
+          <a:effectRef idx="1">
+            <a:schemeClr val="accent1"/>
+          </a:effectRef>
+          <a:fontRef idx="minor">
+            <a:schemeClr val="tx1"/>
+          </a:fontRef>
+        </p:style>
+      </p:cxnSp>
+      <p:cxnSp>
+        <p:nvCxnSpPr>
+          <p:cNvPr id="13" name="Straight Arrow Connector 12">
+            <a:extLst>
+              <a:ext uri="{FF2B5EF4-FFF2-40B4-BE49-F238E27FC236}">
+                <a16:creationId xmlns:a16="http://schemas.microsoft.com/office/drawing/2014/main" id="{CEAD05EF-E70B-3B51-76CB-B942235D9C7D}"/>
+              </a:ext>
+            </a:extLst>
+          </p:cNvPr>
+          <p:cNvCxnSpPr>
+            <a:cxnSpLocks/>
+          </p:cNvCxnSpPr>
+          <p:nvPr/>
+        </p:nvCxnSpPr>
+        <p:spPr>
+          <a:xfrm flipV="1">
+            <a:off x="4659284" y="2732810"/>
+            <a:ext cx="2244436" cy="967004"/>
+          </a:xfrm>
+          <a:prstGeom prst="straightConnector1">
+            <a:avLst/>
+          </a:prstGeom>
+          <a:ln w="38100">
+            <a:solidFill>
+              <a:srgbClr val="C00000"/>
+            </a:solidFill>
+            <a:tailEnd type="triangle"/>
+          </a:ln>
+        </p:spPr>
+        <p:style>
+          <a:lnRef idx="2">
+            <a:schemeClr val="accent1"/>
+          </a:lnRef>
+          <a:fillRef idx="0">
+            <a:schemeClr val="accent1"/>
+          </a:fillRef>
+          <a:effectRef idx="1">
+            <a:schemeClr val="accent1"/>
+          </a:effectRef>
+          <a:fontRef idx="minor">
+            <a:schemeClr val="tx1"/>
+          </a:fontRef>
+        </p:style>
+      </p:cxnSp>
     </p:spTree>
   </p:cSld>
   <p:clrMapOvr>
@@ -27985,6 +28659,87 @@
                                   </p:childTnLst>
                                 </p:cTn>
                               </p:par>
+                              <p:par>
+                                <p:cTn id="27" presetID="1" presetClass="entr" presetSubtype="0" fill="hold" nodeType="withEffect">
+                                  <p:stCondLst>
+                                    <p:cond delay="0"/>
+                                  </p:stCondLst>
+                                  <p:childTnLst>
+                                    <p:set>
+                                      <p:cBhvr>
+                                        <p:cTn id="28" dur="1" fill="hold">
+                                          <p:stCondLst>
+                                            <p:cond delay="0"/>
+                                          </p:stCondLst>
+                                        </p:cTn>
+                                        <p:tgtEl>
+                                          <p:spTgt spid="6"/>
+                                        </p:tgtEl>
+                                        <p:attrNameLst>
+                                          <p:attrName>style.visibility</p:attrName>
+                                        </p:attrNameLst>
+                                      </p:cBhvr>
+                                      <p:to>
+                                        <p:strVal val="visible"/>
+                                      </p:to>
+                                    </p:set>
+                                  </p:childTnLst>
+                                </p:cTn>
+                              </p:par>
+                              <p:par>
+                                <p:cTn id="29" presetID="1" presetClass="entr" presetSubtype="0" fill="hold" nodeType="withEffect">
+                                  <p:stCondLst>
+                                    <p:cond delay="0"/>
+                                  </p:stCondLst>
+                                  <p:childTnLst>
+                                    <p:set>
+                                      <p:cBhvr>
+                                        <p:cTn id="30" dur="1" fill="hold">
+                                          <p:stCondLst>
+                                            <p:cond delay="0"/>
+                                          </p:stCondLst>
+                                        </p:cTn>
+                                        <p:tgtEl>
+                                          <p:spTgt spid="10"/>
+                                        </p:tgtEl>
+                                        <p:attrNameLst>
+                                          <p:attrName>style.visibility</p:attrName>
+                                        </p:attrNameLst>
+                                      </p:cBhvr>
+                                      <p:to>
+                                        <p:strVal val="visible"/>
+                                      </p:to>
+                                    </p:set>
+                                  </p:childTnLst>
+                                </p:cTn>
+                              </p:par>
+                              <p:par>
+                                <p:cTn id="31" presetID="1" presetClass="entr" presetSubtype="0" fill="hold" nodeType="withEffect">
+                                  <p:stCondLst>
+                                    <p:cond delay="0"/>
+                                  </p:stCondLst>
+                                  <p:childTnLst>
+                                    <p:set>
+                                      <p:cBhvr>
+                                        <p:cTn id="32" dur="1" fill="hold">
+                                          <p:stCondLst>
+                                            <p:cond delay="0"/>
+                                          </p:stCondLst>
+                                        </p:cTn>
+                                        <p:tgtEl>
+                                          <p:spTgt spid="13"/>
+                                        </p:tgtEl>
+                                        <p:attrNameLst>
+                                          <p:attrName>style.visibility</p:attrName>
+                                        </p:attrNameLst>
+                                      </p:cBhvr>
+                                      <p:to>
+                                        <p:strVal val="visible"/>
+                                      </p:to>
+                                    </p:set>
+                                  </p:childTnLst>
+                                </p:cTn>
+                              </p:par>
                             </p:childTnLst>
                           </p:cTn>
                         </p:par>
@@ -28020,7 +28775,71 @@
 </p:sld>
 </file>
 
-<file path=ppt/slides/slide49.xml><?xml version="1.0" encoding="utf-8"?>
+<file path=ppt/slides/slide5.xml><?xml version="1.0" encoding="utf-8"?>
+<p:sld xmlns:a="http://schemas.openxmlformats.org/drawingml/2006/main" xmlns:r="http://schemas.openxmlformats.org/officeDocument/2006/relationships" xmlns:p="http://schemas.openxmlformats.org/presentationml/2006/main">
+  <p:cSld>
+    <p:spTree>
+      <p:nvGrpSpPr>
+        <p:cNvPr id="1" name=""/>
+        <p:cNvGrpSpPr/>
+        <p:nvPr/>
+      </p:nvGrpSpPr>
+      <p:grpSpPr>
+        <a:xfrm>
+          <a:off x="0" y="0"/>
+          <a:ext cx="0" cy="0"/>
+          <a:chOff x="0" y="0"/>
+          <a:chExt cx="0" cy="0"/>
+        </a:xfrm>
+      </p:grpSpPr>
+      <p:sp>
+        <p:nvSpPr>
+          <p:cNvPr id="2" name="Title 1">
+            <a:extLst>
+              <a:ext uri="{FF2B5EF4-FFF2-40B4-BE49-F238E27FC236}">
+                <a16:creationId xmlns:a16="http://schemas.microsoft.com/office/drawing/2014/main" id="{5498C255-8488-A6BF-D8CF-6C0F8BDB00EA}"/>
+              </a:ext>
+            </a:extLst>
+          </p:cNvPr>
+          <p:cNvSpPr>
+            <a:spLocks noGrp="1"/>
+          </p:cNvSpPr>
+          <p:nvPr>
+            <p:ph type="title"/>
+          </p:nvPr>
+        </p:nvSpPr>
+        <p:spPr>
+          <a:xfrm>
+            <a:off x="771081" y="1850264"/>
+            <a:ext cx="7772400" cy="1021556"/>
+          </a:xfrm>
+        </p:spPr>
+        <p:txBody>
+          <a:bodyPr/>
+          <a:lstStyle/>
+          <a:p>
+            <a:pPr algn="ctr"/>
+            <a:r>
+              <a:rPr lang="en-US" b="0" cap="none" dirty="0"/>
+              <a:t>Models for Zero-Inflated Response</a:t>
+            </a:r>
+          </a:p>
+        </p:txBody>
+      </p:sp>
+    </p:spTree>
+    <p:extLst>
+      <p:ext uri="{BB962C8B-B14F-4D97-AF65-F5344CB8AC3E}">
+        <p14:creationId xmlns:p14="http://schemas.microsoft.com/office/powerpoint/2010/main" val="3761794938"/>
+      </p:ext>
+    </p:extLst>
+  </p:cSld>
+  <p:clrMapOvr>
+    <a:masterClrMapping/>
+  </p:clrMapOvr>
+</p:sld>
+</file>
+
+<file path=ppt/slides/slide50.xml><?xml version="1.0" encoding="utf-8"?>
 <p:sld xmlns:a="http://schemas.openxmlformats.org/drawingml/2006/main" xmlns:r="http://schemas.openxmlformats.org/officeDocument/2006/relationships" xmlns:p="http://schemas.openxmlformats.org/presentationml/2006/main">
   <p:cSld>
     <p:spTree>
@@ -28480,6 +29299,94 @@
           </a:p>
         </p:txBody>
       </p:sp>
+      <p:cxnSp>
+        <p:nvCxnSpPr>
+          <p:cNvPr id="6" name="Straight Arrow Connector 5">
+            <a:extLst>
+              <a:ext uri="{FF2B5EF4-FFF2-40B4-BE49-F238E27FC236}">
+                <a16:creationId xmlns:a16="http://schemas.microsoft.com/office/drawing/2014/main" id="{93687FF5-2F4F-964A-7E48-2F37A940534E}"/>
+              </a:ext>
+            </a:extLst>
+          </p:cNvPr>
+          <p:cNvCxnSpPr>
+            <a:cxnSpLocks/>
+          </p:cNvCxnSpPr>
+          <p:nvPr/>
+        </p:nvCxnSpPr>
+        <p:spPr>
+          <a:xfrm>
+            <a:off x="4659284" y="1733204"/>
+            <a:ext cx="2439785" cy="344978"/>
+          </a:xfrm>
+          <a:prstGeom prst="straightConnector1">
+            <a:avLst/>
+          </a:prstGeom>
+          <a:ln w="38100">
+            <a:solidFill>
+              <a:srgbClr val="C00000"/>
+            </a:solidFill>
+            <a:tailEnd type="triangle"/>
+          </a:ln>
+        </p:spPr>
+        <p:style>
+          <a:lnRef idx="2">
+            <a:schemeClr val="accent1"/>
+          </a:lnRef>
+          <a:fillRef idx="0">
+            <a:schemeClr val="accent1"/>
+          </a:fillRef>
+          <a:effectRef idx="1">
+            <a:schemeClr val="accent1"/>
+          </a:effectRef>
+          <a:fontRef idx="minor">
+            <a:schemeClr val="tx1"/>
+          </a:fontRef>
+        </p:style>
+      </p:cxnSp>
+      <p:cxnSp>
+        <p:nvCxnSpPr>
+          <p:cNvPr id="10" name="Straight Arrow Connector 9">
+            <a:extLst>
+              <a:ext uri="{FF2B5EF4-FFF2-40B4-BE49-F238E27FC236}">
+                <a16:creationId xmlns:a16="http://schemas.microsoft.com/office/drawing/2014/main" id="{9DF8C9FD-51CA-5C46-95D8-1FA442B9D74B}"/>
+              </a:ext>
+            </a:extLst>
+          </p:cNvPr>
+          <p:cNvCxnSpPr>
+            <a:cxnSpLocks/>
+          </p:cNvCxnSpPr>
+          <p:nvPr/>
+        </p:nvCxnSpPr>
+        <p:spPr>
+          <a:xfrm flipV="1">
+            <a:off x="5185439" y="2115589"/>
+            <a:ext cx="508779" cy="768927"/>
+          </a:xfrm>
+          <a:prstGeom prst="straightConnector1">
+            <a:avLst/>
+          </a:prstGeom>
+          <a:ln w="38100">
+            <a:solidFill>
+              <a:srgbClr val="C00000"/>
+            </a:solidFill>
+            <a:tailEnd type="triangle"/>
+          </a:ln>
+        </p:spPr>
+        <p:style>
+          <a:lnRef idx="2">
+            <a:schemeClr val="accent1"/>
+          </a:lnRef>
+          <a:fillRef idx="0">
+            <a:schemeClr val="accent1"/>
+          </a:fillRef>
+          <a:effectRef idx="1">
+            <a:schemeClr val="accent1"/>
+          </a:effectRef>
+          <a:fontRef idx="minor">
+            <a:schemeClr val="tx1"/>
+          </a:fontRef>
+        </p:style>
+      </p:cxnSp>
     </p:spTree>
   </p:cSld>
   <p:clrMapOvr>
@@ -28728,7 +29635,7 @@
                                 </p:cTn>
                               </p:par>
                               <p:par>
-                                <p:cTn id="21" presetID="1" presetClass="entr" presetSubtype="0" fill="hold" nodeType="withEffect">
+                                <p:cTn id="21" presetID="1" presetClass="entr" presetSubtype="0" fill="hold" grpId="0" nodeType="withEffect">
                                   <p:stCondLst>
                                     <p:cond delay="0"/>
                                   </p:stCondLst>
@@ -28741,7 +29648,7 @@
                                           </p:stCondLst>
                                         </p:cTn>
                                         <p:tgtEl>
-                                          <p:spTgt spid="4"/>
+                                          <p:spTgt spid="5"/>
                                         </p:tgtEl>
                                         <p:attrNameLst>
                                           <p:attrName>style.visibility</p:attrName>
@@ -28768,7 +29675,7 @@
                                           </p:stCondLst>
                                         </p:cTn>
                                         <p:tgtEl>
-                                          <p:spTgt spid="5"/>
+                                          <p:spTgt spid="9"/>
                                         </p:tgtEl>
                                         <p:attrNameLst>
                                           <p:attrName>style.visibility</p:attrName>
@@ -28782,7 +29689,7 @@
                                 </p:cTn>
                               </p:par>
                               <p:par>
-                                <p:cTn id="25" presetID="1" presetClass="entr" presetSubtype="0" fill="hold" grpId="0" nodeType="withEffect">
+                                <p:cTn id="25" presetID="1" presetClass="entr" presetSubtype="0" fill="hold" nodeType="withEffect">
                                   <p:stCondLst>
                                     <p:cond delay="0"/>
                                   </p:stCondLst>
@@ -28795,7 +29702,61 @@
                                           </p:stCondLst>
                                         </p:cTn>
                                         <p:tgtEl>
-                                          <p:spTgt spid="9"/>
+                                          <p:spTgt spid="4"/>
+                                        </p:tgtEl>
+                                        <p:attrNameLst>
+                                          <p:attrName>style.visibility</p:attrName>
+                                        </p:attrNameLst>
+                                      </p:cBhvr>
+                                      <p:to>
+                                        <p:strVal val="visible"/>
+                                      </p:to>
+                                    </p:set>
+                                  </p:childTnLst>
+                                </p:cTn>
+                              </p:par>
+                              <p:par>
+                                <p:cTn id="27" presetID="1" presetClass="entr" presetSubtype="0" fill="hold" nodeType="withEffect">
+                                  <p:stCondLst>
+                                    <p:cond delay="0"/>
+                                  </p:stCondLst>
+                                  <p:childTnLst>
+                                    <p:set>
+                                      <p:cBhvr>
+                                        <p:cTn id="28" dur="1" fill="hold">
+                                          <p:stCondLst>
+                                            <p:cond delay="0"/>
+                                          </p:stCondLst>
+                                        </p:cTn>
+                                        <p:tgtEl>
+                                          <p:spTgt spid="10"/>
+                                        </p:tgtEl>
+                                        <p:attrNameLst>
+                                          <p:attrName>style.visibility</p:attrName>
+                                        </p:attrNameLst>
+                                      </p:cBhvr>
+                                      <p:to>
+                                        <p:strVal val="visible"/>
+                                      </p:to>
+                                    </p:set>
+                                  </p:childTnLst>
+                                </p:cTn>
+                              </p:par>
+                              <p:par>
+                                <p:cTn id="29" presetID="1" presetClass="entr" presetSubtype="0" fill="hold" nodeType="withEffect">
+                                  <p:stCondLst>
+                                    <p:cond delay="0"/>
+                                  </p:stCondLst>
+                                  <p:childTnLst>
+                                    <p:set>
+                                      <p:cBhvr>
+                                        <p:cTn id="30" dur="1" fill="hold">
+                                          <p:stCondLst>
+                                            <p:cond delay="0"/>
+                                          </p:stCondLst>
+                                        </p:cTn>
+                                        <p:tgtEl>
+                                          <p:spTgt spid="6"/>
                                         </p:tgtEl>
                                         <p:attrNameLst>
                                           <p:attrName>style.visibility</p:attrName>
@@ -28843,71 +29804,7 @@
 </p:sld>
 </file>
 
-<file path=ppt/slides/slide5.xml><?xml version="1.0" encoding="utf-8"?>
-<p:sld xmlns:a="http://schemas.openxmlformats.org/drawingml/2006/main" xmlns:r="http://schemas.openxmlformats.org/officeDocument/2006/relationships" xmlns:p="http://schemas.openxmlformats.org/presentationml/2006/main">
-  <p:cSld>
-    <p:spTree>
-      <p:nvGrpSpPr>
-        <p:cNvPr id="1" name=""/>
-        <p:cNvGrpSpPr/>
-        <p:nvPr/>
-      </p:nvGrpSpPr>
-      <p:grpSpPr>
-        <a:xfrm>
-          <a:off x="0" y="0"/>
-          <a:ext cx="0" cy="0"/>
-          <a:chOff x="0" y="0"/>
-          <a:chExt cx="0" cy="0"/>
-        </a:xfrm>
-      </p:grpSpPr>
-      <p:sp>
-        <p:nvSpPr>
-          <p:cNvPr id="2" name="Title 1">
-            <a:extLst>
-              <a:ext uri="{FF2B5EF4-FFF2-40B4-BE49-F238E27FC236}">
-                <a16:creationId xmlns:a16="http://schemas.microsoft.com/office/drawing/2014/main" id="{5498C255-8488-A6BF-D8CF-6C0F8BDB00EA}"/>
-              </a:ext>
-            </a:extLst>
-          </p:cNvPr>
-          <p:cNvSpPr>
-            <a:spLocks noGrp="1"/>
-          </p:cNvSpPr>
-          <p:nvPr>
-            <p:ph type="title"/>
-          </p:nvPr>
-        </p:nvSpPr>
-        <p:spPr>
-          <a:xfrm>
-            <a:off x="771081" y="1850264"/>
-            <a:ext cx="7772400" cy="1021556"/>
-          </a:xfrm>
-        </p:spPr>
-        <p:txBody>
-          <a:bodyPr/>
-          <a:lstStyle/>
-          <a:p>
-            <a:pPr algn="ctr"/>
-            <a:r>
-              <a:rPr lang="en-US" b="0" cap="none" dirty="0"/>
-              <a:t>Models for Zero-Inflated Response</a:t>
-            </a:r>
-          </a:p>
-        </p:txBody>
-      </p:sp>
-    </p:spTree>
-    <p:extLst>
-      <p:ext uri="{BB962C8B-B14F-4D97-AF65-F5344CB8AC3E}">
-        <p14:creationId xmlns:p14="http://schemas.microsoft.com/office/powerpoint/2010/main" val="3761794938"/>
-      </p:ext>
-    </p:extLst>
-  </p:cSld>
-  <p:clrMapOvr>
-    <a:masterClrMapping/>
-  </p:clrMapOvr>
-</p:sld>
-</file>
-
-<file path=ppt/slides/slide50.xml><?xml version="1.0" encoding="utf-8"?>
+<file path=ppt/slides/slide51.xml><?xml version="1.0" encoding="utf-8"?>
 <p:sld xmlns:a="http://schemas.openxmlformats.org/drawingml/2006/main" xmlns:r="http://schemas.openxmlformats.org/officeDocument/2006/relationships" xmlns:p="http://schemas.openxmlformats.org/presentationml/2006/main">
   <p:cSld>
     <p:spTree>
@@ -29260,7 +30157,7 @@
 </p:sld>
 </file>
 
-<file path=ppt/slides/slide51.xml><?xml version="1.0" encoding="utf-8"?>
+<file path=ppt/slides/slide52.xml><?xml version="1.0" encoding="utf-8"?>
 <p:sld xmlns:a="http://schemas.openxmlformats.org/drawingml/2006/main" xmlns:r="http://schemas.openxmlformats.org/officeDocument/2006/relationships" xmlns:p="http://schemas.openxmlformats.org/presentationml/2006/main">
   <p:cSld>
     <p:spTree>
@@ -29816,7 +30713,7 @@
 </p:sld>
 </file>
 
-<file path=ppt/slides/slide52.xml><?xml version="1.0" encoding="utf-8"?>
+<file path=ppt/slides/slide53.xml><?xml version="1.0" encoding="utf-8"?>
 <p:sld xmlns:a="http://schemas.openxmlformats.org/drawingml/2006/main" xmlns:r="http://schemas.openxmlformats.org/officeDocument/2006/relationships" xmlns:p="http://schemas.openxmlformats.org/presentationml/2006/main">
   <p:cSld>
     <p:spTree>
@@ -30430,7 +31327,7 @@
 </p:sld>
 </file>
 
-<file path=ppt/slides/slide53.xml><?xml version="1.0" encoding="utf-8"?>
+<file path=ppt/slides/slide54.xml><?xml version="1.0" encoding="utf-8"?>
 <p:sld xmlns:a="http://schemas.openxmlformats.org/drawingml/2006/main" xmlns:r="http://schemas.openxmlformats.org/officeDocument/2006/relationships" xmlns:p="http://schemas.openxmlformats.org/presentationml/2006/main">
   <p:cSld>
     <p:spTree>
@@ -31135,7 +32032,7 @@
 </p:sld>
 </file>
 
-<file path=ppt/slides/slide54.xml><?xml version="1.0" encoding="utf-8"?>
+<file path=ppt/slides/slide55.xml><?xml version="1.0" encoding="utf-8"?>
 <p:sld xmlns:a="http://schemas.openxmlformats.org/drawingml/2006/main" xmlns:r="http://schemas.openxmlformats.org/officeDocument/2006/relationships" xmlns:p="http://schemas.openxmlformats.org/presentationml/2006/main">
   <p:cSld>
     <p:spTree>
@@ -31289,13 +32186,8 @@
             </a:r>
             <a:r>
               <a:rPr lang="en-US" dirty="0"/>
-              <a:t>on the </a:t>
-            </a:r>
-            <a:r>
-              <a:rPr lang="en-US"/>
-              <a:t>response </a:t>
-            </a:r>
-            <a:endParaRPr lang="en-US" dirty="0"/>
+              <a:t>on the response </a:t>
+            </a:r>
           </a:p>
         </p:txBody>
       </p:sp>
@@ -32228,11 +33120,7 @@
                                           </p:stCondLst>
                                         </p:cTn>
                                         <p:tgtEl>
-                                          <p:spTgt spid="3">
-                                            <p:txEl>
-                                              <p:pRg st="2" end="2"/>
-                                            </p:txEl>
-                                          </p:spTgt>
+                                          <p:spTgt spid="7"/>
                                         </p:tgtEl>
                                         <p:attrNameLst>
                                           <p:attrName>style.visibility</p:attrName>
@@ -32277,7 +33165,11 @@
                                           </p:stCondLst>
                                         </p:cTn>
                                         <p:tgtEl>
-                                          <p:spTgt spid="7"/>
+                                          <p:spTgt spid="3">
+                                            <p:txEl>
+                                              <p:pRg st="2" end="2"/>
+                                            </p:txEl>
+                                          </p:spTgt>
                                         </p:tgtEl>
                                         <p:attrNameLst>
                                           <p:attrName>style.visibility</p:attrName>
@@ -32782,8 +33674,8 @@
           </a:p>
         </p:txBody>
       </p:sp>
-      <mc:AlternateContent xmlns:mc="http://schemas.openxmlformats.org/markup-compatibility/2006" xmlns:a14="http://schemas.microsoft.com/office/drawing/2010/main">
-        <mc:Choice Requires="a14">
+      <mc:AlternateContent xmlns:mc="http://schemas.openxmlformats.org/markup-compatibility/2006">
+        <mc:Choice xmlns:a14="http://schemas.microsoft.com/office/drawing/2010/main" Requires="a14">
           <p:sp>
             <p:nvSpPr>
               <p:cNvPr id="3" name="Content Placeholder 2">
@@ -32802,13 +33694,13 @@
             </p:nvSpPr>
             <p:spPr>
               <a:xfrm>
-                <a:off x="457200" y="1200151"/>
+                <a:off x="369916" y="1200151"/>
                 <a:ext cx="8229600" cy="3621976"/>
               </a:xfrm>
             </p:spPr>
             <p:txBody>
               <a:bodyPr>
-                <a:normAutofit lnSpcReduction="10000"/>
+                <a:normAutofit fontScale="92500" lnSpcReduction="10000"/>
               </a:bodyPr>
               <a:lstStyle/>
               <a:p>
@@ -33007,375 +33899,385 @@
                 <a:endParaRPr lang="en-US" dirty="0"/>
               </a:p>
               <a:p>
+                <a:pPr marL="0" indent="0">
+                  <a:buNone/>
+                </a:pPr>
+                <a14:m>
+                  <m:oMathPara xmlns:m="http://schemas.openxmlformats.org/officeDocument/2006/math">
+                    <m:oMathParaPr>
+                      <m:jc m:val="centerGroup"/>
+                    </m:oMathParaPr>
+                    <m:oMath xmlns:m="http://schemas.openxmlformats.org/officeDocument/2006/math">
+                      <m:m>
+                        <m:mPr>
+                          <m:mcs>
+                            <m:mc>
+                              <m:mcPr>
+                                <m:count m:val="1"/>
+                                <m:mcJc m:val="center"/>
+                              </m:mcPr>
+                            </m:mc>
+                          </m:mcs>
+                          <m:ctrlPr>
+                            <a:rPr lang="en-US" i="1">
+                              <a:latin typeface="Cambria Math" panose="02040503050406030204" pitchFamily="18" charset="0"/>
+                            </a:rPr>
+                          </m:ctrlPr>
+                        </m:mPr>
+                        <m:mr>
+                          <m:e>
+                            <m:r>
+                              <m:rPr>
+                                <m:brk m:alnAt="7"/>
+                              </m:rPr>
+                              <a:rPr lang="en-US" i="1">
+                                <a:latin typeface="Cambria Math" panose="02040503050406030204" pitchFamily="18" charset="0"/>
+                              </a:rPr>
+                              <m:t>𝑃</m:t>
+                            </m:r>
+                            <m:d>
+                              <m:dPr>
+                                <m:ctrlPr>
+                                  <a:rPr lang="en-US" i="1">
+                                    <a:latin typeface="Cambria Math" panose="02040503050406030204" pitchFamily="18" charset="0"/>
+                                  </a:rPr>
+                                </m:ctrlPr>
+                              </m:dPr>
+                              <m:e>
+                                <m:r>
+                                  <a:rPr lang="en-US" i="1">
+                                    <a:latin typeface="Cambria Math" panose="02040503050406030204" pitchFamily="18" charset="0"/>
+                                  </a:rPr>
+                                  <m:t>𝑌</m:t>
+                                </m:r>
+                                <m:r>
+                                  <a:rPr lang="en-US" i="1">
+                                    <a:latin typeface="Cambria Math" panose="02040503050406030204" pitchFamily="18" charset="0"/>
+                                  </a:rPr>
+                                  <m:t>=</m:t>
+                                </m:r>
+                                <m:r>
+                                  <a:rPr lang="en-US" i="1">
+                                    <a:latin typeface="Cambria Math" panose="02040503050406030204" pitchFamily="18" charset="0"/>
+                                  </a:rPr>
+                                  <m:t>0</m:t>
+                                </m:r>
+                              </m:e>
+                            </m:d>
+                            <m:r>
+                              <m:rPr>
+                                <m:brk m:alnAt="7"/>
+                              </m:rPr>
+                              <a:rPr lang="en-US" i="1">
+                                <a:latin typeface="Cambria Math" panose="02040503050406030204" pitchFamily="18" charset="0"/>
+                              </a:rPr>
+                              <m:t>=</m:t>
+                            </m:r>
+                            <m:r>
+                              <a:rPr lang="en-US" i="1">
+                                <a:latin typeface="Cambria Math" panose="02040503050406030204" pitchFamily="18" charset="0"/>
+                                <a:ea typeface="Cambria Math" panose="02040503050406030204" pitchFamily="18" charset="0"/>
+                              </a:rPr>
+                              <m:t>𝜋</m:t>
+                            </m:r>
+                            <m:r>
+                              <a:rPr lang="en-US" b="0" i="1" smtClean="0">
+                                <a:latin typeface="Cambria Math" panose="02040503050406030204" pitchFamily="18" charset="0"/>
+                                <a:ea typeface="Cambria Math" panose="02040503050406030204" pitchFamily="18" charset="0"/>
+                              </a:rPr>
+                              <m:t>+</m:t>
+                            </m:r>
+                            <m:d>
+                              <m:dPr>
+                                <m:ctrlPr>
+                                  <a:rPr lang="en-US" i="1">
+                                    <a:latin typeface="Cambria Math" panose="02040503050406030204" pitchFamily="18" charset="0"/>
+                                    <a:ea typeface="Cambria Math" panose="02040503050406030204" pitchFamily="18" charset="0"/>
+                                  </a:rPr>
+                                </m:ctrlPr>
+                              </m:dPr>
+                              <m:e>
+                                <m:r>
+                                  <a:rPr lang="en-US" i="1">
+                                    <a:latin typeface="Cambria Math" panose="02040503050406030204" pitchFamily="18" charset="0"/>
+                                    <a:ea typeface="Cambria Math" panose="02040503050406030204" pitchFamily="18" charset="0"/>
+                                  </a:rPr>
+                                  <m:t>1</m:t>
+                                </m:r>
+                                <m:r>
+                                  <a:rPr lang="en-US" i="1">
+                                    <a:latin typeface="Cambria Math" panose="02040503050406030204" pitchFamily="18" charset="0"/>
+                                    <a:ea typeface="Cambria Math" panose="02040503050406030204" pitchFamily="18" charset="0"/>
+                                  </a:rPr>
+                                  <m:t>−</m:t>
+                                </m:r>
+                                <m:r>
+                                  <a:rPr lang="en-US" i="1">
+                                    <a:latin typeface="Cambria Math" panose="02040503050406030204" pitchFamily="18" charset="0"/>
+                                    <a:ea typeface="Cambria Math" panose="02040503050406030204" pitchFamily="18" charset="0"/>
+                                  </a:rPr>
+                                  <m:t>𝜋</m:t>
+                                </m:r>
+                              </m:e>
+                            </m:d>
+                            <m:sSub>
+                              <m:sSubPr>
+                                <m:ctrlPr>
+                                  <a:rPr lang="en-US" i="1">
+                                    <a:latin typeface="Cambria Math" panose="02040503050406030204" pitchFamily="18" charset="0"/>
+                                  </a:rPr>
+                                </m:ctrlPr>
+                              </m:sSubPr>
+                              <m:e>
+                                <m:r>
+                                  <a:rPr lang="en-US" i="1">
+                                    <a:latin typeface="Cambria Math" panose="02040503050406030204" pitchFamily="18" charset="0"/>
+                                  </a:rPr>
+                                  <m:t> </m:t>
+                                </m:r>
+                                <m:r>
+                                  <a:rPr lang="en-US" i="1">
+                                    <a:latin typeface="Cambria Math" panose="02040503050406030204" pitchFamily="18" charset="0"/>
+                                  </a:rPr>
+                                  <m:t>𝑃</m:t>
+                                </m:r>
+                              </m:e>
+                              <m:sub>
+                                <m:r>
+                                  <a:rPr lang="en-US" i="1">
+                                    <a:latin typeface="Cambria Math" panose="02040503050406030204" pitchFamily="18" charset="0"/>
+                                  </a:rPr>
+                                  <m:t>0</m:t>
+                                </m:r>
+                              </m:sub>
+                            </m:sSub>
+                            <m:d>
+                              <m:dPr>
+                                <m:ctrlPr>
+                                  <a:rPr lang="en-US" i="1">
+                                    <a:latin typeface="Cambria Math" panose="02040503050406030204" pitchFamily="18" charset="0"/>
+                                  </a:rPr>
+                                </m:ctrlPr>
+                              </m:dPr>
+                              <m:e>
+                                <m:r>
+                                  <a:rPr lang="en-US" b="0" i="1" smtClean="0">
+                                    <a:latin typeface="Cambria Math" panose="02040503050406030204" pitchFamily="18" charset="0"/>
+                                  </a:rPr>
+                                  <m:t>0</m:t>
+                                </m:r>
+                                <m:r>
+                                  <a:rPr lang="en-US" b="0" i="1" smtClean="0">
+                                    <a:latin typeface="Cambria Math" panose="02040503050406030204" pitchFamily="18" charset="0"/>
+                                  </a:rPr>
+                                  <m:t> | </m:t>
+                                </m:r>
+                                <m:r>
+                                  <a:rPr lang="en-US" i="1">
+                                    <a:latin typeface="Cambria Math" panose="02040503050406030204" pitchFamily="18" charset="0"/>
+                                    <a:ea typeface="Cambria Math" panose="02040503050406030204" pitchFamily="18" charset="0"/>
+                                  </a:rPr>
+                                  <m:t>𝜃</m:t>
+                                </m:r>
+                              </m:e>
+                            </m:d>
+                          </m:e>
+                        </m:mr>
+                        <m:mr>
+                          <m:e>
+                            <m:r>
+                              <m:rPr>
+                                <m:brk m:alnAt="7"/>
+                              </m:rPr>
+                              <a:rPr lang="en-US" i="1">
+                                <a:latin typeface="Cambria Math" panose="02040503050406030204" pitchFamily="18" charset="0"/>
+                              </a:rPr>
+                              <m:t>𝑃</m:t>
+                            </m:r>
+                            <m:d>
+                              <m:dPr>
+                                <m:ctrlPr>
+                                  <a:rPr lang="en-US" i="1">
+                                    <a:latin typeface="Cambria Math" panose="02040503050406030204" pitchFamily="18" charset="0"/>
+                                  </a:rPr>
+                                </m:ctrlPr>
+                              </m:dPr>
+                              <m:e>
+                                <m:r>
+                                  <a:rPr lang="en-US" i="1">
+                                    <a:latin typeface="Cambria Math" panose="02040503050406030204" pitchFamily="18" charset="0"/>
+                                  </a:rPr>
+                                  <m:t>𝑌</m:t>
+                                </m:r>
+                                <m:r>
+                                  <a:rPr lang="en-US" i="1">
+                                    <a:latin typeface="Cambria Math" panose="02040503050406030204" pitchFamily="18" charset="0"/>
+                                  </a:rPr>
+                                  <m:t>=</m:t>
+                                </m:r>
+                                <m:sSub>
+                                  <m:sSubPr>
+                                    <m:ctrlPr>
+                                      <a:rPr lang="en-US" i="1">
+                                        <a:latin typeface="Cambria Math" panose="02040503050406030204" pitchFamily="18" charset="0"/>
+                                      </a:rPr>
+                                    </m:ctrlPr>
+                                  </m:sSubPr>
+                                  <m:e>
+                                    <m:r>
+                                      <a:rPr lang="en-US" i="1">
+                                        <a:latin typeface="Cambria Math" panose="02040503050406030204" pitchFamily="18" charset="0"/>
+                                      </a:rPr>
+                                      <m:t>𝑦</m:t>
+                                    </m:r>
+                                  </m:e>
+                                  <m:sub>
+                                    <m:r>
+                                      <a:rPr lang="en-US" i="1">
+                                        <a:latin typeface="Cambria Math" panose="02040503050406030204" pitchFamily="18" charset="0"/>
+                                      </a:rPr>
+                                      <m:t>𝑖</m:t>
+                                    </m:r>
+                                  </m:sub>
+                                </m:sSub>
+                              </m:e>
+                            </m:d>
+                            <m:r>
+                              <m:rPr>
+                                <m:brk m:alnAt="7"/>
+                              </m:rPr>
+                              <a:rPr lang="en-US" i="1">
+                                <a:latin typeface="Cambria Math" panose="02040503050406030204" pitchFamily="18" charset="0"/>
+                              </a:rPr>
+                              <m:t>=</m:t>
+                            </m:r>
+                            <m:d>
+                              <m:dPr>
+                                <m:ctrlPr>
+                                  <a:rPr lang="en-US" i="1">
+                                    <a:latin typeface="Cambria Math" panose="02040503050406030204" pitchFamily="18" charset="0"/>
+                                    <a:ea typeface="Cambria Math" panose="02040503050406030204" pitchFamily="18" charset="0"/>
+                                  </a:rPr>
+                                </m:ctrlPr>
+                              </m:dPr>
+                              <m:e>
+                                <m:r>
+                                  <a:rPr lang="en-US" i="1">
+                                    <a:latin typeface="Cambria Math" panose="02040503050406030204" pitchFamily="18" charset="0"/>
+                                    <a:ea typeface="Cambria Math" panose="02040503050406030204" pitchFamily="18" charset="0"/>
+                                  </a:rPr>
+                                  <m:t>1</m:t>
+                                </m:r>
+                                <m:r>
+                                  <a:rPr lang="en-US" i="1">
+                                    <a:latin typeface="Cambria Math" panose="02040503050406030204" pitchFamily="18" charset="0"/>
+                                    <a:ea typeface="Cambria Math" panose="02040503050406030204" pitchFamily="18" charset="0"/>
+                                  </a:rPr>
+                                  <m:t>−</m:t>
+                                </m:r>
+                                <m:r>
+                                  <a:rPr lang="en-US" i="1">
+                                    <a:latin typeface="Cambria Math" panose="02040503050406030204" pitchFamily="18" charset="0"/>
+                                    <a:ea typeface="Cambria Math" panose="02040503050406030204" pitchFamily="18" charset="0"/>
+                                  </a:rPr>
+                                  <m:t>𝜋</m:t>
+                                </m:r>
+                              </m:e>
+                            </m:d>
+                            <m:sSub>
+                              <m:sSubPr>
+                                <m:ctrlPr>
+                                  <a:rPr lang="en-US" i="1">
+                                    <a:latin typeface="Cambria Math" panose="02040503050406030204" pitchFamily="18" charset="0"/>
+                                  </a:rPr>
+                                </m:ctrlPr>
+                              </m:sSubPr>
+                              <m:e>
+                                <m:r>
+                                  <a:rPr lang="en-US" i="1">
+                                    <a:latin typeface="Cambria Math" panose="02040503050406030204" pitchFamily="18" charset="0"/>
+                                  </a:rPr>
+                                  <m:t> </m:t>
+                                </m:r>
+                                <m:r>
+                                  <a:rPr lang="en-US" i="1">
+                                    <a:latin typeface="Cambria Math" panose="02040503050406030204" pitchFamily="18" charset="0"/>
+                                  </a:rPr>
+                                  <m:t>𝑃</m:t>
+                                </m:r>
+                              </m:e>
+                              <m:sub>
+                                <m:r>
+                                  <a:rPr lang="en-US" i="1">
+                                    <a:latin typeface="Cambria Math" panose="02040503050406030204" pitchFamily="18" charset="0"/>
+                                  </a:rPr>
+                                  <m:t>0</m:t>
+                                </m:r>
+                              </m:sub>
+                            </m:sSub>
+                            <m:d>
+                              <m:dPr>
+                                <m:ctrlPr>
+                                  <a:rPr lang="en-US" i="1">
+                                    <a:latin typeface="Cambria Math" panose="02040503050406030204" pitchFamily="18" charset="0"/>
+                                  </a:rPr>
+                                </m:ctrlPr>
+                              </m:dPr>
+                              <m:e>
+                                <m:sSub>
+                                  <m:sSubPr>
+                                    <m:ctrlPr>
+                                      <a:rPr lang="en-US" i="1">
+                                        <a:latin typeface="Cambria Math" panose="02040503050406030204" pitchFamily="18" charset="0"/>
+                                      </a:rPr>
+                                    </m:ctrlPr>
+                                  </m:sSubPr>
+                                  <m:e>
+                                    <m:r>
+                                      <a:rPr lang="en-US" i="1">
+                                        <a:latin typeface="Cambria Math" panose="02040503050406030204" pitchFamily="18" charset="0"/>
+                                      </a:rPr>
+                                      <m:t>𝑦</m:t>
+                                    </m:r>
+                                  </m:e>
+                                  <m:sub>
+                                    <m:r>
+                                      <a:rPr lang="en-US" i="1">
+                                        <a:latin typeface="Cambria Math" panose="02040503050406030204" pitchFamily="18" charset="0"/>
+                                      </a:rPr>
+                                      <m:t>𝑖</m:t>
+                                    </m:r>
+                                  </m:sub>
+                                </m:sSub>
+                                <m:r>
+                                  <a:rPr lang="en-US" i="1">
+                                    <a:latin typeface="Cambria Math" panose="02040503050406030204" pitchFamily="18" charset="0"/>
+                                  </a:rPr>
+                                  <m:t> | </m:t>
+                                </m:r>
+                                <m:r>
+                                  <a:rPr lang="en-US" i="1">
+                                    <a:latin typeface="Cambria Math" panose="02040503050406030204" pitchFamily="18" charset="0"/>
+                                    <a:ea typeface="Cambria Math" panose="02040503050406030204" pitchFamily="18" charset="0"/>
+                                  </a:rPr>
+                                  <m:t>𝜃</m:t>
+                                </m:r>
+                              </m:e>
+                            </m:d>
+                          </m:e>
+                        </m:mr>
+                      </m:m>
+                    </m:oMath>
+                  </m:oMathPara>
+                </a14:m>
+                <a:endParaRPr lang="en-US" dirty="0"/>
+              </a:p>
+              <a:p>
                 <a:pPr lvl="1"/>
                 <a:r>
                   <a:rPr lang="en-US" dirty="0"/>
-                  <a:t>Switching probability adds an addition degree of freedom </a:t>
+                  <a:t>Switching probability adds an addition degree of freedom</a:t>
                 </a:r>
-                <a14:m>
-                  <m:oMath xmlns:m="http://schemas.openxmlformats.org/officeDocument/2006/math">
-                    <m:m>
-                      <m:mPr>
-                        <m:mcs>
-                          <m:mc>
-                            <m:mcPr>
-                              <m:count m:val="1"/>
-                              <m:mcJc m:val="center"/>
-                            </m:mcPr>
-                          </m:mc>
-                        </m:mcs>
-                        <m:ctrlPr>
-                          <a:rPr lang="en-US" i="1" smtClean="0">
-                            <a:latin typeface="Cambria Math" panose="02040503050406030204" pitchFamily="18" charset="0"/>
-                          </a:rPr>
-                        </m:ctrlPr>
-                      </m:mPr>
-                      <m:mr>
-                        <m:e>
-                          <m:r>
-                            <m:rPr>
-                              <m:brk m:alnAt="7"/>
-                            </m:rPr>
-                            <a:rPr lang="en-US" b="0" i="1" smtClean="0">
-                              <a:latin typeface="Cambria Math" panose="02040503050406030204" pitchFamily="18" charset="0"/>
-                            </a:rPr>
-                            <m:t>𝑃</m:t>
-                          </m:r>
-                          <m:d>
-                            <m:dPr>
-                              <m:ctrlPr>
-                                <a:rPr lang="en-US" b="0" i="1" smtClean="0">
-                                  <a:latin typeface="Cambria Math" panose="02040503050406030204" pitchFamily="18" charset="0"/>
-                                </a:rPr>
-                              </m:ctrlPr>
-                            </m:dPr>
-                            <m:e>
-                              <m:r>
-                                <a:rPr lang="en-US" b="0" i="1" smtClean="0">
-                                  <a:latin typeface="Cambria Math" panose="02040503050406030204" pitchFamily="18" charset="0"/>
-                                </a:rPr>
-                                <m:t>𝑌</m:t>
-                              </m:r>
-                              <m:r>
-                                <a:rPr lang="en-US" b="0" i="1" smtClean="0">
-                                  <a:latin typeface="Cambria Math" panose="02040503050406030204" pitchFamily="18" charset="0"/>
-                                </a:rPr>
-                                <m:t>=</m:t>
-                              </m:r>
-                              <m:r>
-                                <a:rPr lang="en-US" b="0" i="1" smtClean="0">
-                                  <a:latin typeface="Cambria Math" panose="02040503050406030204" pitchFamily="18" charset="0"/>
-                                </a:rPr>
-                                <m:t>0</m:t>
-                              </m:r>
-                            </m:e>
-                          </m:d>
-                          <m:r>
-                            <m:rPr>
-                              <m:brk m:alnAt="7"/>
-                            </m:rPr>
-                            <a:rPr lang="en-US" b="0" i="1" smtClean="0">
-                              <a:latin typeface="Cambria Math" panose="02040503050406030204" pitchFamily="18" charset="0"/>
-                            </a:rPr>
-                            <m:t>=</m:t>
-                          </m:r>
-                          <m:r>
-                            <a:rPr lang="en-US" b="0" i="1" smtClean="0">
-                              <a:latin typeface="Cambria Math" panose="02040503050406030204" pitchFamily="18" charset="0"/>
-                              <a:ea typeface="Cambria Math" panose="02040503050406030204" pitchFamily="18" charset="0"/>
-                            </a:rPr>
-                            <m:t>𝜋</m:t>
-                          </m:r>
-                          <m:r>
-                            <a:rPr lang="en-US" b="0" i="1" smtClean="0">
-                              <a:latin typeface="Cambria Math" panose="02040503050406030204" pitchFamily="18" charset="0"/>
-                              <a:ea typeface="Cambria Math" panose="02040503050406030204" pitchFamily="18" charset="0"/>
-                            </a:rPr>
-                            <m:t>+</m:t>
-                          </m:r>
-                          <m:d>
-                            <m:dPr>
-                              <m:ctrlPr>
-                                <a:rPr lang="en-US" b="0" i="1" smtClean="0">
-                                  <a:latin typeface="Cambria Math" panose="02040503050406030204" pitchFamily="18" charset="0"/>
-                                  <a:ea typeface="Cambria Math" panose="02040503050406030204" pitchFamily="18" charset="0"/>
-                                </a:rPr>
-                              </m:ctrlPr>
-                            </m:dPr>
-                            <m:e>
-                              <m:r>
-                                <a:rPr lang="en-US" b="0" i="1" smtClean="0">
-                                  <a:latin typeface="Cambria Math" panose="02040503050406030204" pitchFamily="18" charset="0"/>
-                                  <a:ea typeface="Cambria Math" panose="02040503050406030204" pitchFamily="18" charset="0"/>
-                                </a:rPr>
-                                <m:t>1</m:t>
-                              </m:r>
-                              <m:r>
-                                <a:rPr lang="en-US" b="0" i="1" smtClean="0">
-                                  <a:latin typeface="Cambria Math" panose="02040503050406030204" pitchFamily="18" charset="0"/>
-                                  <a:ea typeface="Cambria Math" panose="02040503050406030204" pitchFamily="18" charset="0"/>
-                                </a:rPr>
-                                <m:t>−</m:t>
-                              </m:r>
-                              <m:r>
-                                <a:rPr lang="en-US" b="0" i="1" smtClean="0">
-                                  <a:latin typeface="Cambria Math" panose="02040503050406030204" pitchFamily="18" charset="0"/>
-                                  <a:ea typeface="Cambria Math" panose="02040503050406030204" pitchFamily="18" charset="0"/>
-                                </a:rPr>
-                                <m:t>𝜋</m:t>
-                              </m:r>
-                            </m:e>
-                          </m:d>
-                          <m:sSub>
-                            <m:sSubPr>
-                              <m:ctrlPr>
-                                <a:rPr lang="en-US" i="1">
-                                  <a:latin typeface="Cambria Math" panose="02040503050406030204" pitchFamily="18" charset="0"/>
-                                </a:rPr>
-                              </m:ctrlPr>
-                            </m:sSubPr>
-                            <m:e>
-                              <m:r>
-                                <a:rPr lang="en-US" b="0" i="1" smtClean="0">
-                                  <a:latin typeface="Cambria Math" panose="02040503050406030204" pitchFamily="18" charset="0"/>
-                                </a:rPr>
-                                <m:t> </m:t>
-                              </m:r>
-                              <m:r>
-                                <a:rPr lang="en-US" i="1">
-                                  <a:latin typeface="Cambria Math" panose="02040503050406030204" pitchFamily="18" charset="0"/>
-                                </a:rPr>
-                                <m:t>𝑃</m:t>
-                              </m:r>
-                            </m:e>
-                            <m:sub>
-                              <m:r>
-                                <a:rPr lang="en-US" i="1">
-                                  <a:latin typeface="Cambria Math" panose="02040503050406030204" pitchFamily="18" charset="0"/>
-                                </a:rPr>
-                                <m:t>0</m:t>
-                              </m:r>
-                            </m:sub>
-                          </m:sSub>
-                          <m:d>
-                            <m:dPr>
-                              <m:ctrlPr>
-                                <a:rPr lang="en-US" i="1">
-                                  <a:latin typeface="Cambria Math" panose="02040503050406030204" pitchFamily="18" charset="0"/>
-                                </a:rPr>
-                              </m:ctrlPr>
-                            </m:dPr>
-                            <m:e>
-                              <m:r>
-                                <a:rPr lang="en-US" b="0" i="1" smtClean="0">
-                                  <a:latin typeface="Cambria Math" panose="02040503050406030204" pitchFamily="18" charset="0"/>
-                                </a:rPr>
-                                <m:t>0</m:t>
-                              </m:r>
-                              <m:r>
-                                <a:rPr lang="en-US" b="0" i="1" smtClean="0">
-                                  <a:latin typeface="Cambria Math" panose="02040503050406030204" pitchFamily="18" charset="0"/>
-                                </a:rPr>
-                                <m:t> | </m:t>
-                              </m:r>
-                              <m:r>
-                                <a:rPr lang="en-US" i="1">
-                                  <a:latin typeface="Cambria Math" panose="02040503050406030204" pitchFamily="18" charset="0"/>
-                                  <a:ea typeface="Cambria Math" panose="02040503050406030204" pitchFamily="18" charset="0"/>
-                                </a:rPr>
-                                <m:t>𝜃</m:t>
-                              </m:r>
-                            </m:e>
-                          </m:d>
-                        </m:e>
-                      </m:mr>
-                      <m:mr>
-                        <m:e>
-                          <m:r>
-                            <m:rPr>
-                              <m:brk m:alnAt="7"/>
-                            </m:rPr>
-                            <a:rPr lang="en-US" i="1">
-                              <a:latin typeface="Cambria Math" panose="02040503050406030204" pitchFamily="18" charset="0"/>
-                            </a:rPr>
-                            <m:t>𝑃</m:t>
-                          </m:r>
-                          <m:d>
-                            <m:dPr>
-                              <m:ctrlPr>
-                                <a:rPr lang="en-US" i="1">
-                                  <a:latin typeface="Cambria Math" panose="02040503050406030204" pitchFamily="18" charset="0"/>
-                                </a:rPr>
-                              </m:ctrlPr>
-                            </m:dPr>
-                            <m:e>
-                              <m:r>
-                                <a:rPr lang="en-US" i="1">
-                                  <a:latin typeface="Cambria Math" panose="02040503050406030204" pitchFamily="18" charset="0"/>
-                                </a:rPr>
-                                <m:t>𝑌</m:t>
-                              </m:r>
-                              <m:r>
-                                <a:rPr lang="en-US" i="1">
-                                  <a:latin typeface="Cambria Math" panose="02040503050406030204" pitchFamily="18" charset="0"/>
-                                </a:rPr>
-                                <m:t>=</m:t>
-                              </m:r>
-                              <m:sSub>
-                                <m:sSubPr>
-                                  <m:ctrlPr>
-                                    <a:rPr lang="en-US" i="1" smtClean="0">
-                                      <a:latin typeface="Cambria Math" panose="02040503050406030204" pitchFamily="18" charset="0"/>
-                                    </a:rPr>
-                                  </m:ctrlPr>
-                                </m:sSubPr>
-                                <m:e>
-                                  <m:r>
-                                    <a:rPr lang="en-US" b="0" i="1" smtClean="0">
-                                      <a:latin typeface="Cambria Math" panose="02040503050406030204" pitchFamily="18" charset="0"/>
-                                    </a:rPr>
-                                    <m:t>𝑦</m:t>
-                                  </m:r>
-                                </m:e>
-                                <m:sub>
-                                  <m:r>
-                                    <a:rPr lang="en-US" b="0" i="1" smtClean="0">
-                                      <a:latin typeface="Cambria Math" panose="02040503050406030204" pitchFamily="18" charset="0"/>
-                                    </a:rPr>
-                                    <m:t>𝑖</m:t>
-                                  </m:r>
-                                </m:sub>
-                              </m:sSub>
-                            </m:e>
-                          </m:d>
-                          <m:r>
-                            <m:rPr>
-                              <m:brk m:alnAt="7"/>
-                            </m:rPr>
-                            <a:rPr lang="en-US" i="1">
-                              <a:latin typeface="Cambria Math" panose="02040503050406030204" pitchFamily="18" charset="0"/>
-                            </a:rPr>
-                            <m:t>=</m:t>
-                          </m:r>
-                          <m:d>
-                            <m:dPr>
-                              <m:ctrlPr>
-                                <a:rPr lang="en-US" i="1">
-                                  <a:latin typeface="Cambria Math" panose="02040503050406030204" pitchFamily="18" charset="0"/>
-                                  <a:ea typeface="Cambria Math" panose="02040503050406030204" pitchFamily="18" charset="0"/>
-                                </a:rPr>
-                              </m:ctrlPr>
-                            </m:dPr>
-                            <m:e>
-                              <m:r>
-                                <a:rPr lang="en-US" i="1">
-                                  <a:latin typeface="Cambria Math" panose="02040503050406030204" pitchFamily="18" charset="0"/>
-                                  <a:ea typeface="Cambria Math" panose="02040503050406030204" pitchFamily="18" charset="0"/>
-                                </a:rPr>
-                                <m:t>1</m:t>
-                              </m:r>
-                              <m:r>
-                                <a:rPr lang="en-US" i="1">
-                                  <a:latin typeface="Cambria Math" panose="02040503050406030204" pitchFamily="18" charset="0"/>
-                                  <a:ea typeface="Cambria Math" panose="02040503050406030204" pitchFamily="18" charset="0"/>
-                                </a:rPr>
-                                <m:t>−</m:t>
-                              </m:r>
-                              <m:r>
-                                <a:rPr lang="en-US" i="1">
-                                  <a:latin typeface="Cambria Math" panose="02040503050406030204" pitchFamily="18" charset="0"/>
-                                  <a:ea typeface="Cambria Math" panose="02040503050406030204" pitchFamily="18" charset="0"/>
-                                </a:rPr>
-                                <m:t>𝜋</m:t>
-                              </m:r>
-                            </m:e>
-                          </m:d>
-                          <m:sSub>
-                            <m:sSubPr>
-                              <m:ctrlPr>
-                                <a:rPr lang="en-US" i="1">
-                                  <a:latin typeface="Cambria Math" panose="02040503050406030204" pitchFamily="18" charset="0"/>
-                                </a:rPr>
-                              </m:ctrlPr>
-                            </m:sSubPr>
-                            <m:e>
-                              <m:r>
-                                <a:rPr lang="en-US" b="0" i="1" smtClean="0">
-                                  <a:latin typeface="Cambria Math" panose="02040503050406030204" pitchFamily="18" charset="0"/>
-                                </a:rPr>
-                                <m:t> </m:t>
-                              </m:r>
-                              <m:r>
-                                <a:rPr lang="en-US" i="1">
-                                  <a:latin typeface="Cambria Math" panose="02040503050406030204" pitchFamily="18" charset="0"/>
-                                </a:rPr>
-                                <m:t>𝑃</m:t>
-                              </m:r>
-                            </m:e>
-                            <m:sub>
-                              <m:r>
-                                <a:rPr lang="en-US" i="1">
-                                  <a:latin typeface="Cambria Math" panose="02040503050406030204" pitchFamily="18" charset="0"/>
-                                </a:rPr>
-                                <m:t>0</m:t>
-                              </m:r>
-                            </m:sub>
-                          </m:sSub>
-                          <m:d>
-                            <m:dPr>
-                              <m:ctrlPr>
-                                <a:rPr lang="en-US" i="1">
-                                  <a:latin typeface="Cambria Math" panose="02040503050406030204" pitchFamily="18" charset="0"/>
-                                </a:rPr>
-                              </m:ctrlPr>
-                            </m:dPr>
-                            <m:e>
-                              <m:sSub>
-                                <m:sSubPr>
-                                  <m:ctrlPr>
-                                    <a:rPr lang="en-US" i="1">
-                                      <a:latin typeface="Cambria Math" panose="02040503050406030204" pitchFamily="18" charset="0"/>
-                                    </a:rPr>
-                                  </m:ctrlPr>
-                                </m:sSubPr>
-                                <m:e>
-                                  <m:r>
-                                    <a:rPr lang="en-US" i="1">
-                                      <a:latin typeface="Cambria Math" panose="02040503050406030204" pitchFamily="18" charset="0"/>
-                                    </a:rPr>
-                                    <m:t>𝑦</m:t>
-                                  </m:r>
-                                </m:e>
-                                <m:sub>
-                                  <m:r>
-                                    <a:rPr lang="en-US" i="1">
-                                      <a:latin typeface="Cambria Math" panose="02040503050406030204" pitchFamily="18" charset="0"/>
-                                    </a:rPr>
-                                    <m:t>𝑖</m:t>
-                                  </m:r>
-                                </m:sub>
-                              </m:sSub>
-                              <m:r>
-                                <a:rPr lang="en-US" b="0" i="1" smtClean="0">
-                                  <a:latin typeface="Cambria Math" panose="02040503050406030204" pitchFamily="18" charset="0"/>
-                                </a:rPr>
-                                <m:t> | </m:t>
-                              </m:r>
-                              <m:r>
-                                <a:rPr lang="en-US" i="1">
-                                  <a:latin typeface="Cambria Math" panose="02040503050406030204" pitchFamily="18" charset="0"/>
-                                  <a:ea typeface="Cambria Math" panose="02040503050406030204" pitchFamily="18" charset="0"/>
-                                </a:rPr>
-                                <m:t>𝜃</m:t>
-                              </m:r>
-                            </m:e>
-                          </m:d>
-                        </m:e>
-                      </m:mr>
-                    </m:m>
-                  </m:oMath>
-                </a14:m>
-                <a:endParaRPr lang="en-US" dirty="0"/>
               </a:p>
               <a:p>
                 <a:pPr lvl="0"/>
@@ -33384,7 +34286,7 @@
             </p:txBody>
           </p:sp>
         </mc:Choice>
-        <mc:Fallback xmlns="">
+        <mc:Fallback>
           <p:sp>
             <p:nvSpPr>
               <p:cNvPr id="3" name="Content Placeholder 2">
@@ -33403,13 +34305,13 @@
             </p:nvSpPr>
             <p:spPr>
               <a:xfrm>
-                <a:off x="457200" y="1200151"/>
+                <a:off x="369916" y="1200151"/>
                 <a:ext cx="8229600" cy="3621976"/>
               </a:xfrm>
               <a:blipFill>
                 <a:blip r:embed="rId2"/>
                 <a:stretch>
-                  <a:fillRect l="-1111" t="-2357"/>
+                  <a:fillRect l="-963" t="-2189"/>
                 </a:stretch>
               </a:blipFill>
             </p:spPr>
@@ -33684,6 +34586,37 @@
                                           <p:spTgt spid="3">
                                             <p:txEl>
                                               <p:pRg st="5" end="5"/>
+                                            </p:txEl>
+                                          </p:spTgt>
+                                        </p:tgtEl>
+                                        <p:attrNameLst>
+                                          <p:attrName>style.visibility</p:attrName>
+                                        </p:attrNameLst>
+                                      </p:cBhvr>
+                                      <p:to>
+                                        <p:strVal val="visible"/>
+                                      </p:to>
+                                    </p:set>
+                                  </p:childTnLst>
+                                </p:cTn>
+                              </p:par>
+                              <p:par>
+                                <p:cTn id="23" presetID="1" presetClass="entr" presetSubtype="0" fill="hold" grpId="0" nodeType="withEffect">
+                                  <p:stCondLst>
+                                    <p:cond delay="0"/>
+                                  </p:stCondLst>
+                                  <p:childTnLst>
+                                    <p:set>
+                                      <p:cBhvr>
+                                        <p:cTn id="24" dur="1" fill="hold">
+                                          <p:stCondLst>
+                                            <p:cond delay="0"/>
+                                          </p:stCondLst>
+                                        </p:cTn>
+                                        <p:tgtEl>
+                                          <p:spTgt spid="3">
+                                            <p:txEl>
+                                              <p:pRg st="6" end="6"/>
                                             </p:txEl>
                                           </p:spTgt>
                                         </p:tgtEl>

</xml_diff>

<commit_message>
Changed name of slide file
</commit_message>
<xml_diff>
--- a/LectureSlides/10b_ModelsFor OutliersAndOverdispersion.pptx
+++ b/LectureSlides/10b_ModelsFor OutliersAndOverdispersion.pptx
@@ -5,7 +5,7 @@
     <p:sldMasterId id="2147483648" r:id="rId1"/>
   </p:sldMasterIdLst>
   <p:notesMasterIdLst>
-    <p:notesMasterId r:id="rId57"/>
+    <p:notesMasterId r:id="rId58"/>
   </p:notesMasterIdLst>
   <p:sldIdLst>
     <p:sldId id="337" r:id="rId2"/>
@@ -34,35 +34,36 @@
     <p:sldId id="358" r:id="rId25"/>
     <p:sldId id="359" r:id="rId26"/>
     <p:sldId id="360" r:id="rId27"/>
-    <p:sldId id="361" r:id="rId28"/>
-    <p:sldId id="362" r:id="rId29"/>
-    <p:sldId id="351" r:id="rId30"/>
-    <p:sldId id="383" r:id="rId31"/>
-    <p:sldId id="375" r:id="rId32"/>
-    <p:sldId id="376" r:id="rId33"/>
-    <p:sldId id="380" r:id="rId34"/>
-    <p:sldId id="378" r:id="rId35"/>
-    <p:sldId id="379" r:id="rId36"/>
-    <p:sldId id="377" r:id="rId37"/>
-    <p:sldId id="320" r:id="rId38"/>
-    <p:sldId id="321" r:id="rId39"/>
-    <p:sldId id="364" r:id="rId40"/>
-    <p:sldId id="365" r:id="rId41"/>
-    <p:sldId id="382" r:id="rId42"/>
-    <p:sldId id="323" r:id="rId43"/>
-    <p:sldId id="324" r:id="rId44"/>
-    <p:sldId id="326" r:id="rId45"/>
-    <p:sldId id="366" r:id="rId46"/>
-    <p:sldId id="327" r:id="rId47"/>
-    <p:sldId id="328" r:id="rId48"/>
-    <p:sldId id="329" r:id="rId49"/>
-    <p:sldId id="330" r:id="rId50"/>
-    <p:sldId id="331" r:id="rId51"/>
-    <p:sldId id="332" r:id="rId52"/>
-    <p:sldId id="333" r:id="rId53"/>
-    <p:sldId id="367" r:id="rId54"/>
-    <p:sldId id="368" r:id="rId55"/>
-    <p:sldId id="381" r:id="rId56"/>
+    <p:sldId id="384" r:id="rId28"/>
+    <p:sldId id="361" r:id="rId29"/>
+    <p:sldId id="362" r:id="rId30"/>
+    <p:sldId id="351" r:id="rId31"/>
+    <p:sldId id="383" r:id="rId32"/>
+    <p:sldId id="375" r:id="rId33"/>
+    <p:sldId id="376" r:id="rId34"/>
+    <p:sldId id="380" r:id="rId35"/>
+    <p:sldId id="378" r:id="rId36"/>
+    <p:sldId id="379" r:id="rId37"/>
+    <p:sldId id="377" r:id="rId38"/>
+    <p:sldId id="320" r:id="rId39"/>
+    <p:sldId id="321" r:id="rId40"/>
+    <p:sldId id="364" r:id="rId41"/>
+    <p:sldId id="365" r:id="rId42"/>
+    <p:sldId id="382" r:id="rId43"/>
+    <p:sldId id="323" r:id="rId44"/>
+    <p:sldId id="324" r:id="rId45"/>
+    <p:sldId id="326" r:id="rId46"/>
+    <p:sldId id="366" r:id="rId47"/>
+    <p:sldId id="327" r:id="rId48"/>
+    <p:sldId id="328" r:id="rId49"/>
+    <p:sldId id="329" r:id="rId50"/>
+    <p:sldId id="330" r:id="rId51"/>
+    <p:sldId id="331" r:id="rId52"/>
+    <p:sldId id="332" r:id="rId53"/>
+    <p:sldId id="333" r:id="rId54"/>
+    <p:sldId id="367" r:id="rId55"/>
+    <p:sldId id="368" r:id="rId56"/>
+    <p:sldId id="381" r:id="rId57"/>
   </p:sldIdLst>
   <p:sldSz cx="9144000" cy="5143500" type="screen16x9"/>
   <p:notesSz cx="6858000" cy="9144000"/>
@@ -262,7 +263,7 @@
           <a:p>
             <a:fld id="{B45A0028-71D2-4800-AD8E-38BD1BCDF688}" type="datetimeFigureOut">
               <a:rPr lang="en-US" smtClean="0"/>
-              <a:t>10/15/2025</a:t>
+              <a:t>10/17/2025</a:t>
             </a:fld>
             <a:endParaRPr lang="en-US"/>
           </a:p>
@@ -792,7 +793,7 @@
           <a:p>
             <a:fld id="{241EB5C9-1307-BA42-ABA2-0BC069CD8E7F}" type="datetimeFigureOut">
               <a:rPr lang="en-US" smtClean="0"/>
-              <a:t>10/15/2025</a:t>
+              <a:t>10/17/2025</a:t>
             </a:fld>
             <a:endParaRPr lang="en-US"/>
           </a:p>
@@ -960,7 +961,7 @@
           <a:p>
             <a:fld id="{241EB5C9-1307-BA42-ABA2-0BC069CD8E7F}" type="datetimeFigureOut">
               <a:rPr lang="en-US" smtClean="0"/>
-              <a:t>10/15/2025</a:t>
+              <a:t>10/17/2025</a:t>
             </a:fld>
             <a:endParaRPr lang="en-US"/>
           </a:p>
@@ -1138,7 +1139,7 @@
           <a:p>
             <a:fld id="{241EB5C9-1307-BA42-ABA2-0BC069CD8E7F}" type="datetimeFigureOut">
               <a:rPr lang="en-US" smtClean="0"/>
-              <a:t>10/15/2025</a:t>
+              <a:t>10/17/2025</a:t>
             </a:fld>
             <a:endParaRPr lang="en-US"/>
           </a:p>
@@ -1306,7 +1307,7 @@
           <a:p>
             <a:fld id="{241EB5C9-1307-BA42-ABA2-0BC069CD8E7F}" type="datetimeFigureOut">
               <a:rPr lang="en-US" smtClean="0"/>
-              <a:t>10/15/2025</a:t>
+              <a:t>10/17/2025</a:t>
             </a:fld>
             <a:endParaRPr lang="en-US"/>
           </a:p>
@@ -1551,7 +1552,7 @@
           <a:p>
             <a:fld id="{241EB5C9-1307-BA42-ABA2-0BC069CD8E7F}" type="datetimeFigureOut">
               <a:rPr lang="en-US" smtClean="0"/>
-              <a:t>10/15/2025</a:t>
+              <a:t>10/17/2025</a:t>
             </a:fld>
             <a:endParaRPr lang="en-US"/>
           </a:p>
@@ -1836,7 +1837,7 @@
           <a:p>
             <a:fld id="{241EB5C9-1307-BA42-ABA2-0BC069CD8E7F}" type="datetimeFigureOut">
               <a:rPr lang="en-US" smtClean="0"/>
-              <a:t>10/15/2025</a:t>
+              <a:t>10/17/2025</a:t>
             </a:fld>
             <a:endParaRPr lang="en-US"/>
           </a:p>
@@ -2255,7 +2256,7 @@
           <a:p>
             <a:fld id="{241EB5C9-1307-BA42-ABA2-0BC069CD8E7F}" type="datetimeFigureOut">
               <a:rPr lang="en-US" smtClean="0"/>
-              <a:t>10/15/2025</a:t>
+              <a:t>10/17/2025</a:t>
             </a:fld>
             <a:endParaRPr lang="en-US"/>
           </a:p>
@@ -2372,7 +2373,7 @@
           <a:p>
             <a:fld id="{241EB5C9-1307-BA42-ABA2-0BC069CD8E7F}" type="datetimeFigureOut">
               <a:rPr lang="en-US" smtClean="0"/>
-              <a:t>10/15/2025</a:t>
+              <a:t>10/17/2025</a:t>
             </a:fld>
             <a:endParaRPr lang="en-US"/>
           </a:p>
@@ -2467,7 +2468,7 @@
           <a:p>
             <a:fld id="{241EB5C9-1307-BA42-ABA2-0BC069CD8E7F}" type="datetimeFigureOut">
               <a:rPr lang="en-US" smtClean="0"/>
-              <a:t>10/15/2025</a:t>
+              <a:t>10/17/2025</a:t>
             </a:fld>
             <a:endParaRPr lang="en-US"/>
           </a:p>
@@ -2742,7 +2743,7 @@
           <a:p>
             <a:fld id="{241EB5C9-1307-BA42-ABA2-0BC069CD8E7F}" type="datetimeFigureOut">
               <a:rPr lang="en-US" smtClean="0"/>
-              <a:t>10/15/2025</a:t>
+              <a:t>10/17/2025</a:t>
             </a:fld>
             <a:endParaRPr lang="en-US"/>
           </a:p>
@@ -2994,7 +2995,7 @@
           <a:p>
             <a:fld id="{241EB5C9-1307-BA42-ABA2-0BC069CD8E7F}" type="datetimeFigureOut">
               <a:rPr lang="en-US" smtClean="0"/>
-              <a:t>10/15/2025</a:t>
+              <a:t>10/17/2025</a:t>
             </a:fld>
             <a:endParaRPr lang="en-US"/>
           </a:p>
@@ -3205,7 +3206,7 @@
           <a:p>
             <a:fld id="{241EB5C9-1307-BA42-ABA2-0BC069CD8E7F}" type="datetimeFigureOut">
               <a:rPr lang="en-US" smtClean="0"/>
-              <a:t>10/15/2025</a:t>
+              <a:t>10/17/2025</a:t>
             </a:fld>
             <a:endParaRPr lang="en-US"/>
           </a:p>
@@ -4331,7 +4332,7 @@
                             <m:d>
                               <m:dPr>
                                 <m:ctrlPr>
-                                  <a:rPr lang="en-US" i="1">
+                                  <a:rPr lang="en-US" i="1" smtClean="0">
                                     <a:latin typeface="Cambria Math" panose="02040503050406030204" pitchFamily="18" charset="0"/>
                                   </a:rPr>
                                 </m:ctrlPr>
@@ -4374,6 +4375,20 @@
                                     </m:r>
                                   </m:sub>
                                 </m:sSub>
+                                <m:r>
+                                  <a:rPr lang="en-US" b="0" i="1" smtClean="0">
+                                    <a:latin typeface="Cambria Math" panose="02040503050406030204" pitchFamily="18" charset="0"/>
+                                    <a:ea typeface="Cambria Math" panose="02040503050406030204" pitchFamily="18" charset="0"/>
+                                  </a:rPr>
+                                  <m:t>&gt;</m:t>
+                                </m:r>
+                                <m:r>
+                                  <a:rPr lang="en-US" b="0" i="1" smtClean="0">
+                                    <a:latin typeface="Cambria Math" panose="02040503050406030204" pitchFamily="18" charset="0"/>
+                                    <a:ea typeface="Cambria Math" panose="02040503050406030204" pitchFamily="18" charset="0"/>
+                                  </a:rPr>
+                                  <m:t>0</m:t>
+                                </m:r>
                               </m:e>
                             </m:d>
                             <m:r>
@@ -4615,258 +4630,6 @@
   <p:clrMapOvr>
     <a:masterClrMapping/>
   </p:clrMapOvr>
-  <p:timing>
-    <p:tnLst>
-      <p:par>
-        <p:cTn id="1" dur="indefinite" restart="never" nodeType="tmRoot">
-          <p:childTnLst>
-            <p:seq concurrent="1" nextAc="seek">
-              <p:cTn id="2" dur="indefinite" nodeType="mainSeq">
-                <p:childTnLst>
-                  <p:par>
-                    <p:cTn id="3" fill="hold">
-                      <p:stCondLst>
-                        <p:cond delay="indefinite"/>
-                      </p:stCondLst>
-                      <p:childTnLst>
-                        <p:par>
-                          <p:cTn id="4" fill="hold">
-                            <p:stCondLst>
-                              <p:cond delay="0"/>
-                            </p:stCondLst>
-                            <p:childTnLst>
-                              <p:par>
-                                <p:cTn id="5" presetID="1" presetClass="entr" presetSubtype="0" fill="hold" nodeType="clickEffect">
-                                  <p:stCondLst>
-                                    <p:cond delay="0"/>
-                                  </p:stCondLst>
-                                  <p:childTnLst>
-                                    <p:set>
-                                      <p:cBhvr>
-                                        <p:cTn id="6" dur="1" fill="hold">
-                                          <p:stCondLst>
-                                            <p:cond delay="0"/>
-                                          </p:stCondLst>
-                                        </p:cTn>
-                                        <p:tgtEl>
-                                          <p:spTgt spid="3">
-                                            <p:txEl>
-                                              <p:pRg st="1" end="1"/>
-                                            </p:txEl>
-                                          </p:spTgt>
-                                        </p:tgtEl>
-                                        <p:attrNameLst>
-                                          <p:attrName>style.visibility</p:attrName>
-                                        </p:attrNameLst>
-                                      </p:cBhvr>
-                                      <p:to>
-                                        <p:strVal val="visible"/>
-                                      </p:to>
-                                    </p:set>
-                                  </p:childTnLst>
-                                </p:cTn>
-                              </p:par>
-                              <p:par>
-                                <p:cTn id="7" presetID="1" presetClass="entr" presetSubtype="0" fill="hold" nodeType="withEffect">
-                                  <p:stCondLst>
-                                    <p:cond delay="0"/>
-                                  </p:stCondLst>
-                                  <p:childTnLst>
-                                    <p:set>
-                                      <p:cBhvr>
-                                        <p:cTn id="8" dur="1" fill="hold">
-                                          <p:stCondLst>
-                                            <p:cond delay="0"/>
-                                          </p:stCondLst>
-                                        </p:cTn>
-                                        <p:tgtEl>
-                                          <p:spTgt spid="3">
-                                            <p:txEl>
-                                              <p:pRg st="2" end="2"/>
-                                            </p:txEl>
-                                          </p:spTgt>
-                                        </p:tgtEl>
-                                        <p:attrNameLst>
-                                          <p:attrName>style.visibility</p:attrName>
-                                        </p:attrNameLst>
-                                      </p:cBhvr>
-                                      <p:to>
-                                        <p:strVal val="visible"/>
-                                      </p:to>
-                                    </p:set>
-                                  </p:childTnLst>
-                                </p:cTn>
-                              </p:par>
-                              <p:par>
-                                <p:cTn id="9" presetID="1" presetClass="entr" presetSubtype="0" fill="hold" nodeType="withEffect">
-                                  <p:stCondLst>
-                                    <p:cond delay="0"/>
-                                  </p:stCondLst>
-                                  <p:childTnLst>
-                                    <p:set>
-                                      <p:cBhvr>
-                                        <p:cTn id="10" dur="1" fill="hold">
-                                          <p:stCondLst>
-                                            <p:cond delay="0"/>
-                                          </p:stCondLst>
-                                        </p:cTn>
-                                        <p:tgtEl>
-                                          <p:spTgt spid="3">
-                                            <p:txEl>
-                                              <p:pRg st="3" end="3"/>
-                                            </p:txEl>
-                                          </p:spTgt>
-                                        </p:tgtEl>
-                                        <p:attrNameLst>
-                                          <p:attrName>style.visibility</p:attrName>
-                                        </p:attrNameLst>
-                                      </p:cBhvr>
-                                      <p:to>
-                                        <p:strVal val="visible"/>
-                                      </p:to>
-                                    </p:set>
-                                  </p:childTnLst>
-                                </p:cTn>
-                              </p:par>
-                              <p:par>
-                                <p:cTn id="11" presetID="1" presetClass="entr" presetSubtype="0" fill="hold" nodeType="withEffect">
-                                  <p:stCondLst>
-                                    <p:cond delay="0"/>
-                                  </p:stCondLst>
-                                  <p:childTnLst>
-                                    <p:set>
-                                      <p:cBhvr>
-                                        <p:cTn id="12" dur="1" fill="hold">
-                                          <p:stCondLst>
-                                            <p:cond delay="0"/>
-                                          </p:stCondLst>
-                                        </p:cTn>
-                                        <p:tgtEl>
-                                          <p:spTgt spid="3">
-                                            <p:txEl>
-                                              <p:pRg st="4" end="4"/>
-                                            </p:txEl>
-                                          </p:spTgt>
-                                        </p:tgtEl>
-                                        <p:attrNameLst>
-                                          <p:attrName>style.visibility</p:attrName>
-                                        </p:attrNameLst>
-                                      </p:cBhvr>
-                                      <p:to>
-                                        <p:strVal val="visible"/>
-                                      </p:to>
-                                    </p:set>
-                                  </p:childTnLst>
-                                </p:cTn>
-                              </p:par>
-                            </p:childTnLst>
-                          </p:cTn>
-                        </p:par>
-                      </p:childTnLst>
-                    </p:cTn>
-                  </p:par>
-                  <p:par>
-                    <p:cTn id="13" fill="hold">
-                      <p:stCondLst>
-                        <p:cond delay="indefinite"/>
-                      </p:stCondLst>
-                      <p:childTnLst>
-                        <p:par>
-                          <p:cTn id="14" fill="hold">
-                            <p:stCondLst>
-                              <p:cond delay="0"/>
-                            </p:stCondLst>
-                            <p:childTnLst>
-                              <p:par>
-                                <p:cTn id="15" presetID="1" presetClass="entr" presetSubtype="0" fill="hold" nodeType="clickEffect">
-                                  <p:stCondLst>
-                                    <p:cond delay="0"/>
-                                  </p:stCondLst>
-                                  <p:childTnLst>
-                                    <p:set>
-                                      <p:cBhvr>
-                                        <p:cTn id="16" dur="1" fill="hold">
-                                          <p:stCondLst>
-                                            <p:cond delay="0"/>
-                                          </p:stCondLst>
-                                        </p:cTn>
-                                        <p:tgtEl>
-                                          <p:spTgt spid="3">
-                                            <p:txEl>
-                                              <p:pRg st="5" end="5"/>
-                                            </p:txEl>
-                                          </p:spTgt>
-                                        </p:tgtEl>
-                                        <p:attrNameLst>
-                                          <p:attrName>style.visibility</p:attrName>
-                                        </p:attrNameLst>
-                                      </p:cBhvr>
-                                      <p:to>
-                                        <p:strVal val="visible"/>
-                                      </p:to>
-                                    </p:set>
-                                  </p:childTnLst>
-                                </p:cTn>
-                              </p:par>
-                              <p:par>
-                                <p:cTn id="17" presetID="1" presetClass="entr" presetSubtype="0" fill="hold" nodeType="withEffect">
-                                  <p:stCondLst>
-                                    <p:cond delay="0"/>
-                                  </p:stCondLst>
-                                  <p:childTnLst>
-                                    <p:set>
-                                      <p:cBhvr>
-                                        <p:cTn id="18" dur="1" fill="hold">
-                                          <p:stCondLst>
-                                            <p:cond delay="0"/>
-                                          </p:stCondLst>
-                                        </p:cTn>
-                                        <p:tgtEl>
-                                          <p:spTgt spid="3">
-                                            <p:txEl>
-                                              <p:pRg st="6" end="6"/>
-                                            </p:txEl>
-                                          </p:spTgt>
-                                        </p:tgtEl>
-                                        <p:attrNameLst>
-                                          <p:attrName>style.visibility</p:attrName>
-                                        </p:attrNameLst>
-                                      </p:cBhvr>
-                                      <p:to>
-                                        <p:strVal val="visible"/>
-                                      </p:to>
-                                    </p:set>
-                                  </p:childTnLst>
-                                </p:cTn>
-                              </p:par>
-                            </p:childTnLst>
-                          </p:cTn>
-                        </p:par>
-                      </p:childTnLst>
-                    </p:cTn>
-                  </p:par>
-                </p:childTnLst>
-              </p:cTn>
-              <p:prevCondLst>
-                <p:cond evt="onPrev" delay="0">
-                  <p:tgtEl>
-                    <p:sldTgt/>
-                  </p:tgtEl>
-                </p:cond>
-              </p:prevCondLst>
-              <p:nextCondLst>
-                <p:cond evt="onNext" delay="0">
-                  <p:tgtEl>
-                    <p:sldTgt/>
-                  </p:tgtEl>
-                </p:cond>
-              </p:nextCondLst>
-            </p:seq>
-          </p:childTnLst>
-        </p:cTn>
-      </p:par>
-    </p:tnLst>
-  </p:timing>
 </p:sld>
 </file>
 
@@ -5641,8 +5404,8 @@
           </a:p>
         </p:txBody>
       </p:sp>
-      <mc:AlternateContent xmlns:mc="http://schemas.openxmlformats.org/markup-compatibility/2006">
-        <mc:Choice xmlns:a14="http://schemas.microsoft.com/office/drawing/2010/main" Requires="a14">
+      <mc:AlternateContent xmlns:mc="http://schemas.openxmlformats.org/markup-compatibility/2006" xmlns:a14="http://schemas.microsoft.com/office/drawing/2010/main">
+        <mc:Choice Requires="a14">
           <p:sp>
             <p:nvSpPr>
               <p:cNvPr id="3" name="Content Placeholder 2">
@@ -5818,7 +5581,7 @@
             </p:txBody>
           </p:sp>
         </mc:Choice>
-        <mc:Fallback>
+        <mc:Fallback xmlns="">
           <p:sp>
             <p:nvSpPr>
               <p:cNvPr id="3" name="Content Placeholder 2">
@@ -6324,8 +6087,8 @@
           </a:p>
         </p:txBody>
       </p:sp>
-      <mc:AlternateContent xmlns:mc="http://schemas.openxmlformats.org/markup-compatibility/2006">
-        <mc:Choice xmlns:a14="http://schemas.microsoft.com/office/drawing/2010/main" Requires="a14">
+      <mc:AlternateContent xmlns:mc="http://schemas.openxmlformats.org/markup-compatibility/2006" xmlns:a14="http://schemas.microsoft.com/office/drawing/2010/main">
+        <mc:Choice Requires="a14">
           <p:sp>
             <p:nvSpPr>
               <p:cNvPr id="3" name="Content Placeholder 2">
@@ -6473,7 +6236,7 @@
             </p:txBody>
           </p:sp>
         </mc:Choice>
-        <mc:Fallback>
+        <mc:Fallback xmlns="">
           <p:sp>
             <p:nvSpPr>
               <p:cNvPr id="3" name="Content Placeholder 2">
@@ -9072,7 +8835,7 @@
             </a:r>
             <a:r>
               <a:rPr lang="en-US" dirty="0"/>
-              <a:t> Introduction to Bayes Models</a:t>
+              <a:t> Introduction to Bayes Models </a:t>
             </a:r>
             <a:endParaRPr dirty="0"/>
           </a:p>
@@ -9096,7 +8859,7 @@
             </a:r>
             <a:r>
               <a:rPr lang="en-US" dirty="0"/>
-              <a:t> MCMC for Bayes</a:t>
+              <a:t> MCMC for Bayes </a:t>
             </a:r>
             <a:endParaRPr dirty="0"/>
           </a:p>
@@ -9124,7 +8887,7 @@
             </a:r>
             <a:r>
               <a:rPr lang="en-US" dirty="0"/>
-              <a:t> Hierarchical Bayesian models</a:t>
+              <a:t> Hierarchical Bayesian models </a:t>
             </a:r>
           </a:p>
           <a:p>
@@ -9158,7 +8921,7 @@
             </a:r>
             <a:r>
               <a:rPr lang="en-US" dirty="0"/>
-              <a:t>Modern Time Series Models </a:t>
+              <a:t>Modern Time Series Models or TBD</a:t>
             </a:r>
             <a:endParaRPr dirty="0"/>
           </a:p>
@@ -11321,8 +11084,8 @@
           </a:p>
         </p:txBody>
       </p:sp>
-      <mc:AlternateContent xmlns:mc="http://schemas.openxmlformats.org/markup-compatibility/2006" xmlns:a14="http://schemas.microsoft.com/office/drawing/2010/main">
-        <mc:Choice Requires="a14">
+      <mc:AlternateContent xmlns:mc="http://schemas.openxmlformats.org/markup-compatibility/2006">
+        <mc:Choice xmlns:a14="http://schemas.microsoft.com/office/drawing/2010/main" Requires="a14">
           <p:sp>
             <p:nvSpPr>
               <p:cNvPr id="3" name="Content Placeholder 2">
@@ -11347,7 +11110,7 @@
             </p:spPr>
             <p:txBody>
               <a:bodyPr>
-                <a:normAutofit fontScale="92500" lnSpcReduction="20000"/>
+                <a:normAutofit fontScale="85000" lnSpcReduction="20000"/>
               </a:bodyPr>
               <a:lstStyle/>
               <a:p>
@@ -11456,7 +11219,7 @@
                             <a:rPr lang="en-US" b="0" i="1" smtClean="0">
                               <a:latin typeface="Cambria Math" panose="02040503050406030204" pitchFamily="18" charset="0"/>
                             </a:rPr>
-                            <m:t>𝑛</m:t>
+                            <m:t>𝑟</m:t>
                           </m:r>
                           <m:r>
                             <a:rPr lang="en-US" b="0" i="1" smtClean="0">
@@ -11524,7 +11287,7 @@
                                   <a:rPr lang="en-US" b="0" i="1" smtClean="0">
                                     <a:latin typeface="Cambria Math" panose="02040503050406030204" pitchFamily="18" charset="0"/>
                                   </a:rPr>
-                                  <m:t>𝑛</m:t>
+                                  <m:t>𝑟</m:t>
                                 </m:r>
                                 <m:r>
                                   <a:rPr lang="en-US" b="0" i="1" smtClean="0">
@@ -11546,7 +11309,7 @@
                                   <a:rPr lang="en-US" b="0" i="1" smtClean="0">
                                     <a:latin typeface="Cambria Math" panose="02040503050406030204" pitchFamily="18" charset="0"/>
                                   </a:rPr>
-                                  <m:t>𝑛</m:t>
+                                  <m:t>𝑟</m:t>
                                 </m:r>
                                 <m:r>
                                   <a:rPr lang="en-US" b="0" i="1" smtClean="0">
@@ -11586,7 +11349,7 @@
                             <a:rPr lang="en-US" b="0" i="1" smtClean="0">
                               <a:latin typeface="Cambria Math" panose="02040503050406030204" pitchFamily="18" charset="0"/>
                             </a:rPr>
-                            <m:t>𝑛</m:t>
+                            <m:t>𝑟</m:t>
                           </m:r>
                         </m:sup>
                       </m:sSup>
@@ -11670,6 +11433,30 @@
                       </a:rPr>
                       <m:t>=</m:t>
                     </m:r>
+                    <m:r>
+                      <a:rPr lang="en-US" b="0" i="1" smtClean="0">
+                        <a:latin typeface="Cambria Math" panose="02040503050406030204" pitchFamily="18" charset="0"/>
+                      </a:rPr>
+                      <m:t>𝑘</m:t>
+                    </m:r>
+                    <m:r>
+                      <a:rPr lang="en-US" b="0" i="1" smtClean="0">
+                        <a:latin typeface="Cambria Math" panose="02040503050406030204" pitchFamily="18" charset="0"/>
+                      </a:rPr>
+                      <m:t>+</m:t>
+                    </m:r>
+                    <m:r>
+                      <a:rPr lang="en-US" b="0" i="1" smtClean="0">
+                        <a:latin typeface="Cambria Math" panose="02040503050406030204" pitchFamily="18" charset="0"/>
+                      </a:rPr>
+                      <m:t>𝑟</m:t>
+                    </m:r>
+                    <m:r>
+                      <a:rPr lang="en-US" b="0" i="1" smtClean="0">
+                        <a:latin typeface="Cambria Math" panose="02040503050406030204" pitchFamily="18" charset="0"/>
+                      </a:rPr>
+                      <m:t>=</m:t>
+                    </m:r>
                   </m:oMath>
                 </a14:m>
                 <a:r>
@@ -11684,10 +11471,35 @@
                 <a14:m>
                   <m:oMath xmlns:m="http://schemas.openxmlformats.org/officeDocument/2006/math">
                     <m:r>
+                      <a:rPr lang="en-US" i="1">
+                        <a:latin typeface="Cambria Math" panose="02040503050406030204" pitchFamily="18" charset="0"/>
+                      </a:rPr>
+                      <m:t>𝑘</m:t>
+                    </m:r>
+                    <m:r>
+                      <a:rPr lang="en-US" i="1">
+                        <a:latin typeface="Cambria Math" panose="02040503050406030204" pitchFamily="18" charset="0"/>
+                      </a:rPr>
+                      <m:t>=</m:t>
+                    </m:r>
+                  </m:oMath>
+                </a14:m>
+                <a:r>
+                  <a:rPr lang="en-US" dirty="0"/>
+                  <a:t> number of failures</a:t>
+                </a:r>
+              </a:p>
+              <a:p>
+                <a:pPr marL="342900" lvl="1" indent="0">
+                  <a:buNone/>
+                </a:pPr>
+                <a14:m>
+                  <m:oMath xmlns:m="http://schemas.openxmlformats.org/officeDocument/2006/math">
+                    <m:r>
                       <a:rPr lang="en-US" b="0" i="1" smtClean="0">
                         <a:latin typeface="Cambria Math" panose="02040503050406030204" pitchFamily="18" charset="0"/>
                       </a:rPr>
-                      <m:t>𝑘</m:t>
+                      <m:t>𝑟</m:t>
                     </m:r>
                     <m:r>
                       <a:rPr lang="en-US" b="0" i="1" smtClean="0">
@@ -11885,7 +11697,7 @@
             </p:txBody>
           </p:sp>
         </mc:Choice>
-        <mc:Fallback xmlns="">
+        <mc:Fallback>
           <p:sp>
             <p:nvSpPr>
               <p:cNvPr id="3" name="Content Placeholder 2">
@@ -11910,7 +11722,7 @@
               <a:blipFill>
                 <a:blip r:embed="rId4"/>
                 <a:stretch>
-                  <a:fillRect l="-963" t="-2867"/>
+                  <a:fillRect l="-741" t="-2530"/>
                 </a:stretch>
               </a:blipFill>
             </p:spPr>
@@ -11943,7 +11755,7 @@
 </file>
 
 <file path=ppt/slides/slide25.xml><?xml version="1.0" encoding="utf-8"?>
-<p:sld xmlns:a="http://schemas.openxmlformats.org/drawingml/2006/main" xmlns:r="http://schemas.openxmlformats.org/officeDocument/2006/relationships" xmlns:p="http://schemas.openxmlformats.org/presentationml/2006/main">
+<p:sld xmlns:a="http://schemas.openxmlformats.org/drawingml/2006/main" xmlns:r="http://schemas.openxmlformats.org/officeDocument/2006/relationships" xmlns:p="http://schemas.openxmlformats.org/presentationml/2006/main" show="0">
   <p:cSld>
     <p:spTree>
       <p:nvGrpSpPr>
@@ -11997,8 +11809,8 @@
           </a:p>
         </p:txBody>
       </p:sp>
-      <mc:AlternateContent xmlns:mc="http://schemas.openxmlformats.org/markup-compatibility/2006" xmlns:a14="http://schemas.microsoft.com/office/drawing/2010/main">
-        <mc:Choice Requires="a14">
+      <mc:AlternateContent xmlns:mc="http://schemas.openxmlformats.org/markup-compatibility/2006">
+        <mc:Choice xmlns:a14="http://schemas.microsoft.com/office/drawing/2010/main" Requires="a14">
           <p:sp>
             <p:nvSpPr>
               <p:cNvPr id="3" name="Content Placeholder 2">
@@ -12102,7 +11914,7 @@
                     </m:oMathParaPr>
                     <m:oMath xmlns:m="http://schemas.openxmlformats.org/officeDocument/2006/math">
                       <m:r>
-                        <a:rPr lang="en-US" b="0" i="1" smtClean="0">
+                        <a:rPr lang="en-US" i="1">
                           <a:latin typeface="Cambria Math" panose="02040503050406030204" pitchFamily="18" charset="0"/>
                         </a:rPr>
                         <m:t>𝑓</m:t>
@@ -12110,38 +11922,38 @@
                       <m:d>
                         <m:dPr>
                           <m:ctrlPr>
-                            <a:rPr lang="en-US" b="0" i="1" smtClean="0">
+                            <a:rPr lang="en-US" i="1">
                               <a:latin typeface="Cambria Math" panose="02040503050406030204" pitchFamily="18" charset="0"/>
                             </a:rPr>
                           </m:ctrlPr>
                         </m:dPr>
                         <m:e>
                           <m:r>
-                            <a:rPr lang="en-US" b="0" i="1" smtClean="0">
+                            <a:rPr lang="en-US" i="1">
                               <a:latin typeface="Cambria Math" panose="02040503050406030204" pitchFamily="18" charset="0"/>
                             </a:rPr>
                             <m:t>𝑘</m:t>
                           </m:r>
                           <m:r>
-                            <a:rPr lang="en-US" b="0" i="1" smtClean="0">
+                            <a:rPr lang="en-US" i="1">
                               <a:latin typeface="Cambria Math" panose="02040503050406030204" pitchFamily="18" charset="0"/>
                             </a:rPr>
                             <m:t> | </m:t>
                           </m:r>
                           <m:r>
-                            <a:rPr lang="en-US" b="0" i="1" smtClean="0">
+                            <a:rPr lang="en-US" i="1">
                               <a:latin typeface="Cambria Math" panose="02040503050406030204" pitchFamily="18" charset="0"/>
                             </a:rPr>
-                            <m:t>𝑛</m:t>
+                            <m:t>𝑟</m:t>
                           </m:r>
                           <m:r>
-                            <a:rPr lang="en-US" b="0" i="1" smtClean="0">
+                            <a:rPr lang="en-US" i="1">
                               <a:latin typeface="Cambria Math" panose="02040503050406030204" pitchFamily="18" charset="0"/>
                             </a:rPr>
-                            <m:t>,</m:t>
+                            <m:t>, </m:t>
                           </m:r>
                           <m:r>
-                            <a:rPr lang="en-US" b="0" i="1" smtClean="0">
+                            <a:rPr lang="en-US" i="1">
                               <a:latin typeface="Cambria Math" panose="02040503050406030204" pitchFamily="18" charset="0"/>
                             </a:rPr>
                             <m:t>𝑝</m:t>
@@ -12149,7 +11961,7 @@
                         </m:e>
                       </m:d>
                       <m:r>
-                        <a:rPr lang="en-US" b="0" i="1" smtClean="0">
+                        <a:rPr lang="en-US" i="1">
                           <a:latin typeface="Cambria Math" panose="02040503050406030204" pitchFamily="18" charset="0"/>
                         </a:rPr>
                         <m:t>=</m:t>
@@ -12157,7 +11969,7 @@
                       <m:d>
                         <m:dPr>
                           <m:ctrlPr>
-                            <a:rPr lang="en-US" b="0" i="1" smtClean="0">
+                            <a:rPr lang="en-US" i="1">
                               <a:latin typeface="Cambria Math" panose="02040503050406030204" pitchFamily="18" charset="0"/>
                             </a:rPr>
                           </m:ctrlPr>
@@ -12174,7 +11986,7 @@
                                 </m:mc>
                               </m:mcs>
                               <m:ctrlPr>
-                                <a:rPr lang="en-US" b="0" i="1" smtClean="0">
+                                <a:rPr lang="en-US" i="1">
                                   <a:latin typeface="Cambria Math" panose="02040503050406030204" pitchFamily="18" charset="0"/>
                                 </a:rPr>
                               </m:ctrlPr>
@@ -12185,56 +11997,44 @@
                                   <m:rPr>
                                     <m:brk m:alnAt="7"/>
                                   </m:rPr>
-                                  <a:rPr lang="en-US" b="0" i="1" smtClean="0">
+                                  <a:rPr lang="en-US" i="1">
                                     <a:latin typeface="Cambria Math" panose="02040503050406030204" pitchFamily="18" charset="0"/>
                                   </a:rPr>
                                   <m:t>𝑘</m:t>
                                 </m:r>
                                 <m:r>
-                                  <a:rPr lang="en-US" b="0" i="1" smtClean="0">
+                                  <a:rPr lang="en-US" i="1">
                                     <a:latin typeface="Cambria Math" panose="02040503050406030204" pitchFamily="18" charset="0"/>
                                   </a:rPr>
                                   <m:t>+</m:t>
                                 </m:r>
                                 <m:r>
-                                  <a:rPr lang="en-US" b="0" i="1" smtClean="0">
+                                  <a:rPr lang="en-US" i="1">
                                     <a:latin typeface="Cambria Math" panose="02040503050406030204" pitchFamily="18" charset="0"/>
                                   </a:rPr>
-                                  <m:t>𝑛</m:t>
+                                  <m:t>𝑟</m:t>
                                 </m:r>
                                 <m:r>
-                                  <a:rPr lang="en-US" b="0" i="1" smtClean="0">
+                                  <a:rPr lang="en-US" i="1">
                                     <a:latin typeface="Cambria Math" panose="02040503050406030204" pitchFamily="18" charset="0"/>
                                   </a:rPr>
-                                  <m:t>−</m:t>
-                                </m:r>
-                                <m:r>
-                                  <a:rPr lang="en-US" b="0" i="1" smtClean="0">
-                                    <a:latin typeface="Cambria Math" panose="02040503050406030204" pitchFamily="18" charset="0"/>
-                                  </a:rPr>
-                                  <m:t>1</m:t>
+                                  <m:t>−1</m:t>
                                 </m:r>
                               </m:e>
                             </m:mr>
                             <m:mr>
                               <m:e>
                                 <m:r>
-                                  <a:rPr lang="en-US" b="0" i="1" smtClean="0">
+                                  <a:rPr lang="en-US" i="1">
                                     <a:latin typeface="Cambria Math" panose="02040503050406030204" pitchFamily="18" charset="0"/>
                                   </a:rPr>
-                                  <m:t>𝑛</m:t>
+                                  <m:t>𝑟</m:t>
                                 </m:r>
                                 <m:r>
-                                  <a:rPr lang="en-US" b="0" i="1" smtClean="0">
+                                  <a:rPr lang="en-US" i="1">
                                     <a:latin typeface="Cambria Math" panose="02040503050406030204" pitchFamily="18" charset="0"/>
                                   </a:rPr>
-                                  <m:t>−</m:t>
-                                </m:r>
-                                <m:r>
-                                  <a:rPr lang="en-US" b="0" i="1" smtClean="0">
-                                    <a:latin typeface="Cambria Math" panose="02040503050406030204" pitchFamily="18" charset="0"/>
-                                  </a:rPr>
-                                  <m:t>1</m:t>
+                                  <m:t>−1</m:t>
                                 </m:r>
                               </m:e>
                             </m:mr>
@@ -12244,14 +12044,14 @@
                       <m:sSup>
                         <m:sSupPr>
                           <m:ctrlPr>
-                            <a:rPr lang="en-US" b="0" i="1" smtClean="0">
+                            <a:rPr lang="en-US" i="1">
                               <a:latin typeface="Cambria Math" panose="02040503050406030204" pitchFamily="18" charset="0"/>
                             </a:rPr>
                           </m:ctrlPr>
                         </m:sSupPr>
                         <m:e>
                           <m:r>
-                            <a:rPr lang="en-US" b="0" i="1" smtClean="0">
+                            <a:rPr lang="en-US" i="1">
                               <a:latin typeface="Cambria Math" panose="02040503050406030204" pitchFamily="18" charset="0"/>
                             </a:rPr>
                             <m:t>𝑝</m:t>
@@ -12259,17 +12059,17 @@
                         </m:e>
                         <m:sup>
                           <m:r>
-                            <a:rPr lang="en-US" b="0" i="1" smtClean="0">
+                            <a:rPr lang="en-US" i="1">
                               <a:latin typeface="Cambria Math" panose="02040503050406030204" pitchFamily="18" charset="0"/>
                             </a:rPr>
-                            <m:t>𝑛</m:t>
+                            <m:t>𝑟</m:t>
                           </m:r>
                         </m:sup>
                       </m:sSup>
                       <m:sSup>
                         <m:sSupPr>
                           <m:ctrlPr>
-                            <a:rPr lang="en-US" b="0" i="1" smtClean="0">
+                            <a:rPr lang="en-US" i="1">
                               <a:latin typeface="Cambria Math" panose="02040503050406030204" pitchFamily="18" charset="0"/>
                             </a:rPr>
                           </m:ctrlPr>
@@ -12278,26 +12078,20 @@
                           <m:d>
                             <m:dPr>
                               <m:ctrlPr>
-                                <a:rPr lang="en-US" b="0" i="1" smtClean="0">
+                                <a:rPr lang="en-US" i="1">
                                   <a:latin typeface="Cambria Math" panose="02040503050406030204" pitchFamily="18" charset="0"/>
                                 </a:rPr>
                               </m:ctrlPr>
                             </m:dPr>
                             <m:e>
                               <m:r>
-                                <a:rPr lang="en-US" b="0" i="1" smtClean="0">
+                                <a:rPr lang="en-US" i="1">
                                   <a:latin typeface="Cambria Math" panose="02040503050406030204" pitchFamily="18" charset="0"/>
                                 </a:rPr>
-                                <m:t>1</m:t>
+                                <m:t>1−</m:t>
                               </m:r>
                               <m:r>
-                                <a:rPr lang="en-US" b="0" i="1" smtClean="0">
-                                  <a:latin typeface="Cambria Math" panose="02040503050406030204" pitchFamily="18" charset="0"/>
-                                </a:rPr>
-                                <m:t>−</m:t>
-                              </m:r>
-                              <m:r>
-                                <a:rPr lang="en-US" b="0" i="1" smtClean="0">
+                                <a:rPr lang="en-US" i="1">
                                   <a:latin typeface="Cambria Math" panose="02040503050406030204" pitchFamily="18" charset="0"/>
                                 </a:rPr>
                                 <m:t>𝑝</m:t>
@@ -12307,7 +12101,7 @@
                         </m:e>
                         <m:sup>
                           <m:r>
-                            <a:rPr lang="en-US" b="0" i="1" smtClean="0">
+                            <a:rPr lang="en-US" i="1">
                               <a:latin typeface="Cambria Math" panose="02040503050406030204" pitchFamily="18" charset="0"/>
                             </a:rPr>
                             <m:t>𝑘</m:t>
@@ -12669,7 +12463,7 @@
             </p:txBody>
           </p:sp>
         </mc:Choice>
-        <mc:Fallback xmlns="">
+        <mc:Fallback>
           <p:sp>
             <p:nvSpPr>
               <p:cNvPr id="3" name="Content Placeholder 2">
@@ -12971,8 +12765,8 @@
           </a:p>
         </p:txBody>
       </p:sp>
-      <mc:AlternateContent xmlns:mc="http://schemas.openxmlformats.org/markup-compatibility/2006" xmlns:a14="http://schemas.microsoft.com/office/drawing/2010/main">
-        <mc:Choice Requires="a14">
+      <mc:AlternateContent xmlns:mc="http://schemas.openxmlformats.org/markup-compatibility/2006">
+        <mc:Choice xmlns:a14="http://schemas.microsoft.com/office/drawing/2010/main" Requires="a14">
           <p:sp>
             <p:nvSpPr>
               <p:cNvPr id="3" name="Content Placeholder 2">
@@ -12997,7 +12791,7 @@
             </p:spPr>
             <p:txBody>
               <a:bodyPr>
-                <a:normAutofit fontScale="85000" lnSpcReduction="20000"/>
+                <a:normAutofit fontScale="92500" lnSpcReduction="10000"/>
               </a:bodyPr>
               <a:lstStyle/>
               <a:p>
@@ -13121,91 +12915,6 @@
                       <m:jc m:val="centerGroup"/>
                     </m:oMathParaPr>
                     <m:oMath xmlns:m="http://schemas.openxmlformats.org/officeDocument/2006/math">
-                      <m:sSup>
-                        <m:sSupPr>
-                          <m:ctrlPr>
-                            <a:rPr lang="en-US" i="1">
-                              <a:latin typeface="Cambria Math" panose="02040503050406030204" pitchFamily="18" charset="0"/>
-                            </a:rPr>
-                          </m:ctrlPr>
-                        </m:sSupPr>
-                        <m:e>
-                          <m:r>
-                            <a:rPr lang="en-US" i="1">
-                              <a:latin typeface="Cambria Math" panose="02040503050406030204" pitchFamily="18" charset="0"/>
-                              <a:ea typeface="Cambria Math" panose="02040503050406030204" pitchFamily="18" charset="0"/>
-                            </a:rPr>
-                            <m:t>𝜎</m:t>
-                          </m:r>
-                        </m:e>
-                        <m:sup>
-                          <m:r>
-                            <a:rPr lang="en-US" i="1">
-                              <a:latin typeface="Cambria Math" panose="02040503050406030204" pitchFamily="18" charset="0"/>
-                            </a:rPr>
-                            <m:t>2</m:t>
-                          </m:r>
-                        </m:sup>
-                      </m:sSup>
-                      <m:r>
-                        <a:rPr lang="en-US" i="1">
-                          <a:latin typeface="Cambria Math" panose="02040503050406030204" pitchFamily="18" charset="0"/>
-                        </a:rPr>
-                        <m:t>=</m:t>
-                      </m:r>
-                      <m:r>
-                        <a:rPr lang="en-US" i="1">
-                          <a:latin typeface="Cambria Math" panose="02040503050406030204" pitchFamily="18" charset="0"/>
-                          <a:ea typeface="Cambria Math" panose="02040503050406030204" pitchFamily="18" charset="0"/>
-                        </a:rPr>
-                        <m:t>𝜇</m:t>
-                      </m:r>
-                      <m:r>
-                        <a:rPr lang="en-US" i="1">
-                          <a:latin typeface="Cambria Math" panose="02040503050406030204" pitchFamily="18" charset="0"/>
-                          <a:ea typeface="Cambria Math" panose="02040503050406030204" pitchFamily="18" charset="0"/>
-                        </a:rPr>
-                        <m:t>+</m:t>
-                      </m:r>
-                      <m:r>
-                        <a:rPr lang="en-US" i="1">
-                          <a:latin typeface="Cambria Math" panose="02040503050406030204" pitchFamily="18" charset="0"/>
-                          <a:ea typeface="Cambria Math" panose="02040503050406030204" pitchFamily="18" charset="0"/>
-                        </a:rPr>
-                        <m:t>𝛼</m:t>
-                      </m:r>
-                      <m:sSup>
-                        <m:sSupPr>
-                          <m:ctrlPr>
-                            <a:rPr lang="en-US" i="1">
-                              <a:latin typeface="Cambria Math" panose="02040503050406030204" pitchFamily="18" charset="0"/>
-                            </a:rPr>
-                          </m:ctrlPr>
-                        </m:sSupPr>
-                        <m:e>
-                          <m:r>
-                            <a:rPr lang="en-US" i="1">
-                              <a:latin typeface="Cambria Math" panose="02040503050406030204" pitchFamily="18" charset="0"/>
-                              <a:ea typeface="Cambria Math" panose="02040503050406030204" pitchFamily="18" charset="0"/>
-                            </a:rPr>
-                            <m:t>𝜇</m:t>
-                          </m:r>
-                        </m:e>
-                        <m:sup>
-                          <m:r>
-                            <a:rPr lang="en-US" i="1">
-                              <a:latin typeface="Cambria Math" panose="02040503050406030204" pitchFamily="18" charset="0"/>
-                            </a:rPr>
-                            <m:t>2</m:t>
-                          </m:r>
-                        </m:sup>
-                      </m:sSup>
-                      <m:r>
-                        <a:rPr lang="en-US" b="0" i="1" smtClean="0">
-                          <a:latin typeface="Cambria Math" panose="02040503050406030204" pitchFamily="18" charset="0"/>
-                        </a:rPr>
-                        <m:t>,  </m:t>
-                      </m:r>
                       <m:r>
                         <a:rPr lang="en-US" b="0" i="1" smtClean="0">
                           <a:latin typeface="Cambria Math" panose="02040503050406030204" pitchFamily="18" charset="0"/>
@@ -13274,7 +12983,935 @@
                         <a:rPr lang="en-US" b="0" i="1" smtClean="0">
                           <a:latin typeface="Cambria Math" panose="02040503050406030204" pitchFamily="18" charset="0"/>
                         </a:rPr>
-                        <m:t>𝑛</m:t>
+                        <m:t>𝑟</m:t>
+                      </m:r>
+                      <m:r>
+                        <a:rPr lang="en-US" b="0" i="1" smtClean="0">
+                          <a:latin typeface="Cambria Math" panose="02040503050406030204" pitchFamily="18" charset="0"/>
+                        </a:rPr>
+                        <m:t>=</m:t>
+                      </m:r>
+                      <m:f>
+                        <m:fPr>
+                          <m:ctrlPr>
+                            <a:rPr lang="en-US" b="0" i="1" smtClean="0">
+                              <a:latin typeface="Cambria Math" panose="02040503050406030204" pitchFamily="18" charset="0"/>
+                            </a:rPr>
+                          </m:ctrlPr>
+                        </m:fPr>
+                        <m:num>
+                          <m:sSup>
+                            <m:sSupPr>
+                              <m:ctrlPr>
+                                <a:rPr lang="en-US" b="0" i="1" smtClean="0">
+                                  <a:latin typeface="Cambria Math" panose="02040503050406030204" pitchFamily="18" charset="0"/>
+                                </a:rPr>
+                              </m:ctrlPr>
+                            </m:sSupPr>
+                            <m:e>
+                              <m:r>
+                                <a:rPr lang="en-US" b="0" i="1" smtClean="0">
+                                  <a:latin typeface="Cambria Math" panose="02040503050406030204" pitchFamily="18" charset="0"/>
+                                  <a:ea typeface="Cambria Math" panose="02040503050406030204" pitchFamily="18" charset="0"/>
+                                </a:rPr>
+                                <m:t>𝜇</m:t>
+                              </m:r>
+                            </m:e>
+                            <m:sup>
+                              <m:r>
+                                <a:rPr lang="en-US" b="0" i="1" smtClean="0">
+                                  <a:latin typeface="Cambria Math" panose="02040503050406030204" pitchFamily="18" charset="0"/>
+                                </a:rPr>
+                                <m:t>2</m:t>
+                              </m:r>
+                            </m:sup>
+                          </m:sSup>
+                        </m:num>
+                        <m:den>
+                          <m:sSup>
+                            <m:sSupPr>
+                              <m:ctrlPr>
+                                <a:rPr lang="en-US" i="1">
+                                  <a:latin typeface="Cambria Math" panose="02040503050406030204" pitchFamily="18" charset="0"/>
+                                </a:rPr>
+                              </m:ctrlPr>
+                            </m:sSupPr>
+                            <m:e>
+                              <m:r>
+                                <a:rPr lang="en-US" i="1">
+                                  <a:latin typeface="Cambria Math" panose="02040503050406030204" pitchFamily="18" charset="0"/>
+                                  <a:ea typeface="Cambria Math" panose="02040503050406030204" pitchFamily="18" charset="0"/>
+                                </a:rPr>
+                                <m:t>𝜎</m:t>
+                              </m:r>
+                            </m:e>
+                            <m:sup>
+                              <m:r>
+                                <a:rPr lang="en-US" i="1">
+                                  <a:latin typeface="Cambria Math" panose="02040503050406030204" pitchFamily="18" charset="0"/>
+                                </a:rPr>
+                                <m:t>2</m:t>
+                              </m:r>
+                            </m:sup>
+                          </m:sSup>
+                          <m:r>
+                            <a:rPr lang="en-US" b="0" i="1" smtClean="0">
+                              <a:latin typeface="Cambria Math" panose="02040503050406030204" pitchFamily="18" charset="0"/>
+                            </a:rPr>
+                            <m:t>−</m:t>
+                          </m:r>
+                          <m:r>
+                            <a:rPr lang="en-US" i="1">
+                              <a:latin typeface="Cambria Math" panose="02040503050406030204" pitchFamily="18" charset="0"/>
+                              <a:ea typeface="Cambria Math" panose="02040503050406030204" pitchFamily="18" charset="0"/>
+                            </a:rPr>
+                            <m:t>𝜇</m:t>
+                          </m:r>
+                        </m:den>
+                      </m:f>
+                    </m:oMath>
+                  </m:oMathPara>
+                </a14:m>
+                <a:endParaRPr lang="en-US" dirty="0"/>
+              </a:p>
+              <a:p>
+                <a:r>
+                  <a:rPr lang="en-US" dirty="0"/>
+                  <a:t>The form of the negative binomial distribution is then   </a:t>
+                </a:r>
+              </a:p>
+              <a:p>
+                <a:pPr marL="0" indent="0">
+                  <a:buNone/>
+                </a:pPr>
+                <a14:m>
+                  <m:oMathPara xmlns:m="http://schemas.openxmlformats.org/officeDocument/2006/math">
+                    <m:oMathParaPr>
+                      <m:jc m:val="centerGroup"/>
+                    </m:oMathParaPr>
+                    <m:oMath xmlns:m="http://schemas.openxmlformats.org/officeDocument/2006/math">
+                      <m:r>
+                        <a:rPr lang="en-US" i="1">
+                          <a:latin typeface="Cambria Math" panose="02040503050406030204" pitchFamily="18" charset="0"/>
+                        </a:rPr>
+                        <m:t>𝑓</m:t>
+                      </m:r>
+                      <m:d>
+                        <m:dPr>
+                          <m:ctrlPr>
+                            <a:rPr lang="en-US" i="1">
+                              <a:latin typeface="Cambria Math" panose="02040503050406030204" pitchFamily="18" charset="0"/>
+                            </a:rPr>
+                          </m:ctrlPr>
+                        </m:dPr>
+                        <m:e>
+                          <m:r>
+                            <a:rPr lang="en-US" i="1">
+                              <a:latin typeface="Cambria Math" panose="02040503050406030204" pitchFamily="18" charset="0"/>
+                            </a:rPr>
+                            <m:t>𝑘</m:t>
+                          </m:r>
+                          <m:r>
+                            <a:rPr lang="en-US" i="1">
+                              <a:latin typeface="Cambria Math" panose="02040503050406030204" pitchFamily="18" charset="0"/>
+                            </a:rPr>
+                            <m:t> | </m:t>
+                          </m:r>
+                          <m:r>
+                            <a:rPr lang="en-US" i="1">
+                              <a:latin typeface="Cambria Math" panose="02040503050406030204" pitchFamily="18" charset="0"/>
+                            </a:rPr>
+                            <m:t>𝑟</m:t>
+                          </m:r>
+                          <m:r>
+                            <a:rPr lang="en-US" i="1">
+                              <a:latin typeface="Cambria Math" panose="02040503050406030204" pitchFamily="18" charset="0"/>
+                            </a:rPr>
+                            <m:t>, </m:t>
+                          </m:r>
+                          <m:r>
+                            <a:rPr lang="en-US" i="1">
+                              <a:latin typeface="Cambria Math" panose="02040503050406030204" pitchFamily="18" charset="0"/>
+                            </a:rPr>
+                            <m:t>𝑝</m:t>
+                          </m:r>
+                        </m:e>
+                      </m:d>
+                      <m:r>
+                        <a:rPr lang="en-US" i="1">
+                          <a:latin typeface="Cambria Math" panose="02040503050406030204" pitchFamily="18" charset="0"/>
+                        </a:rPr>
+                        <m:t>=</m:t>
+                      </m:r>
+                      <m:d>
+                        <m:dPr>
+                          <m:ctrlPr>
+                            <a:rPr lang="en-US" i="1">
+                              <a:latin typeface="Cambria Math" panose="02040503050406030204" pitchFamily="18" charset="0"/>
+                            </a:rPr>
+                          </m:ctrlPr>
+                        </m:dPr>
+                        <m:e>
+                          <m:m>
+                            <m:mPr>
+                              <m:mcs>
+                                <m:mc>
+                                  <m:mcPr>
+                                    <m:count m:val="1"/>
+                                    <m:mcJc m:val="center"/>
+                                  </m:mcPr>
+                                </m:mc>
+                              </m:mcs>
+                              <m:ctrlPr>
+                                <a:rPr lang="en-US" i="1">
+                                  <a:latin typeface="Cambria Math" panose="02040503050406030204" pitchFamily="18" charset="0"/>
+                                </a:rPr>
+                              </m:ctrlPr>
+                            </m:mPr>
+                            <m:mr>
+                              <m:e>
+                                <m:r>
+                                  <m:rPr>
+                                    <m:brk m:alnAt="7"/>
+                                  </m:rPr>
+                                  <a:rPr lang="en-US" i="1">
+                                    <a:latin typeface="Cambria Math" panose="02040503050406030204" pitchFamily="18" charset="0"/>
+                                  </a:rPr>
+                                  <m:t>𝑘</m:t>
+                                </m:r>
+                                <m:r>
+                                  <a:rPr lang="en-US" i="1">
+                                    <a:latin typeface="Cambria Math" panose="02040503050406030204" pitchFamily="18" charset="0"/>
+                                  </a:rPr>
+                                  <m:t>+</m:t>
+                                </m:r>
+                                <m:f>
+                                  <m:fPr>
+                                    <m:ctrlPr>
+                                      <a:rPr lang="en-US" i="1">
+                                        <a:latin typeface="Cambria Math" panose="02040503050406030204" pitchFamily="18" charset="0"/>
+                                      </a:rPr>
+                                    </m:ctrlPr>
+                                  </m:fPr>
+                                  <m:num>
+                                    <m:sSup>
+                                      <m:sSupPr>
+                                        <m:ctrlPr>
+                                          <a:rPr lang="en-US" i="1">
+                                            <a:latin typeface="Cambria Math" panose="02040503050406030204" pitchFamily="18" charset="0"/>
+                                          </a:rPr>
+                                        </m:ctrlPr>
+                                      </m:sSupPr>
+                                      <m:e>
+                                        <m:r>
+                                          <a:rPr lang="en-US" i="1">
+                                            <a:latin typeface="Cambria Math" panose="02040503050406030204" pitchFamily="18" charset="0"/>
+                                            <a:ea typeface="Cambria Math" panose="02040503050406030204" pitchFamily="18" charset="0"/>
+                                          </a:rPr>
+                                          <m:t>𝜇</m:t>
+                                        </m:r>
+                                      </m:e>
+                                      <m:sup>
+                                        <m:r>
+                                          <a:rPr lang="en-US" i="1">
+                                            <a:latin typeface="Cambria Math" panose="02040503050406030204" pitchFamily="18" charset="0"/>
+                                          </a:rPr>
+                                          <m:t>2</m:t>
+                                        </m:r>
+                                      </m:sup>
+                                    </m:sSup>
+                                  </m:num>
+                                  <m:den>
+                                    <m:sSup>
+                                      <m:sSupPr>
+                                        <m:ctrlPr>
+                                          <a:rPr lang="en-US" i="1">
+                                            <a:latin typeface="Cambria Math" panose="02040503050406030204" pitchFamily="18" charset="0"/>
+                                          </a:rPr>
+                                        </m:ctrlPr>
+                                      </m:sSupPr>
+                                      <m:e>
+                                        <m:r>
+                                          <a:rPr lang="en-US" i="1">
+                                            <a:latin typeface="Cambria Math" panose="02040503050406030204" pitchFamily="18" charset="0"/>
+                                            <a:ea typeface="Cambria Math" panose="02040503050406030204" pitchFamily="18" charset="0"/>
+                                          </a:rPr>
+                                          <m:t>𝜎</m:t>
+                                        </m:r>
+                                      </m:e>
+                                      <m:sup>
+                                        <m:r>
+                                          <a:rPr lang="en-US" i="1">
+                                            <a:latin typeface="Cambria Math" panose="02040503050406030204" pitchFamily="18" charset="0"/>
+                                          </a:rPr>
+                                          <m:t>2</m:t>
+                                        </m:r>
+                                      </m:sup>
+                                    </m:sSup>
+                                    <m:r>
+                                      <a:rPr lang="en-US" i="1">
+                                        <a:latin typeface="Cambria Math" panose="02040503050406030204" pitchFamily="18" charset="0"/>
+                                      </a:rPr>
+                                      <m:t>−</m:t>
+                                    </m:r>
+                                    <m:r>
+                                      <a:rPr lang="en-US" i="1">
+                                        <a:latin typeface="Cambria Math" panose="02040503050406030204" pitchFamily="18" charset="0"/>
+                                        <a:ea typeface="Cambria Math" panose="02040503050406030204" pitchFamily="18" charset="0"/>
+                                      </a:rPr>
+                                      <m:t>𝜇</m:t>
+                                    </m:r>
+                                  </m:den>
+                                </m:f>
+                                <m:r>
+                                  <a:rPr lang="en-US" i="1">
+                                    <a:latin typeface="Cambria Math" panose="02040503050406030204" pitchFamily="18" charset="0"/>
+                                  </a:rPr>
+                                  <m:t>−</m:t>
+                                </m:r>
+                                <m:r>
+                                  <a:rPr lang="en-US" i="1">
+                                    <a:latin typeface="Cambria Math" panose="02040503050406030204" pitchFamily="18" charset="0"/>
+                                  </a:rPr>
+                                  <m:t>1</m:t>
+                                </m:r>
+                              </m:e>
+                            </m:mr>
+                            <m:mr>
+                              <m:e>
+                                <m:r>
+                                  <a:rPr lang="en-US" b="0" i="1" smtClean="0">
+                                    <a:latin typeface="Cambria Math" panose="02040503050406030204" pitchFamily="18" charset="0"/>
+                                  </a:rPr>
+                                  <m:t>𝑘</m:t>
+                                </m:r>
+                              </m:e>
+                            </m:mr>
+                          </m:m>
+                        </m:e>
+                      </m:d>
+                      <m:sSup>
+                        <m:sSupPr>
+                          <m:ctrlPr>
+                            <a:rPr lang="en-US" i="1">
+                              <a:latin typeface="Cambria Math" panose="02040503050406030204" pitchFamily="18" charset="0"/>
+                            </a:rPr>
+                          </m:ctrlPr>
+                        </m:sSupPr>
+                        <m:e>
+                          <m:d>
+                            <m:dPr>
+                              <m:ctrlPr>
+                                <a:rPr lang="en-US" i="1">
+                                  <a:latin typeface="Cambria Math" panose="02040503050406030204" pitchFamily="18" charset="0"/>
+                                </a:rPr>
+                              </m:ctrlPr>
+                            </m:dPr>
+                            <m:e>
+                              <m:r>
+                                <a:rPr lang="en-US" i="1">
+                                  <a:latin typeface="Cambria Math" panose="02040503050406030204" pitchFamily="18" charset="0"/>
+                                </a:rPr>
+                                <m:t>1</m:t>
+                              </m:r>
+                              <m:r>
+                                <a:rPr lang="en-US" i="1">
+                                  <a:latin typeface="Cambria Math" panose="02040503050406030204" pitchFamily="18" charset="0"/>
+                                </a:rPr>
+                                <m:t>−</m:t>
+                              </m:r>
+                              <m:f>
+                                <m:fPr>
+                                  <m:ctrlPr>
+                                    <a:rPr lang="en-US" i="1">
+                                      <a:latin typeface="Cambria Math" panose="02040503050406030204" pitchFamily="18" charset="0"/>
+                                    </a:rPr>
+                                  </m:ctrlPr>
+                                </m:fPr>
+                                <m:num>
+                                  <m:sSup>
+                                    <m:sSupPr>
+                                      <m:ctrlPr>
+                                        <a:rPr lang="en-US" i="1">
+                                          <a:latin typeface="Cambria Math" panose="02040503050406030204" pitchFamily="18" charset="0"/>
+                                        </a:rPr>
+                                      </m:ctrlPr>
+                                    </m:sSupPr>
+                                    <m:e>
+                                      <m:r>
+                                        <a:rPr lang="en-US" i="1">
+                                          <a:latin typeface="Cambria Math" panose="02040503050406030204" pitchFamily="18" charset="0"/>
+                                          <a:ea typeface="Cambria Math" panose="02040503050406030204" pitchFamily="18" charset="0"/>
+                                        </a:rPr>
+                                        <m:t>𝜇</m:t>
+                                      </m:r>
+                                    </m:e>
+                                    <m:sup>
+                                      <m:r>
+                                        <a:rPr lang="en-US" b="0" i="1" smtClean="0">
+                                          <a:latin typeface="Cambria Math" panose="02040503050406030204" pitchFamily="18" charset="0"/>
+                                          <a:ea typeface="Cambria Math" panose="02040503050406030204" pitchFamily="18" charset="0"/>
+                                        </a:rPr>
+                                        <m:t> </m:t>
+                                      </m:r>
+                                    </m:sup>
+                                  </m:sSup>
+                                </m:num>
+                                <m:den>
+                                  <m:sSup>
+                                    <m:sSupPr>
+                                      <m:ctrlPr>
+                                        <a:rPr lang="en-US" i="1">
+                                          <a:latin typeface="Cambria Math" panose="02040503050406030204" pitchFamily="18" charset="0"/>
+                                        </a:rPr>
+                                      </m:ctrlPr>
+                                    </m:sSupPr>
+                                    <m:e>
+                                      <m:r>
+                                        <a:rPr lang="en-US" i="1">
+                                          <a:latin typeface="Cambria Math" panose="02040503050406030204" pitchFamily="18" charset="0"/>
+                                          <a:ea typeface="Cambria Math" panose="02040503050406030204" pitchFamily="18" charset="0"/>
+                                        </a:rPr>
+                                        <m:t>𝜎</m:t>
+                                      </m:r>
+                                    </m:e>
+                                    <m:sup>
+                                      <m:r>
+                                        <a:rPr lang="en-US" i="1">
+                                          <a:latin typeface="Cambria Math" panose="02040503050406030204" pitchFamily="18" charset="0"/>
+                                        </a:rPr>
+                                        <m:t>2</m:t>
+                                      </m:r>
+                                    </m:sup>
+                                  </m:sSup>
+                                </m:den>
+                              </m:f>
+                            </m:e>
+                          </m:d>
+                        </m:e>
+                        <m:sup>
+                          <m:r>
+                            <a:rPr lang="en-US" i="1">
+                              <a:latin typeface="Cambria Math" panose="02040503050406030204" pitchFamily="18" charset="0"/>
+                            </a:rPr>
+                            <m:t>𝑘</m:t>
+                          </m:r>
+                        </m:sup>
+                      </m:sSup>
+                      <m:sSup>
+                        <m:sSupPr>
+                          <m:ctrlPr>
+                            <a:rPr lang="en-US" i="1">
+                              <a:latin typeface="Cambria Math" panose="02040503050406030204" pitchFamily="18" charset="0"/>
+                            </a:rPr>
+                          </m:ctrlPr>
+                        </m:sSupPr>
+                        <m:e>
+                          <m:d>
+                            <m:dPr>
+                              <m:ctrlPr>
+                                <a:rPr lang="en-US" i="1">
+                                  <a:latin typeface="Cambria Math" panose="02040503050406030204" pitchFamily="18" charset="0"/>
+                                </a:rPr>
+                              </m:ctrlPr>
+                            </m:dPr>
+                            <m:e>
+                              <m:f>
+                                <m:fPr>
+                                  <m:ctrlPr>
+                                    <a:rPr lang="en-US" i="1">
+                                      <a:latin typeface="Cambria Math" panose="02040503050406030204" pitchFamily="18" charset="0"/>
+                                    </a:rPr>
+                                  </m:ctrlPr>
+                                </m:fPr>
+                                <m:num>
+                                  <m:sSup>
+                                    <m:sSupPr>
+                                      <m:ctrlPr>
+                                        <a:rPr lang="en-US" i="1">
+                                          <a:latin typeface="Cambria Math" panose="02040503050406030204" pitchFamily="18" charset="0"/>
+                                        </a:rPr>
+                                      </m:ctrlPr>
+                                    </m:sSupPr>
+                                    <m:e>
+                                      <m:r>
+                                        <a:rPr lang="en-US" i="1">
+                                          <a:latin typeface="Cambria Math" panose="02040503050406030204" pitchFamily="18" charset="0"/>
+                                          <a:ea typeface="Cambria Math" panose="02040503050406030204" pitchFamily="18" charset="0"/>
+                                        </a:rPr>
+                                        <m:t>𝜇</m:t>
+                                      </m:r>
+                                    </m:e>
+                                    <m:sup>
+                                      <m:r>
+                                        <a:rPr lang="en-US" i="1">
+                                          <a:latin typeface="Cambria Math" panose="02040503050406030204" pitchFamily="18" charset="0"/>
+                                          <a:ea typeface="Cambria Math" panose="02040503050406030204" pitchFamily="18" charset="0"/>
+                                        </a:rPr>
+                                        <m:t> </m:t>
+                                      </m:r>
+                                    </m:sup>
+                                  </m:sSup>
+                                </m:num>
+                                <m:den>
+                                  <m:sSup>
+                                    <m:sSupPr>
+                                      <m:ctrlPr>
+                                        <a:rPr lang="en-US" i="1">
+                                          <a:latin typeface="Cambria Math" panose="02040503050406030204" pitchFamily="18" charset="0"/>
+                                        </a:rPr>
+                                      </m:ctrlPr>
+                                    </m:sSupPr>
+                                    <m:e>
+                                      <m:r>
+                                        <a:rPr lang="en-US" i="1">
+                                          <a:latin typeface="Cambria Math" panose="02040503050406030204" pitchFamily="18" charset="0"/>
+                                          <a:ea typeface="Cambria Math" panose="02040503050406030204" pitchFamily="18" charset="0"/>
+                                        </a:rPr>
+                                        <m:t>𝜎</m:t>
+                                      </m:r>
+                                    </m:e>
+                                    <m:sup>
+                                      <m:r>
+                                        <a:rPr lang="en-US" i="1">
+                                          <a:latin typeface="Cambria Math" panose="02040503050406030204" pitchFamily="18" charset="0"/>
+                                        </a:rPr>
+                                        <m:t>2</m:t>
+                                      </m:r>
+                                    </m:sup>
+                                  </m:sSup>
+                                </m:den>
+                              </m:f>
+                            </m:e>
+                          </m:d>
+                        </m:e>
+                        <m:sup>
+                          <m:f>
+                            <m:fPr>
+                              <m:ctrlPr>
+                                <a:rPr lang="en-US" i="1">
+                                  <a:latin typeface="Cambria Math" panose="02040503050406030204" pitchFamily="18" charset="0"/>
+                                </a:rPr>
+                              </m:ctrlPr>
+                            </m:fPr>
+                            <m:num>
+                              <m:sSup>
+                                <m:sSupPr>
+                                  <m:ctrlPr>
+                                    <a:rPr lang="en-US" i="1">
+                                      <a:latin typeface="Cambria Math" panose="02040503050406030204" pitchFamily="18" charset="0"/>
+                                    </a:rPr>
+                                  </m:ctrlPr>
+                                </m:sSupPr>
+                                <m:e>
+                                  <m:r>
+                                    <a:rPr lang="en-US" i="1">
+                                      <a:latin typeface="Cambria Math" panose="02040503050406030204" pitchFamily="18" charset="0"/>
+                                      <a:ea typeface="Cambria Math" panose="02040503050406030204" pitchFamily="18" charset="0"/>
+                                    </a:rPr>
+                                    <m:t>𝜇</m:t>
+                                  </m:r>
+                                </m:e>
+                                <m:sup>
+                                  <m:r>
+                                    <a:rPr lang="en-US" i="1">
+                                      <a:latin typeface="Cambria Math" panose="02040503050406030204" pitchFamily="18" charset="0"/>
+                                    </a:rPr>
+                                    <m:t>2</m:t>
+                                  </m:r>
+                                </m:sup>
+                              </m:sSup>
+                            </m:num>
+                            <m:den>
+                              <m:sSup>
+                                <m:sSupPr>
+                                  <m:ctrlPr>
+                                    <a:rPr lang="en-US" i="1">
+                                      <a:latin typeface="Cambria Math" panose="02040503050406030204" pitchFamily="18" charset="0"/>
+                                    </a:rPr>
+                                  </m:ctrlPr>
+                                </m:sSupPr>
+                                <m:e>
+                                  <m:r>
+                                    <a:rPr lang="en-US" i="1">
+                                      <a:latin typeface="Cambria Math" panose="02040503050406030204" pitchFamily="18" charset="0"/>
+                                      <a:ea typeface="Cambria Math" panose="02040503050406030204" pitchFamily="18" charset="0"/>
+                                    </a:rPr>
+                                    <m:t>𝜎</m:t>
+                                  </m:r>
+                                </m:e>
+                                <m:sup>
+                                  <m:r>
+                                    <a:rPr lang="en-US" i="1">
+                                      <a:latin typeface="Cambria Math" panose="02040503050406030204" pitchFamily="18" charset="0"/>
+                                    </a:rPr>
+                                    <m:t>2</m:t>
+                                  </m:r>
+                                </m:sup>
+                              </m:sSup>
+                              <m:r>
+                                <a:rPr lang="en-US" i="1">
+                                  <a:latin typeface="Cambria Math" panose="02040503050406030204" pitchFamily="18" charset="0"/>
+                                </a:rPr>
+                                <m:t>−</m:t>
+                              </m:r>
+                              <m:r>
+                                <a:rPr lang="en-US" i="1">
+                                  <a:latin typeface="Cambria Math" panose="02040503050406030204" pitchFamily="18" charset="0"/>
+                                  <a:ea typeface="Cambria Math" panose="02040503050406030204" pitchFamily="18" charset="0"/>
+                                </a:rPr>
+                                <m:t>𝜇</m:t>
+                              </m:r>
+                            </m:den>
+                          </m:f>
+                        </m:sup>
+                      </m:sSup>
+                    </m:oMath>
+                  </m:oMathPara>
+                </a14:m>
+                <a:endParaRPr lang="en-US" dirty="0"/>
+              </a:p>
+              <a:p>
+                <a:endParaRPr lang="en-US" dirty="0"/>
+              </a:p>
+              <a:p>
+                <a:pPr lvl="1"/>
+                <a:endParaRPr dirty="0"/>
+              </a:p>
+            </p:txBody>
+          </p:sp>
+        </mc:Choice>
+        <mc:Fallback>
+          <p:sp>
+            <p:nvSpPr>
+              <p:cNvPr id="3" name="Content Placeholder 2">
+                <a:extLst>
+                  <a:ext uri="{FF2B5EF4-FFF2-40B4-BE49-F238E27FC236}">
+                    <a16:creationId xmlns:a16="http://schemas.microsoft.com/office/drawing/2014/main" id="{364107CC-0B7A-2331-4339-E9C4D766CB50}"/>
+                  </a:ext>
+                </a:extLst>
+              </p:cNvPr>
+              <p:cNvSpPr>
+                <a:spLocks noGrp="1" noRot="1" noChangeAspect="1" noMove="1" noResize="1" noEditPoints="1" noAdjustHandles="1" noChangeArrowheads="1" noChangeShapeType="1" noTextEdit="1"/>
+              </p:cNvSpPr>
+              <p:nvPr>
+                <p:ph idx="1"/>
+              </p:nvPr>
+            </p:nvSpPr>
+            <p:spPr>
+              <a:xfrm>
+                <a:off x="457200" y="1105408"/>
+                <a:ext cx="8229600" cy="3616959"/>
+              </a:xfrm>
+              <a:blipFill>
+                <a:blip r:embed="rId3"/>
+                <a:stretch>
+                  <a:fillRect l="-963" t="-1852" r="-667"/>
+                </a:stretch>
+              </a:blipFill>
+            </p:spPr>
+            <p:txBody>
+              <a:bodyPr/>
+              <a:lstStyle/>
+              <a:p>
+                <a:r>
+                  <a:rPr lang="en-US">
+                    <a:noFill/>
+                  </a:rPr>
+                  <a:t> </a:t>
+                </a:r>
+              </a:p>
+            </p:txBody>
+          </p:sp>
+        </mc:Fallback>
+      </mc:AlternateContent>
+    </p:spTree>
+    <p:extLst>
+      <p:ext uri="{BB962C8B-B14F-4D97-AF65-F5344CB8AC3E}">
+        <p14:creationId xmlns:p14="http://schemas.microsoft.com/office/powerpoint/2010/main" val="562998681"/>
+      </p:ext>
+    </p:extLst>
+  </p:cSld>
+  <p:clrMapOvr>
+    <a:masterClrMapping/>
+  </p:clrMapOvr>
+</p:sld>
+</file>
+
+<file path=ppt/slides/slide27.xml><?xml version="1.0" encoding="utf-8"?>
+<p:sld xmlns:a="http://schemas.openxmlformats.org/drawingml/2006/main" xmlns:r="http://schemas.openxmlformats.org/officeDocument/2006/relationships" xmlns:p="http://schemas.openxmlformats.org/presentationml/2006/main">
+  <p:cSld>
+    <p:spTree>
+      <p:nvGrpSpPr>
+        <p:cNvPr id="1" name="">
+          <a:extLst>
+            <a:ext uri="{FF2B5EF4-FFF2-40B4-BE49-F238E27FC236}">
+              <a16:creationId xmlns:a16="http://schemas.microsoft.com/office/drawing/2014/main" id="{33030D59-FC5A-4187-23EF-2D853B9B472C}"/>
+            </a:ext>
+          </a:extLst>
+        </p:cNvPr>
+        <p:cNvGrpSpPr/>
+        <p:nvPr/>
+      </p:nvGrpSpPr>
+      <p:grpSpPr>
+        <a:xfrm>
+          <a:off x="0" y="0"/>
+          <a:ext cx="0" cy="0"/>
+          <a:chOff x="0" y="0"/>
+          <a:chExt cx="0" cy="0"/>
+        </a:xfrm>
+      </p:grpSpPr>
+      <p:sp>
+        <p:nvSpPr>
+          <p:cNvPr id="2" name="Title 1">
+            <a:extLst>
+              <a:ext uri="{FF2B5EF4-FFF2-40B4-BE49-F238E27FC236}">
+                <a16:creationId xmlns:a16="http://schemas.microsoft.com/office/drawing/2014/main" id="{EF626DC8-5E3C-C7C0-5F01-A17371AE8E1B}"/>
+              </a:ext>
+            </a:extLst>
+          </p:cNvPr>
+          <p:cNvSpPr>
+            <a:spLocks noGrp="1"/>
+          </p:cNvSpPr>
+          <p:nvPr>
+            <p:ph type="title"/>
+          </p:nvPr>
+        </p:nvSpPr>
+        <p:spPr/>
+        <p:txBody>
+          <a:bodyPr/>
+          <a:lstStyle/>
+          <a:p>
+            <a:pPr marL="0" lvl="0" indent="0">
+              <a:buNone/>
+            </a:pPr>
+            <a:r>
+              <a:rPr lang="en-US" dirty="0"/>
+              <a:t>Negative Binomial Distribution</a:t>
+            </a:r>
+            <a:endParaRPr dirty="0"/>
+          </a:p>
+        </p:txBody>
+      </p:sp>
+      <mc:AlternateContent xmlns:mc="http://schemas.openxmlformats.org/markup-compatibility/2006">
+        <mc:Choice xmlns:a14="http://schemas.microsoft.com/office/drawing/2010/main" Requires="a14">
+          <p:sp>
+            <p:nvSpPr>
+              <p:cNvPr id="3" name="Content Placeholder 2">
+                <a:extLst>
+                  <a:ext uri="{FF2B5EF4-FFF2-40B4-BE49-F238E27FC236}">
+                    <a16:creationId xmlns:a16="http://schemas.microsoft.com/office/drawing/2014/main" id="{63FD7361-F608-6D5C-7F2E-ADAE3E265BA8}"/>
+                  </a:ext>
+                </a:extLst>
+              </p:cNvPr>
+              <p:cNvSpPr>
+                <a:spLocks noGrp="1"/>
+              </p:cNvSpPr>
+              <p:nvPr>
+                <p:ph idx="1"/>
+              </p:nvPr>
+            </p:nvSpPr>
+            <p:spPr>
+              <a:xfrm>
+                <a:off x="457200" y="1105408"/>
+                <a:ext cx="8229600" cy="3616959"/>
+              </a:xfrm>
+            </p:spPr>
+            <p:txBody>
+              <a:bodyPr>
+                <a:normAutofit fontScale="92500" lnSpcReduction="10000"/>
+              </a:bodyPr>
+              <a:lstStyle/>
+              <a:p>
+                <a:pPr marL="0" lvl="0" indent="0">
+                  <a:buNone/>
+                </a:pPr>
+                <a:r>
+                  <a:rPr lang="en-US" dirty="0"/>
+                  <a:t>The </a:t>
+                </a:r>
+                <a14:m>
+                  <m:oMath xmlns:m="http://schemas.openxmlformats.org/officeDocument/2006/math">
+                    <m:r>
+                      <a:rPr lang="en-US" b="1" i="0" dirty="0" smtClean="0">
+                        <a:latin typeface="Cambria Math" panose="02040503050406030204" pitchFamily="18" charset="0"/>
+                        <a:hlinkClick r:id="rId2"/>
+                      </a:rPr>
+                      <m:t>𝐧𝐞𝐠𝐚𝐭𝐢𝐯𝐞</m:t>
+                    </m:r>
+                    <m:r>
+                      <a:rPr lang="en-US" b="1" i="0" dirty="0" smtClean="0">
+                        <a:latin typeface="Cambria Math" panose="02040503050406030204" pitchFamily="18" charset="0"/>
+                        <a:hlinkClick r:id="rId2"/>
+                      </a:rPr>
+                      <m:t> </m:t>
+                    </m:r>
+                    <m:r>
+                      <a:rPr lang="en-US" b="1" i="0" dirty="0" smtClean="0">
+                        <a:latin typeface="Cambria Math" panose="02040503050406030204" pitchFamily="18" charset="0"/>
+                        <a:hlinkClick r:id="rId2"/>
+                      </a:rPr>
+                      <m:t>𝐛𝐢𝐧𝐨𝐦𝐢𝐚𝐥</m:t>
+                    </m:r>
+                    <m:r>
+                      <a:rPr lang="en-US" b="1" i="0" dirty="0" smtClean="0">
+                        <a:latin typeface="Cambria Math" panose="02040503050406030204" pitchFamily="18" charset="0"/>
+                        <a:hlinkClick r:id="rId2"/>
+                      </a:rPr>
+                      <m:t> </m:t>
+                    </m:r>
+                    <m:r>
+                      <a:rPr lang="en-US" b="1" i="0" dirty="0" smtClean="0">
+                        <a:latin typeface="Cambria Math" panose="02040503050406030204" pitchFamily="18" charset="0"/>
+                        <a:hlinkClick r:id="rId2"/>
+                      </a:rPr>
+                      <m:t>𝐝𝐢𝐬𝐭𝐫𝐢𝐛𝐮𝐭𝐢𝐨𝐧</m:t>
+                    </m:r>
+                    <m:r>
+                      <a:rPr lang="en-US" b="1" i="0" dirty="0" smtClean="0">
+                        <a:latin typeface="Cambria Math" panose="02040503050406030204" pitchFamily="18" charset="0"/>
+                        <a:hlinkClick r:id="rId2"/>
+                      </a:rPr>
+                      <m:t> </m:t>
+                    </m:r>
+                  </m:oMath>
+                </a14:m>
+                <a:r>
+                  <a:rPr lang="en-US" dirty="0"/>
+                  <a:t>is a generalization of the Poisson distribution </a:t>
+                </a:r>
+              </a:p>
+              <a:p>
+                <a:r>
+                  <a:rPr lang="en-US" dirty="0"/>
+                  <a:t>We can reparametrize to get a form suitable for analysis in terms of the average arrival rate, </a:t>
+                </a:r>
+                <a14:m>
+                  <m:oMath xmlns:m="http://schemas.openxmlformats.org/officeDocument/2006/math">
+                    <m:r>
+                      <a:rPr lang="en-US" i="1">
+                        <a:latin typeface="Cambria Math" panose="02040503050406030204" pitchFamily="18" charset="0"/>
+                        <a:ea typeface="Cambria Math" panose="02040503050406030204" pitchFamily="18" charset="0"/>
+                      </a:rPr>
+                      <m:t>𝜇</m:t>
+                    </m:r>
+                  </m:oMath>
+                </a14:m>
+                <a:r>
+                  <a:rPr lang="en-US" dirty="0"/>
+                  <a:t>, and the variance, </a:t>
+                </a:r>
+                <a14:m>
+                  <m:oMath xmlns:m="http://schemas.openxmlformats.org/officeDocument/2006/math">
+                    <m:sSup>
+                      <m:sSupPr>
+                        <m:ctrlPr>
+                          <a:rPr lang="en-US" i="1" smtClean="0">
+                            <a:latin typeface="Cambria Math" panose="02040503050406030204" pitchFamily="18" charset="0"/>
+                          </a:rPr>
+                        </m:ctrlPr>
+                      </m:sSupPr>
+                      <m:e>
+                        <m:r>
+                          <a:rPr lang="en-US" i="1">
+                            <a:latin typeface="Cambria Math" panose="02040503050406030204" pitchFamily="18" charset="0"/>
+                            <a:ea typeface="Cambria Math" panose="02040503050406030204" pitchFamily="18" charset="0"/>
+                          </a:rPr>
+                          <m:t>𝜎</m:t>
+                        </m:r>
+                      </m:e>
+                      <m:sup>
+                        <m:r>
+                          <a:rPr lang="en-US" i="1">
+                            <a:latin typeface="Cambria Math" panose="02040503050406030204" pitchFamily="18" charset="0"/>
+                          </a:rPr>
+                          <m:t>2</m:t>
+                        </m:r>
+                      </m:sup>
+                    </m:sSup>
+                  </m:oMath>
+                </a14:m>
+                <a:endParaRPr lang="en-US" dirty="0"/>
+              </a:p>
+              <a:p>
+                <a:pPr marL="0" indent="0">
+                  <a:buNone/>
+                </a:pPr>
+                <a14:m>
+                  <m:oMathPara xmlns:m="http://schemas.openxmlformats.org/officeDocument/2006/math">
+                    <m:oMathParaPr>
+                      <m:jc m:val="centerGroup"/>
+                    </m:oMathParaPr>
+                    <m:oMath xmlns:m="http://schemas.openxmlformats.org/officeDocument/2006/math">
+                      <m:r>
+                        <a:rPr lang="en-US" b="0" i="1" smtClean="0">
+                          <a:latin typeface="Cambria Math" panose="02040503050406030204" pitchFamily="18" charset="0"/>
+                        </a:rPr>
+                        <m:t>𝑝</m:t>
+                      </m:r>
+                      <m:r>
+                        <a:rPr lang="en-US" b="0" i="1" smtClean="0">
+                          <a:latin typeface="Cambria Math" panose="02040503050406030204" pitchFamily="18" charset="0"/>
+                        </a:rPr>
+                        <m:t>=</m:t>
+                      </m:r>
+                      <m:f>
+                        <m:fPr>
+                          <m:ctrlPr>
+                            <a:rPr lang="en-US" b="0" i="1" smtClean="0">
+                              <a:latin typeface="Cambria Math" panose="02040503050406030204" pitchFamily="18" charset="0"/>
+                            </a:rPr>
+                          </m:ctrlPr>
+                        </m:fPr>
+                        <m:num>
+                          <m:r>
+                            <a:rPr lang="en-US" b="0" i="1" smtClean="0">
+                              <a:latin typeface="Cambria Math" panose="02040503050406030204" pitchFamily="18" charset="0"/>
+                              <a:ea typeface="Cambria Math" panose="02040503050406030204" pitchFamily="18" charset="0"/>
+                            </a:rPr>
+                            <m:t>𝜇</m:t>
+                          </m:r>
+                        </m:num>
+                        <m:den>
+                          <m:sSup>
+                            <m:sSupPr>
+                              <m:ctrlPr>
+                                <a:rPr lang="en-US" b="0" i="1" smtClean="0">
+                                  <a:latin typeface="Cambria Math" panose="02040503050406030204" pitchFamily="18" charset="0"/>
+                                </a:rPr>
+                              </m:ctrlPr>
+                            </m:sSupPr>
+                            <m:e>
+                              <m:r>
+                                <a:rPr lang="en-US" b="0" i="1" smtClean="0">
+                                  <a:latin typeface="Cambria Math" panose="02040503050406030204" pitchFamily="18" charset="0"/>
+                                  <a:ea typeface="Cambria Math" panose="02040503050406030204" pitchFamily="18" charset="0"/>
+                                </a:rPr>
+                                <m:t>𝜎</m:t>
+                              </m:r>
+                            </m:e>
+                            <m:sup>
+                              <m:r>
+                                <a:rPr lang="en-US" b="0" i="1" smtClean="0">
+                                  <a:latin typeface="Cambria Math" panose="02040503050406030204" pitchFamily="18" charset="0"/>
+                                </a:rPr>
+                                <m:t>2</m:t>
+                              </m:r>
+                            </m:sup>
+                          </m:sSup>
+                        </m:den>
+                      </m:f>
+                      <m:r>
+                        <a:rPr lang="en-US" b="0" i="1" smtClean="0">
+                          <a:latin typeface="Cambria Math" panose="02040503050406030204" pitchFamily="18" charset="0"/>
+                        </a:rPr>
+                        <m:t>,    </m:t>
+                      </m:r>
+                      <m:r>
+                        <a:rPr lang="en-US" b="0" i="1" smtClean="0">
+                          <a:latin typeface="Cambria Math" panose="02040503050406030204" pitchFamily="18" charset="0"/>
+                        </a:rPr>
+                        <m:t>𝑟</m:t>
                       </m:r>
                       <m:r>
                         <a:rPr lang="en-US" b="0" i="1" smtClean="0">
@@ -13426,30 +14063,7 @@
                 <a:pPr lvl="1"/>
                 <a:r>
                   <a:rPr lang="en-US" dirty="0"/>
-                  <a:t>The parameter </a:t>
-                </a:r>
-                <a14:m>
-                  <m:oMath xmlns:m="http://schemas.openxmlformats.org/officeDocument/2006/math">
-                    <m:r>
-                      <a:rPr lang="en-US" b="0" i="1" smtClean="0">
-                        <a:latin typeface="Cambria Math" panose="02040503050406030204" pitchFamily="18" charset="0"/>
-                        <a:ea typeface="Cambria Math" panose="02040503050406030204" pitchFamily="18" charset="0"/>
-                      </a:rPr>
-                      <m:t>𝛼</m:t>
-                    </m:r>
-                  </m:oMath>
-                </a14:m>
-                <a:r>
-                  <a:rPr lang="en-US" dirty="0"/>
-                  <a:t> adds </a:t>
-                </a:r>
-                <a:r>
-                  <a:rPr lang="en-US" b="1" dirty="0"/>
-                  <a:t>excess dispersion </a:t>
-                </a:r>
-                <a:r>
-                  <a:rPr lang="en-US" dirty="0"/>
-                  <a:t>as a function of </a:t>
+                  <a:t>When </a:t>
                 </a:r>
                 <a14:m>
                   <m:oMath xmlns:m="http://schemas.openxmlformats.org/officeDocument/2006/math">
@@ -13467,7 +14081,7 @@
                             <a:latin typeface="Cambria Math" panose="02040503050406030204" pitchFamily="18" charset="0"/>
                             <a:ea typeface="Cambria Math" panose="02040503050406030204" pitchFamily="18" charset="0"/>
                           </a:rPr>
-                          <m:t>𝜇</m:t>
+                          <m:t>𝜎</m:t>
                         </m:r>
                       </m:e>
                       <m:sup>
@@ -13479,69 +14093,185 @@
                         </m:r>
                       </m:sup>
                     </m:sSup>
-                  </m:oMath>
-                </a14:m>
-                <a:endParaRPr lang="en-US" dirty="0"/>
-              </a:p>
-              <a:p>
-                <a:pPr lvl="1"/>
-                <a:r>
-                  <a:rPr lang="en-US" dirty="0"/>
-                  <a:t>Increasing </a:t>
-                </a:r>
-                <a14:m>
-                  <m:oMath xmlns:m="http://schemas.openxmlformats.org/officeDocument/2006/math">
                     <m:r>
-                      <a:rPr lang="en-US" b="0" i="1" smtClean="0">
+                      <a:rPr lang="en-US" i="1" smtClean="0">
                         <a:latin typeface="Cambria Math" panose="02040503050406030204" pitchFamily="18" charset="0"/>
                         <a:ea typeface="Cambria Math" panose="02040503050406030204" pitchFamily="18" charset="0"/>
                       </a:rPr>
-                      <m:t>𝛼</m:t>
+                      <m:t>&gt;</m:t>
+                    </m:r>
+                    <m:r>
+                      <a:rPr lang="en-US" i="1">
+                        <a:latin typeface="Cambria Math" panose="02040503050406030204" pitchFamily="18" charset="0"/>
+                        <a:ea typeface="Cambria Math" panose="02040503050406030204" pitchFamily="18" charset="0"/>
+                      </a:rPr>
+                      <m:t>𝜇</m:t>
                     </m:r>
                   </m:oMath>
                 </a14:m>
                 <a:r>
                   <a:rPr lang="en-US" dirty="0"/>
-                  <a:t> increases the dispersion of the negative binomial distribution </a:t>
+                  <a:t> the distribution has </a:t>
+                </a:r>
+                <a:r>
+                  <a:rPr lang="en-US" b="1" dirty="0"/>
+                  <a:t>excess dispersion </a:t>
+                </a:r>
+                <a:r>
+                  <a:rPr lang="en-US" dirty="0"/>
+                  <a:t>since r in</a:t>
                 </a:r>
               </a:p>
               <a:p>
                 <a:pPr lvl="1"/>
                 <a:r>
                   <a:rPr lang="en-US" dirty="0"/>
-                  <a:t>At </a:t>
+                  <a:t>For the Poisson distribution </a:t>
                 </a:r>
                 <a14:m>
                   <m:oMath xmlns:m="http://schemas.openxmlformats.org/officeDocument/2006/math">
                     <m:r>
+                      <a:rPr lang="en-US" i="1">
+                        <a:latin typeface="Cambria Math" panose="02040503050406030204" pitchFamily="18" charset="0"/>
+                      </a:rPr>
+                      <m:t>𝑝</m:t>
+                    </m:r>
+                    <m:r>
+                      <a:rPr lang="en-US" i="1">
+                        <a:latin typeface="Cambria Math" panose="02040503050406030204" pitchFamily="18" charset="0"/>
+                      </a:rPr>
+                      <m:t>=</m:t>
+                    </m:r>
+                    <m:f>
+                      <m:fPr>
+                        <m:ctrlPr>
+                          <a:rPr lang="en-US" i="1">
+                            <a:latin typeface="Cambria Math" panose="02040503050406030204" pitchFamily="18" charset="0"/>
+                          </a:rPr>
+                        </m:ctrlPr>
+                      </m:fPr>
+                      <m:num>
+                        <m:r>
+                          <a:rPr lang="en-US" i="1">
+                            <a:latin typeface="Cambria Math" panose="02040503050406030204" pitchFamily="18" charset="0"/>
+                            <a:ea typeface="Cambria Math" panose="02040503050406030204" pitchFamily="18" charset="0"/>
+                          </a:rPr>
+                          <m:t>𝜇</m:t>
+                        </m:r>
+                      </m:num>
+                      <m:den>
+                        <m:sSup>
+                          <m:sSupPr>
+                            <m:ctrlPr>
+                              <a:rPr lang="en-US" i="1">
+                                <a:latin typeface="Cambria Math" panose="02040503050406030204" pitchFamily="18" charset="0"/>
+                              </a:rPr>
+                            </m:ctrlPr>
+                          </m:sSupPr>
+                          <m:e>
+                            <m:r>
+                              <a:rPr lang="en-US" i="1">
+                                <a:latin typeface="Cambria Math" panose="02040503050406030204" pitchFamily="18" charset="0"/>
+                                <a:ea typeface="Cambria Math" panose="02040503050406030204" pitchFamily="18" charset="0"/>
+                              </a:rPr>
+                              <m:t>𝜎</m:t>
+                            </m:r>
+                          </m:e>
+                          <m:sup>
+                            <m:r>
+                              <a:rPr lang="en-US" i="1">
+                                <a:latin typeface="Cambria Math" panose="02040503050406030204" pitchFamily="18" charset="0"/>
+                              </a:rPr>
+                              <m:t>2</m:t>
+                            </m:r>
+                          </m:sup>
+                        </m:sSup>
+                      </m:den>
+                    </m:f>
+                    <m:r>
                       <a:rPr lang="en-US" b="0" i="1" smtClean="0">
                         <a:latin typeface="Cambria Math" panose="02040503050406030204" pitchFamily="18" charset="0"/>
-                        <a:ea typeface="Cambria Math" panose="02040503050406030204" pitchFamily="18" charset="0"/>
-                      </a:rPr>
-                      <m:t>𝛼</m:t>
-                    </m:r>
-                    <m:r>
-                      <a:rPr lang="en-US" b="0" i="0" smtClean="0">
-                        <a:latin typeface="Cambria Math" panose="02040503050406030204" pitchFamily="18" charset="0"/>
-                        <a:ea typeface="Cambria Math" panose="02040503050406030204" pitchFamily="18" charset="0"/>
                       </a:rPr>
                       <m:t>=</m:t>
                     </m:r>
                     <m:r>
-                      <a:rPr lang="en-US" b="0" i="0" smtClean="0">
+                      <a:rPr lang="en-US" b="0" i="1" smtClean="0">
                         <a:latin typeface="Cambria Math" panose="02040503050406030204" pitchFamily="18" charset="0"/>
-                        <a:ea typeface="Cambria Math" panose="02040503050406030204" pitchFamily="18" charset="0"/>
                       </a:rPr>
-                      <m:t>0</m:t>
+                      <m:t>1</m:t>
                     </m:r>
                   </m:oMath>
                 </a14:m>
                 <a:r>
                   <a:rPr lang="en-US" dirty="0"/>
-                  <a:t> the negative binomial distribution is identical to the Poisson distribution </a:t>
+                  <a:t>, and </a:t>
                 </a:r>
-              </a:p>
-              <a:p>
+                <a14:m>
+                  <m:oMath xmlns:m="http://schemas.openxmlformats.org/officeDocument/2006/math">
+                    <m:r>
+                      <a:rPr lang="en-US" i="1">
+                        <a:latin typeface="Cambria Math" panose="02040503050406030204" pitchFamily="18" charset="0"/>
+                      </a:rPr>
+                      <m:t>𝑟</m:t>
+                    </m:r>
+                    <m:r>
+                      <a:rPr lang="en-US" i="1">
+                        <a:latin typeface="Cambria Math" panose="02040503050406030204" pitchFamily="18" charset="0"/>
+                      </a:rPr>
+                      <m:t>=</m:t>
+                    </m:r>
+                    <m:f>
+                      <m:fPr>
+                        <m:ctrlPr>
+                          <a:rPr lang="en-US" i="1">
+                            <a:latin typeface="Cambria Math" panose="02040503050406030204" pitchFamily="18" charset="0"/>
+                          </a:rPr>
+                        </m:ctrlPr>
+                      </m:fPr>
+                      <m:num>
+                        <m:r>
+                          <a:rPr lang="en-US" b="0" i="1" smtClean="0">
+                            <a:latin typeface="Cambria Math" panose="02040503050406030204" pitchFamily="18" charset="0"/>
+                          </a:rPr>
+                          <m:t>1</m:t>
+                        </m:r>
+                      </m:num>
+                      <m:den>
+                        <m:r>
+                          <a:rPr lang="en-US" b="0" i="1" smtClean="0">
+                            <a:latin typeface="Cambria Math" panose="02040503050406030204" pitchFamily="18" charset="0"/>
+                          </a:rPr>
+                          <m:t>1</m:t>
+                        </m:r>
+                        <m:r>
+                          <a:rPr lang="en-US" i="1">
+                            <a:latin typeface="Cambria Math" panose="02040503050406030204" pitchFamily="18" charset="0"/>
+                          </a:rPr>
+                          <m:t>−</m:t>
+                        </m:r>
+                        <m:r>
+                          <a:rPr lang="en-US" b="0" i="1" smtClean="0">
+                            <a:latin typeface="Cambria Math" panose="02040503050406030204" pitchFamily="18" charset="0"/>
+                          </a:rPr>
+                          <m:t>1</m:t>
+                        </m:r>
+                        <m:r>
+                          <a:rPr lang="en-US" b="0" i="1" smtClean="0">
+                            <a:latin typeface="Cambria Math" panose="02040503050406030204" pitchFamily="18" charset="0"/>
+                          </a:rPr>
+                          <m:t>/</m:t>
+                        </m:r>
+                        <m:r>
+                          <a:rPr lang="en-US" i="1">
+                            <a:latin typeface="Cambria Math" panose="02040503050406030204" pitchFamily="18" charset="0"/>
+                            <a:ea typeface="Cambria Math" panose="02040503050406030204" pitchFamily="18" charset="0"/>
+                          </a:rPr>
+                          <m:t>𝜇</m:t>
+                        </m:r>
+                      </m:den>
+                    </m:f>
+                  </m:oMath>
+                </a14:m>
                 <a:endParaRPr lang="en-US" dirty="0"/>
               </a:p>
               <a:p>
@@ -13551,13 +14281,13 @@
             </p:txBody>
           </p:sp>
         </mc:Choice>
-        <mc:Fallback xmlns="">
+        <mc:Fallback>
           <p:sp>
             <p:nvSpPr>
               <p:cNvPr id="3" name="Content Placeholder 2">
                 <a:extLst>
                   <a:ext uri="{FF2B5EF4-FFF2-40B4-BE49-F238E27FC236}">
-                    <a16:creationId xmlns:a16="http://schemas.microsoft.com/office/drawing/2014/main" id="{364107CC-0B7A-2331-4339-E9C4D766CB50}"/>
+                    <a16:creationId xmlns:a16="http://schemas.microsoft.com/office/drawing/2014/main" id="{63FD7361-F608-6D5C-7F2E-ADAE3E265BA8}"/>
                   </a:ext>
                 </a:extLst>
               </p:cNvPr>
@@ -13576,7 +14306,7 @@
               <a:blipFill>
                 <a:blip r:embed="rId3"/>
                 <a:stretch>
-                  <a:fillRect l="-741" t="-2357"/>
+                  <a:fillRect l="-963" t="-1852" r="-667" b="-337"/>
                 </a:stretch>
               </a:blipFill>
             </p:spPr>
@@ -13598,220 +14328,17 @@
     </p:spTree>
     <p:extLst>
       <p:ext uri="{BB962C8B-B14F-4D97-AF65-F5344CB8AC3E}">
-        <p14:creationId xmlns:p14="http://schemas.microsoft.com/office/powerpoint/2010/main" val="562998681"/>
+        <p14:creationId xmlns:p14="http://schemas.microsoft.com/office/powerpoint/2010/main" val="3281168990"/>
       </p:ext>
     </p:extLst>
   </p:cSld>
   <p:clrMapOvr>
     <a:masterClrMapping/>
   </p:clrMapOvr>
-  <p:timing>
-    <p:tnLst>
-      <p:par>
-        <p:cTn id="1" dur="indefinite" restart="never" nodeType="tmRoot">
-          <p:childTnLst>
-            <p:seq concurrent="1" nextAc="seek">
-              <p:cTn id="2" dur="indefinite" nodeType="mainSeq">
-                <p:childTnLst>
-                  <p:par>
-                    <p:cTn id="3" fill="hold">
-                      <p:stCondLst>
-                        <p:cond delay="indefinite"/>
-                      </p:stCondLst>
-                      <p:childTnLst>
-                        <p:par>
-                          <p:cTn id="4" fill="hold">
-                            <p:stCondLst>
-                              <p:cond delay="0"/>
-                            </p:stCondLst>
-                            <p:childTnLst>
-                              <p:par>
-                                <p:cTn id="5" presetID="1" presetClass="entr" presetSubtype="0" fill="hold" nodeType="clickEffect">
-                                  <p:stCondLst>
-                                    <p:cond delay="0"/>
-                                  </p:stCondLst>
-                                  <p:childTnLst>
-                                    <p:set>
-                                      <p:cBhvr>
-                                        <p:cTn id="6" dur="1" fill="hold">
-                                          <p:stCondLst>
-                                            <p:cond delay="0"/>
-                                          </p:stCondLst>
-                                        </p:cTn>
-                                        <p:tgtEl>
-                                          <p:spTgt spid="3">
-                                            <p:txEl>
-                                              <p:pRg st="3" end="3"/>
-                                            </p:txEl>
-                                          </p:spTgt>
-                                        </p:tgtEl>
-                                        <p:attrNameLst>
-                                          <p:attrName>style.visibility</p:attrName>
-                                        </p:attrNameLst>
-                                      </p:cBhvr>
-                                      <p:to>
-                                        <p:strVal val="visible"/>
-                                      </p:to>
-                                    </p:set>
-                                  </p:childTnLst>
-                                </p:cTn>
-                              </p:par>
-                              <p:par>
-                                <p:cTn id="7" presetID="1" presetClass="entr" presetSubtype="0" fill="hold" nodeType="withEffect">
-                                  <p:stCondLst>
-                                    <p:cond delay="0"/>
-                                  </p:stCondLst>
-                                  <p:childTnLst>
-                                    <p:set>
-                                      <p:cBhvr>
-                                        <p:cTn id="8" dur="1" fill="hold">
-                                          <p:stCondLst>
-                                            <p:cond delay="0"/>
-                                          </p:stCondLst>
-                                        </p:cTn>
-                                        <p:tgtEl>
-                                          <p:spTgt spid="3">
-                                            <p:txEl>
-                                              <p:pRg st="4" end="4"/>
-                                            </p:txEl>
-                                          </p:spTgt>
-                                        </p:tgtEl>
-                                        <p:attrNameLst>
-                                          <p:attrName>style.visibility</p:attrName>
-                                        </p:attrNameLst>
-                                      </p:cBhvr>
-                                      <p:to>
-                                        <p:strVal val="visible"/>
-                                      </p:to>
-                                    </p:set>
-                                  </p:childTnLst>
-                                </p:cTn>
-                              </p:par>
-                              <p:par>
-                                <p:cTn id="9" presetID="1" presetClass="entr" presetSubtype="0" fill="hold" nodeType="withEffect">
-                                  <p:stCondLst>
-                                    <p:cond delay="0"/>
-                                  </p:stCondLst>
-                                  <p:childTnLst>
-                                    <p:set>
-                                      <p:cBhvr>
-                                        <p:cTn id="10" dur="1" fill="hold">
-                                          <p:stCondLst>
-                                            <p:cond delay="0"/>
-                                          </p:stCondLst>
-                                        </p:cTn>
-                                        <p:tgtEl>
-                                          <p:spTgt spid="3">
-                                            <p:txEl>
-                                              <p:pRg st="5" end="5"/>
-                                            </p:txEl>
-                                          </p:spTgt>
-                                        </p:tgtEl>
-                                        <p:attrNameLst>
-                                          <p:attrName>style.visibility</p:attrName>
-                                        </p:attrNameLst>
-                                      </p:cBhvr>
-                                      <p:to>
-                                        <p:strVal val="visible"/>
-                                      </p:to>
-                                    </p:set>
-                                  </p:childTnLst>
-                                </p:cTn>
-                              </p:par>
-                              <p:par>
-                                <p:cTn id="11" presetID="1" presetClass="entr" presetSubtype="0" fill="hold" nodeType="withEffect">
-                                  <p:stCondLst>
-                                    <p:cond delay="0"/>
-                                  </p:stCondLst>
-                                  <p:childTnLst>
-                                    <p:set>
-                                      <p:cBhvr>
-                                        <p:cTn id="12" dur="1" fill="hold">
-                                          <p:stCondLst>
-                                            <p:cond delay="0"/>
-                                          </p:stCondLst>
-                                        </p:cTn>
-                                        <p:tgtEl>
-                                          <p:spTgt spid="3">
-                                            <p:txEl>
-                                              <p:pRg st="6" end="6"/>
-                                            </p:txEl>
-                                          </p:spTgt>
-                                        </p:tgtEl>
-                                        <p:attrNameLst>
-                                          <p:attrName>style.visibility</p:attrName>
-                                        </p:attrNameLst>
-                                      </p:cBhvr>
-                                      <p:to>
-                                        <p:strVal val="visible"/>
-                                      </p:to>
-                                    </p:set>
-                                  </p:childTnLst>
-                                </p:cTn>
-                              </p:par>
-                              <p:par>
-                                <p:cTn id="13" presetID="1" presetClass="entr" presetSubtype="0" fill="hold" nodeType="withEffect">
-                                  <p:stCondLst>
-                                    <p:cond delay="0"/>
-                                  </p:stCondLst>
-                                  <p:childTnLst>
-                                    <p:set>
-                                      <p:cBhvr>
-                                        <p:cTn id="14" dur="1" fill="hold">
-                                          <p:stCondLst>
-                                            <p:cond delay="0"/>
-                                          </p:stCondLst>
-                                        </p:cTn>
-                                        <p:tgtEl>
-                                          <p:spTgt spid="3">
-                                            <p:txEl>
-                                              <p:pRg st="7" end="7"/>
-                                            </p:txEl>
-                                          </p:spTgt>
-                                        </p:tgtEl>
-                                        <p:attrNameLst>
-                                          <p:attrName>style.visibility</p:attrName>
-                                        </p:attrNameLst>
-                                      </p:cBhvr>
-                                      <p:to>
-                                        <p:strVal val="visible"/>
-                                      </p:to>
-                                    </p:set>
-                                  </p:childTnLst>
-                                </p:cTn>
-                              </p:par>
-                            </p:childTnLst>
-                          </p:cTn>
-                        </p:par>
-                      </p:childTnLst>
-                    </p:cTn>
-                  </p:par>
-                </p:childTnLst>
-              </p:cTn>
-              <p:prevCondLst>
-                <p:cond evt="onPrev" delay="0">
-                  <p:tgtEl>
-                    <p:sldTgt/>
-                  </p:tgtEl>
-                </p:cond>
-              </p:prevCondLst>
-              <p:nextCondLst>
-                <p:cond evt="onNext" delay="0">
-                  <p:tgtEl>
-                    <p:sldTgt/>
-                  </p:tgtEl>
-                </p:cond>
-              </p:nextCondLst>
-            </p:seq>
-          </p:childTnLst>
-        </p:cTn>
-      </p:par>
-    </p:tnLst>
-  </p:timing>
 </p:sld>
 </file>
 
-<file path=ppt/slides/slide27.xml><?xml version="1.0" encoding="utf-8"?>
+<file path=ppt/slides/slide28.xml><?xml version="1.0" encoding="utf-8"?>
 <p:sld xmlns:a="http://schemas.openxmlformats.org/drawingml/2006/main" xmlns:r="http://schemas.openxmlformats.org/officeDocument/2006/relationships" xmlns:p="http://schemas.openxmlformats.org/presentationml/2006/main">
   <p:cSld>
     <p:spTree>
@@ -14285,7 +14812,7 @@
 </p:sld>
 </file>
 
-<file path=ppt/slides/slide28.xml><?xml version="1.0" encoding="utf-8"?>
+<file path=ppt/slides/slide29.xml><?xml version="1.0" encoding="utf-8"?>
 <p:sld xmlns:a="http://schemas.openxmlformats.org/drawingml/2006/main" xmlns:r="http://schemas.openxmlformats.org/officeDocument/2006/relationships" xmlns:p="http://schemas.openxmlformats.org/presentationml/2006/main">
   <p:cSld>
     <p:spTree>
@@ -14340,8 +14867,8 @@
           </a:p>
         </p:txBody>
       </p:sp>
-      <mc:AlternateContent xmlns:mc="http://schemas.openxmlformats.org/markup-compatibility/2006" xmlns:a14="http://schemas.microsoft.com/office/drawing/2010/main">
-        <mc:Choice Requires="a14">
+      <mc:AlternateContent xmlns:mc="http://schemas.openxmlformats.org/markup-compatibility/2006">
+        <mc:Choice xmlns:a14="http://schemas.microsoft.com/office/drawing/2010/main" Requires="a14">
           <p:sp>
             <p:nvSpPr>
               <p:cNvPr id="3" name="Content Placeholder 2">
@@ -14577,29 +15104,78 @@
                           </m:r>
                         </m:e>
                       </m:d>
+                      <m:d>
+                        <m:dPr>
+                          <m:ctrlPr>
+                            <a:rPr lang="en-US" i="1">
+                              <a:latin typeface="Cambria Math" panose="02040503050406030204" pitchFamily="18" charset="0"/>
+                            </a:rPr>
+                          </m:ctrlPr>
+                        </m:dPr>
+                        <m:e>
+                          <m:r>
+                            <a:rPr lang="en-US" i="1">
+                              <a:latin typeface="Cambria Math" panose="02040503050406030204" pitchFamily="18" charset="0"/>
+                            </a:rPr>
+                            <m:t>1</m:t>
+                          </m:r>
+                          <m:r>
+                            <a:rPr lang="en-US" i="1">
+                              <a:latin typeface="Cambria Math" panose="02040503050406030204" pitchFamily="18" charset="0"/>
+                            </a:rPr>
+                            <m:t>−</m:t>
+                          </m:r>
+                          <m:r>
+                            <a:rPr lang="en-US" b="0" i="1" smtClean="0">
+                              <a:latin typeface="Cambria Math" panose="02040503050406030204" pitchFamily="18" charset="0"/>
+                            </a:rPr>
+                            <m:t>𝑛</m:t>
+                          </m:r>
+                        </m:e>
+                      </m:d>
                       <m:sSup>
                         <m:sSupPr>
                           <m:ctrlPr>
-                            <a:rPr lang="en-US" b="0" i="1" smtClean="0">
+                            <a:rPr lang="en-US" i="1">
                               <a:latin typeface="Cambria Math" panose="02040503050406030204" pitchFamily="18" charset="0"/>
-                              <a:ea typeface="Cambria Math" panose="02040503050406030204" pitchFamily="18" charset="0"/>
                             </a:rPr>
                           </m:ctrlPr>
                         </m:sSupPr>
                         <m:e>
-                          <m:r>
-                            <a:rPr lang="en-US" b="0" i="1" smtClean="0">
-                              <a:latin typeface="Cambria Math" panose="02040503050406030204" pitchFamily="18" charset="0"/>
-                              <a:ea typeface="Cambria Math" panose="02040503050406030204" pitchFamily="18" charset="0"/>
-                            </a:rPr>
-                            <m:t>𝑝</m:t>
-                          </m:r>
+                          <m:d>
+                            <m:dPr>
+                              <m:ctrlPr>
+                                <a:rPr lang="en-US" i="1">
+                                  <a:latin typeface="Cambria Math" panose="02040503050406030204" pitchFamily="18" charset="0"/>
+                                </a:rPr>
+                              </m:ctrlPr>
+                            </m:dPr>
+                            <m:e>
+                              <m:r>
+                                <a:rPr lang="en-US" i="1">
+                                  <a:latin typeface="Cambria Math" panose="02040503050406030204" pitchFamily="18" charset="0"/>
+                                </a:rPr>
+                                <m:t>1</m:t>
+                              </m:r>
+                              <m:r>
+                                <a:rPr lang="en-US" i="1">
+                                  <a:latin typeface="Cambria Math" panose="02040503050406030204" pitchFamily="18" charset="0"/>
+                                </a:rPr>
+                                <m:t>−</m:t>
+                              </m:r>
+                              <m:r>
+                                <a:rPr lang="en-US" i="1">
+                                  <a:latin typeface="Cambria Math" panose="02040503050406030204" pitchFamily="18" charset="0"/>
+                                </a:rPr>
+                                <m:t>𝑝</m:t>
+                              </m:r>
+                            </m:e>
+                          </m:d>
                         </m:e>
                         <m:sup>
                           <m:r>
                             <a:rPr lang="en-US" b="0" i="1" smtClean="0">
                               <a:latin typeface="Cambria Math" panose="02040503050406030204" pitchFamily="18" charset="0"/>
-                              <a:ea typeface="Cambria Math" panose="02040503050406030204" pitchFamily="18" charset="0"/>
                             </a:rPr>
                             <m:t>𝑛</m:t>
                           </m:r>
@@ -14766,7 +15342,7 @@
                                   <a:rPr lang="en-US" i="1">
                                     <a:latin typeface="Cambria Math" panose="02040503050406030204" pitchFamily="18" charset="0"/>
                                   </a:rPr>
-                                  <m:t>𝑛</m:t>
+                                  <m:t>𝑟</m:t>
                                 </m:r>
                                 <m:r>
                                   <a:rPr lang="en-US" i="1">
@@ -14788,7 +15364,7 @@
                                   <a:rPr lang="en-US" i="1">
                                     <a:latin typeface="Cambria Math" panose="02040503050406030204" pitchFamily="18" charset="0"/>
                                   </a:rPr>
-                                  <m:t>𝑛</m:t>
+                                  <m:t>𝑟</m:t>
                                 </m:r>
                                 <m:r>
                                   <a:rPr lang="en-US" i="1">
@@ -14828,7 +15404,7 @@
                             <a:rPr lang="en-US" i="1">
                               <a:latin typeface="Cambria Math" panose="02040503050406030204" pitchFamily="18" charset="0"/>
                             </a:rPr>
-                            <m:t>𝑛</m:t>
+                            <m:t>𝑟</m:t>
                           </m:r>
                         </m:sup>
                       </m:sSup>
@@ -14902,7 +15478,7 @@
             </p:txBody>
           </p:sp>
         </mc:Choice>
-        <mc:Fallback xmlns="">
+        <mc:Fallback>
           <p:sp>
             <p:nvSpPr>
               <p:cNvPr id="3" name="Content Placeholder 2">
@@ -14956,200 +15532,238 @@
   <p:clrMapOvr>
     <a:masterClrMapping/>
   </p:clrMapOvr>
-  <p:timing>
-    <p:tnLst>
-      <p:par>
-        <p:cTn id="1" dur="indefinite" restart="never" nodeType="tmRoot">
-          <p:childTnLst>
-            <p:seq concurrent="1" nextAc="seek">
-              <p:cTn id="2" dur="indefinite" nodeType="mainSeq">
-                <p:childTnLst>
-                  <p:par>
-                    <p:cTn id="3" fill="hold">
-                      <p:stCondLst>
-                        <p:cond delay="indefinite"/>
-                      </p:stCondLst>
-                      <p:childTnLst>
-                        <p:par>
-                          <p:cTn id="4" fill="hold">
-                            <p:stCondLst>
-                              <p:cond delay="0"/>
-                            </p:stCondLst>
-                            <p:childTnLst>
-                              <p:par>
-                                <p:cTn id="5" presetID="1" presetClass="entr" presetSubtype="0" fill="hold" nodeType="clickEffect">
-                                  <p:stCondLst>
-                                    <p:cond delay="0"/>
-                                  </p:stCondLst>
-                                  <p:childTnLst>
-                                    <p:set>
-                                      <p:cBhvr>
-                                        <p:cTn id="6" dur="1" fill="hold">
-                                          <p:stCondLst>
-                                            <p:cond delay="0"/>
-                                          </p:stCondLst>
-                                        </p:cTn>
-                                        <p:tgtEl>
-                                          <p:spTgt spid="3">
-                                            <p:txEl>
-                                              <p:pRg st="1" end="1"/>
-                                            </p:txEl>
-                                          </p:spTgt>
-                                        </p:tgtEl>
-                                        <p:attrNameLst>
-                                          <p:attrName>style.visibility</p:attrName>
-                                        </p:attrNameLst>
-                                      </p:cBhvr>
-                                      <p:to>
-                                        <p:strVal val="visible"/>
-                                      </p:to>
-                                    </p:set>
-                                  </p:childTnLst>
-                                </p:cTn>
-                              </p:par>
-                              <p:par>
-                                <p:cTn id="7" presetID="1" presetClass="entr" presetSubtype="0" fill="hold" nodeType="withEffect">
-                                  <p:stCondLst>
-                                    <p:cond delay="0"/>
-                                  </p:stCondLst>
-                                  <p:childTnLst>
-                                    <p:set>
-                                      <p:cBhvr>
-                                        <p:cTn id="8" dur="1" fill="hold">
-                                          <p:stCondLst>
-                                            <p:cond delay="0"/>
-                                          </p:stCondLst>
-                                        </p:cTn>
-                                        <p:tgtEl>
-                                          <p:spTgt spid="3">
-                                            <p:txEl>
-                                              <p:pRg st="2" end="2"/>
-                                            </p:txEl>
-                                          </p:spTgt>
-                                        </p:tgtEl>
-                                        <p:attrNameLst>
-                                          <p:attrName>style.visibility</p:attrName>
-                                        </p:attrNameLst>
-                                      </p:cBhvr>
-                                      <p:to>
-                                        <p:strVal val="visible"/>
-                                      </p:to>
-                                    </p:set>
-                                  </p:childTnLst>
-                                </p:cTn>
-                              </p:par>
-                              <p:par>
-                                <p:cTn id="9" presetID="1" presetClass="entr" presetSubtype="0" fill="hold" nodeType="withEffect">
-                                  <p:stCondLst>
-                                    <p:cond delay="0"/>
-                                  </p:stCondLst>
-                                  <p:childTnLst>
-                                    <p:set>
-                                      <p:cBhvr>
-                                        <p:cTn id="10" dur="1" fill="hold">
-                                          <p:stCondLst>
-                                            <p:cond delay="0"/>
-                                          </p:stCondLst>
-                                        </p:cTn>
-                                        <p:tgtEl>
-                                          <p:spTgt spid="3">
-                                            <p:txEl>
-                                              <p:pRg st="3" end="3"/>
-                                            </p:txEl>
-                                          </p:spTgt>
-                                        </p:tgtEl>
-                                        <p:attrNameLst>
-                                          <p:attrName>style.visibility</p:attrName>
-                                        </p:attrNameLst>
-                                      </p:cBhvr>
-                                      <p:to>
-                                        <p:strVal val="visible"/>
-                                      </p:to>
-                                    </p:set>
-                                  </p:childTnLst>
-                                </p:cTn>
-                              </p:par>
-                            </p:childTnLst>
-                          </p:cTn>
-                        </p:par>
-                      </p:childTnLst>
-                    </p:cTn>
-                  </p:par>
-                  <p:par>
-                    <p:cTn id="11" fill="hold">
-                      <p:stCondLst>
-                        <p:cond delay="indefinite"/>
-                      </p:stCondLst>
-                      <p:childTnLst>
-                        <p:par>
-                          <p:cTn id="12" fill="hold">
-                            <p:stCondLst>
-                              <p:cond delay="0"/>
-                            </p:stCondLst>
-                            <p:childTnLst>
-                              <p:par>
-                                <p:cTn id="13" presetID="1" presetClass="entr" presetSubtype="0" fill="hold" nodeType="clickEffect">
-                                  <p:stCondLst>
-                                    <p:cond delay="0"/>
-                                  </p:stCondLst>
-                                  <p:childTnLst>
-                                    <p:set>
-                                      <p:cBhvr>
-                                        <p:cTn id="14" dur="1" fill="hold">
-                                          <p:stCondLst>
-                                            <p:cond delay="0"/>
-                                          </p:stCondLst>
-                                        </p:cTn>
-                                        <p:tgtEl>
-                                          <p:spTgt spid="3">
-                                            <p:txEl>
-                                              <p:pRg st="4" end="4"/>
-                                            </p:txEl>
-                                          </p:spTgt>
-                                        </p:tgtEl>
-                                        <p:attrNameLst>
-                                          <p:attrName>style.visibility</p:attrName>
-                                        </p:attrNameLst>
-                                      </p:cBhvr>
-                                      <p:to>
-                                        <p:strVal val="visible"/>
-                                      </p:to>
-                                    </p:set>
-                                  </p:childTnLst>
-                                </p:cTn>
-                              </p:par>
-                            </p:childTnLst>
-                          </p:cTn>
-                        </p:par>
-                      </p:childTnLst>
-                    </p:cTn>
-                  </p:par>
-                </p:childTnLst>
-              </p:cTn>
-              <p:prevCondLst>
-                <p:cond evt="onPrev" delay="0">
-                  <p:tgtEl>
-                    <p:sldTgt/>
-                  </p:tgtEl>
-                </p:cond>
-              </p:prevCondLst>
-              <p:nextCondLst>
-                <p:cond evt="onNext" delay="0">
-                  <p:tgtEl>
-                    <p:sldTgt/>
-                  </p:tgtEl>
-                </p:cond>
-              </p:nextCondLst>
-            </p:seq>
-          </p:childTnLst>
-        </p:cTn>
-      </p:par>
-    </p:tnLst>
-  </p:timing>
 </p:sld>
 </file>
 
-<file path=ppt/slides/slide29.xml><?xml version="1.0" encoding="utf-8"?>
+<file path=ppt/slides/slide3.xml><?xml version="1.0" encoding="utf-8"?>
+<p:sld xmlns:a="http://schemas.openxmlformats.org/drawingml/2006/main" xmlns:r="http://schemas.openxmlformats.org/officeDocument/2006/relationships" xmlns:p="http://schemas.openxmlformats.org/presentationml/2006/main" show="0">
+  <p:cSld>
+    <p:spTree>
+      <p:nvGrpSpPr>
+        <p:cNvPr id="1" name=""/>
+        <p:cNvGrpSpPr/>
+        <p:nvPr/>
+      </p:nvGrpSpPr>
+      <p:grpSpPr>
+        <a:xfrm>
+          <a:off x="0" y="0"/>
+          <a:ext cx="0" cy="0"/>
+          <a:chOff x="0" y="0"/>
+          <a:chExt cx="0" cy="0"/>
+        </a:xfrm>
+      </p:grpSpPr>
+      <p:sp>
+        <p:nvSpPr>
+          <p:cNvPr id="2" name="Title 1"/>
+          <p:cNvSpPr>
+            <a:spLocks noGrp="1"/>
+          </p:cNvSpPr>
+          <p:nvPr>
+            <p:ph type="title"/>
+          </p:nvPr>
+        </p:nvSpPr>
+        <p:spPr/>
+        <p:txBody>
+          <a:bodyPr/>
+          <a:lstStyle/>
+          <a:p>
+            <a:pPr marL="0" lvl="0" indent="0">
+              <a:buNone/>
+            </a:pPr>
+            <a:r>
+              <a:t>Linear Model Assumptions</a:t>
+            </a:r>
+          </a:p>
+        </p:txBody>
+      </p:sp>
+      <p:sp>
+        <p:nvSpPr>
+          <p:cNvPr id="3" name="Content Placeholder 2"/>
+          <p:cNvSpPr>
+            <a:spLocks noGrp="1"/>
+          </p:cNvSpPr>
+          <p:nvPr>
+            <p:ph idx="1"/>
+          </p:nvPr>
+        </p:nvSpPr>
+        <p:spPr>
+          <a:xfrm>
+            <a:off x="457200" y="1167938"/>
+            <a:ext cx="8229600" cy="3769583"/>
+          </a:xfrm>
+        </p:spPr>
+        <p:txBody>
+          <a:bodyPr>
+            <a:normAutofit fontScale="70000" lnSpcReduction="20000"/>
+          </a:bodyPr>
+          <a:lstStyle/>
+          <a:p>
+            <a:pPr marL="0" lvl="0" indent="0">
+              <a:buNone/>
+            </a:pPr>
+            <a:r>
+              <a:rPr dirty="0"/>
+              <a:t>There are a number of assumptions in linear models that you overlook at your peril!</a:t>
+            </a:r>
+          </a:p>
+          <a:p>
+            <a:pPr lvl="0"/>
+            <a:r>
+              <a:rPr dirty="0"/>
+              <a:t>The feature or predictor variables should be </a:t>
+            </a:r>
+            <a:r>
+              <a:rPr b="1" dirty="0"/>
+              <a:t>independent</a:t>
+            </a:r>
+            <a:r>
+              <a:rPr dirty="0"/>
+              <a:t> of one another</a:t>
+            </a:r>
+          </a:p>
+          <a:p>
+            <a:pPr lvl="1"/>
+            <a:r>
+              <a:rPr dirty="0"/>
+              <a:t>This is rarely true in practice</a:t>
+            </a:r>
+          </a:p>
+          <a:p>
+            <a:pPr lvl="1"/>
+            <a:r>
+              <a:rPr b="1" dirty="0"/>
+              <a:t>Multi-</a:t>
+            </a:r>
+            <a:r>
+              <a:rPr b="1" dirty="0" err="1"/>
+              <a:t>colinearity</a:t>
+            </a:r>
+            <a:r>
+              <a:rPr dirty="0"/>
+              <a:t> between features makes the model </a:t>
+            </a:r>
+            <a:r>
+              <a:rPr b="1" dirty="0"/>
+              <a:t>under-determined</a:t>
+            </a:r>
+          </a:p>
+          <a:p>
+            <a:pPr lvl="0"/>
+            <a:r>
+              <a:rPr dirty="0"/>
+              <a:t>We assume that numeric features or predictors have zero mean and about the same scale</a:t>
+            </a:r>
+          </a:p>
+          <a:p>
+            <a:pPr lvl="1"/>
+            <a:r>
+              <a:rPr lang="en-US" dirty="0"/>
+              <a:t>Zero-center predictors to get</a:t>
+            </a:r>
+            <a:r>
+              <a:rPr dirty="0"/>
+              <a:t> </a:t>
+            </a:r>
+            <a:r>
+              <a:rPr lang="en-US" dirty="0"/>
+              <a:t>interpretable </a:t>
+            </a:r>
+            <a:r>
+              <a:rPr dirty="0"/>
+              <a:t>estimat</a:t>
+            </a:r>
+            <a:r>
+              <a:rPr lang="en-US" dirty="0"/>
+              <a:t>es</a:t>
+            </a:r>
+            <a:r>
+              <a:rPr dirty="0"/>
+              <a:t> of regression coefficients</a:t>
+            </a:r>
+          </a:p>
+          <a:p>
+            <a:pPr lvl="1"/>
+            <a:r>
+              <a:rPr dirty="0"/>
+              <a:t>We do not want to have predictors with a large numeric range dominate training</a:t>
+            </a:r>
+          </a:p>
+          <a:p>
+            <a:pPr lvl="1"/>
+            <a:r>
+              <a:rPr dirty="0"/>
+              <a:t>Example: income is in the range of 10s or 100s of thousands and age is in the range of 10s, but </a:t>
+            </a:r>
+            <a:r>
+              <a:rPr dirty="0" err="1"/>
+              <a:t>apriori</a:t>
+            </a:r>
+            <a:r>
+              <a:rPr dirty="0"/>
+              <a:t> income is no more important than age as a predictor</a:t>
+            </a:r>
+          </a:p>
+          <a:p>
+            <a:pPr lvl="0"/>
+            <a:r>
+              <a:rPr dirty="0"/>
+              <a:t>Values of each predictor or feature should be </a:t>
+            </a:r>
+            <a:r>
+              <a:rPr dirty="0" err="1"/>
+              <a:t>iid</a:t>
+            </a:r>
+            <a:endParaRPr dirty="0"/>
+          </a:p>
+          <a:p>
+            <a:pPr lvl="1"/>
+            <a:r>
+              <a:rPr dirty="0"/>
+              <a:t>If variance changes with sample, the optimal value of the coefficient could not be constant</a:t>
+            </a:r>
+          </a:p>
+          <a:p>
+            <a:pPr lvl="1"/>
+            <a:r>
+              <a:rPr dirty="0"/>
+              <a:t>If there</a:t>
+            </a:r>
+            <a:r>
+              <a:rPr lang="en-US" dirty="0"/>
+              <a:t> is</a:t>
+            </a:r>
+            <a:r>
+              <a:rPr dirty="0"/>
+              <a:t> </a:t>
+            </a:r>
+            <a:r>
+              <a:rPr b="1" dirty="0"/>
+              <a:t>serial correlation</a:t>
+            </a:r>
+            <a:r>
+              <a:rPr dirty="0"/>
+              <a:t> in the predictor values, the </a:t>
+            </a:r>
+            <a:r>
+              <a:rPr dirty="0" err="1"/>
+              <a:t>iid</a:t>
+            </a:r>
+            <a:r>
+              <a:rPr dirty="0"/>
+              <a:t> assumption is violated - but can account for this such as in time series models</a:t>
+            </a:r>
+          </a:p>
+        </p:txBody>
+      </p:sp>
+    </p:spTree>
+  </p:cSld>
+  <p:clrMapOvr>
+    <a:masterClrMapping/>
+  </p:clrMapOvr>
+</p:sld>
+</file>
+
+<file path=ppt/slides/slide30.xml><?xml version="1.0" encoding="utf-8"?>
 <p:sld xmlns:a="http://schemas.openxmlformats.org/drawingml/2006/main" xmlns:r="http://schemas.openxmlformats.org/officeDocument/2006/relationships" xmlns:p="http://schemas.openxmlformats.org/presentationml/2006/main">
   <p:cSld>
     <p:spTree>
@@ -16017,235 +16631,7 @@
 </p:sld>
 </file>
 
-<file path=ppt/slides/slide3.xml><?xml version="1.0" encoding="utf-8"?>
-<p:sld xmlns:a="http://schemas.openxmlformats.org/drawingml/2006/main" xmlns:r="http://schemas.openxmlformats.org/officeDocument/2006/relationships" xmlns:p="http://schemas.openxmlformats.org/presentationml/2006/main">
-  <p:cSld>
-    <p:spTree>
-      <p:nvGrpSpPr>
-        <p:cNvPr id="1" name=""/>
-        <p:cNvGrpSpPr/>
-        <p:nvPr/>
-      </p:nvGrpSpPr>
-      <p:grpSpPr>
-        <a:xfrm>
-          <a:off x="0" y="0"/>
-          <a:ext cx="0" cy="0"/>
-          <a:chOff x="0" y="0"/>
-          <a:chExt cx="0" cy="0"/>
-        </a:xfrm>
-      </p:grpSpPr>
-      <p:sp>
-        <p:nvSpPr>
-          <p:cNvPr id="2" name="Title 1"/>
-          <p:cNvSpPr>
-            <a:spLocks noGrp="1"/>
-          </p:cNvSpPr>
-          <p:nvPr>
-            <p:ph type="title"/>
-          </p:nvPr>
-        </p:nvSpPr>
-        <p:spPr/>
-        <p:txBody>
-          <a:bodyPr/>
-          <a:lstStyle/>
-          <a:p>
-            <a:pPr marL="0" lvl="0" indent="0">
-              <a:buNone/>
-            </a:pPr>
-            <a:r>
-              <a:t>Linear Model Assumptions</a:t>
-            </a:r>
-          </a:p>
-        </p:txBody>
-      </p:sp>
-      <p:sp>
-        <p:nvSpPr>
-          <p:cNvPr id="3" name="Content Placeholder 2"/>
-          <p:cNvSpPr>
-            <a:spLocks noGrp="1"/>
-          </p:cNvSpPr>
-          <p:nvPr>
-            <p:ph idx="1"/>
-          </p:nvPr>
-        </p:nvSpPr>
-        <p:spPr>
-          <a:xfrm>
-            <a:off x="457200" y="1167938"/>
-            <a:ext cx="8229600" cy="3769583"/>
-          </a:xfrm>
-        </p:spPr>
-        <p:txBody>
-          <a:bodyPr>
-            <a:normAutofit fontScale="70000" lnSpcReduction="20000"/>
-          </a:bodyPr>
-          <a:lstStyle/>
-          <a:p>
-            <a:pPr marL="0" lvl="0" indent="0">
-              <a:buNone/>
-            </a:pPr>
-            <a:r>
-              <a:rPr dirty="0"/>
-              <a:t>There are a number of assumptions in linear models that you overlook at your peril!</a:t>
-            </a:r>
-          </a:p>
-          <a:p>
-            <a:pPr lvl="0"/>
-            <a:r>
-              <a:rPr dirty="0"/>
-              <a:t>The feature or predictor variables should be </a:t>
-            </a:r>
-            <a:r>
-              <a:rPr b="1" dirty="0"/>
-              <a:t>independent</a:t>
-            </a:r>
-            <a:r>
-              <a:rPr dirty="0"/>
-              <a:t> of one another</a:t>
-            </a:r>
-          </a:p>
-          <a:p>
-            <a:pPr lvl="1"/>
-            <a:r>
-              <a:rPr dirty="0"/>
-              <a:t>This is rarely true in practice</a:t>
-            </a:r>
-          </a:p>
-          <a:p>
-            <a:pPr lvl="1"/>
-            <a:r>
-              <a:rPr b="1" dirty="0"/>
-              <a:t>Multi-</a:t>
-            </a:r>
-            <a:r>
-              <a:rPr b="1" dirty="0" err="1"/>
-              <a:t>colinearity</a:t>
-            </a:r>
-            <a:r>
-              <a:rPr dirty="0"/>
-              <a:t> between features makes the model </a:t>
-            </a:r>
-            <a:r>
-              <a:rPr b="1" dirty="0"/>
-              <a:t>under-determined</a:t>
-            </a:r>
-          </a:p>
-          <a:p>
-            <a:pPr lvl="0"/>
-            <a:r>
-              <a:rPr dirty="0"/>
-              <a:t>We assume that numeric features or predictors have zero mean and about the same scale</a:t>
-            </a:r>
-          </a:p>
-          <a:p>
-            <a:pPr lvl="1"/>
-            <a:r>
-              <a:rPr lang="en-US" dirty="0"/>
-              <a:t>Zero-center predictors to get</a:t>
-            </a:r>
-            <a:r>
-              <a:rPr dirty="0"/>
-              <a:t> </a:t>
-            </a:r>
-            <a:r>
-              <a:rPr lang="en-US" dirty="0"/>
-              <a:t>interpretable </a:t>
-            </a:r>
-            <a:r>
-              <a:rPr dirty="0"/>
-              <a:t>estimat</a:t>
-            </a:r>
-            <a:r>
-              <a:rPr lang="en-US" dirty="0"/>
-              <a:t>es</a:t>
-            </a:r>
-            <a:r>
-              <a:rPr dirty="0"/>
-              <a:t> of regression coefficients</a:t>
-            </a:r>
-          </a:p>
-          <a:p>
-            <a:pPr lvl="1"/>
-            <a:r>
-              <a:rPr dirty="0"/>
-              <a:t>We do not want to have predictors with a large numeric range dominate training</a:t>
-            </a:r>
-          </a:p>
-          <a:p>
-            <a:pPr lvl="1"/>
-            <a:r>
-              <a:rPr dirty="0"/>
-              <a:t>Example: income is in the range of 10s or 100s of thousands and age is in the range of 10s, but </a:t>
-            </a:r>
-            <a:r>
-              <a:rPr dirty="0" err="1"/>
-              <a:t>apriori</a:t>
-            </a:r>
-            <a:r>
-              <a:rPr dirty="0"/>
-              <a:t> income is no more important than age as a predictor</a:t>
-            </a:r>
-          </a:p>
-          <a:p>
-            <a:pPr lvl="0"/>
-            <a:r>
-              <a:rPr dirty="0"/>
-              <a:t>Values of each predictor or feature should be </a:t>
-            </a:r>
-            <a:r>
-              <a:rPr dirty="0" err="1"/>
-              <a:t>iid</a:t>
-            </a:r>
-            <a:endParaRPr dirty="0"/>
-          </a:p>
-          <a:p>
-            <a:pPr lvl="1"/>
-            <a:r>
-              <a:rPr dirty="0"/>
-              <a:t>If variance changes with sample, the optimal value of the coefficient could not be constant</a:t>
-            </a:r>
-          </a:p>
-          <a:p>
-            <a:pPr lvl="1"/>
-            <a:r>
-              <a:rPr dirty="0"/>
-              <a:t>If there</a:t>
-            </a:r>
-            <a:r>
-              <a:rPr lang="en-US" dirty="0"/>
-              <a:t> is</a:t>
-            </a:r>
-            <a:r>
-              <a:rPr dirty="0"/>
-              <a:t> </a:t>
-            </a:r>
-            <a:r>
-              <a:rPr b="1" dirty="0"/>
-              <a:t>serial correlation</a:t>
-            </a:r>
-            <a:r>
-              <a:rPr dirty="0"/>
-              <a:t> in the predictor values, the </a:t>
-            </a:r>
-            <a:r>
-              <a:rPr dirty="0" err="1"/>
-              <a:t>iid</a:t>
-            </a:r>
-            <a:r>
-              <a:rPr dirty="0"/>
-              <a:t> assumption is violated - but can account for this such as in time series models</a:t>
-            </a:r>
-          </a:p>
-        </p:txBody>
-      </p:sp>
-    </p:spTree>
-  </p:cSld>
-  <p:clrMapOvr>
-    <a:masterClrMapping/>
-  </p:clrMapOvr>
-</p:sld>
-</file>
-
-<file path=ppt/slides/slide30.xml><?xml version="1.0" encoding="utf-8"?>
+<file path=ppt/slides/slide31.xml><?xml version="1.0" encoding="utf-8"?>
 <p:sld xmlns:a="http://schemas.openxmlformats.org/drawingml/2006/main" xmlns:r="http://schemas.openxmlformats.org/officeDocument/2006/relationships" xmlns:p="http://schemas.openxmlformats.org/presentationml/2006/main">
   <p:cSld>
     <p:spTree>
@@ -16686,7 +17072,7 @@
 </p:sld>
 </file>
 
-<file path=ppt/slides/slide31.xml><?xml version="1.0" encoding="utf-8"?>
+<file path=ppt/slides/slide32.xml><?xml version="1.0" encoding="utf-8"?>
 <p:sld xmlns:a="http://schemas.openxmlformats.org/drawingml/2006/main" xmlns:r="http://schemas.openxmlformats.org/officeDocument/2006/relationships" xmlns:p="http://schemas.openxmlformats.org/presentationml/2006/main">
   <p:cSld>
     <p:spTree>
@@ -17483,7 +17869,7 @@
 </p:sld>
 </file>
 
-<file path=ppt/slides/slide32.xml><?xml version="1.0" encoding="utf-8"?>
+<file path=ppt/slides/slide33.xml><?xml version="1.0" encoding="utf-8"?>
 <p:sld xmlns:a="http://schemas.openxmlformats.org/drawingml/2006/main" xmlns:r="http://schemas.openxmlformats.org/officeDocument/2006/relationships" xmlns:p="http://schemas.openxmlformats.org/presentationml/2006/main">
   <p:cSld>
     <p:spTree>
@@ -17864,7 +18250,7 @@
 </p:sld>
 </file>
 
-<file path=ppt/slides/slide33.xml><?xml version="1.0" encoding="utf-8"?>
+<file path=ppt/slides/slide34.xml><?xml version="1.0" encoding="utf-8"?>
 <p:sld xmlns:a="http://schemas.openxmlformats.org/drawingml/2006/main" xmlns:r="http://schemas.openxmlformats.org/officeDocument/2006/relationships" xmlns:p="http://schemas.openxmlformats.org/presentationml/2006/main">
   <p:cSld>
     <p:spTree>
@@ -18434,7 +18820,7 @@
 </p:sld>
 </file>
 
-<file path=ppt/slides/slide34.xml><?xml version="1.0" encoding="utf-8"?>
+<file path=ppt/slides/slide35.xml><?xml version="1.0" encoding="utf-8"?>
 <p:sld xmlns:a="http://schemas.openxmlformats.org/drawingml/2006/main" xmlns:r="http://schemas.openxmlformats.org/officeDocument/2006/relationships" xmlns:p="http://schemas.openxmlformats.org/presentationml/2006/main">
   <p:cSld>
     <p:spTree>
@@ -19302,7 +19688,7 @@
 </p:sld>
 </file>
 
-<file path=ppt/slides/slide35.xml><?xml version="1.0" encoding="utf-8"?>
+<file path=ppt/slides/slide36.xml><?xml version="1.0" encoding="utf-8"?>
 <p:sld xmlns:a="http://schemas.openxmlformats.org/drawingml/2006/main" xmlns:r="http://schemas.openxmlformats.org/officeDocument/2006/relationships" xmlns:p="http://schemas.openxmlformats.org/presentationml/2006/main">
   <p:cSld>
     <p:spTree>
@@ -19967,7 +20353,7 @@
 </p:sld>
 </file>
 
-<file path=ppt/slides/slide36.xml><?xml version="1.0" encoding="utf-8"?>
+<file path=ppt/slides/slide37.xml><?xml version="1.0" encoding="utf-8"?>
 <p:sld xmlns:a="http://schemas.openxmlformats.org/drawingml/2006/main" xmlns:r="http://schemas.openxmlformats.org/officeDocument/2006/relationships" xmlns:p="http://schemas.openxmlformats.org/presentationml/2006/main">
   <p:cSld>
     <p:spTree>
@@ -20037,7 +20423,7 @@
 </p:sld>
 </file>
 
-<file path=ppt/slides/slide37.xml><?xml version="1.0" encoding="utf-8"?>
+<file path=ppt/slides/slide38.xml><?xml version="1.0" encoding="utf-8"?>
 <p:sld xmlns:a="http://schemas.openxmlformats.org/drawingml/2006/main" xmlns:r="http://schemas.openxmlformats.org/officeDocument/2006/relationships" xmlns:p="http://schemas.openxmlformats.org/presentationml/2006/main">
   <p:cSld>
     <p:spTree>
@@ -20608,7 +20994,7 @@
 </p:sld>
 </file>
 
-<file path=ppt/slides/slide38.xml><?xml version="1.0" encoding="utf-8"?>
+<file path=ppt/slides/slide39.xml><?xml version="1.0" encoding="utf-8"?>
 <p:sld xmlns:a="http://schemas.openxmlformats.org/drawingml/2006/main" xmlns:r="http://schemas.openxmlformats.org/officeDocument/2006/relationships" xmlns:p="http://schemas.openxmlformats.org/presentationml/2006/main">
   <p:cSld>
     <p:spTree>
@@ -21164,7 +21550,201 @@
 </p:sld>
 </file>
 
-<file path=ppt/slides/slide39.xml><?xml version="1.0" encoding="utf-8"?>
+<file path=ppt/slides/slide4.xml><?xml version="1.0" encoding="utf-8"?>
+<p:sld xmlns:a="http://schemas.openxmlformats.org/drawingml/2006/main" xmlns:r="http://schemas.openxmlformats.org/officeDocument/2006/relationships" xmlns:p="http://schemas.openxmlformats.org/presentationml/2006/main">
+  <p:cSld>
+    <p:spTree>
+      <p:nvGrpSpPr>
+        <p:cNvPr id="1" name="">
+          <a:extLst>
+            <a:ext uri="{FF2B5EF4-FFF2-40B4-BE49-F238E27FC236}">
+              <a16:creationId xmlns:a16="http://schemas.microsoft.com/office/drawing/2014/main" id="{217CC54D-A93E-7DF0-F2EC-6036421943BA}"/>
+            </a:ext>
+          </a:extLst>
+        </p:cNvPr>
+        <p:cNvGrpSpPr/>
+        <p:nvPr/>
+      </p:nvGrpSpPr>
+      <p:grpSpPr>
+        <a:xfrm>
+          <a:off x="0" y="0"/>
+          <a:ext cx="0" cy="0"/>
+          <a:chOff x="0" y="0"/>
+          <a:chExt cx="0" cy="0"/>
+        </a:xfrm>
+      </p:grpSpPr>
+      <p:sp>
+        <p:nvSpPr>
+          <p:cNvPr id="2" name="Title 1">
+            <a:extLst>
+              <a:ext uri="{FF2B5EF4-FFF2-40B4-BE49-F238E27FC236}">
+                <a16:creationId xmlns:a16="http://schemas.microsoft.com/office/drawing/2014/main" id="{3B05EEC6-D606-BDA0-212E-8D3ADDACF228}"/>
+              </a:ext>
+            </a:extLst>
+          </p:cNvPr>
+          <p:cNvSpPr>
+            <a:spLocks noGrp="1"/>
+          </p:cNvSpPr>
+          <p:nvPr>
+            <p:ph type="title"/>
+          </p:nvPr>
+        </p:nvSpPr>
+        <p:spPr/>
+        <p:txBody>
+          <a:bodyPr/>
+          <a:lstStyle/>
+          <a:p>
+            <a:pPr marL="0" lvl="0" indent="0">
+              <a:buNone/>
+            </a:pPr>
+            <a:r>
+              <a:rPr lang="en-US" dirty="0"/>
+              <a:t>Introduction</a:t>
+            </a:r>
+            <a:endParaRPr dirty="0"/>
+          </a:p>
+        </p:txBody>
+      </p:sp>
+      <p:sp>
+        <p:nvSpPr>
+          <p:cNvPr id="3" name="Content Placeholder 2">
+            <a:extLst>
+              <a:ext uri="{FF2B5EF4-FFF2-40B4-BE49-F238E27FC236}">
+                <a16:creationId xmlns:a16="http://schemas.microsoft.com/office/drawing/2014/main" id="{07854A8C-8365-5A51-A4BD-48F8386E8528}"/>
+              </a:ext>
+            </a:extLst>
+          </p:cNvPr>
+          <p:cNvSpPr>
+            <a:spLocks noGrp="1"/>
+          </p:cNvSpPr>
+          <p:nvPr>
+            <p:ph idx="1"/>
+          </p:nvPr>
+        </p:nvSpPr>
+        <p:spPr/>
+        <p:txBody>
+          <a:bodyPr>
+            <a:normAutofit fontScale="77500" lnSpcReduction="20000"/>
+          </a:bodyPr>
+          <a:lstStyle/>
+          <a:p>
+            <a:pPr marL="0" lvl="0" indent="0">
+              <a:buNone/>
+            </a:pPr>
+            <a:r>
+              <a:rPr lang="en-US" dirty="0"/>
+              <a:t>Several commonly encountered data problems affect OLS and GLM models</a:t>
+            </a:r>
+            <a:endParaRPr dirty="0"/>
+          </a:p>
+          <a:p>
+            <a:pPr lvl="0"/>
+            <a:r>
+              <a:rPr lang="en-US" b="1" dirty="0"/>
+              <a:t>Zero inflated response variables </a:t>
+            </a:r>
+            <a:r>
+              <a:rPr lang="en-US" dirty="0"/>
+              <a:t>have an unusual number of zero values   </a:t>
+            </a:r>
+          </a:p>
+          <a:p>
+            <a:pPr lvl="1"/>
+            <a:r>
+              <a:rPr lang="en-US" dirty="0"/>
+              <a:t>Use a </a:t>
+            </a:r>
+            <a:r>
+              <a:rPr lang="en-US" b="1" dirty="0"/>
+              <a:t>mixture model </a:t>
+            </a:r>
+            <a:r>
+              <a:rPr lang="en-US" dirty="0"/>
+              <a:t>to switch between a binomial and another distribution</a:t>
+            </a:r>
+          </a:p>
+          <a:p>
+            <a:pPr lvl="0"/>
+            <a:r>
+              <a:rPr lang="en-US" b="1" dirty="0"/>
+              <a:t>Over-dispersed response variables </a:t>
+            </a:r>
+            <a:r>
+              <a:rPr lang="en-US" dirty="0"/>
+              <a:t>have a long tails </a:t>
+            </a:r>
+          </a:p>
+          <a:p>
+            <a:pPr lvl="1"/>
+            <a:r>
+              <a:rPr lang="en-US" dirty="0"/>
+              <a:t>Can be asymmetric with long tails</a:t>
+            </a:r>
+          </a:p>
+          <a:p>
+            <a:pPr lvl="1"/>
+            <a:r>
+              <a:rPr lang="en-US" dirty="0"/>
+              <a:t>Use heavy tailed distribution models</a:t>
+            </a:r>
+          </a:p>
+          <a:p>
+            <a:pPr lvl="1"/>
+            <a:r>
+              <a:rPr lang="en-US" dirty="0"/>
+              <a:t>Apply models with mixtures of distributions to account for large low probability responses </a:t>
+            </a:r>
+          </a:p>
+          <a:p>
+            <a:pPr lvl="0"/>
+            <a:r>
+              <a:rPr lang="en-US" b="1" dirty="0"/>
+              <a:t>Outliers in independent variables </a:t>
+            </a:r>
+            <a:r>
+              <a:rPr lang="en-US" dirty="0"/>
+              <a:t>have an undue influence on OLS and GLM models </a:t>
+            </a:r>
+          </a:p>
+          <a:p>
+            <a:pPr lvl="1"/>
+            <a:r>
+              <a:rPr lang="en-US" dirty="0"/>
+              <a:t>Robust regression models </a:t>
+            </a:r>
+            <a:r>
+              <a:rPr lang="en-US" b="1" dirty="0"/>
+              <a:t>limit the influence of outliers </a:t>
+            </a:r>
+            <a:r>
+              <a:rPr lang="en-US" dirty="0"/>
+              <a:t>on parameter estimates</a:t>
+            </a:r>
+          </a:p>
+          <a:p>
+            <a:pPr lvl="0"/>
+            <a:r>
+              <a:rPr lang="en-US" dirty="0"/>
+              <a:t>We can extend the OLS and GLM frameworks to deal with these situations  </a:t>
+            </a:r>
+            <a:endParaRPr dirty="0"/>
+          </a:p>
+        </p:txBody>
+      </p:sp>
+    </p:spTree>
+    <p:extLst>
+      <p:ext uri="{BB962C8B-B14F-4D97-AF65-F5344CB8AC3E}">
+        <p14:creationId xmlns:p14="http://schemas.microsoft.com/office/powerpoint/2010/main" val="487459844"/>
+      </p:ext>
+    </p:extLst>
+  </p:cSld>
+  <p:clrMapOvr>
+    <a:masterClrMapping/>
+  </p:clrMapOvr>
+</p:sld>
+</file>
+
+<file path=ppt/slides/slide40.xml><?xml version="1.0" encoding="utf-8"?>
 <p:sld xmlns:a="http://schemas.openxmlformats.org/drawingml/2006/main" xmlns:r="http://schemas.openxmlformats.org/officeDocument/2006/relationships" xmlns:p="http://schemas.openxmlformats.org/presentationml/2006/main">
   <p:cSld>
     <p:spTree>
@@ -21695,201 +22275,7 @@
 </p:sld>
 </file>
 
-<file path=ppt/slides/slide4.xml><?xml version="1.0" encoding="utf-8"?>
-<p:sld xmlns:a="http://schemas.openxmlformats.org/drawingml/2006/main" xmlns:r="http://schemas.openxmlformats.org/officeDocument/2006/relationships" xmlns:p="http://schemas.openxmlformats.org/presentationml/2006/main">
-  <p:cSld>
-    <p:spTree>
-      <p:nvGrpSpPr>
-        <p:cNvPr id="1" name="">
-          <a:extLst>
-            <a:ext uri="{FF2B5EF4-FFF2-40B4-BE49-F238E27FC236}">
-              <a16:creationId xmlns:a16="http://schemas.microsoft.com/office/drawing/2014/main" id="{217CC54D-A93E-7DF0-F2EC-6036421943BA}"/>
-            </a:ext>
-          </a:extLst>
-        </p:cNvPr>
-        <p:cNvGrpSpPr/>
-        <p:nvPr/>
-      </p:nvGrpSpPr>
-      <p:grpSpPr>
-        <a:xfrm>
-          <a:off x="0" y="0"/>
-          <a:ext cx="0" cy="0"/>
-          <a:chOff x="0" y="0"/>
-          <a:chExt cx="0" cy="0"/>
-        </a:xfrm>
-      </p:grpSpPr>
-      <p:sp>
-        <p:nvSpPr>
-          <p:cNvPr id="2" name="Title 1">
-            <a:extLst>
-              <a:ext uri="{FF2B5EF4-FFF2-40B4-BE49-F238E27FC236}">
-                <a16:creationId xmlns:a16="http://schemas.microsoft.com/office/drawing/2014/main" id="{3B05EEC6-D606-BDA0-212E-8D3ADDACF228}"/>
-              </a:ext>
-            </a:extLst>
-          </p:cNvPr>
-          <p:cNvSpPr>
-            <a:spLocks noGrp="1"/>
-          </p:cNvSpPr>
-          <p:nvPr>
-            <p:ph type="title"/>
-          </p:nvPr>
-        </p:nvSpPr>
-        <p:spPr/>
-        <p:txBody>
-          <a:bodyPr/>
-          <a:lstStyle/>
-          <a:p>
-            <a:pPr marL="0" lvl="0" indent="0">
-              <a:buNone/>
-            </a:pPr>
-            <a:r>
-              <a:rPr lang="en-US" dirty="0"/>
-              <a:t>Introduction</a:t>
-            </a:r>
-            <a:endParaRPr dirty="0"/>
-          </a:p>
-        </p:txBody>
-      </p:sp>
-      <p:sp>
-        <p:nvSpPr>
-          <p:cNvPr id="3" name="Content Placeholder 2">
-            <a:extLst>
-              <a:ext uri="{FF2B5EF4-FFF2-40B4-BE49-F238E27FC236}">
-                <a16:creationId xmlns:a16="http://schemas.microsoft.com/office/drawing/2014/main" id="{07854A8C-8365-5A51-A4BD-48F8386E8528}"/>
-              </a:ext>
-            </a:extLst>
-          </p:cNvPr>
-          <p:cNvSpPr>
-            <a:spLocks noGrp="1"/>
-          </p:cNvSpPr>
-          <p:nvPr>
-            <p:ph idx="1"/>
-          </p:nvPr>
-        </p:nvSpPr>
-        <p:spPr/>
-        <p:txBody>
-          <a:bodyPr>
-            <a:normAutofit fontScale="77500" lnSpcReduction="20000"/>
-          </a:bodyPr>
-          <a:lstStyle/>
-          <a:p>
-            <a:pPr marL="0" lvl="0" indent="0">
-              <a:buNone/>
-            </a:pPr>
-            <a:r>
-              <a:rPr lang="en-US" dirty="0"/>
-              <a:t>Several commonly encountered data problems affect OLS and GLM models</a:t>
-            </a:r>
-            <a:endParaRPr dirty="0"/>
-          </a:p>
-          <a:p>
-            <a:pPr lvl="0"/>
-            <a:r>
-              <a:rPr lang="en-US" b="1" dirty="0"/>
-              <a:t>Zero inflated response variables </a:t>
-            </a:r>
-            <a:r>
-              <a:rPr lang="en-US" dirty="0"/>
-              <a:t>have an unusual number of zero values   </a:t>
-            </a:r>
-          </a:p>
-          <a:p>
-            <a:pPr lvl="1"/>
-            <a:r>
-              <a:rPr lang="en-US" dirty="0"/>
-              <a:t>Use a </a:t>
-            </a:r>
-            <a:r>
-              <a:rPr lang="en-US" b="1" dirty="0"/>
-              <a:t>mixture model </a:t>
-            </a:r>
-            <a:r>
-              <a:rPr lang="en-US" dirty="0"/>
-              <a:t>to switch between a binomial and another distribution</a:t>
-            </a:r>
-          </a:p>
-          <a:p>
-            <a:pPr lvl="0"/>
-            <a:r>
-              <a:rPr lang="en-US" b="1" dirty="0"/>
-              <a:t>Over-dispersed response variables </a:t>
-            </a:r>
-            <a:r>
-              <a:rPr lang="en-US" dirty="0"/>
-              <a:t>have a long tails </a:t>
-            </a:r>
-          </a:p>
-          <a:p>
-            <a:pPr lvl="1"/>
-            <a:r>
-              <a:rPr lang="en-US" dirty="0"/>
-              <a:t>Can be asymmetric with long tails</a:t>
-            </a:r>
-          </a:p>
-          <a:p>
-            <a:pPr lvl="1"/>
-            <a:r>
-              <a:rPr lang="en-US" dirty="0"/>
-              <a:t>Use heavy tailed distribution models</a:t>
-            </a:r>
-          </a:p>
-          <a:p>
-            <a:pPr lvl="1"/>
-            <a:r>
-              <a:rPr lang="en-US" dirty="0"/>
-              <a:t>Apply models with mixtures of distributions to account for large low probability responses </a:t>
-            </a:r>
-          </a:p>
-          <a:p>
-            <a:pPr lvl="0"/>
-            <a:r>
-              <a:rPr lang="en-US" b="1" dirty="0"/>
-              <a:t>Outliers in independent variables </a:t>
-            </a:r>
-            <a:r>
-              <a:rPr lang="en-US" dirty="0"/>
-              <a:t>have an undue influence on OLS and GLM models </a:t>
-            </a:r>
-          </a:p>
-          <a:p>
-            <a:pPr lvl="1"/>
-            <a:r>
-              <a:rPr lang="en-US" dirty="0"/>
-              <a:t>Robust regression models </a:t>
-            </a:r>
-            <a:r>
-              <a:rPr lang="en-US" b="1" dirty="0"/>
-              <a:t>limit the influence of outliers </a:t>
-            </a:r>
-            <a:r>
-              <a:rPr lang="en-US" dirty="0"/>
-              <a:t>on parameter estimates</a:t>
-            </a:r>
-          </a:p>
-          <a:p>
-            <a:pPr lvl="0"/>
-            <a:r>
-              <a:rPr lang="en-US" dirty="0"/>
-              <a:t>We can extend the OLS and GLM frameworks to deal with these situations  </a:t>
-            </a:r>
-            <a:endParaRPr dirty="0"/>
-          </a:p>
-        </p:txBody>
-      </p:sp>
-    </p:spTree>
-    <p:extLst>
-      <p:ext uri="{BB962C8B-B14F-4D97-AF65-F5344CB8AC3E}">
-        <p14:creationId xmlns:p14="http://schemas.microsoft.com/office/powerpoint/2010/main" val="487459844"/>
-      </p:ext>
-    </p:extLst>
-  </p:cSld>
-  <p:clrMapOvr>
-    <a:masterClrMapping/>
-  </p:clrMapOvr>
-</p:sld>
-</file>
-
-<file path=ppt/slides/slide40.xml><?xml version="1.0" encoding="utf-8"?>
+<file path=ppt/slides/slide41.xml><?xml version="1.0" encoding="utf-8"?>
 <p:sld xmlns:a="http://schemas.openxmlformats.org/drawingml/2006/main" xmlns:r="http://schemas.openxmlformats.org/officeDocument/2006/relationships" xmlns:p="http://schemas.openxmlformats.org/presentationml/2006/main">
   <p:cSld>
     <p:spTree>
@@ -22606,7 +22992,7 @@
 </p:sld>
 </file>
 
-<file path=ppt/slides/slide41.xml><?xml version="1.0" encoding="utf-8"?>
+<file path=ppt/slides/slide42.xml><?xml version="1.0" encoding="utf-8"?>
 <p:sld xmlns:a="http://schemas.openxmlformats.org/drawingml/2006/main" xmlns:r="http://schemas.openxmlformats.org/officeDocument/2006/relationships" xmlns:p="http://schemas.openxmlformats.org/presentationml/2006/main">
   <p:cSld>
     <p:spTree>
@@ -22927,7 +23313,7 @@
 </p:sld>
 </file>
 
-<file path=ppt/slides/slide42.xml><?xml version="1.0" encoding="utf-8"?>
+<file path=ppt/slides/slide43.xml><?xml version="1.0" encoding="utf-8"?>
 <p:sld xmlns:a="http://schemas.openxmlformats.org/drawingml/2006/main" xmlns:r="http://schemas.openxmlformats.org/officeDocument/2006/relationships" xmlns:p="http://schemas.openxmlformats.org/presentationml/2006/main">
   <p:cSld>
     <p:spTree>
@@ -23831,7 +24217,7 @@
 </p:sld>
 </file>
 
-<file path=ppt/slides/slide43.xml><?xml version="1.0" encoding="utf-8"?>
+<file path=ppt/slides/slide44.xml><?xml version="1.0" encoding="utf-8"?>
 <p:sld xmlns:a="http://schemas.openxmlformats.org/drawingml/2006/main" xmlns:r="http://schemas.openxmlformats.org/officeDocument/2006/relationships" xmlns:p="http://schemas.openxmlformats.org/presentationml/2006/main">
   <p:cSld>
     <p:spTree>
@@ -24500,7 +24886,7 @@
 </p:sld>
 </file>
 
-<file path=ppt/slides/slide44.xml><?xml version="1.0" encoding="utf-8"?>
+<file path=ppt/slides/slide45.xml><?xml version="1.0" encoding="utf-8"?>
 <p:sld xmlns:a="http://schemas.openxmlformats.org/drawingml/2006/main" xmlns:r="http://schemas.openxmlformats.org/officeDocument/2006/relationships" xmlns:p="http://schemas.openxmlformats.org/presentationml/2006/main">
   <p:cSld>
     <p:spTree>
@@ -24872,7 +25258,7 @@
 </p:sld>
 </file>
 
-<file path=ppt/slides/slide45.xml><?xml version="1.0" encoding="utf-8"?>
+<file path=ppt/slides/slide46.xml><?xml version="1.0" encoding="utf-8"?>
 <p:sld xmlns:a="http://schemas.openxmlformats.org/drawingml/2006/main" xmlns:r="http://schemas.openxmlformats.org/officeDocument/2006/relationships" xmlns:p="http://schemas.openxmlformats.org/presentationml/2006/main">
   <p:cSld>
     <p:spTree>
@@ -25423,7 +25809,7 @@
 </p:sld>
 </file>
 
-<file path=ppt/slides/slide46.xml><?xml version="1.0" encoding="utf-8"?>
+<file path=ppt/slides/slide47.xml><?xml version="1.0" encoding="utf-8"?>
 <p:sld xmlns:a="http://schemas.openxmlformats.org/drawingml/2006/main" xmlns:r="http://schemas.openxmlformats.org/officeDocument/2006/relationships" xmlns:p="http://schemas.openxmlformats.org/presentationml/2006/main">
   <p:cSld>
     <p:spTree>
@@ -26141,7 +26527,7 @@
 </p:sld>
 </file>
 
-<file path=ppt/slides/slide47.xml><?xml version="1.0" encoding="utf-8"?>
+<file path=ppt/slides/slide48.xml><?xml version="1.0" encoding="utf-8"?>
 <p:sld xmlns:a="http://schemas.openxmlformats.org/drawingml/2006/main" xmlns:r="http://schemas.openxmlformats.org/officeDocument/2006/relationships" xmlns:p="http://schemas.openxmlformats.org/presentationml/2006/main">
   <p:cSld>
     <p:spTree>
@@ -26260,13 +26646,7 @@
                       <a:rPr lang="en-US">
                         <a:latin typeface="Cambria Math" panose="02040503050406030204" pitchFamily="18" charset="0"/>
                       </a:rPr>
-                      <m:t>/</m:t>
-                    </m:r>
-                    <m:r>
-                      <a:rPr lang="en-US">
-                        <a:latin typeface="Cambria Math" panose="02040503050406030204" pitchFamily="18" charset="0"/>
-                      </a:rPr>
-                      <m:t>2</m:t>
+                      <m:t>/2</m:t>
                     </m:r>
                   </m:oMath>
                 </a14:m>
@@ -26321,19 +26701,7 @@
                       <a:rPr lang="en-US" b="0" i="0" smtClean="0">
                         <a:latin typeface="Cambria Math" panose="02040503050406030204" pitchFamily="18" charset="0"/>
                       </a:rPr>
-                      <m:t>1</m:t>
-                    </m:r>
-                    <m:r>
-                      <a:rPr lang="en-US" b="0" i="0" smtClean="0">
-                        <a:latin typeface="Cambria Math" panose="02040503050406030204" pitchFamily="18" charset="0"/>
-                      </a:rPr>
-                      <m:t>.</m:t>
-                    </m:r>
-                    <m:r>
-                      <a:rPr lang="en-US" b="0" i="0" smtClean="0">
-                        <a:latin typeface="Cambria Math" panose="02040503050406030204" pitchFamily="18" charset="0"/>
-                      </a:rPr>
-                      <m:t>0</m:t>
+                      <m:t>1.0</m:t>
                     </m:r>
                   </m:oMath>
                 </a14:m>
@@ -27225,7 +27593,7 @@
 </p:sld>
 </file>
 
-<file path=ppt/slides/slide48.xml><?xml version="1.0" encoding="utf-8"?>
+<file path=ppt/slides/slide49.xml><?xml version="1.0" encoding="utf-8"?>
 <p:sld xmlns:a="http://schemas.openxmlformats.org/drawingml/2006/main" xmlns:r="http://schemas.openxmlformats.org/officeDocument/2006/relationships" xmlns:p="http://schemas.openxmlformats.org/presentationml/2006/main">
   <p:cSld>
     <p:spTree>
@@ -27712,7 +28080,71 @@
 </p:sld>
 </file>
 
-<file path=ppt/slides/slide49.xml><?xml version="1.0" encoding="utf-8"?>
+<file path=ppt/slides/slide5.xml><?xml version="1.0" encoding="utf-8"?>
+<p:sld xmlns:a="http://schemas.openxmlformats.org/drawingml/2006/main" xmlns:r="http://schemas.openxmlformats.org/officeDocument/2006/relationships" xmlns:p="http://schemas.openxmlformats.org/presentationml/2006/main">
+  <p:cSld>
+    <p:spTree>
+      <p:nvGrpSpPr>
+        <p:cNvPr id="1" name=""/>
+        <p:cNvGrpSpPr/>
+        <p:nvPr/>
+      </p:nvGrpSpPr>
+      <p:grpSpPr>
+        <a:xfrm>
+          <a:off x="0" y="0"/>
+          <a:ext cx="0" cy="0"/>
+          <a:chOff x="0" y="0"/>
+          <a:chExt cx="0" cy="0"/>
+        </a:xfrm>
+      </p:grpSpPr>
+      <p:sp>
+        <p:nvSpPr>
+          <p:cNvPr id="2" name="Title 1">
+            <a:extLst>
+              <a:ext uri="{FF2B5EF4-FFF2-40B4-BE49-F238E27FC236}">
+                <a16:creationId xmlns:a16="http://schemas.microsoft.com/office/drawing/2014/main" id="{5498C255-8488-A6BF-D8CF-6C0F8BDB00EA}"/>
+              </a:ext>
+            </a:extLst>
+          </p:cNvPr>
+          <p:cNvSpPr>
+            <a:spLocks noGrp="1"/>
+          </p:cNvSpPr>
+          <p:nvPr>
+            <p:ph type="title"/>
+          </p:nvPr>
+        </p:nvSpPr>
+        <p:spPr>
+          <a:xfrm>
+            <a:off x="771081" y="1850264"/>
+            <a:ext cx="7772400" cy="1021556"/>
+          </a:xfrm>
+        </p:spPr>
+        <p:txBody>
+          <a:bodyPr/>
+          <a:lstStyle/>
+          <a:p>
+            <a:pPr algn="ctr"/>
+            <a:r>
+              <a:rPr lang="en-US" b="0" cap="none" dirty="0"/>
+              <a:t>Models for Zero-Inflated Response</a:t>
+            </a:r>
+          </a:p>
+        </p:txBody>
+      </p:sp>
+    </p:spTree>
+    <p:extLst>
+      <p:ext uri="{BB962C8B-B14F-4D97-AF65-F5344CB8AC3E}">
+        <p14:creationId xmlns:p14="http://schemas.microsoft.com/office/powerpoint/2010/main" val="3761794938"/>
+      </p:ext>
+    </p:extLst>
+  </p:cSld>
+  <p:clrMapOvr>
+    <a:masterClrMapping/>
+  </p:clrMapOvr>
+</p:sld>
+</file>
+
+<file path=ppt/slides/slide50.xml><?xml version="1.0" encoding="utf-8"?>
 <p:sld xmlns:a="http://schemas.openxmlformats.org/drawingml/2006/main" xmlns:r="http://schemas.openxmlformats.org/officeDocument/2006/relationships" xmlns:p="http://schemas.openxmlformats.org/presentationml/2006/main">
   <p:cSld>
     <p:spTree>
@@ -28775,71 +29207,7 @@
 </p:sld>
 </file>
 
-<file path=ppt/slides/slide5.xml><?xml version="1.0" encoding="utf-8"?>
-<p:sld xmlns:a="http://schemas.openxmlformats.org/drawingml/2006/main" xmlns:r="http://schemas.openxmlformats.org/officeDocument/2006/relationships" xmlns:p="http://schemas.openxmlformats.org/presentationml/2006/main">
-  <p:cSld>
-    <p:spTree>
-      <p:nvGrpSpPr>
-        <p:cNvPr id="1" name=""/>
-        <p:cNvGrpSpPr/>
-        <p:nvPr/>
-      </p:nvGrpSpPr>
-      <p:grpSpPr>
-        <a:xfrm>
-          <a:off x="0" y="0"/>
-          <a:ext cx="0" cy="0"/>
-          <a:chOff x="0" y="0"/>
-          <a:chExt cx="0" cy="0"/>
-        </a:xfrm>
-      </p:grpSpPr>
-      <p:sp>
-        <p:nvSpPr>
-          <p:cNvPr id="2" name="Title 1">
-            <a:extLst>
-              <a:ext uri="{FF2B5EF4-FFF2-40B4-BE49-F238E27FC236}">
-                <a16:creationId xmlns:a16="http://schemas.microsoft.com/office/drawing/2014/main" id="{5498C255-8488-A6BF-D8CF-6C0F8BDB00EA}"/>
-              </a:ext>
-            </a:extLst>
-          </p:cNvPr>
-          <p:cNvSpPr>
-            <a:spLocks noGrp="1"/>
-          </p:cNvSpPr>
-          <p:nvPr>
-            <p:ph type="title"/>
-          </p:nvPr>
-        </p:nvSpPr>
-        <p:spPr>
-          <a:xfrm>
-            <a:off x="771081" y="1850264"/>
-            <a:ext cx="7772400" cy="1021556"/>
-          </a:xfrm>
-        </p:spPr>
-        <p:txBody>
-          <a:bodyPr/>
-          <a:lstStyle/>
-          <a:p>
-            <a:pPr algn="ctr"/>
-            <a:r>
-              <a:rPr lang="en-US" b="0" cap="none" dirty="0"/>
-              <a:t>Models for Zero-Inflated Response</a:t>
-            </a:r>
-          </a:p>
-        </p:txBody>
-      </p:sp>
-    </p:spTree>
-    <p:extLst>
-      <p:ext uri="{BB962C8B-B14F-4D97-AF65-F5344CB8AC3E}">
-        <p14:creationId xmlns:p14="http://schemas.microsoft.com/office/powerpoint/2010/main" val="3761794938"/>
-      </p:ext>
-    </p:extLst>
-  </p:cSld>
-  <p:clrMapOvr>
-    <a:masterClrMapping/>
-  </p:clrMapOvr>
-</p:sld>
-</file>
-
-<file path=ppt/slides/slide50.xml><?xml version="1.0" encoding="utf-8"?>
+<file path=ppt/slides/slide51.xml><?xml version="1.0" encoding="utf-8"?>
 <p:sld xmlns:a="http://schemas.openxmlformats.org/drawingml/2006/main" xmlns:r="http://schemas.openxmlformats.org/officeDocument/2006/relationships" xmlns:p="http://schemas.openxmlformats.org/presentationml/2006/main">
   <p:cSld>
     <p:spTree>
@@ -29804,7 +30172,7 @@
 </p:sld>
 </file>
 
-<file path=ppt/slides/slide51.xml><?xml version="1.0" encoding="utf-8"?>
+<file path=ppt/slides/slide52.xml><?xml version="1.0" encoding="utf-8"?>
 <p:sld xmlns:a="http://schemas.openxmlformats.org/drawingml/2006/main" xmlns:r="http://schemas.openxmlformats.org/officeDocument/2006/relationships" xmlns:p="http://schemas.openxmlformats.org/presentationml/2006/main">
   <p:cSld>
     <p:spTree>
@@ -30157,7 +30525,7 @@
 </p:sld>
 </file>
 
-<file path=ppt/slides/slide52.xml><?xml version="1.0" encoding="utf-8"?>
+<file path=ppt/slides/slide53.xml><?xml version="1.0" encoding="utf-8"?>
 <p:sld xmlns:a="http://schemas.openxmlformats.org/drawingml/2006/main" xmlns:r="http://schemas.openxmlformats.org/officeDocument/2006/relationships" xmlns:p="http://schemas.openxmlformats.org/presentationml/2006/main">
   <p:cSld>
     <p:spTree>
@@ -30713,7 +31081,7 @@
 </p:sld>
 </file>
 
-<file path=ppt/slides/slide53.xml><?xml version="1.0" encoding="utf-8"?>
+<file path=ppt/slides/slide54.xml><?xml version="1.0" encoding="utf-8"?>
 <p:sld xmlns:a="http://schemas.openxmlformats.org/drawingml/2006/main" xmlns:r="http://schemas.openxmlformats.org/officeDocument/2006/relationships" xmlns:p="http://schemas.openxmlformats.org/presentationml/2006/main">
   <p:cSld>
     <p:spTree>
@@ -31327,7 +31695,7 @@
 </p:sld>
 </file>
 
-<file path=ppt/slides/slide54.xml><?xml version="1.0" encoding="utf-8"?>
+<file path=ppt/slides/slide55.xml><?xml version="1.0" encoding="utf-8"?>
 <p:sld xmlns:a="http://schemas.openxmlformats.org/drawingml/2006/main" xmlns:r="http://schemas.openxmlformats.org/officeDocument/2006/relationships" xmlns:p="http://schemas.openxmlformats.org/presentationml/2006/main">
   <p:cSld>
     <p:spTree>
@@ -32032,7 +32400,7 @@
 </p:sld>
 </file>
 
-<file path=ppt/slides/slide55.xml><?xml version="1.0" encoding="utf-8"?>
+<file path=ppt/slides/slide56.xml><?xml version="1.0" encoding="utf-8"?>
 <p:sld xmlns:a="http://schemas.openxmlformats.org/drawingml/2006/main" xmlns:r="http://schemas.openxmlformats.org/officeDocument/2006/relationships" xmlns:p="http://schemas.openxmlformats.org/presentationml/2006/main">
   <p:cSld>
     <p:spTree>
@@ -33674,8 +34042,8 @@
           </a:p>
         </p:txBody>
       </p:sp>
-      <mc:AlternateContent xmlns:mc="http://schemas.openxmlformats.org/markup-compatibility/2006">
-        <mc:Choice xmlns:a14="http://schemas.microsoft.com/office/drawing/2010/main" Requires="a14">
+      <mc:AlternateContent xmlns:mc="http://schemas.openxmlformats.org/markup-compatibility/2006" xmlns:a14="http://schemas.microsoft.com/office/drawing/2010/main">
+        <mc:Choice Requires="a14">
           <p:sp>
             <p:nvSpPr>
               <p:cNvPr id="3" name="Content Placeholder 2">
@@ -33954,13 +34322,7 @@
                                   <a:rPr lang="en-US" i="1">
                                     <a:latin typeface="Cambria Math" panose="02040503050406030204" pitchFamily="18" charset="0"/>
                                   </a:rPr>
-                                  <m:t>=</m:t>
-                                </m:r>
-                                <m:r>
-                                  <a:rPr lang="en-US" i="1">
-                                    <a:latin typeface="Cambria Math" panose="02040503050406030204" pitchFamily="18" charset="0"/>
-                                  </a:rPr>
-                                  <m:t>0</m:t>
+                                  <m:t>=0</m:t>
                                 </m:r>
                               </m:e>
                             </m:d>
@@ -34002,14 +34364,7 @@
                                     <a:latin typeface="Cambria Math" panose="02040503050406030204" pitchFamily="18" charset="0"/>
                                     <a:ea typeface="Cambria Math" panose="02040503050406030204" pitchFamily="18" charset="0"/>
                                   </a:rPr>
-                                  <m:t>1</m:t>
-                                </m:r>
-                                <m:r>
-                                  <a:rPr lang="en-US" i="1">
-                                    <a:latin typeface="Cambria Math" panose="02040503050406030204" pitchFamily="18" charset="0"/>
-                                    <a:ea typeface="Cambria Math" panose="02040503050406030204" pitchFamily="18" charset="0"/>
-                                  </a:rPr>
-                                  <m:t>−</m:t>
+                                  <m:t>1−</m:t>
                                 </m:r>
                                 <m:r>
                                   <a:rPr lang="en-US" i="1">
@@ -34064,13 +34419,7 @@
                                   <a:rPr lang="en-US" b="0" i="1" smtClean="0">
                                     <a:latin typeface="Cambria Math" panose="02040503050406030204" pitchFamily="18" charset="0"/>
                                   </a:rPr>
-                                  <m:t>0</m:t>
-                                </m:r>
-                                <m:r>
-                                  <a:rPr lang="en-US" b="0" i="1" smtClean="0">
-                                    <a:latin typeface="Cambria Math" panose="02040503050406030204" pitchFamily="18" charset="0"/>
-                                  </a:rPr>
-                                  <m:t> | </m:t>
+                                  <m:t>0 | </m:t>
                                 </m:r>
                                 <m:r>
                                   <a:rPr lang="en-US" i="1">
@@ -34140,6 +34489,20 @@
                                     </m:r>
                                   </m:sub>
                                 </m:sSub>
+                                <m:r>
+                                  <a:rPr lang="en-US" i="1" smtClean="0">
+                                    <a:latin typeface="Cambria Math" panose="02040503050406030204" pitchFamily="18" charset="0"/>
+                                    <a:ea typeface="Cambria Math" panose="02040503050406030204" pitchFamily="18" charset="0"/>
+                                  </a:rPr>
+                                  <m:t>&gt;</m:t>
+                                </m:r>
+                                <m:r>
+                                  <a:rPr lang="en-US" b="0" i="1" smtClean="0">
+                                    <a:latin typeface="Cambria Math" panose="02040503050406030204" pitchFamily="18" charset="0"/>
+                                    <a:ea typeface="Cambria Math" panose="02040503050406030204" pitchFamily="18" charset="0"/>
+                                  </a:rPr>
+                                  <m:t>0</m:t>
+                                </m:r>
                               </m:e>
                             </m:d>
                             <m:r>
@@ -34166,14 +34529,7 @@
                                     <a:latin typeface="Cambria Math" panose="02040503050406030204" pitchFamily="18" charset="0"/>
                                     <a:ea typeface="Cambria Math" panose="02040503050406030204" pitchFamily="18" charset="0"/>
                                   </a:rPr>
-                                  <m:t>1</m:t>
-                                </m:r>
-                                <m:r>
-                                  <a:rPr lang="en-US" i="1">
-                                    <a:latin typeface="Cambria Math" panose="02040503050406030204" pitchFamily="18" charset="0"/>
-                                    <a:ea typeface="Cambria Math" panose="02040503050406030204" pitchFamily="18" charset="0"/>
-                                  </a:rPr>
-                                  <m:t>−</m:t>
+                                  <m:t>1−</m:t>
                                 </m:r>
                                 <m:r>
                                   <a:rPr lang="en-US" i="1">
@@ -34286,7 +34642,7 @@
             </p:txBody>
           </p:sp>
         </mc:Choice>
-        <mc:Fallback>
+        <mc:Fallback xmlns="">
           <p:sp>
             <p:nvSpPr>
               <p:cNvPr id="3" name="Content Placeholder 2">
@@ -34569,15 +34925,33 @@
                                   </p:childTnLst>
                                 </p:cTn>
                               </p:par>
+                            </p:childTnLst>
+                          </p:cTn>
+                        </p:par>
+                      </p:childTnLst>
+                    </p:cTn>
+                  </p:par>
+                  <p:par>
+                    <p:cTn id="21" fill="hold">
+                      <p:stCondLst>
+                        <p:cond delay="indefinite"/>
+                      </p:stCondLst>
+                      <p:childTnLst>
+                        <p:par>
+                          <p:cTn id="22" fill="hold">
+                            <p:stCondLst>
+                              <p:cond delay="0"/>
+                            </p:stCondLst>
+                            <p:childTnLst>
                               <p:par>
-                                <p:cTn id="21" presetID="1" presetClass="entr" presetSubtype="0" fill="hold" grpId="0" nodeType="withEffect">
+                                <p:cTn id="23" presetID="1" presetClass="entr" presetSubtype="0" fill="hold" grpId="0" nodeType="clickEffect">
                                   <p:stCondLst>
                                     <p:cond delay="0"/>
                                   </p:stCondLst>
                                   <p:childTnLst>
                                     <p:set>
                                       <p:cBhvr>
-                                        <p:cTn id="22" dur="1" fill="hold">
+                                        <p:cTn id="24" dur="1" fill="hold">
                                           <p:stCondLst>
                                             <p:cond delay="0"/>
                                           </p:stCondLst>
@@ -34601,14 +34975,14 @@
                                 </p:cTn>
                               </p:par>
                               <p:par>
-                                <p:cTn id="23" presetID="1" presetClass="entr" presetSubtype="0" fill="hold" grpId="0" nodeType="withEffect">
+                                <p:cTn id="25" presetID="1" presetClass="entr" presetSubtype="0" fill="hold" grpId="0" nodeType="withEffect">
                                   <p:stCondLst>
                                     <p:cond delay="0"/>
                                   </p:stCondLst>
                                   <p:childTnLst>
                                     <p:set>
                                       <p:cBhvr>
-                                        <p:cTn id="24" dur="1" fill="hold">
+                                        <p:cTn id="26" dur="1" fill="hold">
                                           <p:stCondLst>
                                             <p:cond delay="0"/>
                                           </p:stCondLst>

</xml_diff>